<commit_message>
got background slides and references
</commit_message>
<xml_diff>
--- a/presentation/opioid_powerpoint.pptx
+++ b/presentation/opioid_powerpoint.pptx
@@ -7,16 +7,17 @@
   <p:sldIdLst>
     <p:sldId id="273" r:id="rId5"/>
     <p:sldId id="289" r:id="rId6"/>
-    <p:sldId id="290" r:id="rId7"/>
-    <p:sldId id="291" r:id="rId8"/>
-    <p:sldId id="292" r:id="rId9"/>
-    <p:sldId id="293" r:id="rId10"/>
-    <p:sldId id="294" r:id="rId11"/>
-    <p:sldId id="295" r:id="rId12"/>
-    <p:sldId id="296" r:id="rId13"/>
-    <p:sldId id="297" r:id="rId14"/>
-    <p:sldId id="298" r:id="rId15"/>
-    <p:sldId id="288" r:id="rId16"/>
+    <p:sldId id="299" r:id="rId7"/>
+    <p:sldId id="290" r:id="rId8"/>
+    <p:sldId id="291" r:id="rId9"/>
+    <p:sldId id="292" r:id="rId10"/>
+    <p:sldId id="293" r:id="rId11"/>
+    <p:sldId id="294" r:id="rId12"/>
+    <p:sldId id="295" r:id="rId13"/>
+    <p:sldId id="296" r:id="rId14"/>
+    <p:sldId id="297" r:id="rId15"/>
+    <p:sldId id="298" r:id="rId16"/>
+    <p:sldId id="288" r:id="rId17"/>
   </p:sldIdLst>
   <p:sldSz cx="12192000" cy="6858000"/>
   <p:notesSz cx="6858000" cy="9144000"/>
@@ -116,11 +117,48 @@
     </a:lvl9pPr>
   </p:defaultTextStyle>
   <p:extLst>
+    <p:ext uri="{521415D9-36F7-43E2-AB2F-B90AF26B5E84}">
+      <p14:sectionLst xmlns:p14="http://schemas.microsoft.com/office/powerpoint/2010/main">
+        <p14:section name="Default Section" id="{035AE13C-CF27-42AF-A2C0-13D4605B95A7}">
+          <p14:sldIdLst>
+            <p14:sldId id="273"/>
+          </p14:sldIdLst>
+        </p14:section>
+        <p14:section name="Untitled Section" id="{8745A176-7A97-464A-882C-F2C8C4BAA2AB}">
+          <p14:sldIdLst>
+            <p14:sldId id="289"/>
+            <p14:sldId id="299"/>
+            <p14:sldId id="290"/>
+            <p14:sldId id="291"/>
+            <p14:sldId id="292"/>
+            <p14:sldId id="293"/>
+            <p14:sldId id="294"/>
+            <p14:sldId id="295"/>
+            <p14:sldId id="296"/>
+            <p14:sldId id="297"/>
+            <p14:sldId id="298"/>
+            <p14:sldId id="288"/>
+          </p14:sldIdLst>
+        </p14:section>
+      </p14:sectionLst>
+    </p:ext>
     <p:ext uri="{EFAFB233-063F-42B5-8137-9DF3F51BA10A}">
       <p15:sldGuideLst xmlns:p15="http://schemas.microsoft.com/office/powerpoint/2012/main"/>
     </p:ext>
   </p:extLst>
 </p:presentation>
+</file>
+
+<file path=ppt/commentAuthors.xml><?xml version="1.0" encoding="utf-8"?>
+<p:cmAuthorLst xmlns:a="http://schemas.openxmlformats.org/drawingml/2006/main" xmlns:r="http://schemas.openxmlformats.org/officeDocument/2006/relationships" xmlns:p="http://schemas.openxmlformats.org/presentationml/2006/main">
+  <p:cmAuthor id="1" name="Megan Skrobacz" initials="MS" lastIdx="1" clrIdx="0">
+    <p:extLst>
+      <p:ext uri="{19B8F6BF-5375-455C-9EA6-DF929625EA0E}">
+        <p15:presenceInfo xmlns:p15="http://schemas.microsoft.com/office/powerpoint/2012/main" userId="S::skrobacz.m@northeastern.edu::c229df5e-7657-43a2-ac4f-70ac52e6265e" providerId="AD"/>
+      </p:ext>
+    </p:extLst>
+  </p:cmAuthor>
+</p:cmAuthorLst>
 </file>
 
 <file path=ppt/diagrams/colors1.xml><?xml version="1.0" encoding="utf-8"?>
@@ -7429,6 +7467,89 @@
           <p:cNvPr id="2" name="Title 1">
             <a:extLst>
               <a:ext uri="{FF2B5EF4-FFF2-40B4-BE49-F238E27FC236}">
+                <a16:creationId xmlns:a16="http://schemas.microsoft.com/office/drawing/2014/main" id="{459CEFF6-037D-4787-B1CC-ADDDAAAC0433}"/>
+              </a:ext>
+            </a:extLst>
+          </p:cNvPr>
+          <p:cNvSpPr>
+            <a:spLocks noGrp="1"/>
+          </p:cNvSpPr>
+          <p:nvPr>
+            <p:ph type="title"/>
+          </p:nvPr>
+        </p:nvSpPr>
+        <p:spPr/>
+        <p:txBody>
+          <a:bodyPr/>
+          <a:lstStyle/>
+          <a:p>
+            <a:r>
+              <a:rPr lang="en-US" dirty="0"/>
+              <a:t>conclusions</a:t>
+            </a:r>
+          </a:p>
+        </p:txBody>
+      </p:sp>
+      <p:sp>
+        <p:nvSpPr>
+          <p:cNvPr id="3" name="Content Placeholder 2">
+            <a:extLst>
+              <a:ext uri="{FF2B5EF4-FFF2-40B4-BE49-F238E27FC236}">
+                <a16:creationId xmlns:a16="http://schemas.microsoft.com/office/drawing/2014/main" id="{9EC8D954-35D9-44B2-8BBC-135897DA6B09}"/>
+              </a:ext>
+            </a:extLst>
+          </p:cNvPr>
+          <p:cNvSpPr>
+            <a:spLocks noGrp="1"/>
+          </p:cNvSpPr>
+          <p:nvPr>
+            <p:ph idx="1"/>
+          </p:nvPr>
+        </p:nvSpPr>
+        <p:spPr/>
+        <p:txBody>
+          <a:bodyPr/>
+          <a:lstStyle/>
+          <a:p>
+            <a:endParaRPr lang="en-US" dirty="0"/>
+          </a:p>
+        </p:txBody>
+      </p:sp>
+    </p:spTree>
+    <p:extLst>
+      <p:ext uri="{BB962C8B-B14F-4D97-AF65-F5344CB8AC3E}">
+        <p14:creationId xmlns:p14="http://schemas.microsoft.com/office/powerpoint/2010/main" val="2824099778"/>
+      </p:ext>
+    </p:extLst>
+  </p:cSld>
+  <p:clrMapOvr>
+    <a:masterClrMapping/>
+  </p:clrMapOvr>
+</p:sld>
+</file>
+
+<file path=ppt/slides/slide11.xml><?xml version="1.0" encoding="utf-8"?>
+<p:sld xmlns:a="http://schemas.openxmlformats.org/drawingml/2006/main" xmlns:r="http://schemas.openxmlformats.org/officeDocument/2006/relationships" xmlns:p="http://schemas.openxmlformats.org/presentationml/2006/main">
+  <p:cSld>
+    <p:spTree>
+      <p:nvGrpSpPr>
+        <p:cNvPr id="1" name=""/>
+        <p:cNvGrpSpPr/>
+        <p:nvPr/>
+      </p:nvGrpSpPr>
+      <p:grpSpPr>
+        <a:xfrm>
+          <a:off x="0" y="0"/>
+          <a:ext cx="0" cy="0"/>
+          <a:chOff x="0" y="0"/>
+          <a:chExt cx="0" cy="0"/>
+        </a:xfrm>
+      </p:grpSpPr>
+      <p:sp>
+        <p:nvSpPr>
+          <p:cNvPr id="2" name="Title 1">
+            <a:extLst>
+              <a:ext uri="{FF2B5EF4-FFF2-40B4-BE49-F238E27FC236}">
                 <a16:creationId xmlns:a16="http://schemas.microsoft.com/office/drawing/2014/main" id="{DF699B60-68C0-4659-8C6B-6A8EACDE70BA}"/>
               </a:ext>
             </a:extLst>
@@ -7470,8 +7591,179 @@
         </p:nvSpPr>
         <p:spPr/>
         <p:txBody>
-          <a:bodyPr/>
+          <a:bodyPr>
+            <a:normAutofit fontScale="85000" lnSpcReduction="20000"/>
+          </a:bodyPr>
           <a:lstStyle/>
+          <a:p>
+            <a:r>
+              <a:rPr lang="en-US" dirty="0"/>
+              <a:t>[1] “Unintentional Drug Poisoning in the United States”, </a:t>
+            </a:r>
+            <a:r>
+              <a:rPr lang="en-US" i="1" dirty="0"/>
+              <a:t>Center for Disease Control</a:t>
+            </a:r>
+            <a:r>
+              <a:rPr lang="en-US" dirty="0"/>
+              <a:t>, </a:t>
+            </a:r>
+            <a:r>
+              <a:rPr lang="en-US" dirty="0">
+                <a:hlinkClick r:id="rId2"/>
+              </a:rPr>
+              <a:t>https://www.cdc.gov/medicationsafety/pdfs/cdc_5538_ds1.pdf</a:t>
+            </a:r>
+            <a:endParaRPr lang="en-US" dirty="0"/>
+          </a:p>
+          <a:p>
+            <a:r>
+              <a:rPr lang="en-US" dirty="0"/>
+              <a:t>[2] Dowell D, Arias E, </a:t>
+            </a:r>
+            <a:r>
+              <a:rPr lang="en-US" dirty="0" err="1"/>
+              <a:t>Kochanek</a:t>
+            </a:r>
+            <a:r>
+              <a:rPr lang="en-US" dirty="0"/>
+              <a:t> K, et al. Contribution of Opioid-Involved Poisoning to the Change in Life Expectancy in the United States, 2000-2015. </a:t>
+            </a:r>
+            <a:r>
+              <a:rPr lang="en-US" i="1" dirty="0"/>
+              <a:t>JAMA</a:t>
+            </a:r>
+            <a:r>
+              <a:rPr lang="en-US" dirty="0"/>
+              <a:t>. 2017;318(11):1065–1067. doi:10.1001/jama.2017.9308</a:t>
+            </a:r>
+          </a:p>
+          <a:p>
+            <a:r>
+              <a:rPr lang="en-US" dirty="0"/>
+              <a:t>[3] Florence CS, Zhou C, Luo F, Xu L. The Economic Burden of Prescription Opioid Overdose, Abuse, and Dependence in the United States, 2013. </a:t>
+            </a:r>
+            <a:r>
+              <a:rPr lang="en-US" i="1" dirty="0"/>
+              <a:t>Med Care</a:t>
+            </a:r>
+            <a:r>
+              <a:rPr lang="en-US" dirty="0"/>
+              <a:t>. 2016;54(10):901-906. doi:10.1097/MLR.0000000000000625.</a:t>
+            </a:r>
+          </a:p>
+          <a:p>
+            <a:r>
+              <a:rPr lang="en-US" dirty="0"/>
+              <a:t>[4] J. </a:t>
+            </a:r>
+            <a:r>
+              <a:rPr lang="en-US" dirty="0" err="1"/>
+              <a:t>Huinker</a:t>
+            </a:r>
+            <a:r>
+              <a:rPr lang="en-US" dirty="0"/>
+              <a:t>. Using machine learning to predict prescription opioid misuse in patients. </a:t>
+            </a:r>
+            <a:r>
+              <a:rPr lang="en-US" i="1" dirty="0"/>
+              <a:t>Iowa State University Digital Repository, </a:t>
+            </a:r>
+            <a:r>
+              <a:rPr lang="en-US" dirty="0"/>
+              <a:t>194, 2019. </a:t>
+            </a:r>
+          </a:p>
+          <a:p>
+            <a:r>
+              <a:rPr lang="en-US" dirty="0"/>
+              <a:t>[5] A. E. Kilby. Algorithmic fairness in predicting opioid use disorder using machine learning. In </a:t>
+            </a:r>
+            <a:r>
+              <a:rPr lang="en-US" i="1" dirty="0"/>
+              <a:t>Proceedings of the 2021 ACM Conference on Fairness, Accountability, and Transparency</a:t>
+            </a:r>
+            <a:r>
+              <a:rPr lang="en-US" dirty="0"/>
+              <a:t>, </a:t>
+            </a:r>
+            <a:r>
+              <a:rPr lang="en-US" dirty="0" err="1"/>
+              <a:t>FAccT</a:t>
+            </a:r>
+            <a:r>
+              <a:rPr lang="en-US" dirty="0"/>
+              <a:t> ’21, page 272, New York, NY, USA, 2021. Association for Computing Machinery. </a:t>
+            </a:r>
+          </a:p>
+          <a:p>
+            <a:r>
+              <a:rPr lang="en-US" dirty="0"/>
+              <a:t>[6] W.-H. Lo-</a:t>
+            </a:r>
+            <a:r>
+              <a:rPr lang="en-US" dirty="0" err="1"/>
+              <a:t>Ciganic</a:t>
+            </a:r>
+            <a:r>
+              <a:rPr lang="en-US" dirty="0"/>
+              <a:t>, J. L. Huang, H. H. Zhang, J. C. Weiss, Y. Wu, C. K. </a:t>
+            </a:r>
+            <a:r>
+              <a:rPr lang="en-US" dirty="0" err="1"/>
+              <a:t>Kwoh</a:t>
+            </a:r>
+            <a:r>
+              <a:rPr lang="en-US" dirty="0"/>
+              <a:t>, J. M. Donohue, G. Cochran, A. J. Gordon, D. C. Malone, C. C. </a:t>
+            </a:r>
+            <a:r>
+              <a:rPr lang="en-US" dirty="0" err="1"/>
+              <a:t>Kuza</a:t>
+            </a:r>
+            <a:r>
+              <a:rPr lang="en-US" dirty="0"/>
+              <a:t>, and W. F. </a:t>
+            </a:r>
+            <a:r>
+              <a:rPr lang="en-US" dirty="0" err="1"/>
+              <a:t>Gellad</a:t>
+            </a:r>
+            <a:r>
+              <a:rPr lang="en-US" dirty="0"/>
+              <a:t>. Evaluation of machine-learning algorithms for predicting opioid overdose risk among </a:t>
+            </a:r>
+            <a:r>
+              <a:rPr lang="en-US" dirty="0" err="1"/>
+              <a:t>medicare</a:t>
+            </a:r>
+            <a:r>
+              <a:rPr lang="en-US" dirty="0"/>
+              <a:t> beneficiaries with opioid prescriptions. </a:t>
+            </a:r>
+            <a:r>
+              <a:rPr lang="en-US" i="1" dirty="0"/>
+              <a:t>JAMA Network Open</a:t>
+            </a:r>
+            <a:r>
+              <a:rPr lang="en-US" dirty="0"/>
+              <a:t>, 2(3):e190968–e190968, 03 2019. </a:t>
+            </a:r>
+          </a:p>
+          <a:p>
+            <a:r>
+              <a:rPr lang="en-US" dirty="0"/>
+              <a:t>[7] M. Szalavitz. A drug addiction risk algorithm and its grim toll on chronic pain sufferers, </a:t>
+            </a:r>
+            <a:r>
+              <a:rPr lang="en-US" i="1" dirty="0"/>
+              <a:t>Wired, </a:t>
+            </a:r>
+            <a:r>
+              <a:rPr lang="en-US" dirty="0"/>
+              <a:t>08 2021.</a:t>
+            </a:r>
+          </a:p>
           <a:p>
             <a:endParaRPr lang="en-US" dirty="0"/>
           </a:p>
@@ -7490,7 +7782,7 @@
 </p:sld>
 </file>
 
-<file path=ppt/slides/slide11.xml><?xml version="1.0" encoding="utf-8"?>
+<file path=ppt/slides/slide12.xml><?xml version="1.0" encoding="utf-8"?>
 <p:sld xmlns:a="http://schemas.openxmlformats.org/drawingml/2006/main" xmlns:r="http://schemas.openxmlformats.org/officeDocument/2006/relationships" xmlns:p="http://schemas.openxmlformats.org/presentationml/2006/main">
   <p:cSld>
     <p:spTree>
@@ -7554,7 +7846,7 @@
 </p:sld>
 </file>
 
-<file path=ppt/slides/slide12.xml><?xml version="1.0" encoding="utf-8"?>
+<file path=ppt/slides/slide13.xml><?xml version="1.0" encoding="utf-8"?>
 <p:sld xmlns:a="http://schemas.openxmlformats.org/drawingml/2006/main" xmlns:r="http://schemas.openxmlformats.org/officeDocument/2006/relationships" xmlns:p="http://schemas.openxmlformats.org/presentationml/2006/main">
   <p:cSld>
     <p:bg>
@@ -7668,6 +7960,14 @@
 <file path=ppt/slides/slide2.xml><?xml version="1.0" encoding="utf-8"?>
 <p:sld xmlns:a="http://schemas.openxmlformats.org/drawingml/2006/main" xmlns:r="http://schemas.openxmlformats.org/officeDocument/2006/relationships" xmlns:p="http://schemas.openxmlformats.org/presentationml/2006/main">
   <p:cSld>
+    <p:bg>
+      <p:bgPr>
+        <a:solidFill>
+          <a:schemeClr val="bg1"/>
+        </a:solidFill>
+        <a:effectLst/>
+      </p:bgPr>
+    </p:bg>
     <p:spTree>
       <p:nvGrpSpPr>
         <p:cNvPr id="1" name=""/>
@@ -7684,6 +7984,447 @@
       </p:grpSpPr>
       <p:sp>
         <p:nvSpPr>
+          <p:cNvPr id="71" name="Rectangle 70">
+            <a:extLst>
+              <a:ext uri="{FF2B5EF4-FFF2-40B4-BE49-F238E27FC236}">
+                <a16:creationId xmlns:a16="http://schemas.microsoft.com/office/drawing/2014/main" id="{DD651B61-325E-4E73-8445-38B0DE8AAAB6}"/>
+              </a:ext>
+              <a:ext uri="{C183D7F6-B498-43B3-948B-1728B52AA6E4}">
+                <adec:decorative xmlns:adec="http://schemas.microsoft.com/office/drawing/2017/decorative" val="1"/>
+              </a:ext>
+            </a:extLst>
+          </p:cNvPr>
+          <p:cNvSpPr>
+            <a:spLocks noGrp="1" noRot="1" noChangeAspect="1" noMove="1" noResize="1" noEditPoints="1" noAdjustHandles="1" noChangeArrowheads="1" noChangeShapeType="1" noTextEdit="1"/>
+          </p:cNvSpPr>
+          <p:nvPr>
+            <p:extLst>
+              <p:ext uri="{386F3935-93C4-4BCD-93E2-E3B085C9AB24}">
+                <p16:designElem xmlns:p16="http://schemas.microsoft.com/office/powerpoint/2015/main" val="1"/>
+              </p:ext>
+            </p:extLst>
+          </p:nvPr>
+        </p:nvSpPr>
+        <p:spPr>
+          <a:xfrm>
+            <a:off x="446534" y="457200"/>
+            <a:ext cx="3703320" cy="94997"/>
+          </a:xfrm>
+          <a:prstGeom prst="rect">
+            <a:avLst/>
+          </a:prstGeom>
+          <a:solidFill>
+            <a:srgbClr val="465359"/>
+          </a:solidFill>
+          <a:ln>
+            <a:noFill/>
+          </a:ln>
+          <a:effectLst/>
+        </p:spPr>
+        <p:style>
+          <a:lnRef idx="1">
+            <a:schemeClr val="accent1"/>
+          </a:lnRef>
+          <a:fillRef idx="3">
+            <a:schemeClr val="accent1"/>
+          </a:fillRef>
+          <a:effectRef idx="2">
+            <a:schemeClr val="accent1"/>
+          </a:effectRef>
+          <a:fontRef idx="minor">
+            <a:schemeClr val="lt1"/>
+          </a:fontRef>
+        </p:style>
+      </p:sp>
+      <p:sp>
+        <p:nvSpPr>
+          <p:cNvPr id="73" name="Rectangle 72">
+            <a:extLst>
+              <a:ext uri="{FF2B5EF4-FFF2-40B4-BE49-F238E27FC236}">
+                <a16:creationId xmlns:a16="http://schemas.microsoft.com/office/drawing/2014/main" id="{B42E5253-D3AC-4AC2-B766-8B34F13C2F5E}"/>
+              </a:ext>
+              <a:ext uri="{C183D7F6-B498-43B3-948B-1728B52AA6E4}">
+                <adec:decorative xmlns:adec="http://schemas.microsoft.com/office/drawing/2017/decorative" val="1"/>
+              </a:ext>
+            </a:extLst>
+          </p:cNvPr>
+          <p:cNvSpPr>
+            <a:spLocks noGrp="1" noRot="1" noChangeAspect="1" noMove="1" noResize="1" noEditPoints="1" noAdjustHandles="1" noChangeArrowheads="1" noChangeShapeType="1" noTextEdit="1"/>
+          </p:cNvSpPr>
+          <p:nvPr>
+            <p:extLst>
+              <p:ext uri="{386F3935-93C4-4BCD-93E2-E3B085C9AB24}">
+                <p16:designElem xmlns:p16="http://schemas.microsoft.com/office/powerpoint/2015/main" val="1"/>
+              </p:ext>
+            </p:extLst>
+          </p:nvPr>
+        </p:nvSpPr>
+        <p:spPr>
+          <a:xfrm>
+            <a:off x="8042147" y="453643"/>
+            <a:ext cx="3703320" cy="98554"/>
+          </a:xfrm>
+          <a:prstGeom prst="rect">
+            <a:avLst/>
+          </a:prstGeom>
+          <a:solidFill>
+            <a:srgbClr val="969FA7"/>
+          </a:solidFill>
+          <a:ln>
+            <a:noFill/>
+          </a:ln>
+          <a:effectLst/>
+        </p:spPr>
+        <p:style>
+          <a:lnRef idx="1">
+            <a:schemeClr val="accent1"/>
+          </a:lnRef>
+          <a:fillRef idx="3">
+            <a:schemeClr val="accent1"/>
+          </a:fillRef>
+          <a:effectRef idx="2">
+            <a:schemeClr val="accent1"/>
+          </a:effectRef>
+          <a:fontRef idx="minor">
+            <a:schemeClr val="lt1"/>
+          </a:fontRef>
+        </p:style>
+      </p:sp>
+      <p:sp>
+        <p:nvSpPr>
+          <p:cNvPr id="75" name="Rectangle 74">
+            <a:extLst>
+              <a:ext uri="{FF2B5EF4-FFF2-40B4-BE49-F238E27FC236}">
+                <a16:creationId xmlns:a16="http://schemas.microsoft.com/office/drawing/2014/main" id="{10AE8D57-436A-4073-9A75-15BB5949F8B4}"/>
+              </a:ext>
+              <a:ext uri="{C183D7F6-B498-43B3-948B-1728B52AA6E4}">
+                <adec:decorative xmlns:adec="http://schemas.microsoft.com/office/drawing/2017/decorative" val="1"/>
+              </a:ext>
+            </a:extLst>
+          </p:cNvPr>
+          <p:cNvSpPr>
+            <a:spLocks noGrp="1" noRot="1" noChangeAspect="1" noMove="1" noResize="1" noEditPoints="1" noAdjustHandles="1" noChangeArrowheads="1" noChangeShapeType="1" noTextEdit="1"/>
+          </p:cNvSpPr>
+          <p:nvPr>
+            <p:extLst>
+              <p:ext uri="{386F3935-93C4-4BCD-93E2-E3B085C9AB24}">
+                <p16:designElem xmlns:p16="http://schemas.microsoft.com/office/powerpoint/2015/main" val="1"/>
+              </p:ext>
+            </p:extLst>
+          </p:nvPr>
+        </p:nvSpPr>
+        <p:spPr>
+          <a:xfrm>
+            <a:off x="4241830" y="457200"/>
+            <a:ext cx="3703320" cy="91440"/>
+          </a:xfrm>
+          <a:prstGeom prst="rect">
+            <a:avLst/>
+          </a:prstGeom>
+          <a:solidFill>
+            <a:schemeClr val="accent1"/>
+          </a:solidFill>
+          <a:ln>
+            <a:noFill/>
+          </a:ln>
+          <a:effectLst/>
+        </p:spPr>
+        <p:style>
+          <a:lnRef idx="1">
+            <a:schemeClr val="accent1"/>
+          </a:lnRef>
+          <a:fillRef idx="3">
+            <a:schemeClr val="accent1"/>
+          </a:fillRef>
+          <a:effectRef idx="2">
+            <a:schemeClr val="accent1"/>
+          </a:effectRef>
+          <a:fontRef idx="minor">
+            <a:schemeClr val="lt1"/>
+          </a:fontRef>
+        </p:style>
+      </p:sp>
+      <p:sp>
+        <p:nvSpPr>
+          <p:cNvPr id="77" name="Rectangle 76">
+            <a:extLst>
+              <a:ext uri="{FF2B5EF4-FFF2-40B4-BE49-F238E27FC236}">
+                <a16:creationId xmlns:a16="http://schemas.microsoft.com/office/drawing/2014/main" id="{E9751CB9-7B25-4EB8-9A6F-82F822549F12}"/>
+              </a:ext>
+              <a:ext uri="{C183D7F6-B498-43B3-948B-1728B52AA6E4}">
+                <adec:decorative xmlns:adec="http://schemas.microsoft.com/office/drawing/2017/decorative" val="1"/>
+              </a:ext>
+            </a:extLst>
+          </p:cNvPr>
+          <p:cNvSpPr>
+            <a:spLocks noGrp="1" noRot="1" noChangeAspect="1" noMove="1" noResize="1" noEditPoints="1" noAdjustHandles="1" noChangeArrowheads="1" noChangeShapeType="1" noTextEdit="1"/>
+          </p:cNvSpPr>
+          <p:nvPr>
+            <p:extLst>
+              <p:ext uri="{386F3935-93C4-4BCD-93E2-E3B085C9AB24}">
+                <p16:designElem xmlns:p16="http://schemas.microsoft.com/office/powerpoint/2015/main" val="1"/>
+              </p:ext>
+            </p:extLst>
+          </p:nvPr>
+        </p:nvSpPr>
+        <p:spPr>
+          <a:xfrm>
+            <a:off x="0" y="0"/>
+            <a:ext cx="12192000" cy="6858000"/>
+          </a:xfrm>
+          <a:prstGeom prst="rect">
+            <a:avLst/>
+          </a:prstGeom>
+          <a:solidFill>
+            <a:srgbClr val="FFFFFF"/>
+          </a:solidFill>
+          <a:ln>
+            <a:noFill/>
+          </a:ln>
+        </p:spPr>
+        <p:style>
+          <a:lnRef idx="2">
+            <a:schemeClr val="accent1">
+              <a:shade val="50000"/>
+            </a:schemeClr>
+          </a:lnRef>
+          <a:fillRef idx="1">
+            <a:schemeClr val="accent1"/>
+          </a:fillRef>
+          <a:effectRef idx="0">
+            <a:schemeClr val="accent1"/>
+          </a:effectRef>
+          <a:fontRef idx="minor">
+            <a:schemeClr val="lt1"/>
+          </a:fontRef>
+        </p:style>
+        <p:txBody>
+          <a:bodyPr rtlCol="0" anchor="ctr"/>
+          <a:lstStyle/>
+          <a:p>
+            <a:pPr algn="ctr"/>
+            <a:endParaRPr lang="en-US"/>
+          </a:p>
+        </p:txBody>
+      </p:sp>
+      <p:sp>
+        <p:nvSpPr>
+          <p:cNvPr id="79" name="Rectangle 78">
+            <a:extLst>
+              <a:ext uri="{FF2B5EF4-FFF2-40B4-BE49-F238E27FC236}">
+                <a16:creationId xmlns:a16="http://schemas.microsoft.com/office/drawing/2014/main" id="{E1317383-CF3B-4B02-9512-BECBEF6362A4}"/>
+              </a:ext>
+              <a:ext uri="{C183D7F6-B498-43B3-948B-1728B52AA6E4}">
+                <adec:decorative xmlns:adec="http://schemas.microsoft.com/office/drawing/2017/decorative" val="1"/>
+              </a:ext>
+            </a:extLst>
+          </p:cNvPr>
+          <p:cNvSpPr>
+            <a:spLocks noGrp="1" noRot="1" noChangeAspect="1" noMove="1" noResize="1" noEditPoints="1" noAdjustHandles="1" noChangeArrowheads="1" noChangeShapeType="1" noTextEdit="1"/>
+          </p:cNvSpPr>
+          <p:nvPr>
+            <p:extLst>
+              <p:ext uri="{386F3935-93C4-4BCD-93E2-E3B085C9AB24}">
+                <p16:designElem xmlns:p16="http://schemas.microsoft.com/office/powerpoint/2015/main" val="1"/>
+              </p:ext>
+            </p:extLst>
+          </p:nvPr>
+        </p:nvSpPr>
+        <p:spPr>
+          <a:xfrm>
+            <a:off x="446534" y="457200"/>
+            <a:ext cx="3703320" cy="94997"/>
+          </a:xfrm>
+          <a:prstGeom prst="rect">
+            <a:avLst/>
+          </a:prstGeom>
+          <a:solidFill>
+            <a:srgbClr val="465359"/>
+          </a:solidFill>
+          <a:ln>
+            <a:noFill/>
+          </a:ln>
+          <a:effectLst/>
+        </p:spPr>
+        <p:style>
+          <a:lnRef idx="1">
+            <a:schemeClr val="accent1"/>
+          </a:lnRef>
+          <a:fillRef idx="3">
+            <a:schemeClr val="accent1"/>
+          </a:fillRef>
+          <a:effectRef idx="2">
+            <a:schemeClr val="accent1"/>
+          </a:effectRef>
+          <a:fontRef idx="minor">
+            <a:schemeClr val="lt1"/>
+          </a:fontRef>
+        </p:style>
+      </p:sp>
+      <p:sp>
+        <p:nvSpPr>
+          <p:cNvPr id="81" name="Rectangle 80">
+            <a:extLst>
+              <a:ext uri="{FF2B5EF4-FFF2-40B4-BE49-F238E27FC236}">
+                <a16:creationId xmlns:a16="http://schemas.microsoft.com/office/drawing/2014/main" id="{B1D4C7A0-6DF2-4F2D-A45D-F111582974C7}"/>
+              </a:ext>
+              <a:ext uri="{C183D7F6-B498-43B3-948B-1728B52AA6E4}">
+                <adec:decorative xmlns:adec="http://schemas.microsoft.com/office/drawing/2017/decorative" val="1"/>
+              </a:ext>
+            </a:extLst>
+          </p:cNvPr>
+          <p:cNvSpPr>
+            <a:spLocks noGrp="1" noRot="1" noChangeAspect="1" noMove="1" noResize="1" noEditPoints="1" noAdjustHandles="1" noChangeArrowheads="1" noChangeShapeType="1" noTextEdit="1"/>
+          </p:cNvSpPr>
+          <p:nvPr>
+            <p:extLst>
+              <p:ext uri="{386F3935-93C4-4BCD-93E2-E3B085C9AB24}">
+                <p16:designElem xmlns:p16="http://schemas.microsoft.com/office/powerpoint/2015/main" val="1"/>
+              </p:ext>
+            </p:extLst>
+          </p:nvPr>
+        </p:nvSpPr>
+        <p:spPr>
+          <a:xfrm>
+            <a:off x="4241830" y="457200"/>
+            <a:ext cx="3703320" cy="91440"/>
+          </a:xfrm>
+          <a:prstGeom prst="rect">
+            <a:avLst/>
+          </a:prstGeom>
+          <a:solidFill>
+            <a:schemeClr val="accent1"/>
+          </a:solidFill>
+          <a:ln>
+            <a:noFill/>
+          </a:ln>
+          <a:effectLst/>
+        </p:spPr>
+        <p:style>
+          <a:lnRef idx="1">
+            <a:schemeClr val="accent1"/>
+          </a:lnRef>
+          <a:fillRef idx="3">
+            <a:schemeClr val="accent1"/>
+          </a:fillRef>
+          <a:effectRef idx="2">
+            <a:schemeClr val="accent1"/>
+          </a:effectRef>
+          <a:fontRef idx="minor">
+            <a:schemeClr val="lt1"/>
+          </a:fontRef>
+        </p:style>
+      </p:sp>
+      <p:sp>
+        <p:nvSpPr>
+          <p:cNvPr id="83" name="Rectangle 82">
+            <a:extLst>
+              <a:ext uri="{FF2B5EF4-FFF2-40B4-BE49-F238E27FC236}">
+                <a16:creationId xmlns:a16="http://schemas.microsoft.com/office/drawing/2014/main" id="{DBF3943D-BCB6-4B31-809D-A005686483B4}"/>
+              </a:ext>
+              <a:ext uri="{C183D7F6-B498-43B3-948B-1728B52AA6E4}">
+                <adec:decorative xmlns:adec="http://schemas.microsoft.com/office/drawing/2017/decorative" val="1"/>
+              </a:ext>
+            </a:extLst>
+          </p:cNvPr>
+          <p:cNvSpPr>
+            <a:spLocks noGrp="1" noRot="1" noChangeAspect="1" noMove="1" noResize="1" noEditPoints="1" noAdjustHandles="1" noChangeArrowheads="1" noChangeShapeType="1" noTextEdit="1"/>
+          </p:cNvSpPr>
+          <p:nvPr>
+            <p:extLst>
+              <p:ext uri="{386F3935-93C4-4BCD-93E2-E3B085C9AB24}">
+                <p16:designElem xmlns:p16="http://schemas.microsoft.com/office/powerpoint/2015/main" val="1"/>
+              </p:ext>
+            </p:extLst>
+          </p:nvPr>
+        </p:nvSpPr>
+        <p:spPr>
+          <a:xfrm>
+            <a:off x="8042147" y="453643"/>
+            <a:ext cx="3703320" cy="98554"/>
+          </a:xfrm>
+          <a:prstGeom prst="rect">
+            <a:avLst/>
+          </a:prstGeom>
+          <a:solidFill>
+            <a:srgbClr val="969FA7"/>
+          </a:solidFill>
+          <a:ln>
+            <a:noFill/>
+          </a:ln>
+          <a:effectLst/>
+        </p:spPr>
+        <p:style>
+          <a:lnRef idx="1">
+            <a:schemeClr val="accent1"/>
+          </a:lnRef>
+          <a:fillRef idx="3">
+            <a:schemeClr val="accent1"/>
+          </a:fillRef>
+          <a:effectRef idx="2">
+            <a:schemeClr val="accent1"/>
+          </a:effectRef>
+          <a:fontRef idx="minor">
+            <a:schemeClr val="lt1"/>
+          </a:fontRef>
+        </p:style>
+      </p:sp>
+      <p:sp>
+        <p:nvSpPr>
+          <p:cNvPr id="85" name="Rectangle 84">
+            <a:extLst>
+              <a:ext uri="{FF2B5EF4-FFF2-40B4-BE49-F238E27FC236}">
+                <a16:creationId xmlns:a16="http://schemas.microsoft.com/office/drawing/2014/main" id="{39373A6F-2E1F-4613-8E1D-D68057D29F31}"/>
+              </a:ext>
+              <a:ext uri="{C183D7F6-B498-43B3-948B-1728B52AA6E4}">
+                <adec:decorative xmlns:adec="http://schemas.microsoft.com/office/drawing/2017/decorative" val="1"/>
+              </a:ext>
+            </a:extLst>
+          </p:cNvPr>
+          <p:cNvSpPr>
+            <a:spLocks noGrp="1" noRot="1" noChangeAspect="1" noMove="1" noResize="1" noEditPoints="1" noAdjustHandles="1" noChangeArrowheads="1" noChangeShapeType="1" noTextEdit="1"/>
+          </p:cNvSpPr>
+          <p:nvPr>
+            <p:extLst>
+              <p:ext uri="{386F3935-93C4-4BCD-93E2-E3B085C9AB24}">
+                <p16:designElem xmlns:p16="http://schemas.microsoft.com/office/powerpoint/2015/main" val="1"/>
+              </p:ext>
+            </p:extLst>
+          </p:nvPr>
+        </p:nvSpPr>
+        <p:spPr>
+          <a:xfrm>
+            <a:off x="442377" y="601200"/>
+            <a:ext cx="3707477" cy="5624979"/>
+          </a:xfrm>
+          <a:prstGeom prst="rect">
+            <a:avLst/>
+          </a:prstGeom>
+          <a:solidFill>
+            <a:srgbClr val="465359"/>
+          </a:solidFill>
+          <a:ln>
+            <a:noFill/>
+          </a:ln>
+          <a:effectLst/>
+        </p:spPr>
+        <p:style>
+          <a:lnRef idx="1">
+            <a:schemeClr val="accent1"/>
+          </a:lnRef>
+          <a:fillRef idx="3">
+            <a:schemeClr val="accent1"/>
+          </a:fillRef>
+          <a:effectRef idx="2">
+            <a:schemeClr val="accent1"/>
+          </a:effectRef>
+          <a:fontRef idx="minor">
+            <a:schemeClr val="lt1"/>
+          </a:fontRef>
+        </p:style>
+      </p:sp>
+      <p:sp>
+        <p:nvSpPr>
           <p:cNvPr id="2" name="Title 1">
             <a:extLst>
               <a:ext uri="{FF2B5EF4-FFF2-40B4-BE49-F238E27FC236}">
@@ -7698,14 +8439,25 @@
             <p:ph type="title"/>
           </p:nvPr>
         </p:nvSpPr>
-        <p:spPr/>
+        <p:spPr>
+          <a:xfrm>
+            <a:off x="601255" y="702155"/>
+            <a:ext cx="3409783" cy="1300365"/>
+          </a:xfrm>
+        </p:spPr>
         <p:txBody>
-          <a:bodyPr/>
+          <a:bodyPr vert="horz" lIns="91440" tIns="45720" rIns="91440" bIns="45720" rtlCol="0" anchor="b">
+            <a:normAutofit/>
+          </a:bodyPr>
           <a:lstStyle/>
           <a:p>
             <a:r>
-              <a:rPr lang="en-US" dirty="0"/>
-              <a:t>Background and Motivation</a:t>
+              <a:rPr lang="en-US" dirty="0">
+                <a:solidFill>
+                  <a:srgbClr val="FFFFFF"/>
+                </a:solidFill>
+              </a:rPr>
+              <a:t>Background &amp; Motivation</a:t>
             </a:r>
           </a:p>
         </p:txBody>
@@ -7723,15 +8475,161 @@
             <a:spLocks noGrp="1"/>
           </p:cNvSpPr>
           <p:nvPr>
-            <p:ph idx="1"/>
+            <p:ph sz="half" idx="1"/>
           </p:nvPr>
         </p:nvSpPr>
-        <p:spPr/>
+        <p:spPr>
+          <a:xfrm>
+            <a:off x="601255" y="2177142"/>
+            <a:ext cx="3409782" cy="3823607"/>
+          </a:xfrm>
+        </p:spPr>
         <p:txBody>
-          <a:bodyPr/>
+          <a:bodyPr vert="horz" lIns="91440" tIns="45720" rIns="91440" bIns="45720" rtlCol="0" anchor="ctr">
+            <a:normAutofit/>
+          </a:bodyPr>
           <a:lstStyle/>
           <a:p>
-            <a:endParaRPr lang="en-US"/>
+            <a:r>
+              <a:rPr lang="en-US" dirty="0">
+                <a:solidFill>
+                  <a:srgbClr val="FFFFFF"/>
+                </a:solidFill>
+              </a:rPr>
+              <a:t>We wanted to study a topic which would involve a social problem to potentially use ML to help solve it</a:t>
+            </a:r>
+          </a:p>
+          <a:p>
+            <a:r>
+              <a:rPr lang="en-US" dirty="0">
+                <a:solidFill>
+                  <a:srgbClr val="FFFFFF"/>
+                </a:solidFill>
+              </a:rPr>
+              <a:t>The opioid crisis is one which is agnostic of borders and endemic to many countries</a:t>
+            </a:r>
+          </a:p>
+          <a:p>
+            <a:r>
+              <a:rPr lang="en-US" dirty="0">
+                <a:solidFill>
+                  <a:srgbClr val="FFFFFF"/>
+                </a:solidFill>
+              </a:rPr>
+              <a:t>We chose to focus on the US due to the availability of public datasets</a:t>
+            </a:r>
+          </a:p>
+        </p:txBody>
+      </p:sp>
+      <p:pic>
+        <p:nvPicPr>
+          <p:cNvPr id="1026" name="Picture 2">
+            <a:extLst>
+              <a:ext uri="{FF2B5EF4-FFF2-40B4-BE49-F238E27FC236}">
+                <a16:creationId xmlns:a16="http://schemas.microsoft.com/office/drawing/2014/main" id="{27A52688-77D2-4FF2-AE18-F3E61CBA4E8E}"/>
+              </a:ext>
+            </a:extLst>
+          </p:cNvPr>
+          <p:cNvPicPr>
+            <a:picLocks noGrp="1" noChangeAspect="1" noChangeArrowheads="1"/>
+          </p:cNvPicPr>
+          <p:nvPr>
+            <p:ph sz="half" idx="2"/>
+          </p:nvPr>
+        </p:nvPicPr>
+        <p:blipFill>
+          <a:blip r:embed="rId2">
+            <a:extLst>
+              <a:ext uri="{28A0092B-C50C-407E-A947-70E740481C1C}">
+                <a14:useLocalDpi xmlns:a14="http://schemas.microsoft.com/office/drawing/2010/main" val="0"/>
+              </a:ext>
+            </a:extLst>
+          </a:blip>
+          <a:stretch>
+            <a:fillRect/>
+          </a:stretch>
+        </p:blipFill>
+        <p:spPr bwMode="auto">
+          <a:xfrm>
+            <a:off x="4592231" y="1517061"/>
+            <a:ext cx="6831503" cy="3806465"/>
+          </a:xfrm>
+          <a:prstGeom prst="rect">
+            <a:avLst/>
+          </a:prstGeom>
+          <a:noFill/>
+          <a:extLst>
+            <a:ext uri="{909E8E84-426E-40DD-AFC4-6F175D3DCCD1}">
+              <a14:hiddenFill xmlns:a14="http://schemas.microsoft.com/office/drawing/2010/main">
+                <a:solidFill>
+                  <a:srgbClr val="FFFFFF"/>
+                </a:solidFill>
+              </a14:hiddenFill>
+            </a:ext>
+          </a:extLst>
+        </p:spPr>
+      </p:pic>
+      <p:sp>
+        <p:nvSpPr>
+          <p:cNvPr id="5" name="TextBox 4">
+            <a:extLst>
+              <a:ext uri="{FF2B5EF4-FFF2-40B4-BE49-F238E27FC236}">
+                <a16:creationId xmlns:a16="http://schemas.microsoft.com/office/drawing/2014/main" id="{671A39C4-A031-4101-B1B8-D874A3F1A6C2}"/>
+              </a:ext>
+            </a:extLst>
+          </p:cNvPr>
+          <p:cNvSpPr txBox="1"/>
+          <p:nvPr/>
+        </p:nvSpPr>
+        <p:spPr>
+          <a:xfrm>
+            <a:off x="4592231" y="5461233"/>
+            <a:ext cx="6831503" cy="415498"/>
+          </a:xfrm>
+          <a:prstGeom prst="rect">
+            <a:avLst/>
+          </a:prstGeom>
+          <a:noFill/>
+        </p:spPr>
+        <p:txBody>
+          <a:bodyPr wrap="square" rtlCol="0">
+            <a:spAutoFit/>
+          </a:bodyPr>
+          <a:lstStyle/>
+          <a:p>
+            <a:r>
+              <a:rPr lang="en-US" sz="1050" dirty="0">
+                <a:solidFill>
+                  <a:schemeClr val="bg1"/>
+                </a:solidFill>
+              </a:rPr>
+              <a:t>Image source: Virgil, Sarah. “The Opioid Crisis Is Now Officially A National Emergency. Now What?” </a:t>
+            </a:r>
+            <a:r>
+              <a:rPr lang="en-US" sz="1050" i="1" dirty="0">
+                <a:solidFill>
+                  <a:schemeClr val="bg1"/>
+                </a:solidFill>
+              </a:rPr>
+              <a:t>Hc1.com Inc, </a:t>
+            </a:r>
+            <a:r>
+              <a:rPr lang="en-US" sz="1050" dirty="0">
+                <a:solidFill>
+                  <a:schemeClr val="bg1"/>
+                </a:solidFill>
+                <a:hlinkClick r:id="rId3"/>
+              </a:rPr>
+              <a:t>https://www.hc1.com/blog/the-opioid-crisis-is-now-officially-a-national-emergency-now-what/</a:t>
+            </a:r>
+            <a:r>
+              <a:rPr lang="en-US" sz="1050" dirty="0">
+                <a:solidFill>
+                  <a:schemeClr val="bg1"/>
+                </a:solidFill>
+              </a:rPr>
+              <a:t> </a:t>
+            </a:r>
           </a:p>
         </p:txBody>
       </p:sp>
@@ -7743,7 +8641,7 @@
     </p:extLst>
   </p:cSld>
   <p:clrMapOvr>
-    <a:masterClrMapping/>
+    <a:overrideClrMapping bg1="dk1" tx1="lt1" bg2="dk2" tx2="lt2" accent1="accent1" accent2="accent2" accent3="accent3" accent4="accent4" accent5="accent5" accent6="accent6" hlink="hlink" folHlink="folHlink"/>
   </p:clrMapOvr>
 </p:sld>
 </file>
@@ -7751,6 +8649,14 @@
 <file path=ppt/slides/slide3.xml><?xml version="1.0" encoding="utf-8"?>
 <p:sld xmlns:a="http://schemas.openxmlformats.org/drawingml/2006/main" xmlns:r="http://schemas.openxmlformats.org/officeDocument/2006/relationships" xmlns:p="http://schemas.openxmlformats.org/presentationml/2006/main">
   <p:cSld>
+    <p:bg>
+      <p:bgPr>
+        <a:solidFill>
+          <a:schemeClr val="bg2"/>
+        </a:solidFill>
+        <a:effectLst/>
+      </p:bgPr>
+    </p:bg>
     <p:spTree>
       <p:nvGrpSpPr>
         <p:cNvPr id="1" name=""/>
@@ -7767,6 +8673,831 @@
       </p:grpSpPr>
       <p:sp>
         <p:nvSpPr>
+          <p:cNvPr id="139" name="Rectangle 138">
+            <a:extLst>
+              <a:ext uri="{FF2B5EF4-FFF2-40B4-BE49-F238E27FC236}">
+                <a16:creationId xmlns:a16="http://schemas.microsoft.com/office/drawing/2014/main" id="{DD651B61-325E-4E73-8445-38B0DE8AAAB6}"/>
+              </a:ext>
+              <a:ext uri="{C183D7F6-B498-43B3-948B-1728B52AA6E4}">
+                <adec:decorative xmlns:adec="http://schemas.microsoft.com/office/drawing/2017/decorative" val="1"/>
+              </a:ext>
+            </a:extLst>
+          </p:cNvPr>
+          <p:cNvSpPr>
+            <a:spLocks noGrp="1" noRot="1" noChangeAspect="1" noMove="1" noResize="1" noEditPoints="1" noAdjustHandles="1" noChangeArrowheads="1" noChangeShapeType="1" noTextEdit="1"/>
+          </p:cNvSpPr>
+          <p:nvPr>
+            <p:extLst>
+              <p:ext uri="{386F3935-93C4-4BCD-93E2-E3B085C9AB24}">
+                <p16:designElem xmlns:p16="http://schemas.microsoft.com/office/powerpoint/2015/main" val="1"/>
+              </p:ext>
+            </p:extLst>
+          </p:nvPr>
+        </p:nvSpPr>
+        <p:spPr>
+          <a:xfrm>
+            <a:off x="446534" y="457200"/>
+            <a:ext cx="3703320" cy="94997"/>
+          </a:xfrm>
+          <a:prstGeom prst="rect">
+            <a:avLst/>
+          </a:prstGeom>
+          <a:solidFill>
+            <a:srgbClr val="465359"/>
+          </a:solidFill>
+          <a:ln>
+            <a:noFill/>
+          </a:ln>
+          <a:effectLst/>
+        </p:spPr>
+        <p:style>
+          <a:lnRef idx="1">
+            <a:schemeClr val="accent1"/>
+          </a:lnRef>
+          <a:fillRef idx="3">
+            <a:schemeClr val="accent1"/>
+          </a:fillRef>
+          <a:effectRef idx="2">
+            <a:schemeClr val="accent1"/>
+          </a:effectRef>
+          <a:fontRef idx="minor">
+            <a:schemeClr val="lt1"/>
+          </a:fontRef>
+        </p:style>
+      </p:sp>
+      <p:sp>
+        <p:nvSpPr>
+          <p:cNvPr id="141" name="Rectangle 140">
+            <a:extLst>
+              <a:ext uri="{FF2B5EF4-FFF2-40B4-BE49-F238E27FC236}">
+                <a16:creationId xmlns:a16="http://schemas.microsoft.com/office/drawing/2014/main" id="{B42E5253-D3AC-4AC2-B766-8B34F13C2F5E}"/>
+              </a:ext>
+              <a:ext uri="{C183D7F6-B498-43B3-948B-1728B52AA6E4}">
+                <adec:decorative xmlns:adec="http://schemas.microsoft.com/office/drawing/2017/decorative" val="1"/>
+              </a:ext>
+            </a:extLst>
+          </p:cNvPr>
+          <p:cNvSpPr>
+            <a:spLocks noGrp="1" noRot="1" noChangeAspect="1" noMove="1" noResize="1" noEditPoints="1" noAdjustHandles="1" noChangeArrowheads="1" noChangeShapeType="1" noTextEdit="1"/>
+          </p:cNvSpPr>
+          <p:nvPr>
+            <p:extLst>
+              <p:ext uri="{386F3935-93C4-4BCD-93E2-E3B085C9AB24}">
+                <p16:designElem xmlns:p16="http://schemas.microsoft.com/office/powerpoint/2015/main" val="1"/>
+              </p:ext>
+            </p:extLst>
+          </p:nvPr>
+        </p:nvSpPr>
+        <p:spPr>
+          <a:xfrm>
+            <a:off x="8042147" y="453643"/>
+            <a:ext cx="3703320" cy="98554"/>
+          </a:xfrm>
+          <a:prstGeom prst="rect">
+            <a:avLst/>
+          </a:prstGeom>
+          <a:solidFill>
+            <a:srgbClr val="969FA7"/>
+          </a:solidFill>
+          <a:ln>
+            <a:noFill/>
+          </a:ln>
+          <a:effectLst/>
+        </p:spPr>
+        <p:style>
+          <a:lnRef idx="1">
+            <a:schemeClr val="accent1"/>
+          </a:lnRef>
+          <a:fillRef idx="3">
+            <a:schemeClr val="accent1"/>
+          </a:fillRef>
+          <a:effectRef idx="2">
+            <a:schemeClr val="accent1"/>
+          </a:effectRef>
+          <a:fontRef idx="minor">
+            <a:schemeClr val="lt1"/>
+          </a:fontRef>
+        </p:style>
+      </p:sp>
+      <p:sp>
+        <p:nvSpPr>
+          <p:cNvPr id="143" name="Rectangle 142">
+            <a:extLst>
+              <a:ext uri="{FF2B5EF4-FFF2-40B4-BE49-F238E27FC236}">
+                <a16:creationId xmlns:a16="http://schemas.microsoft.com/office/drawing/2014/main" id="{10AE8D57-436A-4073-9A75-15BB5949F8B4}"/>
+              </a:ext>
+              <a:ext uri="{C183D7F6-B498-43B3-948B-1728B52AA6E4}">
+                <adec:decorative xmlns:adec="http://schemas.microsoft.com/office/drawing/2017/decorative" val="1"/>
+              </a:ext>
+            </a:extLst>
+          </p:cNvPr>
+          <p:cNvSpPr>
+            <a:spLocks noGrp="1" noRot="1" noChangeAspect="1" noMove="1" noResize="1" noEditPoints="1" noAdjustHandles="1" noChangeArrowheads="1" noChangeShapeType="1" noTextEdit="1"/>
+          </p:cNvSpPr>
+          <p:nvPr>
+            <p:extLst>
+              <p:ext uri="{386F3935-93C4-4BCD-93E2-E3B085C9AB24}">
+                <p16:designElem xmlns:p16="http://schemas.microsoft.com/office/powerpoint/2015/main" val="1"/>
+              </p:ext>
+            </p:extLst>
+          </p:nvPr>
+        </p:nvSpPr>
+        <p:spPr>
+          <a:xfrm>
+            <a:off x="4241830" y="457200"/>
+            <a:ext cx="3703320" cy="91440"/>
+          </a:xfrm>
+          <a:prstGeom prst="rect">
+            <a:avLst/>
+          </a:prstGeom>
+          <a:solidFill>
+            <a:schemeClr val="accent1"/>
+          </a:solidFill>
+          <a:ln>
+            <a:noFill/>
+          </a:ln>
+          <a:effectLst/>
+        </p:spPr>
+        <p:style>
+          <a:lnRef idx="1">
+            <a:schemeClr val="accent1"/>
+          </a:lnRef>
+          <a:fillRef idx="3">
+            <a:schemeClr val="accent1"/>
+          </a:fillRef>
+          <a:effectRef idx="2">
+            <a:schemeClr val="accent1"/>
+          </a:effectRef>
+          <a:fontRef idx="minor">
+            <a:schemeClr val="lt1"/>
+          </a:fontRef>
+        </p:style>
+      </p:sp>
+      <p:sp>
+        <p:nvSpPr>
+          <p:cNvPr id="2073" name="Rectangle 144">
+            <a:extLst>
+              <a:ext uri="{FF2B5EF4-FFF2-40B4-BE49-F238E27FC236}">
+                <a16:creationId xmlns:a16="http://schemas.microsoft.com/office/drawing/2014/main" id="{88C97474-5879-4DB5-B4F3-F0357104BC8E}"/>
+              </a:ext>
+              <a:ext uri="{C183D7F6-B498-43B3-948B-1728B52AA6E4}">
+                <adec:decorative xmlns:adec="http://schemas.microsoft.com/office/drawing/2017/decorative" val="1"/>
+              </a:ext>
+            </a:extLst>
+          </p:cNvPr>
+          <p:cNvSpPr>
+            <a:spLocks noGrp="1" noRot="1" noChangeAspect="1" noMove="1" noResize="1" noEditPoints="1" noAdjustHandles="1" noChangeArrowheads="1" noChangeShapeType="1" noTextEdit="1"/>
+          </p:cNvSpPr>
+          <p:nvPr>
+            <p:extLst>
+              <p:ext uri="{386F3935-93C4-4BCD-93E2-E3B085C9AB24}">
+                <p16:designElem xmlns:p16="http://schemas.microsoft.com/office/powerpoint/2015/main" val="1"/>
+              </p:ext>
+            </p:extLst>
+          </p:nvPr>
+        </p:nvSpPr>
+        <p:spPr>
+          <a:xfrm>
+            <a:off x="0" y="0"/>
+            <a:ext cx="12192000" cy="6858000"/>
+          </a:xfrm>
+          <a:prstGeom prst="rect">
+            <a:avLst/>
+          </a:prstGeom>
+          <a:solidFill>
+            <a:schemeClr val="tx1"/>
+          </a:solidFill>
+          <a:ln>
+            <a:noFill/>
+          </a:ln>
+        </p:spPr>
+        <p:style>
+          <a:lnRef idx="2">
+            <a:schemeClr val="accent1">
+              <a:shade val="50000"/>
+            </a:schemeClr>
+          </a:lnRef>
+          <a:fillRef idx="1">
+            <a:schemeClr val="accent1"/>
+          </a:fillRef>
+          <a:effectRef idx="0">
+            <a:schemeClr val="accent1"/>
+          </a:effectRef>
+          <a:fontRef idx="minor">
+            <a:schemeClr val="lt1"/>
+          </a:fontRef>
+        </p:style>
+        <p:txBody>
+          <a:bodyPr rtlCol="0" anchor="ctr"/>
+          <a:lstStyle/>
+          <a:p>
+            <a:pPr algn="ctr"/>
+            <a:endParaRPr lang="en-US"/>
+          </a:p>
+        </p:txBody>
+      </p:sp>
+      <p:sp>
+        <p:nvSpPr>
+          <p:cNvPr id="2074" name="Rectangle 146">
+            <a:extLst>
+              <a:ext uri="{FF2B5EF4-FFF2-40B4-BE49-F238E27FC236}">
+                <a16:creationId xmlns:a16="http://schemas.microsoft.com/office/drawing/2014/main" id="{9831CBB7-4817-4B54-A7F9-0AE2D0C47870}"/>
+              </a:ext>
+              <a:ext uri="{C183D7F6-B498-43B3-948B-1728B52AA6E4}">
+                <adec:decorative xmlns:adec="http://schemas.microsoft.com/office/drawing/2017/decorative" val="1"/>
+              </a:ext>
+            </a:extLst>
+          </p:cNvPr>
+          <p:cNvSpPr>
+            <a:spLocks noGrp="1" noRot="1" noChangeAspect="1" noMove="1" noResize="1" noEditPoints="1" noAdjustHandles="1" noChangeArrowheads="1" noChangeShapeType="1" noTextEdit="1"/>
+          </p:cNvSpPr>
+          <p:nvPr>
+            <p:extLst>
+              <p:ext uri="{386F3935-93C4-4BCD-93E2-E3B085C9AB24}">
+                <p16:designElem xmlns:p16="http://schemas.microsoft.com/office/powerpoint/2015/main" val="1"/>
+              </p:ext>
+            </p:extLst>
+          </p:nvPr>
+        </p:nvSpPr>
+        <p:spPr>
+          <a:xfrm>
+            <a:off x="6667029" y="457200"/>
+            <a:ext cx="5010912" cy="91440"/>
+          </a:xfrm>
+          <a:prstGeom prst="rect">
+            <a:avLst/>
+          </a:prstGeom>
+          <a:solidFill>
+            <a:srgbClr val="465359"/>
+          </a:solidFill>
+          <a:ln>
+            <a:noFill/>
+          </a:ln>
+          <a:effectLst/>
+        </p:spPr>
+        <p:style>
+          <a:lnRef idx="1">
+            <a:schemeClr val="accent1"/>
+          </a:lnRef>
+          <a:fillRef idx="3">
+            <a:schemeClr val="accent1"/>
+          </a:fillRef>
+          <a:effectRef idx="2">
+            <a:schemeClr val="accent1"/>
+          </a:effectRef>
+          <a:fontRef idx="minor">
+            <a:schemeClr val="lt1"/>
+          </a:fontRef>
+        </p:style>
+      </p:sp>
+      <p:pic>
+        <p:nvPicPr>
+          <p:cNvPr id="2054" name="Picture 6" descr="2020 Candidate Survey: Knowledge and Attitudes">
+            <a:extLst>
+              <a:ext uri="{FF2B5EF4-FFF2-40B4-BE49-F238E27FC236}">
+                <a16:creationId xmlns:a16="http://schemas.microsoft.com/office/drawing/2014/main" id="{A4D79DD0-B7D4-497E-8821-27C049E3AD9C}"/>
+              </a:ext>
+            </a:extLst>
+          </p:cNvPr>
+          <p:cNvPicPr>
+            <a:picLocks noGrp="1" noChangeAspect="1" noChangeArrowheads="1"/>
+          </p:cNvPicPr>
+          <p:nvPr>
+            <p:ph sz="half" idx="2"/>
+          </p:nvPr>
+        </p:nvPicPr>
+        <p:blipFill>
+          <a:blip r:embed="rId2">
+            <a:extLst>
+              <a:ext uri="{28A0092B-C50C-407E-A947-70E740481C1C}">
+                <a14:useLocalDpi xmlns:a14="http://schemas.microsoft.com/office/drawing/2010/main" val="0"/>
+              </a:ext>
+            </a:extLst>
+          </a:blip>
+          <a:stretch>
+            <a:fillRect/>
+          </a:stretch>
+        </p:blipFill>
+        <p:spPr bwMode="auto">
+          <a:xfrm>
+            <a:off x="419185" y="1507874"/>
+            <a:ext cx="6079278" cy="4042718"/>
+          </a:xfrm>
+          <a:prstGeom prst="rect">
+            <a:avLst/>
+          </a:prstGeom>
+          <a:noFill/>
+          <a:extLst>
+            <a:ext uri="{909E8E84-426E-40DD-AFC4-6F175D3DCCD1}">
+              <a14:hiddenFill xmlns:a14="http://schemas.microsoft.com/office/drawing/2010/main">
+                <a:solidFill>
+                  <a:srgbClr val="FFFFFF"/>
+                </a:solidFill>
+              </a14:hiddenFill>
+            </a:ext>
+          </a:extLst>
+        </p:spPr>
+      </p:pic>
+      <p:sp>
+        <p:nvSpPr>
+          <p:cNvPr id="2075" name="Rectangle 148">
+            <a:extLst>
+              <a:ext uri="{FF2B5EF4-FFF2-40B4-BE49-F238E27FC236}">
+                <a16:creationId xmlns:a16="http://schemas.microsoft.com/office/drawing/2014/main" id="{96BC321D-B05F-4857-8880-97F61B9B7858}"/>
+              </a:ext>
+              <a:ext uri="{C183D7F6-B498-43B3-948B-1728B52AA6E4}">
+                <adec:decorative xmlns:adec="http://schemas.microsoft.com/office/drawing/2017/decorative" val="1"/>
+              </a:ext>
+            </a:extLst>
+          </p:cNvPr>
+          <p:cNvSpPr>
+            <a:spLocks noGrp="1" noRot="1" noChangeAspect="1" noMove="1" noResize="1" noEditPoints="1" noAdjustHandles="1" noChangeArrowheads="1" noChangeShapeType="1" noTextEdit="1"/>
+          </p:cNvSpPr>
+          <p:nvPr>
+            <p:extLst>
+              <p:ext uri="{386F3935-93C4-4BCD-93E2-E3B085C9AB24}">
+                <p16:designElem xmlns:p16="http://schemas.microsoft.com/office/powerpoint/2015/main" val="1"/>
+              </p:ext>
+            </p:extLst>
+          </p:nvPr>
+        </p:nvSpPr>
+        <p:spPr>
+          <a:xfrm>
+            <a:off x="6667791" y="601200"/>
+            <a:ext cx="5009388" cy="5789365"/>
+          </a:xfrm>
+          <a:prstGeom prst="rect">
+            <a:avLst/>
+          </a:prstGeom>
+          <a:solidFill>
+            <a:srgbClr val="465359"/>
+          </a:solidFill>
+          <a:ln>
+            <a:noFill/>
+          </a:ln>
+          <a:effectLst/>
+        </p:spPr>
+        <p:style>
+          <a:lnRef idx="1">
+            <a:schemeClr val="accent1"/>
+          </a:lnRef>
+          <a:fillRef idx="3">
+            <a:schemeClr val="accent1"/>
+          </a:fillRef>
+          <a:effectRef idx="2">
+            <a:schemeClr val="accent1"/>
+          </a:effectRef>
+          <a:fontRef idx="minor">
+            <a:schemeClr val="lt1"/>
+          </a:fontRef>
+        </p:style>
+      </p:sp>
+      <p:sp>
+        <p:nvSpPr>
+          <p:cNvPr id="2" name="Title 1">
+            <a:extLst>
+              <a:ext uri="{FF2B5EF4-FFF2-40B4-BE49-F238E27FC236}">
+                <a16:creationId xmlns:a16="http://schemas.microsoft.com/office/drawing/2014/main" id="{2974849D-52B1-406A-8A82-1249368531C0}"/>
+              </a:ext>
+            </a:extLst>
+          </p:cNvPr>
+          <p:cNvSpPr>
+            <a:spLocks noGrp="1"/>
+          </p:cNvSpPr>
+          <p:nvPr>
+            <p:ph type="title"/>
+          </p:nvPr>
+        </p:nvSpPr>
+        <p:spPr>
+          <a:xfrm>
+            <a:off x="6873606" y="938022"/>
+            <a:ext cx="4597758" cy="1188720"/>
+          </a:xfrm>
+        </p:spPr>
+        <p:txBody>
+          <a:bodyPr vert="horz" lIns="91440" tIns="45720" rIns="91440" bIns="45720" rtlCol="0" anchor="b">
+            <a:normAutofit/>
+          </a:bodyPr>
+          <a:lstStyle/>
+          <a:p>
+            <a:r>
+              <a:rPr lang="en-US">
+                <a:solidFill>
+                  <a:srgbClr val="FFFFFF"/>
+                </a:solidFill>
+              </a:rPr>
+              <a:t>The Opioid Crisis in the United states</a:t>
+            </a:r>
+          </a:p>
+        </p:txBody>
+      </p:sp>
+      <p:sp>
+        <p:nvSpPr>
+          <p:cNvPr id="2076" name="Content Placeholder 2">
+            <a:extLst>
+              <a:ext uri="{FF2B5EF4-FFF2-40B4-BE49-F238E27FC236}">
+                <a16:creationId xmlns:a16="http://schemas.microsoft.com/office/drawing/2014/main" id="{516F202B-3593-438C-B9F1-3D7B7C4999CE}"/>
+              </a:ext>
+            </a:extLst>
+          </p:cNvPr>
+          <p:cNvSpPr>
+            <a:spLocks noGrp="1"/>
+          </p:cNvSpPr>
+          <p:nvPr>
+            <p:ph sz="half" idx="1"/>
+          </p:nvPr>
+        </p:nvSpPr>
+        <p:spPr>
+          <a:xfrm>
+            <a:off x="6873606" y="2340864"/>
+            <a:ext cx="4597758" cy="3793237"/>
+          </a:xfrm>
+        </p:spPr>
+        <p:txBody>
+          <a:bodyPr vert="horz" lIns="91440" tIns="45720" rIns="91440" bIns="45720" rtlCol="0" anchor="ctr">
+            <a:normAutofit/>
+          </a:bodyPr>
+          <a:lstStyle/>
+          <a:p>
+            <a:pPr>
+              <a:lnSpc>
+                <a:spcPct val="100000"/>
+              </a:lnSpc>
+            </a:pPr>
+            <a:r>
+              <a:rPr lang="en-US" sz="1600" dirty="0">
+                <a:solidFill>
+                  <a:srgbClr val="FFFFFF"/>
+                </a:solidFill>
+              </a:rPr>
+              <a:t>1803 </a:t>
+            </a:r>
+            <a:r>
+              <a:rPr lang="en-US" sz="1600" dirty="0">
+                <a:solidFill>
+                  <a:srgbClr val="FFFFFF"/>
+                </a:solidFill>
+                <a:sym typeface="Wingdings" panose="05000000000000000000" pitchFamily="2" charset="2"/>
+              </a:rPr>
+              <a:t> morphine</a:t>
+            </a:r>
+            <a:r>
+              <a:rPr lang="en-US" sz="1600" dirty="0">
+                <a:solidFill>
+                  <a:srgbClr val="FFFFFF"/>
+                </a:solidFill>
+              </a:rPr>
+              <a:t> distributed to soldiers in Civil War for pain relief, many became addicted</a:t>
+            </a:r>
+          </a:p>
+          <a:p>
+            <a:pPr>
+              <a:lnSpc>
+                <a:spcPct val="100000"/>
+              </a:lnSpc>
+            </a:pPr>
+            <a:r>
+              <a:rPr lang="en-US" sz="1600" dirty="0">
+                <a:solidFill>
+                  <a:srgbClr val="FFFFFF"/>
+                </a:solidFill>
+              </a:rPr>
+              <a:t>Overdose deaths increased from 2,000 deaths a year in the 1970s to 93,000 a year in 2020 </a:t>
+            </a:r>
+            <a:r>
+              <a:rPr lang="en-US" sz="1600" baseline="30000" dirty="0">
+                <a:solidFill>
+                  <a:srgbClr val="FFFFFF"/>
+                </a:solidFill>
+              </a:rPr>
+              <a:t>[1]</a:t>
+            </a:r>
+            <a:endParaRPr lang="en-US" sz="1100" baseline="30000" dirty="0">
+              <a:solidFill>
+                <a:srgbClr val="FFFFFF"/>
+              </a:solidFill>
+            </a:endParaRPr>
+          </a:p>
+          <a:p>
+            <a:pPr>
+              <a:lnSpc>
+                <a:spcPct val="100000"/>
+              </a:lnSpc>
+            </a:pPr>
+            <a:r>
+              <a:rPr lang="en-US" sz="1600" dirty="0">
+                <a:solidFill>
+                  <a:srgbClr val="FFFFFF"/>
+                </a:solidFill>
+              </a:rPr>
+              <a:t>The scale of the crisis has been enough to reduce life expectancy in the United States below its peak in 2014 to today </a:t>
+            </a:r>
+            <a:r>
+              <a:rPr lang="en-US" sz="1600" baseline="30000" dirty="0">
+                <a:solidFill>
+                  <a:srgbClr val="FFFFFF"/>
+                </a:solidFill>
+              </a:rPr>
+              <a:t>[2]</a:t>
+            </a:r>
+            <a:endParaRPr lang="en-US" sz="1600" dirty="0">
+              <a:solidFill>
+                <a:srgbClr val="FFFFFF"/>
+              </a:solidFill>
+            </a:endParaRPr>
+          </a:p>
+          <a:p>
+            <a:pPr>
+              <a:lnSpc>
+                <a:spcPct val="100000"/>
+              </a:lnSpc>
+            </a:pPr>
+            <a:r>
+              <a:rPr lang="en-US" sz="1600" dirty="0">
+                <a:solidFill>
+                  <a:srgbClr val="FFFFFF"/>
+                </a:solidFill>
+              </a:rPr>
+              <a:t>The CDC estimates that the total "economic burden" of prescription opioid misuse alone in the United States is $78.5 billion a year, including the costs of healthcare, lost productivity, addiction treatment, and criminal justice involvement </a:t>
+            </a:r>
+            <a:r>
+              <a:rPr lang="en-US" sz="1600" baseline="30000" dirty="0">
+                <a:solidFill>
+                  <a:srgbClr val="FFFFFF"/>
+                </a:solidFill>
+              </a:rPr>
+              <a:t>[3]</a:t>
+            </a:r>
+            <a:endParaRPr lang="en-US" sz="1600" dirty="0">
+              <a:solidFill>
+                <a:srgbClr val="FFFFFF"/>
+              </a:solidFill>
+            </a:endParaRPr>
+          </a:p>
+        </p:txBody>
+      </p:sp>
+    </p:spTree>
+    <p:extLst>
+      <p:ext uri="{BB962C8B-B14F-4D97-AF65-F5344CB8AC3E}">
+        <p14:creationId xmlns:p14="http://schemas.microsoft.com/office/powerpoint/2010/main" val="3729483494"/>
+      </p:ext>
+    </p:extLst>
+  </p:cSld>
+  <p:clrMapOvr>
+    <a:overrideClrMapping bg1="dk1" tx1="lt1" bg2="dk2" tx2="lt2" accent1="accent1" accent2="accent2" accent3="accent3" accent4="accent4" accent5="accent5" accent6="accent6" hlink="hlink" folHlink="folHlink"/>
+  </p:clrMapOvr>
+</p:sld>
+</file>
+
+<file path=ppt/slides/slide4.xml><?xml version="1.0" encoding="utf-8"?>
+<p:sld xmlns:a="http://schemas.openxmlformats.org/drawingml/2006/main" xmlns:r="http://schemas.openxmlformats.org/officeDocument/2006/relationships" xmlns:p="http://schemas.openxmlformats.org/presentationml/2006/main">
+  <p:cSld>
+    <p:bg>
+      <p:bgPr>
+        <a:solidFill>
+          <a:schemeClr val="bg1"/>
+        </a:solidFill>
+        <a:effectLst/>
+      </p:bgPr>
+    </p:bg>
+    <p:spTree>
+      <p:nvGrpSpPr>
+        <p:cNvPr id="1" name=""/>
+        <p:cNvGrpSpPr/>
+        <p:nvPr/>
+      </p:nvGrpSpPr>
+      <p:grpSpPr>
+        <a:xfrm>
+          <a:off x="0" y="0"/>
+          <a:ext cx="0" cy="0"/>
+          <a:chOff x="0" y="0"/>
+          <a:chExt cx="0" cy="0"/>
+        </a:xfrm>
+      </p:grpSpPr>
+      <p:sp>
+        <p:nvSpPr>
+          <p:cNvPr id="3076" name="Rectangle 70">
+            <a:extLst>
+              <a:ext uri="{FF2B5EF4-FFF2-40B4-BE49-F238E27FC236}">
+                <a16:creationId xmlns:a16="http://schemas.microsoft.com/office/drawing/2014/main" id="{E6C8E6EB-4C59-429B-97E4-72A058CFC4FB}"/>
+              </a:ext>
+              <a:ext uri="{C183D7F6-B498-43B3-948B-1728B52AA6E4}">
+                <adec:decorative xmlns:adec="http://schemas.microsoft.com/office/drawing/2017/decorative" val="1"/>
+              </a:ext>
+            </a:extLst>
+          </p:cNvPr>
+          <p:cNvSpPr>
+            <a:spLocks noGrp="1" noRot="1" noChangeAspect="1" noMove="1" noResize="1" noEditPoints="1" noAdjustHandles="1" noChangeArrowheads="1" noChangeShapeType="1" noTextEdit="1"/>
+          </p:cNvSpPr>
+          <p:nvPr>
+            <p:extLst>
+              <p:ext uri="{386F3935-93C4-4BCD-93E2-E3B085C9AB24}">
+                <p16:designElem xmlns:p16="http://schemas.microsoft.com/office/powerpoint/2015/main" val="1"/>
+              </p:ext>
+            </p:extLst>
+          </p:nvPr>
+        </p:nvSpPr>
+        <p:spPr>
+          <a:xfrm>
+            <a:off x="446534" y="457200"/>
+            <a:ext cx="3703320" cy="94997"/>
+          </a:xfrm>
+          <a:prstGeom prst="rect">
+            <a:avLst/>
+          </a:prstGeom>
+          <a:solidFill>
+            <a:srgbClr val="465359"/>
+          </a:solidFill>
+          <a:ln>
+            <a:noFill/>
+          </a:ln>
+          <a:effectLst/>
+        </p:spPr>
+        <p:style>
+          <a:lnRef idx="1">
+            <a:schemeClr val="accent1"/>
+          </a:lnRef>
+          <a:fillRef idx="3">
+            <a:schemeClr val="accent1"/>
+          </a:fillRef>
+          <a:effectRef idx="2">
+            <a:schemeClr val="accent1"/>
+          </a:effectRef>
+          <a:fontRef idx="minor">
+            <a:schemeClr val="lt1"/>
+          </a:fontRef>
+        </p:style>
+      </p:sp>
+      <p:sp>
+        <p:nvSpPr>
+          <p:cNvPr id="3077" name="Rectangle 72">
+            <a:extLst>
+              <a:ext uri="{FF2B5EF4-FFF2-40B4-BE49-F238E27FC236}">
+                <a16:creationId xmlns:a16="http://schemas.microsoft.com/office/drawing/2014/main" id="{B5B90362-AFCC-46A9-B41C-A257A8C5B314}"/>
+              </a:ext>
+              <a:ext uri="{C183D7F6-B498-43B3-948B-1728B52AA6E4}">
+                <adec:decorative xmlns:adec="http://schemas.microsoft.com/office/drawing/2017/decorative" val="1"/>
+              </a:ext>
+            </a:extLst>
+          </p:cNvPr>
+          <p:cNvSpPr>
+            <a:spLocks noGrp="1" noRot="1" noChangeAspect="1" noMove="1" noResize="1" noEditPoints="1" noAdjustHandles="1" noChangeArrowheads="1" noChangeShapeType="1" noTextEdit="1"/>
+          </p:cNvSpPr>
+          <p:nvPr>
+            <p:extLst>
+              <p:ext uri="{386F3935-93C4-4BCD-93E2-E3B085C9AB24}">
+                <p16:designElem xmlns:p16="http://schemas.microsoft.com/office/powerpoint/2015/main" val="1"/>
+              </p:ext>
+            </p:extLst>
+          </p:nvPr>
+        </p:nvSpPr>
+        <p:spPr>
+          <a:xfrm>
+            <a:off x="8042147" y="453643"/>
+            <a:ext cx="3703320" cy="98554"/>
+          </a:xfrm>
+          <a:prstGeom prst="rect">
+            <a:avLst/>
+          </a:prstGeom>
+          <a:solidFill>
+            <a:srgbClr val="969FA7"/>
+          </a:solidFill>
+          <a:ln>
+            <a:noFill/>
+          </a:ln>
+          <a:effectLst/>
+        </p:spPr>
+        <p:style>
+          <a:lnRef idx="1">
+            <a:schemeClr val="accent1"/>
+          </a:lnRef>
+          <a:fillRef idx="3">
+            <a:schemeClr val="accent1"/>
+          </a:fillRef>
+          <a:effectRef idx="2">
+            <a:schemeClr val="accent1"/>
+          </a:effectRef>
+          <a:fontRef idx="minor">
+            <a:schemeClr val="lt1"/>
+          </a:fontRef>
+        </p:style>
+      </p:sp>
+      <p:sp>
+        <p:nvSpPr>
+          <p:cNvPr id="3078" name="Rectangle 74">
+            <a:extLst>
+              <a:ext uri="{FF2B5EF4-FFF2-40B4-BE49-F238E27FC236}">
+                <a16:creationId xmlns:a16="http://schemas.microsoft.com/office/drawing/2014/main" id="{F71EF7F1-38BA-471D-8CD4-2A9AE8E35527}"/>
+              </a:ext>
+              <a:ext uri="{C183D7F6-B498-43B3-948B-1728B52AA6E4}">
+                <adec:decorative xmlns:adec="http://schemas.microsoft.com/office/drawing/2017/decorative" val="1"/>
+              </a:ext>
+            </a:extLst>
+          </p:cNvPr>
+          <p:cNvSpPr>
+            <a:spLocks noGrp="1" noRot="1" noChangeAspect="1" noMove="1" noResize="1" noEditPoints="1" noAdjustHandles="1" noChangeArrowheads="1" noChangeShapeType="1" noTextEdit="1"/>
+          </p:cNvSpPr>
+          <p:nvPr>
+            <p:extLst>
+              <p:ext uri="{386F3935-93C4-4BCD-93E2-E3B085C9AB24}">
+                <p16:designElem xmlns:p16="http://schemas.microsoft.com/office/powerpoint/2015/main" val="1"/>
+              </p:ext>
+            </p:extLst>
+          </p:nvPr>
+        </p:nvSpPr>
+        <p:spPr>
+          <a:xfrm>
+            <a:off x="4241830" y="457200"/>
+            <a:ext cx="3703320" cy="91440"/>
+          </a:xfrm>
+          <a:prstGeom prst="rect">
+            <a:avLst/>
+          </a:prstGeom>
+          <a:solidFill>
+            <a:schemeClr val="accent1"/>
+          </a:solidFill>
+          <a:ln>
+            <a:noFill/>
+          </a:ln>
+          <a:effectLst/>
+        </p:spPr>
+        <p:style>
+          <a:lnRef idx="1">
+            <a:schemeClr val="accent1"/>
+          </a:lnRef>
+          <a:fillRef idx="3">
+            <a:schemeClr val="accent1"/>
+          </a:fillRef>
+          <a:effectRef idx="2">
+            <a:schemeClr val="accent1"/>
+          </a:effectRef>
+          <a:fontRef idx="minor">
+            <a:schemeClr val="lt1"/>
+          </a:fontRef>
+        </p:style>
+      </p:sp>
+      <p:sp useBgFill="1">
+        <p:nvSpPr>
+          <p:cNvPr id="3079" name="Rectangle 76">
+            <a:extLst>
+              <a:ext uri="{FF2B5EF4-FFF2-40B4-BE49-F238E27FC236}">
+                <a16:creationId xmlns:a16="http://schemas.microsoft.com/office/drawing/2014/main" id="{504BED40-EAF7-4E55-AFF7-2CD840EBD3AA}"/>
+              </a:ext>
+              <a:ext uri="{C183D7F6-B498-43B3-948B-1728B52AA6E4}">
+                <adec:decorative xmlns:adec="http://schemas.microsoft.com/office/drawing/2017/decorative" val="1"/>
+              </a:ext>
+            </a:extLst>
+          </p:cNvPr>
+          <p:cNvSpPr>
+            <a:spLocks noGrp="1" noRot="1" noChangeAspect="1" noMove="1" noResize="1" noEditPoints="1" noAdjustHandles="1" noChangeArrowheads="1" noChangeShapeType="1" noTextEdit="1"/>
+          </p:cNvSpPr>
+          <p:nvPr>
+            <p:extLst>
+              <p:ext uri="{386F3935-93C4-4BCD-93E2-E3B085C9AB24}">
+                <p16:designElem xmlns:p16="http://schemas.microsoft.com/office/powerpoint/2015/main" val="1"/>
+              </p:ext>
+            </p:extLst>
+          </p:nvPr>
+        </p:nvSpPr>
+        <p:spPr>
+          <a:xfrm>
+            <a:off x="0" y="0"/>
+            <a:ext cx="12192000" cy="6858000"/>
+          </a:xfrm>
+          <a:prstGeom prst="rect">
+            <a:avLst/>
+          </a:prstGeom>
+          <a:ln>
+            <a:noFill/>
+          </a:ln>
+        </p:spPr>
+        <p:style>
+          <a:lnRef idx="2">
+            <a:schemeClr val="accent1">
+              <a:shade val="50000"/>
+            </a:schemeClr>
+          </a:lnRef>
+          <a:fillRef idx="1">
+            <a:schemeClr val="accent1"/>
+          </a:fillRef>
+          <a:effectRef idx="0">
+            <a:schemeClr val="accent1"/>
+          </a:effectRef>
+          <a:fontRef idx="minor">
+            <a:schemeClr val="lt1"/>
+          </a:fontRef>
+        </p:style>
+        <p:txBody>
+          <a:bodyPr rtlCol="0" anchor="ctr"/>
+          <a:lstStyle/>
+          <a:p>
+            <a:pPr algn="ctr"/>
+            <a:endParaRPr lang="en-US"/>
+          </a:p>
+        </p:txBody>
+      </p:sp>
+      <p:sp>
+        <p:nvSpPr>
           <p:cNvPr id="2" name="Title 1">
             <a:extLst>
               <a:ext uri="{FF2B5EF4-FFF2-40B4-BE49-F238E27FC236}">
@@ -7781,17 +9512,85 @@
             <p:ph type="title"/>
           </p:nvPr>
         </p:nvSpPr>
-        <p:spPr/>
+        <p:spPr>
+          <a:xfrm>
+            <a:off x="581193" y="702156"/>
+            <a:ext cx="6309003" cy="1013800"/>
+          </a:xfrm>
+        </p:spPr>
         <p:txBody>
-          <a:bodyPr/>
+          <a:bodyPr vert="horz" lIns="91440" tIns="45720" rIns="91440" bIns="45720" rtlCol="0" anchor="b">
+            <a:normAutofit/>
+          </a:bodyPr>
           <a:lstStyle/>
           <a:p>
             <a:r>
-              <a:rPr lang="en-US" dirty="0"/>
+              <a:rPr lang="en-US" b="0" kern="1200" cap="all">
+                <a:solidFill>
+                  <a:schemeClr val="tx2"/>
+                </a:solidFill>
+                <a:latin typeface="+mj-lt"/>
+                <a:ea typeface="+mj-ea"/>
+                <a:cs typeface="+mj-cs"/>
+              </a:rPr>
               <a:t>Previous/Related Works</a:t>
             </a:r>
           </a:p>
         </p:txBody>
+      </p:sp>
+      <p:sp>
+        <p:nvSpPr>
+          <p:cNvPr id="79" name="Rectangle 78">
+            <a:extLst>
+              <a:ext uri="{FF2B5EF4-FFF2-40B4-BE49-F238E27FC236}">
+                <a16:creationId xmlns:a16="http://schemas.microsoft.com/office/drawing/2014/main" id="{F367CCF1-BB1E-41CF-8499-94A870C33EFA}"/>
+              </a:ext>
+              <a:ext uri="{C183D7F6-B498-43B3-948B-1728B52AA6E4}">
+                <adec:decorative xmlns:adec="http://schemas.microsoft.com/office/drawing/2017/decorative" val="1"/>
+              </a:ext>
+            </a:extLst>
+          </p:cNvPr>
+          <p:cNvSpPr>
+            <a:spLocks noGrp="1" noRot="1" noChangeAspect="1" noMove="1" noResize="1" noEditPoints="1" noAdjustHandles="1" noChangeArrowheads="1" noChangeShapeType="1" noTextEdit="1"/>
+          </p:cNvSpPr>
+          <p:nvPr>
+            <p:extLst>
+              <p:ext uri="{386F3935-93C4-4BCD-93E2-E3B085C9AB24}">
+                <p16:designElem xmlns:p16="http://schemas.microsoft.com/office/powerpoint/2015/main" val="1"/>
+              </p:ext>
+            </p:extLst>
+          </p:nvPr>
+        </p:nvSpPr>
+        <p:spPr>
+          <a:xfrm>
+            <a:off x="446534" y="457200"/>
+            <a:ext cx="6675120" cy="94997"/>
+          </a:xfrm>
+          <a:prstGeom prst="rect">
+            <a:avLst/>
+          </a:prstGeom>
+          <a:solidFill>
+            <a:schemeClr val="accent1"/>
+          </a:solidFill>
+          <a:ln>
+            <a:noFill/>
+          </a:ln>
+          <a:effectLst/>
+        </p:spPr>
+        <p:style>
+          <a:lnRef idx="1">
+            <a:schemeClr val="accent1"/>
+          </a:lnRef>
+          <a:fillRef idx="3">
+            <a:schemeClr val="accent1"/>
+          </a:fillRef>
+          <a:effectRef idx="2">
+            <a:schemeClr val="accent1"/>
+          </a:effectRef>
+          <a:fontRef idx="minor">
+            <a:schemeClr val="lt1"/>
+          </a:fontRef>
+        </p:style>
       </p:sp>
       <p:sp>
         <p:nvSpPr>
@@ -7806,18 +9605,232 @@
             <a:spLocks noGrp="1"/>
           </p:cNvSpPr>
           <p:nvPr>
-            <p:ph idx="1"/>
+            <p:ph sz="half" idx="1"/>
           </p:nvPr>
         </p:nvSpPr>
-        <p:spPr/>
+        <p:spPr>
+          <a:xfrm>
+            <a:off x="581194" y="1896533"/>
+            <a:ext cx="6309003" cy="3962266"/>
+          </a:xfrm>
+        </p:spPr>
         <p:txBody>
-          <a:bodyPr/>
+          <a:bodyPr vert="horz" lIns="91440" tIns="45720" rIns="91440" bIns="45720" rtlCol="0" anchor="ctr">
+            <a:normAutofit/>
+          </a:bodyPr>
           <a:lstStyle/>
           <a:p>
-            <a:endParaRPr lang="en-US"/>
+            <a:r>
+              <a:rPr lang="en-US" dirty="0">
+                <a:solidFill>
+                  <a:schemeClr val="tx2"/>
+                </a:solidFill>
+              </a:rPr>
+              <a:t>Machine Learning scholarly research is primarily focused on users of opioids, specifically predicting opioid misuse (scholars like </a:t>
+            </a:r>
+            <a:r>
+              <a:rPr lang="en-US" dirty="0" err="1">
+                <a:solidFill>
+                  <a:schemeClr val="tx2"/>
+                </a:solidFill>
+              </a:rPr>
+              <a:t>Huinker</a:t>
+            </a:r>
+            <a:r>
+              <a:rPr lang="en-US" dirty="0">
+                <a:solidFill>
+                  <a:schemeClr val="tx2"/>
+                </a:solidFill>
+              </a:rPr>
+              <a:t> </a:t>
+            </a:r>
+            <a:r>
+              <a:rPr kumimoji="0" lang="en-US" b="0" i="0" u="none" strike="noStrike" cap="none" spc="0" normalizeH="0" baseline="30000" noProof="0" dirty="0">
+                <a:ln>
+                  <a:noFill/>
+                </a:ln>
+                <a:solidFill>
+                  <a:schemeClr val="tx2"/>
+                </a:solidFill>
+                <a:effectLst/>
+                <a:uLnTx/>
+                <a:uFillTx/>
+              </a:rPr>
+              <a:t>[4] </a:t>
+            </a:r>
+            <a:r>
+              <a:rPr lang="en-US" dirty="0">
+                <a:solidFill>
+                  <a:schemeClr val="tx2"/>
+                </a:solidFill>
+              </a:rPr>
+              <a:t>analyze these possible models)</a:t>
+            </a:r>
+          </a:p>
+          <a:p>
+            <a:r>
+              <a:rPr lang="en-US" dirty="0" err="1">
+                <a:solidFill>
+                  <a:schemeClr val="tx2"/>
+                </a:solidFill>
+              </a:rPr>
+              <a:t>Northeastern’s</a:t>
+            </a:r>
+            <a:r>
+              <a:rPr lang="en-US" dirty="0">
+                <a:solidFill>
+                  <a:schemeClr val="tx2"/>
+                </a:solidFill>
+              </a:rPr>
+              <a:t> Angela Kilby </a:t>
+            </a:r>
+            <a:r>
+              <a:rPr kumimoji="0" lang="en-US" b="0" i="0" u="none" strike="noStrike" cap="none" spc="0" normalizeH="0" baseline="30000" noProof="0" dirty="0">
+                <a:ln>
+                  <a:noFill/>
+                </a:ln>
+                <a:solidFill>
+                  <a:schemeClr val="tx2"/>
+                </a:solidFill>
+                <a:effectLst/>
+                <a:uLnTx/>
+                <a:uFillTx/>
+              </a:rPr>
+              <a:t>[5]</a:t>
+            </a:r>
+            <a:r>
+              <a:rPr lang="en-US" dirty="0">
+                <a:solidFill>
+                  <a:schemeClr val="tx2"/>
+                </a:solidFill>
+              </a:rPr>
+              <a:t> and Lo-</a:t>
+            </a:r>
+            <a:r>
+              <a:rPr lang="en-US" dirty="0" err="1">
+                <a:solidFill>
+                  <a:schemeClr val="tx2"/>
+                </a:solidFill>
+              </a:rPr>
+              <a:t>Ciganic</a:t>
+            </a:r>
+            <a:r>
+              <a:rPr lang="en-US" dirty="0">
+                <a:solidFill>
+                  <a:schemeClr val="tx2"/>
+                </a:solidFill>
+              </a:rPr>
+              <a:t> W et al </a:t>
+            </a:r>
+            <a:r>
+              <a:rPr kumimoji="0" lang="en-US" b="0" i="0" u="none" strike="noStrike" cap="none" spc="0" normalizeH="0" baseline="30000" noProof="0" dirty="0">
+                <a:ln>
+                  <a:noFill/>
+                </a:ln>
+                <a:solidFill>
+                  <a:schemeClr val="tx2"/>
+                </a:solidFill>
+                <a:effectLst/>
+                <a:uLnTx/>
+                <a:uFillTx/>
+              </a:rPr>
+              <a:t>[6]</a:t>
+            </a:r>
+            <a:r>
+              <a:rPr lang="en-US" dirty="0">
+                <a:solidFill>
+                  <a:schemeClr val="tx2"/>
+                </a:solidFill>
+              </a:rPr>
+              <a:t> investigate issues with algorithmic methods currently being used in locales such as medical offices and police departments. </a:t>
+            </a:r>
+          </a:p>
+          <a:p>
+            <a:r>
+              <a:rPr lang="en-US" dirty="0">
+                <a:solidFill>
+                  <a:schemeClr val="tx2"/>
+                </a:solidFill>
+              </a:rPr>
+              <a:t>Critique of machine learning algorithms predicting one’s chances of opioid abuse is so prevalent that even mainstream journalistic sources cover the topic, as in Szalavitz’s expose in </a:t>
+            </a:r>
+            <a:r>
+              <a:rPr lang="en-US" i="1" dirty="0">
+                <a:solidFill>
+                  <a:schemeClr val="tx2"/>
+                </a:solidFill>
+              </a:rPr>
+              <a:t>Wired</a:t>
+            </a:r>
+            <a:r>
+              <a:rPr kumimoji="0" lang="en-US" b="0" i="0" u="none" strike="noStrike" cap="none" spc="0" normalizeH="0" baseline="30000" noProof="0" dirty="0">
+                <a:ln>
+                  <a:noFill/>
+                </a:ln>
+                <a:solidFill>
+                  <a:schemeClr val="tx2"/>
+                </a:solidFill>
+                <a:effectLst/>
+                <a:uLnTx/>
+                <a:uFillTx/>
+              </a:rPr>
+              <a:t> [7] </a:t>
+            </a:r>
+            <a:endParaRPr lang="en-US" dirty="0">
+              <a:solidFill>
+                <a:schemeClr val="tx2"/>
+              </a:solidFill>
+            </a:endParaRPr>
           </a:p>
         </p:txBody>
       </p:sp>
+      <p:pic>
+        <p:nvPicPr>
+          <p:cNvPr id="3074" name="Picture 2" descr="In the Midst of Crisis, FDA Approves Opioid Drug 10X ...">
+            <a:extLst>
+              <a:ext uri="{FF2B5EF4-FFF2-40B4-BE49-F238E27FC236}">
+                <a16:creationId xmlns:a16="http://schemas.microsoft.com/office/drawing/2014/main" id="{647BF4FA-3BF7-44B7-8495-C8C1FD2A9F81}"/>
+              </a:ext>
+            </a:extLst>
+          </p:cNvPr>
+          <p:cNvPicPr>
+            <a:picLocks noGrp="1" noChangeAspect="1" noChangeArrowheads="1"/>
+          </p:cNvPicPr>
+          <p:nvPr>
+            <p:ph sz="half" idx="2"/>
+          </p:nvPr>
+        </p:nvPicPr>
+        <p:blipFill rotWithShape="1">
+          <a:blip r:embed="rId2">
+            <a:extLst>
+              <a:ext uri="{28A0092B-C50C-407E-A947-70E740481C1C}">
+                <a14:useLocalDpi xmlns:a14="http://schemas.microsoft.com/office/drawing/2010/main" val="0"/>
+              </a:ext>
+            </a:extLst>
+          </a:blip>
+          <a:srcRect l="23749" r="40495"/>
+          <a:stretch/>
+        </p:blipFill>
+        <p:spPr bwMode="auto">
+          <a:xfrm>
+            <a:off x="7521283" y="10"/>
+            <a:ext cx="4670717" cy="6857990"/>
+          </a:xfrm>
+          <a:prstGeom prst="rect">
+            <a:avLst/>
+          </a:prstGeom>
+          <a:noFill/>
+          <a:extLst>
+            <a:ext uri="{909E8E84-426E-40DD-AFC4-6F175D3DCCD1}">
+              <a14:hiddenFill xmlns:a14="http://schemas.microsoft.com/office/drawing/2010/main">
+                <a:solidFill>
+                  <a:srgbClr val="FFFFFF"/>
+                </a:solidFill>
+              </a14:hiddenFill>
+            </a:ext>
+          </a:extLst>
+        </p:spPr>
+      </p:pic>
     </p:spTree>
     <p:extLst>
       <p:ext uri="{BB962C8B-B14F-4D97-AF65-F5344CB8AC3E}">
@@ -7831,7 +9844,7 @@
 </p:sld>
 </file>
 
-<file path=ppt/slides/slide4.xml><?xml version="1.0" encoding="utf-8"?>
+<file path=ppt/slides/slide5.xml><?xml version="1.0" encoding="utf-8"?>
 <p:sld xmlns:a="http://schemas.openxmlformats.org/drawingml/2006/main" xmlns:r="http://schemas.openxmlformats.org/officeDocument/2006/relationships" xmlns:p="http://schemas.openxmlformats.org/presentationml/2006/main">
   <p:cSld>
     <p:spTree>
@@ -7914,7 +9927,7 @@
 </p:sld>
 </file>
 
-<file path=ppt/slides/slide5.xml><?xml version="1.0" encoding="utf-8"?>
+<file path=ppt/slides/slide6.xml><?xml version="1.0" encoding="utf-8"?>
 <p:sld xmlns:a="http://schemas.openxmlformats.org/drawingml/2006/main" xmlns:r="http://schemas.openxmlformats.org/officeDocument/2006/relationships" xmlns:p="http://schemas.openxmlformats.org/presentationml/2006/main">
   <p:cSld>
     <p:spTree>
@@ -8004,7 +10017,7 @@
 </p:sld>
 </file>
 
-<file path=ppt/slides/slide6.xml><?xml version="1.0" encoding="utf-8"?>
+<file path=ppt/slides/slide7.xml><?xml version="1.0" encoding="utf-8"?>
 <p:sld xmlns:a="http://schemas.openxmlformats.org/drawingml/2006/main" xmlns:r="http://schemas.openxmlformats.org/officeDocument/2006/relationships" xmlns:p="http://schemas.openxmlformats.org/presentationml/2006/main">
   <p:cSld>
     <p:spTree>
@@ -8094,7 +10107,7 @@
 </p:sld>
 </file>
 
-<file path=ppt/slides/slide7.xml><?xml version="1.0" encoding="utf-8"?>
+<file path=ppt/slides/slide8.xml><?xml version="1.0" encoding="utf-8"?>
 <p:sld xmlns:a="http://schemas.openxmlformats.org/drawingml/2006/main" xmlns:r="http://schemas.openxmlformats.org/officeDocument/2006/relationships" xmlns:p="http://schemas.openxmlformats.org/presentationml/2006/main">
   <p:cSld>
     <p:spTree>
@@ -8184,7 +10197,7 @@
 </p:sld>
 </file>
 
-<file path=ppt/slides/slide8.xml><?xml version="1.0" encoding="utf-8"?>
+<file path=ppt/slides/slide9.xml><?xml version="1.0" encoding="utf-8"?>
 <p:sld xmlns:a="http://schemas.openxmlformats.org/drawingml/2006/main" xmlns:r="http://schemas.openxmlformats.org/officeDocument/2006/relationships" xmlns:p="http://schemas.openxmlformats.org/presentationml/2006/main">
   <p:cSld>
     <p:spTree>
@@ -8258,89 +10271,6 @@
     <p:extLst>
       <p:ext uri="{BB962C8B-B14F-4D97-AF65-F5344CB8AC3E}">
         <p14:creationId xmlns:p14="http://schemas.microsoft.com/office/powerpoint/2010/main" val="1728474963"/>
-      </p:ext>
-    </p:extLst>
-  </p:cSld>
-  <p:clrMapOvr>
-    <a:masterClrMapping/>
-  </p:clrMapOvr>
-</p:sld>
-</file>
-
-<file path=ppt/slides/slide9.xml><?xml version="1.0" encoding="utf-8"?>
-<p:sld xmlns:a="http://schemas.openxmlformats.org/drawingml/2006/main" xmlns:r="http://schemas.openxmlformats.org/officeDocument/2006/relationships" xmlns:p="http://schemas.openxmlformats.org/presentationml/2006/main">
-  <p:cSld>
-    <p:spTree>
-      <p:nvGrpSpPr>
-        <p:cNvPr id="1" name=""/>
-        <p:cNvGrpSpPr/>
-        <p:nvPr/>
-      </p:nvGrpSpPr>
-      <p:grpSpPr>
-        <a:xfrm>
-          <a:off x="0" y="0"/>
-          <a:ext cx="0" cy="0"/>
-          <a:chOff x="0" y="0"/>
-          <a:chExt cx="0" cy="0"/>
-        </a:xfrm>
-      </p:grpSpPr>
-      <p:sp>
-        <p:nvSpPr>
-          <p:cNvPr id="2" name="Title 1">
-            <a:extLst>
-              <a:ext uri="{FF2B5EF4-FFF2-40B4-BE49-F238E27FC236}">
-                <a16:creationId xmlns:a16="http://schemas.microsoft.com/office/drawing/2014/main" id="{459CEFF6-037D-4787-B1CC-ADDDAAAC0433}"/>
-              </a:ext>
-            </a:extLst>
-          </p:cNvPr>
-          <p:cNvSpPr>
-            <a:spLocks noGrp="1"/>
-          </p:cNvSpPr>
-          <p:nvPr>
-            <p:ph type="title"/>
-          </p:nvPr>
-        </p:nvSpPr>
-        <p:spPr/>
-        <p:txBody>
-          <a:bodyPr/>
-          <a:lstStyle/>
-          <a:p>
-            <a:r>
-              <a:rPr lang="en-US" dirty="0"/>
-              <a:t>conclusions</a:t>
-            </a:r>
-          </a:p>
-        </p:txBody>
-      </p:sp>
-      <p:sp>
-        <p:nvSpPr>
-          <p:cNvPr id="3" name="Content Placeholder 2">
-            <a:extLst>
-              <a:ext uri="{FF2B5EF4-FFF2-40B4-BE49-F238E27FC236}">
-                <a16:creationId xmlns:a16="http://schemas.microsoft.com/office/drawing/2014/main" id="{9EC8D954-35D9-44B2-8BBC-135897DA6B09}"/>
-              </a:ext>
-            </a:extLst>
-          </p:cNvPr>
-          <p:cNvSpPr>
-            <a:spLocks noGrp="1"/>
-          </p:cNvSpPr>
-          <p:nvPr>
-            <p:ph idx="1"/>
-          </p:nvPr>
-        </p:nvSpPr>
-        <p:spPr/>
-        <p:txBody>
-          <a:bodyPr/>
-          <a:lstStyle/>
-          <a:p>
-            <a:endParaRPr lang="en-US"/>
-          </a:p>
-        </p:txBody>
-      </p:sp>
-    </p:spTree>
-    <p:extLst>
-      <p:ext uri="{BB962C8B-B14F-4D97-AF65-F5344CB8AC3E}">
-        <p14:creationId xmlns:p14="http://schemas.microsoft.com/office/powerpoint/2010/main" val="2824099778"/>
       </p:ext>
     </p:extLst>
   </p:cSld>
@@ -8629,15 +10559,6 @@
 </file>
 
 <file path=customXml/item2.xml><?xml version="1.0" encoding="utf-8"?>
-<?mso-contentType ?>
-<FormTemplates xmlns="http://schemas.microsoft.com/sharepoint/v3/contenttype/forms">
-  <Display>DocumentLibraryForm</Display>
-  <Edit>DocumentLibraryForm</Edit>
-  <New>DocumentLibraryForm</New>
-</FormTemplates>
-</file>
-
-<file path=customXml/item3.xml><?xml version="1.0" encoding="utf-8"?>
 <ct:contentTypeSchema xmlns:ct="http://schemas.microsoft.com/office/2006/metadata/contentType" xmlns:ma="http://schemas.microsoft.com/office/2006/metadata/properties/metaAttributes" ct:_="" ma:_="" ma:contentTypeName="Document" ma:contentTypeID="0x01010079F111ED35F8CC479449609E8A0923A6" ma:contentTypeVersion="12" ma:contentTypeDescription="Create a new document." ma:contentTypeScope="" ma:versionID="a410dd7f93c95333ffa1b60ed6adedd1">
   <xsd:schema xmlns:xsd="http://www.w3.org/2001/XMLSchema" xmlns:xs="http://www.w3.org/2001/XMLSchema" xmlns:p="http://schemas.microsoft.com/office/2006/metadata/properties" xmlns:ns2="71af3243-3dd4-4a8d-8c0d-dd76da1f02a5" xmlns:ns3="16c05727-aa75-4e4a-9b5f-8a80a1165891" targetNamespace="http://schemas.microsoft.com/office/2006/metadata/properties" ma:root="true" ma:fieldsID="a936d9baba76aa3866493feff160faab" ns2:_="" ns3:_="">
     <xsd:import namespace="71af3243-3dd4-4a8d-8c0d-dd76da1f02a5"/>
@@ -8858,6 +10779,15 @@
 </ct:contentTypeSchema>
 </file>
 
+<file path=customXml/item3.xml><?xml version="1.0" encoding="utf-8"?>
+<?mso-contentType ?>
+<FormTemplates xmlns="http://schemas.microsoft.com/sharepoint/v3/contenttype/forms">
+  <Display>DocumentLibraryForm</Display>
+  <Edit>DocumentLibraryForm</Edit>
+  <New>DocumentLibraryForm</New>
+</FormTemplates>
+</file>
+
 <file path=customXml/itemProps1.xml><?xml version="1.0" encoding="utf-8"?>
 <ds:datastoreItem xmlns:ds="http://schemas.openxmlformats.org/officeDocument/2006/customXml" ds:itemID="{FBD2D995-20F0-4C14-BF62-1248AB4B484D}">
   <ds:schemaRefs>
@@ -8869,14 +10799,6 @@
 </file>
 
 <file path=customXml/itemProps2.xml><?xml version="1.0" encoding="utf-8"?>
-<ds:datastoreItem xmlns:ds="http://schemas.openxmlformats.org/officeDocument/2006/customXml" ds:itemID="{BB3242A4-1E6A-4E02-809C-4A24066EC01D}">
-  <ds:schemaRefs>
-    <ds:schemaRef ds:uri="http://schemas.microsoft.com/sharepoint/v3/contenttype/forms"/>
-  </ds:schemaRefs>
-</ds:datastoreItem>
-</file>
-
-<file path=customXml/itemProps3.xml><?xml version="1.0" encoding="utf-8"?>
 <ds:datastoreItem xmlns:ds="http://schemas.openxmlformats.org/officeDocument/2006/customXml" ds:itemID="{965255AC-12AC-4323-AA35-9BAC798B66BD}">
   <ds:schemaRefs>
     <ds:schemaRef ds:uri="http://schemas.microsoft.com/office/2006/metadata/contentType"/>
@@ -8893,4 +10815,12 @@
     <ds:schemaRef ds:uri="http://schemas.microsoft.com/internal/obd"/>
   </ds:schemaRefs>
 </ds:datastoreItem>
+</file>
+
+<file path=customXml/itemProps3.xml><?xml version="1.0" encoding="utf-8"?>
+<ds:datastoreItem xmlns:ds="http://schemas.openxmlformats.org/officeDocument/2006/customXml" ds:itemID="{BB3242A4-1E6A-4E02-809C-4A24066EC01D}">
+  <ds:schemaRefs>
+    <ds:schemaRef ds:uri="http://schemas.microsoft.com/sharepoint/v3/contenttype/forms"/>
+  </ds:schemaRefs>
+</ds:datastoreItem>
 </file>
</xml_diff>

<commit_message>
got everything exepct individual analyses
</commit_message>
<xml_diff>
--- a/presentation/opioid_powerpoint.pptx
+++ b/presentation/opioid_powerpoint.pptx
@@ -17,7 +17,6 @@
     <p:sldId id="296" r:id="rId14"/>
     <p:sldId id="297" r:id="rId15"/>
     <p:sldId id="298" r:id="rId16"/>
-    <p:sldId id="288" r:id="rId17"/>
   </p:sldIdLst>
   <p:sldSz cx="12192000" cy="6858000"/>
   <p:notesSz cx="6858000" cy="9144000"/>
@@ -117,31 +116,6 @@
     </a:lvl9pPr>
   </p:defaultTextStyle>
   <p:extLst>
-    <p:ext uri="{521415D9-36F7-43E2-AB2F-B90AF26B5E84}">
-      <p14:sectionLst xmlns:p14="http://schemas.microsoft.com/office/powerpoint/2010/main">
-        <p14:section name="Default Section" id="{035AE13C-CF27-42AF-A2C0-13D4605B95A7}">
-          <p14:sldIdLst>
-            <p14:sldId id="273"/>
-          </p14:sldIdLst>
-        </p14:section>
-        <p14:section name="Untitled Section" id="{8745A176-7A97-464A-882C-F2C8C4BAA2AB}">
-          <p14:sldIdLst>
-            <p14:sldId id="289"/>
-            <p14:sldId id="299"/>
-            <p14:sldId id="290"/>
-            <p14:sldId id="291"/>
-            <p14:sldId id="292"/>
-            <p14:sldId id="293"/>
-            <p14:sldId id="294"/>
-            <p14:sldId id="295"/>
-            <p14:sldId id="296"/>
-            <p14:sldId id="297"/>
-            <p14:sldId id="298"/>
-            <p14:sldId id="288"/>
-          </p14:sldIdLst>
-        </p14:section>
-      </p14:sectionLst>
-    </p:ext>
     <p:ext uri="{EFAFB233-063F-42B5-8137-9DF3F51BA10A}">
       <p15:sldGuideLst xmlns:p15="http://schemas.microsoft.com/office/powerpoint/2012/main"/>
     </p:ext>
@@ -159,3794 +133,6 @@
     </p:extLst>
   </p:cmAuthor>
 </p:cmAuthorLst>
-</file>
-
-<file path=ppt/diagrams/colors1.xml><?xml version="1.0" encoding="utf-8"?>
-<dgm:colorsDef xmlns:dgm="http://schemas.openxmlformats.org/drawingml/2006/diagram" xmlns:a="http://schemas.openxmlformats.org/drawingml/2006/main" uniqueId="urn:microsoft.com/office/officeart/2005/8/colors/accent0_3">
-  <dgm:title val=""/>
-  <dgm:desc val=""/>
-  <dgm:catLst>
-    <dgm:cat type="mainScheme" pri="10300"/>
-  </dgm:catLst>
-  <dgm:styleLbl name="node0">
-    <dgm:fillClrLst meth="repeat">
-      <a:schemeClr val="dk2"/>
-    </dgm:fillClrLst>
-    <dgm:linClrLst meth="repeat">
-      <a:schemeClr val="lt2"/>
-    </dgm:linClrLst>
-    <dgm:effectClrLst/>
-    <dgm:txLinClrLst/>
-    <dgm:txFillClrLst/>
-    <dgm:txEffectClrLst/>
-  </dgm:styleLbl>
-  <dgm:styleLbl name="alignNode1">
-    <dgm:fillClrLst meth="repeat">
-      <a:schemeClr val="dk2"/>
-    </dgm:fillClrLst>
-    <dgm:linClrLst meth="repeat">
-      <a:schemeClr val="dk2"/>
-    </dgm:linClrLst>
-    <dgm:effectClrLst/>
-    <dgm:txLinClrLst/>
-    <dgm:txFillClrLst/>
-    <dgm:txEffectClrLst/>
-  </dgm:styleLbl>
-  <dgm:styleLbl name="node1">
-    <dgm:fillClrLst meth="repeat">
-      <a:schemeClr val="dk2"/>
-    </dgm:fillClrLst>
-    <dgm:linClrLst meth="repeat">
-      <a:schemeClr val="lt2"/>
-    </dgm:linClrLst>
-    <dgm:effectClrLst/>
-    <dgm:txLinClrLst/>
-    <dgm:txFillClrLst/>
-    <dgm:txEffectClrLst/>
-  </dgm:styleLbl>
-  <dgm:styleLbl name="lnNode1">
-    <dgm:fillClrLst meth="repeat">
-      <a:schemeClr val="dk2"/>
-    </dgm:fillClrLst>
-    <dgm:linClrLst meth="repeat">
-      <a:schemeClr val="lt2"/>
-    </dgm:linClrLst>
-    <dgm:effectClrLst/>
-    <dgm:txLinClrLst/>
-    <dgm:txFillClrLst/>
-    <dgm:txEffectClrLst/>
-  </dgm:styleLbl>
-  <dgm:styleLbl name="vennNode1">
-    <dgm:fillClrLst meth="repeat">
-      <a:schemeClr val="dk2">
-        <a:alpha val="50000"/>
-      </a:schemeClr>
-    </dgm:fillClrLst>
-    <dgm:linClrLst meth="repeat">
-      <a:schemeClr val="lt2"/>
-    </dgm:linClrLst>
-    <dgm:effectClrLst/>
-    <dgm:txLinClrLst/>
-    <dgm:txFillClrLst/>
-    <dgm:txEffectClrLst/>
-  </dgm:styleLbl>
-  <dgm:styleLbl name="node2">
-    <dgm:fillClrLst meth="repeat">
-      <a:schemeClr val="dk2"/>
-    </dgm:fillClrLst>
-    <dgm:linClrLst meth="repeat">
-      <a:schemeClr val="lt2"/>
-    </dgm:linClrLst>
-    <dgm:effectClrLst/>
-    <dgm:txLinClrLst/>
-    <dgm:txFillClrLst/>
-    <dgm:txEffectClrLst/>
-  </dgm:styleLbl>
-  <dgm:styleLbl name="node3">
-    <dgm:fillClrLst meth="repeat">
-      <a:schemeClr val="dk2"/>
-    </dgm:fillClrLst>
-    <dgm:linClrLst meth="repeat">
-      <a:schemeClr val="lt2"/>
-    </dgm:linClrLst>
-    <dgm:effectClrLst/>
-    <dgm:txLinClrLst/>
-    <dgm:txFillClrLst/>
-    <dgm:txEffectClrLst/>
-  </dgm:styleLbl>
-  <dgm:styleLbl name="node4">
-    <dgm:fillClrLst meth="repeat">
-      <a:schemeClr val="dk2"/>
-    </dgm:fillClrLst>
-    <dgm:linClrLst meth="repeat">
-      <a:schemeClr val="lt2"/>
-    </dgm:linClrLst>
-    <dgm:effectClrLst/>
-    <dgm:txLinClrLst/>
-    <dgm:txFillClrLst/>
-    <dgm:txEffectClrLst/>
-  </dgm:styleLbl>
-  <dgm:styleLbl name="fgImgPlace1">
-    <dgm:fillClrLst meth="repeat">
-      <a:schemeClr val="dk2">
-        <a:tint val="50000"/>
-      </a:schemeClr>
-    </dgm:fillClrLst>
-    <dgm:linClrLst meth="repeat">
-      <a:schemeClr val="lt2"/>
-    </dgm:linClrLst>
-    <dgm:effectClrLst/>
-    <dgm:txLinClrLst/>
-    <dgm:txFillClrLst meth="repeat">
-      <a:schemeClr val="lt2"/>
-    </dgm:txFillClrLst>
-    <dgm:txEffectClrLst/>
-  </dgm:styleLbl>
-  <dgm:styleLbl name="alignImgPlace1">
-    <dgm:fillClrLst meth="repeat">
-      <a:schemeClr val="dk2">
-        <a:tint val="50000"/>
-      </a:schemeClr>
-    </dgm:fillClrLst>
-    <dgm:linClrLst meth="repeat">
-      <a:schemeClr val="dk2">
-        <a:shade val="80000"/>
-      </a:schemeClr>
-    </dgm:linClrLst>
-    <dgm:effectClrLst/>
-    <dgm:txLinClrLst/>
-    <dgm:txFillClrLst meth="repeat">
-      <a:schemeClr val="lt2"/>
-    </dgm:txFillClrLst>
-    <dgm:txEffectClrLst/>
-  </dgm:styleLbl>
-  <dgm:styleLbl name="bgImgPlace1">
-    <dgm:fillClrLst meth="repeat">
-      <a:schemeClr val="dk2">
-        <a:tint val="50000"/>
-      </a:schemeClr>
-    </dgm:fillClrLst>
-    <dgm:linClrLst meth="repeat">
-      <a:schemeClr val="dk2">
-        <a:shade val="80000"/>
-      </a:schemeClr>
-    </dgm:linClrLst>
-    <dgm:effectClrLst/>
-    <dgm:txLinClrLst/>
-    <dgm:txFillClrLst meth="repeat">
-      <a:schemeClr val="lt2"/>
-    </dgm:txFillClrLst>
-    <dgm:txEffectClrLst/>
-  </dgm:styleLbl>
-  <dgm:styleLbl name="sibTrans2D1">
-    <dgm:fillClrLst meth="repeat">
-      <a:schemeClr val="dk2">
-        <a:tint val="60000"/>
-      </a:schemeClr>
-    </dgm:fillClrLst>
-    <dgm:linClrLst meth="repeat">
-      <a:schemeClr val="dk2">
-        <a:tint val="60000"/>
-      </a:schemeClr>
-    </dgm:linClrLst>
-    <dgm:effectClrLst/>
-    <dgm:txLinClrLst/>
-    <dgm:txFillClrLst/>
-    <dgm:txEffectClrLst/>
-  </dgm:styleLbl>
-  <dgm:styleLbl name="fgSibTrans2D1">
-    <dgm:fillClrLst meth="repeat">
-      <a:schemeClr val="dk2">
-        <a:tint val="60000"/>
-      </a:schemeClr>
-    </dgm:fillClrLst>
-    <dgm:linClrLst meth="repeat">
-      <a:schemeClr val="dk2">
-        <a:tint val="60000"/>
-      </a:schemeClr>
-    </dgm:linClrLst>
-    <dgm:effectClrLst/>
-    <dgm:txLinClrLst/>
-    <dgm:txFillClrLst/>
-    <dgm:txEffectClrLst/>
-  </dgm:styleLbl>
-  <dgm:styleLbl name="bgSibTrans2D1">
-    <dgm:fillClrLst meth="repeat">
-      <a:schemeClr val="dk2">
-        <a:tint val="60000"/>
-      </a:schemeClr>
-    </dgm:fillClrLst>
-    <dgm:linClrLst meth="repeat">
-      <a:schemeClr val="dk2">
-        <a:tint val="60000"/>
-      </a:schemeClr>
-    </dgm:linClrLst>
-    <dgm:effectClrLst/>
-    <dgm:txLinClrLst/>
-    <dgm:txFillClrLst/>
-    <dgm:txEffectClrLst/>
-  </dgm:styleLbl>
-  <dgm:styleLbl name="sibTrans1D1">
-    <dgm:fillClrLst meth="repeat">
-      <a:schemeClr val="dk2"/>
-    </dgm:fillClrLst>
-    <dgm:linClrLst meth="repeat">
-      <a:schemeClr val="dk2"/>
-    </dgm:linClrLst>
-    <dgm:effectClrLst/>
-    <dgm:txLinClrLst/>
-    <dgm:txFillClrLst meth="repeat">
-      <a:schemeClr val="lt2"/>
-    </dgm:txFillClrLst>
-    <dgm:txEffectClrLst/>
-  </dgm:styleLbl>
-  <dgm:styleLbl name="callout">
-    <dgm:fillClrLst meth="repeat">
-      <a:schemeClr val="dk2"/>
-    </dgm:fillClrLst>
-    <dgm:linClrLst meth="repeat">
-      <a:schemeClr val="dk2">
-        <a:tint val="50000"/>
-      </a:schemeClr>
-    </dgm:linClrLst>
-    <dgm:effectClrLst/>
-    <dgm:txLinClrLst/>
-    <dgm:txFillClrLst meth="repeat">
-      <a:schemeClr val="lt2"/>
-    </dgm:txFillClrLst>
-    <dgm:txEffectClrLst/>
-  </dgm:styleLbl>
-  <dgm:styleLbl name="asst0">
-    <dgm:fillClrLst meth="repeat">
-      <a:schemeClr val="dk2"/>
-    </dgm:fillClrLst>
-    <dgm:linClrLst meth="repeat">
-      <a:schemeClr val="lt2"/>
-    </dgm:linClrLst>
-    <dgm:effectClrLst/>
-    <dgm:txLinClrLst/>
-    <dgm:txFillClrLst/>
-    <dgm:txEffectClrLst/>
-  </dgm:styleLbl>
-  <dgm:styleLbl name="asst1">
-    <dgm:fillClrLst meth="repeat">
-      <a:schemeClr val="dk2"/>
-    </dgm:fillClrLst>
-    <dgm:linClrLst meth="repeat">
-      <a:schemeClr val="lt2"/>
-    </dgm:linClrLst>
-    <dgm:effectClrLst/>
-    <dgm:txLinClrLst/>
-    <dgm:txFillClrLst/>
-    <dgm:txEffectClrLst/>
-  </dgm:styleLbl>
-  <dgm:styleLbl name="asst2">
-    <dgm:fillClrLst meth="repeat">
-      <a:schemeClr val="dk2"/>
-    </dgm:fillClrLst>
-    <dgm:linClrLst meth="repeat">
-      <a:schemeClr val="lt2"/>
-    </dgm:linClrLst>
-    <dgm:effectClrLst/>
-    <dgm:txLinClrLst/>
-    <dgm:txFillClrLst/>
-    <dgm:txEffectClrLst/>
-  </dgm:styleLbl>
-  <dgm:styleLbl name="asst3">
-    <dgm:fillClrLst meth="repeat">
-      <a:schemeClr val="dk2"/>
-    </dgm:fillClrLst>
-    <dgm:linClrLst meth="repeat">
-      <a:schemeClr val="lt2"/>
-    </dgm:linClrLst>
-    <dgm:effectClrLst/>
-    <dgm:txLinClrLst/>
-    <dgm:txFillClrLst/>
-    <dgm:txEffectClrLst/>
-  </dgm:styleLbl>
-  <dgm:styleLbl name="asst4">
-    <dgm:fillClrLst meth="repeat">
-      <a:schemeClr val="dk2"/>
-    </dgm:fillClrLst>
-    <dgm:linClrLst meth="repeat">
-      <a:schemeClr val="lt2"/>
-    </dgm:linClrLst>
-    <dgm:effectClrLst/>
-    <dgm:txLinClrLst/>
-    <dgm:txFillClrLst/>
-    <dgm:txEffectClrLst/>
-  </dgm:styleLbl>
-  <dgm:styleLbl name="parChTrans2D1">
-    <dgm:fillClrLst meth="repeat">
-      <a:schemeClr val="dk2">
-        <a:tint val="60000"/>
-      </a:schemeClr>
-    </dgm:fillClrLst>
-    <dgm:linClrLst meth="repeat">
-      <a:schemeClr val="dk2">
-        <a:tint val="60000"/>
-      </a:schemeClr>
-    </dgm:linClrLst>
-    <dgm:effectClrLst/>
-    <dgm:txLinClrLst/>
-    <dgm:txFillClrLst meth="repeat">
-      <a:schemeClr val="lt2"/>
-    </dgm:txFillClrLst>
-    <dgm:txEffectClrLst/>
-  </dgm:styleLbl>
-  <dgm:styleLbl name="parChTrans2D2">
-    <dgm:fillClrLst meth="repeat">
-      <a:schemeClr val="dk2"/>
-    </dgm:fillClrLst>
-    <dgm:linClrLst meth="repeat">
-      <a:schemeClr val="dk2"/>
-    </dgm:linClrLst>
-    <dgm:effectClrLst/>
-    <dgm:txLinClrLst/>
-    <dgm:txFillClrLst meth="repeat">
-      <a:schemeClr val="lt2"/>
-    </dgm:txFillClrLst>
-    <dgm:txEffectClrLst/>
-  </dgm:styleLbl>
-  <dgm:styleLbl name="parChTrans2D3">
-    <dgm:fillClrLst meth="repeat">
-      <a:schemeClr val="dk2"/>
-    </dgm:fillClrLst>
-    <dgm:linClrLst meth="repeat">
-      <a:schemeClr val="dk2"/>
-    </dgm:linClrLst>
-    <dgm:effectClrLst/>
-    <dgm:txLinClrLst/>
-    <dgm:txFillClrLst meth="repeat">
-      <a:schemeClr val="lt2"/>
-    </dgm:txFillClrLst>
-    <dgm:txEffectClrLst/>
-  </dgm:styleLbl>
-  <dgm:styleLbl name="parChTrans2D4">
-    <dgm:fillClrLst meth="repeat">
-      <a:schemeClr val="dk2"/>
-    </dgm:fillClrLst>
-    <dgm:linClrLst meth="repeat">
-      <a:schemeClr val="dk2"/>
-    </dgm:linClrLst>
-    <dgm:effectClrLst/>
-    <dgm:txLinClrLst/>
-    <dgm:txFillClrLst meth="repeat">
-      <a:schemeClr val="lt2"/>
-    </dgm:txFillClrLst>
-    <dgm:txEffectClrLst/>
-  </dgm:styleLbl>
-  <dgm:styleLbl name="parChTrans1D1">
-    <dgm:fillClrLst meth="repeat">
-      <a:schemeClr val="dk2"/>
-    </dgm:fillClrLst>
-    <dgm:linClrLst meth="repeat">
-      <a:schemeClr val="dk2">
-        <a:shade val="60000"/>
-      </a:schemeClr>
-    </dgm:linClrLst>
-    <dgm:effectClrLst/>
-    <dgm:txLinClrLst/>
-    <dgm:txFillClrLst meth="repeat">
-      <a:schemeClr val="tx1"/>
-    </dgm:txFillClrLst>
-    <dgm:txEffectClrLst/>
-  </dgm:styleLbl>
-  <dgm:styleLbl name="parChTrans1D2">
-    <dgm:fillClrLst meth="repeat">
-      <a:schemeClr val="dk2"/>
-    </dgm:fillClrLst>
-    <dgm:linClrLst meth="repeat">
-      <a:schemeClr val="dk2">
-        <a:shade val="60000"/>
-      </a:schemeClr>
-    </dgm:linClrLst>
-    <dgm:effectClrLst/>
-    <dgm:txLinClrLst/>
-    <dgm:txFillClrLst meth="repeat">
-      <a:schemeClr val="tx1"/>
-    </dgm:txFillClrLst>
-    <dgm:txEffectClrLst/>
-  </dgm:styleLbl>
-  <dgm:styleLbl name="parChTrans1D3">
-    <dgm:fillClrLst meth="repeat">
-      <a:schemeClr val="dk2"/>
-    </dgm:fillClrLst>
-    <dgm:linClrLst meth="repeat">
-      <a:schemeClr val="dk2">
-        <a:shade val="80000"/>
-      </a:schemeClr>
-    </dgm:linClrLst>
-    <dgm:effectClrLst/>
-    <dgm:txLinClrLst/>
-    <dgm:txFillClrLst meth="repeat">
-      <a:schemeClr val="tx1"/>
-    </dgm:txFillClrLst>
-    <dgm:txEffectClrLst/>
-  </dgm:styleLbl>
-  <dgm:styleLbl name="parChTrans1D4">
-    <dgm:fillClrLst meth="repeat">
-      <a:schemeClr val="dk2"/>
-    </dgm:fillClrLst>
-    <dgm:linClrLst meth="repeat">
-      <a:schemeClr val="dk2">
-        <a:shade val="80000"/>
-      </a:schemeClr>
-    </dgm:linClrLst>
-    <dgm:effectClrLst/>
-    <dgm:txLinClrLst/>
-    <dgm:txFillClrLst meth="repeat">
-      <a:schemeClr val="tx1"/>
-    </dgm:txFillClrLst>
-    <dgm:txEffectClrLst/>
-  </dgm:styleLbl>
-  <dgm:styleLbl name="fgAcc1">
-    <dgm:fillClrLst meth="repeat">
-      <a:schemeClr val="lt2">
-        <a:alpha val="90000"/>
-      </a:schemeClr>
-    </dgm:fillClrLst>
-    <dgm:linClrLst meth="repeat">
-      <a:schemeClr val="dk2"/>
-    </dgm:linClrLst>
-    <dgm:effectClrLst/>
-    <dgm:txLinClrLst/>
-    <dgm:txFillClrLst meth="repeat">
-      <a:schemeClr val="dk1"/>
-    </dgm:txFillClrLst>
-    <dgm:txEffectClrLst/>
-  </dgm:styleLbl>
-  <dgm:styleLbl name="conFgAcc1">
-    <dgm:fillClrLst meth="repeat">
-      <a:schemeClr val="lt2">
-        <a:alpha val="90000"/>
-      </a:schemeClr>
-    </dgm:fillClrLst>
-    <dgm:linClrLst meth="repeat">
-      <a:schemeClr val="dk2"/>
-    </dgm:linClrLst>
-    <dgm:effectClrLst/>
-    <dgm:txLinClrLst/>
-    <dgm:txFillClrLst meth="repeat">
-      <a:schemeClr val="dk1"/>
-    </dgm:txFillClrLst>
-    <dgm:txEffectClrLst/>
-  </dgm:styleLbl>
-  <dgm:styleLbl name="alignAcc1">
-    <dgm:fillClrLst meth="repeat">
-      <a:schemeClr val="lt2">
-        <a:alpha val="90000"/>
-      </a:schemeClr>
-    </dgm:fillClrLst>
-    <dgm:linClrLst meth="repeat">
-      <a:schemeClr val="dk2"/>
-    </dgm:linClrLst>
-    <dgm:effectClrLst/>
-    <dgm:txLinClrLst/>
-    <dgm:txFillClrLst meth="repeat">
-      <a:schemeClr val="dk1"/>
-    </dgm:txFillClrLst>
-    <dgm:txEffectClrLst/>
-  </dgm:styleLbl>
-  <dgm:styleLbl name="trAlignAcc1">
-    <dgm:fillClrLst meth="repeat">
-      <a:schemeClr val="lt2">
-        <a:alpha val="40000"/>
-      </a:schemeClr>
-    </dgm:fillClrLst>
-    <dgm:linClrLst meth="repeat">
-      <a:schemeClr val="dk2"/>
-    </dgm:linClrLst>
-    <dgm:effectClrLst/>
-    <dgm:txLinClrLst/>
-    <dgm:txFillClrLst meth="repeat">
-      <a:schemeClr val="dk1"/>
-    </dgm:txFillClrLst>
-    <dgm:txEffectClrLst/>
-  </dgm:styleLbl>
-  <dgm:styleLbl name="bgAcc1">
-    <dgm:fillClrLst meth="repeat">
-      <a:schemeClr val="lt2">
-        <a:alpha val="90000"/>
-      </a:schemeClr>
-    </dgm:fillClrLst>
-    <dgm:linClrLst meth="repeat">
-      <a:schemeClr val="dk2"/>
-    </dgm:linClrLst>
-    <dgm:effectClrLst/>
-    <dgm:txLinClrLst/>
-    <dgm:txFillClrLst meth="repeat">
-      <a:schemeClr val="dk1"/>
-    </dgm:txFillClrLst>
-    <dgm:txEffectClrLst/>
-  </dgm:styleLbl>
-  <dgm:styleLbl name="solidFgAcc1">
-    <dgm:fillClrLst meth="repeat">
-      <a:schemeClr val="lt2"/>
-    </dgm:fillClrLst>
-    <dgm:linClrLst meth="repeat">
-      <a:schemeClr val="dk2"/>
-    </dgm:linClrLst>
-    <dgm:effectClrLst/>
-    <dgm:txLinClrLst/>
-    <dgm:txFillClrLst meth="repeat">
-      <a:schemeClr val="dk1"/>
-    </dgm:txFillClrLst>
-    <dgm:txEffectClrLst/>
-  </dgm:styleLbl>
-  <dgm:styleLbl name="solidAlignAcc1">
-    <dgm:fillClrLst meth="repeat">
-      <a:schemeClr val="lt2"/>
-    </dgm:fillClrLst>
-    <dgm:linClrLst meth="repeat">
-      <a:schemeClr val="dk2"/>
-    </dgm:linClrLst>
-    <dgm:effectClrLst/>
-    <dgm:txLinClrLst/>
-    <dgm:txFillClrLst meth="repeat">
-      <a:schemeClr val="dk1"/>
-    </dgm:txFillClrLst>
-    <dgm:txEffectClrLst/>
-  </dgm:styleLbl>
-  <dgm:styleLbl name="solidBgAcc1">
-    <dgm:fillClrLst meth="repeat">
-      <a:schemeClr val="lt2"/>
-    </dgm:fillClrLst>
-    <dgm:linClrLst meth="repeat">
-      <a:schemeClr val="dk2"/>
-    </dgm:linClrLst>
-    <dgm:effectClrLst/>
-    <dgm:txLinClrLst/>
-    <dgm:txFillClrLst meth="repeat">
-      <a:schemeClr val="dk1"/>
-    </dgm:txFillClrLst>
-    <dgm:txEffectClrLst/>
-  </dgm:styleLbl>
-  <dgm:styleLbl name="fgAccFollowNode1">
-    <dgm:fillClrLst meth="repeat">
-      <a:schemeClr val="dk2">
-        <a:alpha val="90000"/>
-        <a:tint val="40000"/>
-      </a:schemeClr>
-    </dgm:fillClrLst>
-    <dgm:linClrLst meth="repeat">
-      <a:schemeClr val="dk2">
-        <a:alpha val="90000"/>
-        <a:tint val="40000"/>
-      </a:schemeClr>
-    </dgm:linClrLst>
-    <dgm:effectClrLst/>
-    <dgm:txLinClrLst/>
-    <dgm:txFillClrLst meth="repeat">
-      <a:schemeClr val="dk1"/>
-    </dgm:txFillClrLst>
-    <dgm:txEffectClrLst/>
-  </dgm:styleLbl>
-  <dgm:styleLbl name="alignAccFollowNode1">
-    <dgm:fillClrLst meth="repeat">
-      <a:schemeClr val="dk2">
-        <a:alpha val="90000"/>
-        <a:tint val="40000"/>
-      </a:schemeClr>
-    </dgm:fillClrLst>
-    <dgm:linClrLst meth="repeat">
-      <a:schemeClr val="dk2">
-        <a:alpha val="90000"/>
-        <a:tint val="40000"/>
-      </a:schemeClr>
-    </dgm:linClrLst>
-    <dgm:effectClrLst/>
-    <dgm:txLinClrLst/>
-    <dgm:txFillClrLst meth="repeat">
-      <a:schemeClr val="dk1"/>
-    </dgm:txFillClrLst>
-    <dgm:txEffectClrLst/>
-  </dgm:styleLbl>
-  <dgm:styleLbl name="bgAccFollowNode1">
-    <dgm:fillClrLst meth="repeat">
-      <a:schemeClr val="dk2">
-        <a:alpha val="90000"/>
-        <a:tint val="40000"/>
-      </a:schemeClr>
-    </dgm:fillClrLst>
-    <dgm:linClrLst meth="repeat">
-      <a:schemeClr val="dk2">
-        <a:alpha val="90000"/>
-        <a:tint val="40000"/>
-      </a:schemeClr>
-    </dgm:linClrLst>
-    <dgm:effectClrLst/>
-    <dgm:txLinClrLst/>
-    <dgm:txFillClrLst meth="repeat">
-      <a:schemeClr val="dk1"/>
-    </dgm:txFillClrLst>
-    <dgm:txEffectClrLst/>
-  </dgm:styleLbl>
-  <dgm:styleLbl name="fgAcc0">
-    <dgm:fillClrLst meth="repeat">
-      <a:schemeClr val="lt2">
-        <a:alpha val="90000"/>
-      </a:schemeClr>
-    </dgm:fillClrLst>
-    <dgm:linClrLst meth="repeat">
-      <a:schemeClr val="dk2"/>
-    </dgm:linClrLst>
-    <dgm:effectClrLst/>
-    <dgm:txLinClrLst/>
-    <dgm:txFillClrLst meth="repeat">
-      <a:schemeClr val="dk1"/>
-    </dgm:txFillClrLst>
-    <dgm:txEffectClrLst/>
-  </dgm:styleLbl>
-  <dgm:styleLbl name="fgAcc2">
-    <dgm:fillClrLst meth="repeat">
-      <a:schemeClr val="lt2">
-        <a:alpha val="90000"/>
-      </a:schemeClr>
-    </dgm:fillClrLst>
-    <dgm:linClrLst meth="repeat">
-      <a:schemeClr val="dk2"/>
-    </dgm:linClrLst>
-    <dgm:effectClrLst/>
-    <dgm:txLinClrLst/>
-    <dgm:txFillClrLst meth="repeat">
-      <a:schemeClr val="dk1"/>
-    </dgm:txFillClrLst>
-    <dgm:txEffectClrLst/>
-  </dgm:styleLbl>
-  <dgm:styleLbl name="fgAcc3">
-    <dgm:fillClrLst meth="repeat">
-      <a:schemeClr val="lt2">
-        <a:alpha val="90000"/>
-      </a:schemeClr>
-    </dgm:fillClrLst>
-    <dgm:linClrLst meth="repeat">
-      <a:schemeClr val="dk2"/>
-    </dgm:linClrLst>
-    <dgm:effectClrLst/>
-    <dgm:txLinClrLst/>
-    <dgm:txFillClrLst meth="repeat">
-      <a:schemeClr val="dk1"/>
-    </dgm:txFillClrLst>
-    <dgm:txEffectClrLst/>
-  </dgm:styleLbl>
-  <dgm:styleLbl name="fgAcc4">
-    <dgm:fillClrLst meth="repeat">
-      <a:schemeClr val="lt2">
-        <a:alpha val="90000"/>
-      </a:schemeClr>
-    </dgm:fillClrLst>
-    <dgm:linClrLst meth="repeat">
-      <a:schemeClr val="dk2"/>
-    </dgm:linClrLst>
-    <dgm:effectClrLst/>
-    <dgm:txLinClrLst/>
-    <dgm:txFillClrLst meth="repeat">
-      <a:schemeClr val="dk1"/>
-    </dgm:txFillClrLst>
-    <dgm:txEffectClrLst/>
-  </dgm:styleLbl>
-  <dgm:styleLbl name="bgShp">
-    <dgm:fillClrLst meth="repeat">
-      <a:schemeClr val="dk2">
-        <a:tint val="40000"/>
-      </a:schemeClr>
-    </dgm:fillClrLst>
-    <dgm:linClrLst meth="repeat">
-      <a:schemeClr val="dk2"/>
-    </dgm:linClrLst>
-    <dgm:effectClrLst/>
-    <dgm:txLinClrLst/>
-    <dgm:txFillClrLst meth="repeat">
-      <a:schemeClr val="dk1"/>
-    </dgm:txFillClrLst>
-    <dgm:txEffectClrLst/>
-  </dgm:styleLbl>
-  <dgm:styleLbl name="dkBgShp">
-    <dgm:fillClrLst meth="repeat">
-      <a:schemeClr val="dk2">
-        <a:shade val="80000"/>
-      </a:schemeClr>
-    </dgm:fillClrLst>
-    <dgm:linClrLst meth="repeat">
-      <a:schemeClr val="dk2"/>
-    </dgm:linClrLst>
-    <dgm:effectClrLst/>
-    <dgm:txLinClrLst/>
-    <dgm:txFillClrLst meth="repeat">
-      <a:schemeClr val="lt1"/>
-    </dgm:txFillClrLst>
-    <dgm:txEffectClrLst/>
-  </dgm:styleLbl>
-  <dgm:styleLbl name="trBgShp">
-    <dgm:fillClrLst meth="repeat">
-      <a:schemeClr val="dk2">
-        <a:tint val="50000"/>
-        <a:alpha val="40000"/>
-      </a:schemeClr>
-    </dgm:fillClrLst>
-    <dgm:linClrLst meth="repeat">
-      <a:schemeClr val="dk2"/>
-    </dgm:linClrLst>
-    <dgm:effectClrLst/>
-    <dgm:txLinClrLst/>
-    <dgm:txFillClrLst meth="repeat">
-      <a:schemeClr val="lt1"/>
-    </dgm:txFillClrLst>
-    <dgm:txEffectClrLst/>
-  </dgm:styleLbl>
-  <dgm:styleLbl name="fgShp">
-    <dgm:fillClrLst meth="repeat">
-      <a:schemeClr val="dk2">
-        <a:tint val="60000"/>
-      </a:schemeClr>
-    </dgm:fillClrLst>
-    <dgm:linClrLst meth="repeat">
-      <a:schemeClr val="lt2"/>
-    </dgm:linClrLst>
-    <dgm:effectClrLst/>
-    <dgm:txLinClrLst/>
-    <dgm:txFillClrLst meth="repeat">
-      <a:schemeClr val="dk1"/>
-    </dgm:txFillClrLst>
-    <dgm:txEffectClrLst/>
-  </dgm:styleLbl>
-  <dgm:styleLbl name="revTx">
-    <dgm:fillClrLst meth="repeat">
-      <a:schemeClr val="lt2">
-        <a:alpha val="0"/>
-      </a:schemeClr>
-    </dgm:fillClrLst>
-    <dgm:linClrLst meth="repeat">
-      <a:schemeClr val="dk1">
-        <a:alpha val="0"/>
-      </a:schemeClr>
-    </dgm:linClrLst>
-    <dgm:effectClrLst/>
-    <dgm:txLinClrLst/>
-    <dgm:txFillClrLst meth="repeat">
-      <a:schemeClr val="tx1"/>
-    </dgm:txFillClrLst>
-    <dgm:txEffectClrLst/>
-  </dgm:styleLbl>
-</dgm:colorsDef>
-</file>
-
-<file path=ppt/diagrams/data1.xml><?xml version="1.0" encoding="utf-8"?>
-<dgm:dataModel xmlns:dgm="http://schemas.openxmlformats.org/drawingml/2006/diagram" xmlns:a="http://schemas.openxmlformats.org/drawingml/2006/main">
-  <dgm:ptLst>
-    <dgm:pt modelId="{AAD4E0A1-2FAA-4C4F-A963-A18676DD2709}" type="doc">
-      <dgm:prSet loTypeId="urn:microsoft.com/office/officeart/2016/7/layout/AccentHomeChevronProcess" loCatId="process" qsTypeId="urn:microsoft.com/office/officeart/2005/8/quickstyle/simple1" qsCatId="simple" csTypeId="urn:microsoft.com/office/officeart/2005/8/colors/accent0_3" csCatId="mainScheme"/>
-      <dgm:spPr/>
-      <dgm:t>
-        <a:bodyPr/>
-        <a:lstStyle/>
-        <a:p>
-          <a:endParaRPr lang="en-US"/>
-        </a:p>
-      </dgm:t>
-    </dgm:pt>
-    <dgm:pt modelId="{59A0B26A-2973-451B-9ADA-6468D9C1A82E}">
-      <dgm:prSet/>
-      <dgm:spPr/>
-      <dgm:t>
-        <a:bodyPr/>
-        <a:lstStyle/>
-        <a:p>
-          <a:r>
-            <a:rPr lang="en-US" dirty="0"/>
-            <a:t>2016</a:t>
-          </a:r>
-        </a:p>
-      </dgm:t>
-    </dgm:pt>
-    <dgm:pt modelId="{485F4D2F-583A-4E49-8439-7E9505C9635E}" type="parTrans" cxnId="{3B32756D-B3E5-411D-8FF5-9443D03E0512}">
-      <dgm:prSet/>
-      <dgm:spPr/>
-      <dgm:t>
-        <a:bodyPr/>
-        <a:lstStyle/>
-        <a:p>
-          <a:endParaRPr lang="en-US"/>
-        </a:p>
-      </dgm:t>
-    </dgm:pt>
-    <dgm:pt modelId="{82DF06A8-49E6-4C50-8190-748A5D28FD6E}" type="sibTrans" cxnId="{3B32756D-B3E5-411D-8FF5-9443D03E0512}">
-      <dgm:prSet/>
-      <dgm:spPr/>
-      <dgm:t>
-        <a:bodyPr/>
-        <a:lstStyle/>
-        <a:p>
-          <a:endParaRPr lang="en-US"/>
-        </a:p>
-      </dgm:t>
-    </dgm:pt>
-    <dgm:pt modelId="{EFA50C6C-022A-4BE7-B363-CC5944231205}">
-      <dgm:prSet/>
-      <dgm:spPr/>
-      <dgm:t>
-        <a:bodyPr/>
-        <a:lstStyle/>
-        <a:p>
-          <a:r>
-            <a:rPr lang="en-US" dirty="0"/>
-            <a:t>Lorem ipsum dolor sit amet, consectetuer adipiscing elit. </a:t>
-          </a:r>
-        </a:p>
-      </dgm:t>
-    </dgm:pt>
-    <dgm:pt modelId="{2DCDB026-5A6D-4F6F-854C-5F88D23D2A99}" type="parTrans" cxnId="{F7E24D59-9532-4E70-A381-FD77E8E3792F}">
-      <dgm:prSet/>
-      <dgm:spPr/>
-      <dgm:t>
-        <a:bodyPr/>
-        <a:lstStyle/>
-        <a:p>
-          <a:endParaRPr lang="en-US"/>
-        </a:p>
-      </dgm:t>
-    </dgm:pt>
-    <dgm:pt modelId="{1640FBF7-6D83-46D6-9A14-66833FCD0185}" type="sibTrans" cxnId="{F7E24D59-9532-4E70-A381-FD77E8E3792F}">
-      <dgm:prSet/>
-      <dgm:spPr/>
-      <dgm:t>
-        <a:bodyPr/>
-        <a:lstStyle/>
-        <a:p>
-          <a:endParaRPr lang="en-US"/>
-        </a:p>
-      </dgm:t>
-    </dgm:pt>
-    <dgm:pt modelId="{8159643A-818D-4545-AFE5-29FC064B1AAA}">
-      <dgm:prSet/>
-      <dgm:spPr/>
-      <dgm:t>
-        <a:bodyPr/>
-        <a:lstStyle/>
-        <a:p>
-          <a:r>
-            <a:rPr lang="en-US" dirty="0"/>
-            <a:t>2017</a:t>
-          </a:r>
-        </a:p>
-      </dgm:t>
-    </dgm:pt>
-    <dgm:pt modelId="{2AC99ED1-74BC-44F4-AB57-AD4179C7D85F}" type="parTrans" cxnId="{D9DD0A07-3DE1-4FDB-9228-533E0FAB48D9}">
-      <dgm:prSet/>
-      <dgm:spPr/>
-      <dgm:t>
-        <a:bodyPr/>
-        <a:lstStyle/>
-        <a:p>
-          <a:endParaRPr lang="en-US"/>
-        </a:p>
-      </dgm:t>
-    </dgm:pt>
-    <dgm:pt modelId="{384C38D0-1DF9-4571-8437-3CD10BEF2AAE}" type="sibTrans" cxnId="{D9DD0A07-3DE1-4FDB-9228-533E0FAB48D9}">
-      <dgm:prSet/>
-      <dgm:spPr/>
-      <dgm:t>
-        <a:bodyPr/>
-        <a:lstStyle/>
-        <a:p>
-          <a:endParaRPr lang="en-US"/>
-        </a:p>
-      </dgm:t>
-    </dgm:pt>
-    <dgm:pt modelId="{A5F3A565-F1A9-4263-BA1F-374C68AB041C}">
-      <dgm:prSet/>
-      <dgm:spPr/>
-      <dgm:t>
-        <a:bodyPr/>
-        <a:lstStyle/>
-        <a:p>
-          <a:r>
-            <a:rPr lang="en-US" dirty="0"/>
-            <a:t>Lorem ipsum dolor sit amet, consectetuer adipiscing elit. </a:t>
-          </a:r>
-        </a:p>
-      </dgm:t>
-    </dgm:pt>
-    <dgm:pt modelId="{BC9CEAF5-0740-4D16-9B53-CFBE32998C15}" type="parTrans" cxnId="{5674DB32-52A8-4AD6-91A2-851D4F5D774E}">
-      <dgm:prSet/>
-      <dgm:spPr/>
-      <dgm:t>
-        <a:bodyPr/>
-        <a:lstStyle/>
-        <a:p>
-          <a:endParaRPr lang="en-US"/>
-        </a:p>
-      </dgm:t>
-    </dgm:pt>
-    <dgm:pt modelId="{E138BD27-CD5F-4B72-9EE7-AFCFDA324151}" type="sibTrans" cxnId="{5674DB32-52A8-4AD6-91A2-851D4F5D774E}">
-      <dgm:prSet/>
-      <dgm:spPr/>
-      <dgm:t>
-        <a:bodyPr/>
-        <a:lstStyle/>
-        <a:p>
-          <a:endParaRPr lang="en-US"/>
-        </a:p>
-      </dgm:t>
-    </dgm:pt>
-    <dgm:pt modelId="{11173297-B697-4A11-9EAC-E45317C547A3}">
-      <dgm:prSet/>
-      <dgm:spPr/>
-      <dgm:t>
-        <a:bodyPr/>
-        <a:lstStyle/>
-        <a:p>
-          <a:r>
-            <a:rPr lang="en-US" dirty="0"/>
-            <a:t>2018</a:t>
-          </a:r>
-        </a:p>
-      </dgm:t>
-    </dgm:pt>
-    <dgm:pt modelId="{04B33EEE-24D9-46D5-87A7-153B2EA6E29D}" type="parTrans" cxnId="{6C7779F4-FD69-4B67-B910-A8608F5BFD91}">
-      <dgm:prSet/>
-      <dgm:spPr/>
-      <dgm:t>
-        <a:bodyPr/>
-        <a:lstStyle/>
-        <a:p>
-          <a:endParaRPr lang="en-US"/>
-        </a:p>
-      </dgm:t>
-    </dgm:pt>
-    <dgm:pt modelId="{F44242F6-86F1-4EA1-8BA3-3748696B9D36}" type="sibTrans" cxnId="{6C7779F4-FD69-4B67-B910-A8608F5BFD91}">
-      <dgm:prSet/>
-      <dgm:spPr/>
-      <dgm:t>
-        <a:bodyPr/>
-        <a:lstStyle/>
-        <a:p>
-          <a:endParaRPr lang="en-US"/>
-        </a:p>
-      </dgm:t>
-    </dgm:pt>
-    <dgm:pt modelId="{388BDCB2-DCDF-44F3-8324-AEB38FDDBDD1}">
-      <dgm:prSet/>
-      <dgm:spPr/>
-      <dgm:t>
-        <a:bodyPr/>
-        <a:lstStyle/>
-        <a:p>
-          <a:r>
-            <a:rPr lang="en-US" dirty="0"/>
-            <a:t>Lorem ipsum dolor sit amet, consectetuer adipiscing elit. </a:t>
-          </a:r>
-        </a:p>
-      </dgm:t>
-    </dgm:pt>
-    <dgm:pt modelId="{37941136-BD0B-4BA2-AB30-C59B281AC064}" type="parTrans" cxnId="{F7EA216A-8EED-4AEA-8470-B1B8F045C9C9}">
-      <dgm:prSet/>
-      <dgm:spPr/>
-      <dgm:t>
-        <a:bodyPr/>
-        <a:lstStyle/>
-        <a:p>
-          <a:endParaRPr lang="en-US"/>
-        </a:p>
-      </dgm:t>
-    </dgm:pt>
-    <dgm:pt modelId="{3E43BD3A-DE7D-4F87-8DF8-BE45D9E99A98}" type="sibTrans" cxnId="{F7EA216A-8EED-4AEA-8470-B1B8F045C9C9}">
-      <dgm:prSet/>
-      <dgm:spPr/>
-      <dgm:t>
-        <a:bodyPr/>
-        <a:lstStyle/>
-        <a:p>
-          <a:endParaRPr lang="en-US"/>
-        </a:p>
-      </dgm:t>
-    </dgm:pt>
-    <dgm:pt modelId="{D59A6E49-80F2-47F2-A3F1-A7D3C1042B7A}">
-      <dgm:prSet/>
-      <dgm:spPr/>
-      <dgm:t>
-        <a:bodyPr/>
-        <a:lstStyle/>
-        <a:p>
-          <a:r>
-            <a:rPr lang="en-US" dirty="0"/>
-            <a:t>2019</a:t>
-          </a:r>
-        </a:p>
-      </dgm:t>
-    </dgm:pt>
-    <dgm:pt modelId="{0F0347E2-53BF-4AF0-BE04-E562E9D07F8C}" type="parTrans" cxnId="{1DEAA8D5-09D4-43B8-9CE1-38F63628F861}">
-      <dgm:prSet/>
-      <dgm:spPr/>
-      <dgm:t>
-        <a:bodyPr/>
-        <a:lstStyle/>
-        <a:p>
-          <a:endParaRPr lang="en-US"/>
-        </a:p>
-      </dgm:t>
-    </dgm:pt>
-    <dgm:pt modelId="{7E011706-AE0C-4AA0-B690-E8284D94C1FB}" type="sibTrans" cxnId="{1DEAA8D5-09D4-43B8-9CE1-38F63628F861}">
-      <dgm:prSet/>
-      <dgm:spPr/>
-      <dgm:t>
-        <a:bodyPr/>
-        <a:lstStyle/>
-        <a:p>
-          <a:endParaRPr lang="en-US"/>
-        </a:p>
-      </dgm:t>
-    </dgm:pt>
-    <dgm:pt modelId="{B37999E7-C394-42CA-9788-025667B2F148}">
-      <dgm:prSet/>
-      <dgm:spPr/>
-      <dgm:t>
-        <a:bodyPr/>
-        <a:lstStyle/>
-        <a:p>
-          <a:r>
-            <a:rPr lang="en-US" dirty="0"/>
-            <a:t>Lorem ipsum dolor sit amet, consectetuer adipiscing elit. </a:t>
-          </a:r>
-        </a:p>
-      </dgm:t>
-    </dgm:pt>
-    <dgm:pt modelId="{4E4B7B64-9855-4792-8CF8-036E24B99347}" type="parTrans" cxnId="{60F2516C-41F3-4218-A1D1-062B64CCA51C}">
-      <dgm:prSet/>
-      <dgm:spPr/>
-      <dgm:t>
-        <a:bodyPr/>
-        <a:lstStyle/>
-        <a:p>
-          <a:endParaRPr lang="en-US"/>
-        </a:p>
-      </dgm:t>
-    </dgm:pt>
-    <dgm:pt modelId="{B2DC8013-B540-4718-801F-00BFBC13037A}" type="sibTrans" cxnId="{60F2516C-41F3-4218-A1D1-062B64CCA51C}">
-      <dgm:prSet/>
-      <dgm:spPr/>
-      <dgm:t>
-        <a:bodyPr/>
-        <a:lstStyle/>
-        <a:p>
-          <a:endParaRPr lang="en-US"/>
-        </a:p>
-      </dgm:t>
-    </dgm:pt>
-    <dgm:pt modelId="{8AE324F7-386D-45A2-868A-242E22B37484}">
-      <dgm:prSet/>
-      <dgm:spPr/>
-      <dgm:t>
-        <a:bodyPr/>
-        <a:lstStyle/>
-        <a:p>
-          <a:r>
-            <a:rPr lang="en-US" dirty="0"/>
-            <a:t>2020</a:t>
-          </a:r>
-        </a:p>
-      </dgm:t>
-    </dgm:pt>
-    <dgm:pt modelId="{234A76A7-017C-468D-B6C6-6AE5595F0A60}" type="parTrans" cxnId="{3558A59D-7369-44E9-904F-FA6F4D04C070}">
-      <dgm:prSet/>
-      <dgm:spPr/>
-      <dgm:t>
-        <a:bodyPr/>
-        <a:lstStyle/>
-        <a:p>
-          <a:endParaRPr lang="en-US"/>
-        </a:p>
-      </dgm:t>
-    </dgm:pt>
-    <dgm:pt modelId="{EC9BCBCD-EFC8-4290-B863-734E9A2158AC}" type="sibTrans" cxnId="{3558A59D-7369-44E9-904F-FA6F4D04C070}">
-      <dgm:prSet/>
-      <dgm:spPr/>
-      <dgm:t>
-        <a:bodyPr/>
-        <a:lstStyle/>
-        <a:p>
-          <a:endParaRPr lang="en-US"/>
-        </a:p>
-      </dgm:t>
-    </dgm:pt>
-    <dgm:pt modelId="{F2C5946E-96AC-4D5A-B458-7D2B25514DE6}">
-      <dgm:prSet/>
-      <dgm:spPr/>
-      <dgm:t>
-        <a:bodyPr/>
-        <a:lstStyle/>
-        <a:p>
-          <a:r>
-            <a:rPr lang="en-US" dirty="0"/>
-            <a:t>Lorem ipsum dolor sit amet, consectetuer adipiscing elit. </a:t>
-          </a:r>
-        </a:p>
-      </dgm:t>
-    </dgm:pt>
-    <dgm:pt modelId="{00377DCE-90FB-46C7-8AA2-8160B9C8E411}" type="parTrans" cxnId="{1AC5888B-5F0A-4CE7-8F69-58ACC0AA1100}">
-      <dgm:prSet/>
-      <dgm:spPr/>
-      <dgm:t>
-        <a:bodyPr/>
-        <a:lstStyle/>
-        <a:p>
-          <a:endParaRPr lang="en-US"/>
-        </a:p>
-      </dgm:t>
-    </dgm:pt>
-    <dgm:pt modelId="{A191672C-E826-4D12-AE04-B7C722E1DAD5}" type="sibTrans" cxnId="{1AC5888B-5F0A-4CE7-8F69-58ACC0AA1100}">
-      <dgm:prSet/>
-      <dgm:spPr/>
-      <dgm:t>
-        <a:bodyPr/>
-        <a:lstStyle/>
-        <a:p>
-          <a:endParaRPr lang="en-US"/>
-        </a:p>
-      </dgm:t>
-    </dgm:pt>
-    <dgm:pt modelId="{783BA2EA-8436-4CCE-A39E-6BCF5238143F}" type="pres">
-      <dgm:prSet presAssocID="{AAD4E0A1-2FAA-4C4F-A963-A18676DD2709}" presName="Name0" presStyleCnt="0">
-        <dgm:presLayoutVars>
-          <dgm:animLvl val="lvl"/>
-          <dgm:resizeHandles val="exact"/>
-        </dgm:presLayoutVars>
-      </dgm:prSet>
-      <dgm:spPr/>
-    </dgm:pt>
-    <dgm:pt modelId="{F0826536-DCAA-4063-BFB9-4645227B9732}" type="pres">
-      <dgm:prSet presAssocID="{59A0B26A-2973-451B-9ADA-6468D9C1A82E}" presName="composite" presStyleCnt="0"/>
-      <dgm:spPr/>
-    </dgm:pt>
-    <dgm:pt modelId="{E3149CA8-F730-4485-B25A-C15A62708F74}" type="pres">
-      <dgm:prSet presAssocID="{59A0B26A-2973-451B-9ADA-6468D9C1A82E}" presName="L" presStyleLbl="solidFgAcc1" presStyleIdx="0" presStyleCnt="5">
-        <dgm:presLayoutVars>
-          <dgm:chMax val="0"/>
-          <dgm:chPref val="0"/>
-        </dgm:presLayoutVars>
-      </dgm:prSet>
-      <dgm:spPr/>
-    </dgm:pt>
-    <dgm:pt modelId="{356E000D-F109-45EB-B501-4B78AA5C433C}" type="pres">
-      <dgm:prSet presAssocID="{59A0B26A-2973-451B-9ADA-6468D9C1A82E}" presName="parTx" presStyleLbl="alignNode1" presStyleIdx="0" presStyleCnt="5">
-        <dgm:presLayoutVars>
-          <dgm:chMax val="0"/>
-          <dgm:chPref val="0"/>
-          <dgm:bulletEnabled val="1"/>
-        </dgm:presLayoutVars>
-      </dgm:prSet>
-      <dgm:spPr/>
-    </dgm:pt>
-    <dgm:pt modelId="{690A1E60-14A3-48E2-969A-2D37B614EB37}" type="pres">
-      <dgm:prSet presAssocID="{59A0B26A-2973-451B-9ADA-6468D9C1A82E}" presName="desTx" presStyleLbl="revTx" presStyleIdx="0" presStyleCnt="5">
-        <dgm:presLayoutVars>
-          <dgm:chMax val="0"/>
-          <dgm:chPref val="0"/>
-          <dgm:bulletEnabled val="1"/>
-        </dgm:presLayoutVars>
-      </dgm:prSet>
-      <dgm:spPr/>
-    </dgm:pt>
-    <dgm:pt modelId="{792BD85C-2D0D-4BF4-AF83-D8128B6A0BBD}" type="pres">
-      <dgm:prSet presAssocID="{59A0B26A-2973-451B-9ADA-6468D9C1A82E}" presName="EmptyPlaceHolder" presStyleCnt="0"/>
-      <dgm:spPr/>
-    </dgm:pt>
-    <dgm:pt modelId="{B1D346D7-C154-4D58-8724-9D8D322272D9}" type="pres">
-      <dgm:prSet presAssocID="{82DF06A8-49E6-4C50-8190-748A5D28FD6E}" presName="space" presStyleCnt="0"/>
-      <dgm:spPr/>
-    </dgm:pt>
-    <dgm:pt modelId="{14B6A5EE-E0B3-4A85-B764-A872E77BD918}" type="pres">
-      <dgm:prSet presAssocID="{8159643A-818D-4545-AFE5-29FC064B1AAA}" presName="composite" presStyleCnt="0"/>
-      <dgm:spPr/>
-    </dgm:pt>
-    <dgm:pt modelId="{CC632145-1148-4956-9088-B915D0D0FD99}" type="pres">
-      <dgm:prSet presAssocID="{8159643A-818D-4545-AFE5-29FC064B1AAA}" presName="L" presStyleLbl="solidFgAcc1" presStyleIdx="1" presStyleCnt="5">
-        <dgm:presLayoutVars>
-          <dgm:chMax val="0"/>
-          <dgm:chPref val="0"/>
-        </dgm:presLayoutVars>
-      </dgm:prSet>
-      <dgm:spPr/>
-    </dgm:pt>
-    <dgm:pt modelId="{E71F2D5D-B2F9-4DA3-A66A-9C6CCF024E35}" type="pres">
-      <dgm:prSet presAssocID="{8159643A-818D-4545-AFE5-29FC064B1AAA}" presName="parTx" presStyleLbl="alignNode1" presStyleIdx="1" presStyleCnt="5">
-        <dgm:presLayoutVars>
-          <dgm:chMax val="0"/>
-          <dgm:chPref val="0"/>
-          <dgm:bulletEnabled val="1"/>
-        </dgm:presLayoutVars>
-      </dgm:prSet>
-      <dgm:spPr/>
-    </dgm:pt>
-    <dgm:pt modelId="{76F87B8F-7B70-4B8F-BD86-BC83CD9F0297}" type="pres">
-      <dgm:prSet presAssocID="{8159643A-818D-4545-AFE5-29FC064B1AAA}" presName="desTx" presStyleLbl="revTx" presStyleIdx="1" presStyleCnt="5">
-        <dgm:presLayoutVars>
-          <dgm:chMax val="0"/>
-          <dgm:chPref val="0"/>
-          <dgm:bulletEnabled val="1"/>
-        </dgm:presLayoutVars>
-      </dgm:prSet>
-      <dgm:spPr/>
-    </dgm:pt>
-    <dgm:pt modelId="{05D16F6A-9EB7-4E55-B58D-6F5902C7CC80}" type="pres">
-      <dgm:prSet presAssocID="{8159643A-818D-4545-AFE5-29FC064B1AAA}" presName="EmptyPlaceHolder" presStyleCnt="0"/>
-      <dgm:spPr/>
-    </dgm:pt>
-    <dgm:pt modelId="{6A4F6B20-1C90-450E-965A-C1EB3B417C04}" type="pres">
-      <dgm:prSet presAssocID="{384C38D0-1DF9-4571-8437-3CD10BEF2AAE}" presName="space" presStyleCnt="0"/>
-      <dgm:spPr/>
-    </dgm:pt>
-    <dgm:pt modelId="{D85162A9-E7E1-4DA6-A96C-574B4875794C}" type="pres">
-      <dgm:prSet presAssocID="{11173297-B697-4A11-9EAC-E45317C547A3}" presName="composite" presStyleCnt="0"/>
-      <dgm:spPr/>
-    </dgm:pt>
-    <dgm:pt modelId="{5C7AB7EB-E74C-4AF9-873D-5493F7962F03}" type="pres">
-      <dgm:prSet presAssocID="{11173297-B697-4A11-9EAC-E45317C547A3}" presName="L" presStyleLbl="solidFgAcc1" presStyleIdx="2" presStyleCnt="5">
-        <dgm:presLayoutVars>
-          <dgm:chMax val="0"/>
-          <dgm:chPref val="0"/>
-        </dgm:presLayoutVars>
-      </dgm:prSet>
-      <dgm:spPr/>
-    </dgm:pt>
-    <dgm:pt modelId="{FCBE03BB-10EF-463F-ADE9-2490921E2F01}" type="pres">
-      <dgm:prSet presAssocID="{11173297-B697-4A11-9EAC-E45317C547A3}" presName="parTx" presStyleLbl="alignNode1" presStyleIdx="2" presStyleCnt="5">
-        <dgm:presLayoutVars>
-          <dgm:chMax val="0"/>
-          <dgm:chPref val="0"/>
-          <dgm:bulletEnabled val="1"/>
-        </dgm:presLayoutVars>
-      </dgm:prSet>
-      <dgm:spPr/>
-    </dgm:pt>
-    <dgm:pt modelId="{499DECC5-47AF-4CB1-BCD3-F288444FFD05}" type="pres">
-      <dgm:prSet presAssocID="{11173297-B697-4A11-9EAC-E45317C547A3}" presName="desTx" presStyleLbl="revTx" presStyleIdx="2" presStyleCnt="5">
-        <dgm:presLayoutVars>
-          <dgm:chMax val="0"/>
-          <dgm:chPref val="0"/>
-          <dgm:bulletEnabled val="1"/>
-        </dgm:presLayoutVars>
-      </dgm:prSet>
-      <dgm:spPr/>
-    </dgm:pt>
-    <dgm:pt modelId="{303CC2BE-542F-4C56-82EF-DBD9BE5FA7D0}" type="pres">
-      <dgm:prSet presAssocID="{11173297-B697-4A11-9EAC-E45317C547A3}" presName="EmptyPlaceHolder" presStyleCnt="0"/>
-      <dgm:spPr/>
-    </dgm:pt>
-    <dgm:pt modelId="{31E06083-C734-4BB7-B45B-F495DA16657F}" type="pres">
-      <dgm:prSet presAssocID="{F44242F6-86F1-4EA1-8BA3-3748696B9D36}" presName="space" presStyleCnt="0"/>
-      <dgm:spPr/>
-    </dgm:pt>
-    <dgm:pt modelId="{33C0640E-1908-43E2-A30D-C597CD2E5C45}" type="pres">
-      <dgm:prSet presAssocID="{D59A6E49-80F2-47F2-A3F1-A7D3C1042B7A}" presName="composite" presStyleCnt="0"/>
-      <dgm:spPr/>
-    </dgm:pt>
-    <dgm:pt modelId="{D45698BB-B312-4969-9C62-8B658A7BE04B}" type="pres">
-      <dgm:prSet presAssocID="{D59A6E49-80F2-47F2-A3F1-A7D3C1042B7A}" presName="L" presStyleLbl="solidFgAcc1" presStyleIdx="3" presStyleCnt="5">
-        <dgm:presLayoutVars>
-          <dgm:chMax val="0"/>
-          <dgm:chPref val="0"/>
-        </dgm:presLayoutVars>
-      </dgm:prSet>
-      <dgm:spPr/>
-    </dgm:pt>
-    <dgm:pt modelId="{8CE5514B-799A-4B97-A4CE-949CED117359}" type="pres">
-      <dgm:prSet presAssocID="{D59A6E49-80F2-47F2-A3F1-A7D3C1042B7A}" presName="parTx" presStyleLbl="alignNode1" presStyleIdx="3" presStyleCnt="5">
-        <dgm:presLayoutVars>
-          <dgm:chMax val="0"/>
-          <dgm:chPref val="0"/>
-          <dgm:bulletEnabled val="1"/>
-        </dgm:presLayoutVars>
-      </dgm:prSet>
-      <dgm:spPr/>
-    </dgm:pt>
-    <dgm:pt modelId="{26E75E88-EED9-45B9-B2E1-7CF90983F84F}" type="pres">
-      <dgm:prSet presAssocID="{D59A6E49-80F2-47F2-A3F1-A7D3C1042B7A}" presName="desTx" presStyleLbl="revTx" presStyleIdx="3" presStyleCnt="5">
-        <dgm:presLayoutVars>
-          <dgm:chMax val="0"/>
-          <dgm:chPref val="0"/>
-          <dgm:bulletEnabled val="1"/>
-        </dgm:presLayoutVars>
-      </dgm:prSet>
-      <dgm:spPr/>
-    </dgm:pt>
-    <dgm:pt modelId="{0E310878-290E-4CDF-A224-A01279FC1395}" type="pres">
-      <dgm:prSet presAssocID="{D59A6E49-80F2-47F2-A3F1-A7D3C1042B7A}" presName="EmptyPlaceHolder" presStyleCnt="0"/>
-      <dgm:spPr/>
-    </dgm:pt>
-    <dgm:pt modelId="{55F036F5-304F-4940-A050-48A87A0DF8E4}" type="pres">
-      <dgm:prSet presAssocID="{7E011706-AE0C-4AA0-B690-E8284D94C1FB}" presName="space" presStyleCnt="0"/>
-      <dgm:spPr/>
-    </dgm:pt>
-    <dgm:pt modelId="{1B1FFA15-18C7-4FA1-8E23-8A3F31C302EB}" type="pres">
-      <dgm:prSet presAssocID="{8AE324F7-386D-45A2-868A-242E22B37484}" presName="composite" presStyleCnt="0"/>
-      <dgm:spPr/>
-    </dgm:pt>
-    <dgm:pt modelId="{736EA73E-CF05-45B4-A946-DC09155D617E}" type="pres">
-      <dgm:prSet presAssocID="{8AE324F7-386D-45A2-868A-242E22B37484}" presName="L" presStyleLbl="solidFgAcc1" presStyleIdx="4" presStyleCnt="5">
-        <dgm:presLayoutVars>
-          <dgm:chMax val="0"/>
-          <dgm:chPref val="0"/>
-        </dgm:presLayoutVars>
-      </dgm:prSet>
-      <dgm:spPr/>
-    </dgm:pt>
-    <dgm:pt modelId="{507DCF5B-980F-4E37-B5EB-2E84D9C6B52F}" type="pres">
-      <dgm:prSet presAssocID="{8AE324F7-386D-45A2-868A-242E22B37484}" presName="parTx" presStyleLbl="alignNode1" presStyleIdx="4" presStyleCnt="5">
-        <dgm:presLayoutVars>
-          <dgm:chMax val="0"/>
-          <dgm:chPref val="0"/>
-          <dgm:bulletEnabled val="1"/>
-        </dgm:presLayoutVars>
-      </dgm:prSet>
-      <dgm:spPr/>
-    </dgm:pt>
-    <dgm:pt modelId="{EEA84B30-BE1D-4937-8B3F-F60859618187}" type="pres">
-      <dgm:prSet presAssocID="{8AE324F7-386D-45A2-868A-242E22B37484}" presName="desTx" presStyleLbl="revTx" presStyleIdx="4" presStyleCnt="5">
-        <dgm:presLayoutVars>
-          <dgm:chMax val="0"/>
-          <dgm:chPref val="0"/>
-          <dgm:bulletEnabled val="1"/>
-        </dgm:presLayoutVars>
-      </dgm:prSet>
-      <dgm:spPr/>
-    </dgm:pt>
-    <dgm:pt modelId="{74B8F068-5875-4CEC-BBA5-2D4AFCF2A5DE}" type="pres">
-      <dgm:prSet presAssocID="{8AE324F7-386D-45A2-868A-242E22B37484}" presName="EmptyPlaceHolder" presStyleCnt="0"/>
-      <dgm:spPr/>
-    </dgm:pt>
-  </dgm:ptLst>
-  <dgm:cxnLst>
-    <dgm:cxn modelId="{D9DD0A07-3DE1-4FDB-9228-533E0FAB48D9}" srcId="{AAD4E0A1-2FAA-4C4F-A963-A18676DD2709}" destId="{8159643A-818D-4545-AFE5-29FC064B1AAA}" srcOrd="1" destOrd="0" parTransId="{2AC99ED1-74BC-44F4-AB57-AD4179C7D85F}" sibTransId="{384C38D0-1DF9-4571-8437-3CD10BEF2AAE}"/>
-    <dgm:cxn modelId="{9534A01A-7215-484A-B231-394DE85E33EE}" type="presOf" srcId="{8AE324F7-386D-45A2-868A-242E22B37484}" destId="{507DCF5B-980F-4E37-B5EB-2E84D9C6B52F}" srcOrd="0" destOrd="0" presId="urn:microsoft.com/office/officeart/2016/7/layout/AccentHomeChevronProcess"/>
-    <dgm:cxn modelId="{C7E7C71A-8D4E-49A3-870A-EF1B52EA7E44}" type="presOf" srcId="{388BDCB2-DCDF-44F3-8324-AEB38FDDBDD1}" destId="{499DECC5-47AF-4CB1-BCD3-F288444FFD05}" srcOrd="0" destOrd="0" presId="urn:microsoft.com/office/officeart/2016/7/layout/AccentHomeChevronProcess"/>
-    <dgm:cxn modelId="{5674DB32-52A8-4AD6-91A2-851D4F5D774E}" srcId="{8159643A-818D-4545-AFE5-29FC064B1AAA}" destId="{A5F3A565-F1A9-4263-BA1F-374C68AB041C}" srcOrd="0" destOrd="0" parTransId="{BC9CEAF5-0740-4D16-9B53-CFBE32998C15}" sibTransId="{E138BD27-CD5F-4B72-9EE7-AFCFDA324151}"/>
-    <dgm:cxn modelId="{3B4F2C34-A5FB-4876-BE0B-B329E5E0B605}" type="presOf" srcId="{F2C5946E-96AC-4D5A-B458-7D2B25514DE6}" destId="{EEA84B30-BE1D-4937-8B3F-F60859618187}" srcOrd="0" destOrd="0" presId="urn:microsoft.com/office/officeart/2016/7/layout/AccentHomeChevronProcess"/>
-    <dgm:cxn modelId="{EBCA9966-8EF2-49F3-972B-7D6EDBB39C81}" type="presOf" srcId="{11173297-B697-4A11-9EAC-E45317C547A3}" destId="{FCBE03BB-10EF-463F-ADE9-2490921E2F01}" srcOrd="0" destOrd="0" presId="urn:microsoft.com/office/officeart/2016/7/layout/AccentHomeChevronProcess"/>
-    <dgm:cxn modelId="{F7EA216A-8EED-4AEA-8470-B1B8F045C9C9}" srcId="{11173297-B697-4A11-9EAC-E45317C547A3}" destId="{388BDCB2-DCDF-44F3-8324-AEB38FDDBDD1}" srcOrd="0" destOrd="0" parTransId="{37941136-BD0B-4BA2-AB30-C59B281AC064}" sibTransId="{3E43BD3A-DE7D-4F87-8DF8-BE45D9E99A98}"/>
-    <dgm:cxn modelId="{60F2516C-41F3-4218-A1D1-062B64CCA51C}" srcId="{D59A6E49-80F2-47F2-A3F1-A7D3C1042B7A}" destId="{B37999E7-C394-42CA-9788-025667B2F148}" srcOrd="0" destOrd="0" parTransId="{4E4B7B64-9855-4792-8CF8-036E24B99347}" sibTransId="{B2DC8013-B540-4718-801F-00BFBC13037A}"/>
-    <dgm:cxn modelId="{3B32756D-B3E5-411D-8FF5-9443D03E0512}" srcId="{AAD4E0A1-2FAA-4C4F-A963-A18676DD2709}" destId="{59A0B26A-2973-451B-9ADA-6468D9C1A82E}" srcOrd="0" destOrd="0" parTransId="{485F4D2F-583A-4E49-8439-7E9505C9635E}" sibTransId="{82DF06A8-49E6-4C50-8190-748A5D28FD6E}"/>
-    <dgm:cxn modelId="{F30B326E-5A4C-40C9-B022-26DA52A304C3}" type="presOf" srcId="{59A0B26A-2973-451B-9ADA-6468D9C1A82E}" destId="{356E000D-F109-45EB-B501-4B78AA5C433C}" srcOrd="0" destOrd="0" presId="urn:microsoft.com/office/officeart/2016/7/layout/AccentHomeChevronProcess"/>
-    <dgm:cxn modelId="{050C9254-2664-45D0-A7C0-16D1E600B953}" type="presOf" srcId="{D59A6E49-80F2-47F2-A3F1-A7D3C1042B7A}" destId="{8CE5514B-799A-4B97-A4CE-949CED117359}" srcOrd="0" destOrd="0" presId="urn:microsoft.com/office/officeart/2016/7/layout/AccentHomeChevronProcess"/>
-    <dgm:cxn modelId="{F7E24D59-9532-4E70-A381-FD77E8E3792F}" srcId="{59A0B26A-2973-451B-9ADA-6468D9C1A82E}" destId="{EFA50C6C-022A-4BE7-B363-CC5944231205}" srcOrd="0" destOrd="0" parTransId="{2DCDB026-5A6D-4F6F-854C-5F88D23D2A99}" sibTransId="{1640FBF7-6D83-46D6-9A14-66833FCD0185}"/>
-    <dgm:cxn modelId="{BB331587-E8E0-4EB4-A73E-6C4FBC78406B}" type="presOf" srcId="{A5F3A565-F1A9-4263-BA1F-374C68AB041C}" destId="{76F87B8F-7B70-4B8F-BD86-BC83CD9F0297}" srcOrd="0" destOrd="0" presId="urn:microsoft.com/office/officeart/2016/7/layout/AccentHomeChevronProcess"/>
-    <dgm:cxn modelId="{4A7EFD87-320F-45A4-8133-759E7A6020E6}" type="presOf" srcId="{B37999E7-C394-42CA-9788-025667B2F148}" destId="{26E75E88-EED9-45B9-B2E1-7CF90983F84F}" srcOrd="0" destOrd="0" presId="urn:microsoft.com/office/officeart/2016/7/layout/AccentHomeChevronProcess"/>
-    <dgm:cxn modelId="{1AC5888B-5F0A-4CE7-8F69-58ACC0AA1100}" srcId="{8AE324F7-386D-45A2-868A-242E22B37484}" destId="{F2C5946E-96AC-4D5A-B458-7D2B25514DE6}" srcOrd="0" destOrd="0" parTransId="{00377DCE-90FB-46C7-8AA2-8160B9C8E411}" sibTransId="{A191672C-E826-4D12-AE04-B7C722E1DAD5}"/>
-    <dgm:cxn modelId="{3558A59D-7369-44E9-904F-FA6F4D04C070}" srcId="{AAD4E0A1-2FAA-4C4F-A963-A18676DD2709}" destId="{8AE324F7-386D-45A2-868A-242E22B37484}" srcOrd="4" destOrd="0" parTransId="{234A76A7-017C-468D-B6C6-6AE5595F0A60}" sibTransId="{EC9BCBCD-EFC8-4290-B863-734E9A2158AC}"/>
-    <dgm:cxn modelId="{0DCDD2B0-40B4-4FE3-97A4-E8F517D667FA}" type="presOf" srcId="{EFA50C6C-022A-4BE7-B363-CC5944231205}" destId="{690A1E60-14A3-48E2-969A-2D37B614EB37}" srcOrd="0" destOrd="0" presId="urn:microsoft.com/office/officeart/2016/7/layout/AccentHomeChevronProcess"/>
-    <dgm:cxn modelId="{AEC3EBD0-1922-4FDA-8C9E-4E7A1D61E53D}" type="presOf" srcId="{AAD4E0A1-2FAA-4C4F-A963-A18676DD2709}" destId="{783BA2EA-8436-4CCE-A39E-6BCF5238143F}" srcOrd="0" destOrd="0" presId="urn:microsoft.com/office/officeart/2016/7/layout/AccentHomeChevronProcess"/>
-    <dgm:cxn modelId="{1DEAA8D5-09D4-43B8-9CE1-38F63628F861}" srcId="{AAD4E0A1-2FAA-4C4F-A963-A18676DD2709}" destId="{D59A6E49-80F2-47F2-A3F1-A7D3C1042B7A}" srcOrd="3" destOrd="0" parTransId="{0F0347E2-53BF-4AF0-BE04-E562E9D07F8C}" sibTransId="{7E011706-AE0C-4AA0-B690-E8284D94C1FB}"/>
-    <dgm:cxn modelId="{5ADCAFE7-EEA6-4BFA-9A5B-7E47089881FE}" type="presOf" srcId="{8159643A-818D-4545-AFE5-29FC064B1AAA}" destId="{E71F2D5D-B2F9-4DA3-A66A-9C6CCF024E35}" srcOrd="0" destOrd="0" presId="urn:microsoft.com/office/officeart/2016/7/layout/AccentHomeChevronProcess"/>
-    <dgm:cxn modelId="{6C7779F4-FD69-4B67-B910-A8608F5BFD91}" srcId="{AAD4E0A1-2FAA-4C4F-A963-A18676DD2709}" destId="{11173297-B697-4A11-9EAC-E45317C547A3}" srcOrd="2" destOrd="0" parTransId="{04B33EEE-24D9-46D5-87A7-153B2EA6E29D}" sibTransId="{F44242F6-86F1-4EA1-8BA3-3748696B9D36}"/>
-    <dgm:cxn modelId="{6611D126-9F3D-4D3A-AAF3-BB5655B14647}" type="presParOf" srcId="{783BA2EA-8436-4CCE-A39E-6BCF5238143F}" destId="{F0826536-DCAA-4063-BFB9-4645227B9732}" srcOrd="0" destOrd="0" presId="urn:microsoft.com/office/officeart/2016/7/layout/AccentHomeChevronProcess"/>
-    <dgm:cxn modelId="{85796E44-494A-4150-B35F-33B1B9A5FF16}" type="presParOf" srcId="{F0826536-DCAA-4063-BFB9-4645227B9732}" destId="{E3149CA8-F730-4485-B25A-C15A62708F74}" srcOrd="0" destOrd="0" presId="urn:microsoft.com/office/officeart/2016/7/layout/AccentHomeChevronProcess"/>
-    <dgm:cxn modelId="{A166AD79-2619-4D52-A3B3-6215B3AA43D1}" type="presParOf" srcId="{F0826536-DCAA-4063-BFB9-4645227B9732}" destId="{356E000D-F109-45EB-B501-4B78AA5C433C}" srcOrd="1" destOrd="0" presId="urn:microsoft.com/office/officeart/2016/7/layout/AccentHomeChevronProcess"/>
-    <dgm:cxn modelId="{F077F179-9385-4782-9283-8B16C1C2BA34}" type="presParOf" srcId="{F0826536-DCAA-4063-BFB9-4645227B9732}" destId="{690A1E60-14A3-48E2-969A-2D37B614EB37}" srcOrd="2" destOrd="0" presId="urn:microsoft.com/office/officeart/2016/7/layout/AccentHomeChevronProcess"/>
-    <dgm:cxn modelId="{FA9EB690-4AD1-4C19-B9A1-53E66DA560CD}" type="presParOf" srcId="{F0826536-DCAA-4063-BFB9-4645227B9732}" destId="{792BD85C-2D0D-4BF4-AF83-D8128B6A0BBD}" srcOrd="3" destOrd="0" presId="urn:microsoft.com/office/officeart/2016/7/layout/AccentHomeChevronProcess"/>
-    <dgm:cxn modelId="{3742C70D-B7C4-4347-ADE9-AE1A90E7AA08}" type="presParOf" srcId="{783BA2EA-8436-4CCE-A39E-6BCF5238143F}" destId="{B1D346D7-C154-4D58-8724-9D8D322272D9}" srcOrd="1" destOrd="0" presId="urn:microsoft.com/office/officeart/2016/7/layout/AccentHomeChevronProcess"/>
-    <dgm:cxn modelId="{7F2E54B8-A4E8-4F58-B05C-AC407951920B}" type="presParOf" srcId="{783BA2EA-8436-4CCE-A39E-6BCF5238143F}" destId="{14B6A5EE-E0B3-4A85-B764-A872E77BD918}" srcOrd="2" destOrd="0" presId="urn:microsoft.com/office/officeart/2016/7/layout/AccentHomeChevronProcess"/>
-    <dgm:cxn modelId="{B7C14F8B-CC24-4358-ACAC-06BBD57C9232}" type="presParOf" srcId="{14B6A5EE-E0B3-4A85-B764-A872E77BD918}" destId="{CC632145-1148-4956-9088-B915D0D0FD99}" srcOrd="0" destOrd="0" presId="urn:microsoft.com/office/officeart/2016/7/layout/AccentHomeChevronProcess"/>
-    <dgm:cxn modelId="{EB2BC1A5-5145-4896-855A-0AFEACE82BCF}" type="presParOf" srcId="{14B6A5EE-E0B3-4A85-B764-A872E77BD918}" destId="{E71F2D5D-B2F9-4DA3-A66A-9C6CCF024E35}" srcOrd="1" destOrd="0" presId="urn:microsoft.com/office/officeart/2016/7/layout/AccentHomeChevronProcess"/>
-    <dgm:cxn modelId="{BFE19651-BA6F-4861-AC66-33F319D53F7D}" type="presParOf" srcId="{14B6A5EE-E0B3-4A85-B764-A872E77BD918}" destId="{76F87B8F-7B70-4B8F-BD86-BC83CD9F0297}" srcOrd="2" destOrd="0" presId="urn:microsoft.com/office/officeart/2016/7/layout/AccentHomeChevronProcess"/>
-    <dgm:cxn modelId="{98F69F0E-9C66-428E-8A69-C89EADF74318}" type="presParOf" srcId="{14B6A5EE-E0B3-4A85-B764-A872E77BD918}" destId="{05D16F6A-9EB7-4E55-B58D-6F5902C7CC80}" srcOrd="3" destOrd="0" presId="urn:microsoft.com/office/officeart/2016/7/layout/AccentHomeChevronProcess"/>
-    <dgm:cxn modelId="{DA6016D0-FF08-42BE-9BDC-FF482682D30D}" type="presParOf" srcId="{783BA2EA-8436-4CCE-A39E-6BCF5238143F}" destId="{6A4F6B20-1C90-450E-965A-C1EB3B417C04}" srcOrd="3" destOrd="0" presId="urn:microsoft.com/office/officeart/2016/7/layout/AccentHomeChevronProcess"/>
-    <dgm:cxn modelId="{6EF0D53E-C29F-4657-A617-6C3C35BB9FAE}" type="presParOf" srcId="{783BA2EA-8436-4CCE-A39E-6BCF5238143F}" destId="{D85162A9-E7E1-4DA6-A96C-574B4875794C}" srcOrd="4" destOrd="0" presId="urn:microsoft.com/office/officeart/2016/7/layout/AccentHomeChevronProcess"/>
-    <dgm:cxn modelId="{C3DCC376-D230-47A5-B0AF-7BF05A5F988F}" type="presParOf" srcId="{D85162A9-E7E1-4DA6-A96C-574B4875794C}" destId="{5C7AB7EB-E74C-4AF9-873D-5493F7962F03}" srcOrd="0" destOrd="0" presId="urn:microsoft.com/office/officeart/2016/7/layout/AccentHomeChevronProcess"/>
-    <dgm:cxn modelId="{3B951B36-7350-4EA2-B9D5-5614563BACC1}" type="presParOf" srcId="{D85162A9-E7E1-4DA6-A96C-574B4875794C}" destId="{FCBE03BB-10EF-463F-ADE9-2490921E2F01}" srcOrd="1" destOrd="0" presId="urn:microsoft.com/office/officeart/2016/7/layout/AccentHomeChevronProcess"/>
-    <dgm:cxn modelId="{0DF3A932-41AE-4A1B-B940-4F00F9CF7627}" type="presParOf" srcId="{D85162A9-E7E1-4DA6-A96C-574B4875794C}" destId="{499DECC5-47AF-4CB1-BCD3-F288444FFD05}" srcOrd="2" destOrd="0" presId="urn:microsoft.com/office/officeart/2016/7/layout/AccentHomeChevronProcess"/>
-    <dgm:cxn modelId="{959D2AAF-704B-4D08-8294-3790BF74564E}" type="presParOf" srcId="{D85162A9-E7E1-4DA6-A96C-574B4875794C}" destId="{303CC2BE-542F-4C56-82EF-DBD9BE5FA7D0}" srcOrd="3" destOrd="0" presId="urn:microsoft.com/office/officeart/2016/7/layout/AccentHomeChevronProcess"/>
-    <dgm:cxn modelId="{E44537FE-1975-4124-BCD2-862CC511C87F}" type="presParOf" srcId="{783BA2EA-8436-4CCE-A39E-6BCF5238143F}" destId="{31E06083-C734-4BB7-B45B-F495DA16657F}" srcOrd="5" destOrd="0" presId="urn:microsoft.com/office/officeart/2016/7/layout/AccentHomeChevronProcess"/>
-    <dgm:cxn modelId="{D08F1D36-1DBD-4A90-B35A-11CB6AB70837}" type="presParOf" srcId="{783BA2EA-8436-4CCE-A39E-6BCF5238143F}" destId="{33C0640E-1908-43E2-A30D-C597CD2E5C45}" srcOrd="6" destOrd="0" presId="urn:microsoft.com/office/officeart/2016/7/layout/AccentHomeChevronProcess"/>
-    <dgm:cxn modelId="{77398350-C6EC-4106-8EBF-0C0C73F7D8E2}" type="presParOf" srcId="{33C0640E-1908-43E2-A30D-C597CD2E5C45}" destId="{D45698BB-B312-4969-9C62-8B658A7BE04B}" srcOrd="0" destOrd="0" presId="urn:microsoft.com/office/officeart/2016/7/layout/AccentHomeChevronProcess"/>
-    <dgm:cxn modelId="{BB0C5B20-87A6-498F-A1F7-C45BD18A0349}" type="presParOf" srcId="{33C0640E-1908-43E2-A30D-C597CD2E5C45}" destId="{8CE5514B-799A-4B97-A4CE-949CED117359}" srcOrd="1" destOrd="0" presId="urn:microsoft.com/office/officeart/2016/7/layout/AccentHomeChevronProcess"/>
-    <dgm:cxn modelId="{7900CD8C-9318-4089-992F-92843765BB6E}" type="presParOf" srcId="{33C0640E-1908-43E2-A30D-C597CD2E5C45}" destId="{26E75E88-EED9-45B9-B2E1-7CF90983F84F}" srcOrd="2" destOrd="0" presId="urn:microsoft.com/office/officeart/2016/7/layout/AccentHomeChevronProcess"/>
-    <dgm:cxn modelId="{51FB55C6-15A1-4FDA-9B20-03379835FB58}" type="presParOf" srcId="{33C0640E-1908-43E2-A30D-C597CD2E5C45}" destId="{0E310878-290E-4CDF-A224-A01279FC1395}" srcOrd="3" destOrd="0" presId="urn:microsoft.com/office/officeart/2016/7/layout/AccentHomeChevronProcess"/>
-    <dgm:cxn modelId="{846F24E1-EA22-4D81-ACCB-5088E0274B96}" type="presParOf" srcId="{783BA2EA-8436-4CCE-A39E-6BCF5238143F}" destId="{55F036F5-304F-4940-A050-48A87A0DF8E4}" srcOrd="7" destOrd="0" presId="urn:microsoft.com/office/officeart/2016/7/layout/AccentHomeChevronProcess"/>
-    <dgm:cxn modelId="{9CDD98A5-3C45-403C-8FFA-C5E45A5D72EC}" type="presParOf" srcId="{783BA2EA-8436-4CCE-A39E-6BCF5238143F}" destId="{1B1FFA15-18C7-4FA1-8E23-8A3F31C302EB}" srcOrd="8" destOrd="0" presId="urn:microsoft.com/office/officeart/2016/7/layout/AccentHomeChevronProcess"/>
-    <dgm:cxn modelId="{7E6ED34B-B1F0-4FB3-850D-E94B6E9E17D3}" type="presParOf" srcId="{1B1FFA15-18C7-4FA1-8E23-8A3F31C302EB}" destId="{736EA73E-CF05-45B4-A946-DC09155D617E}" srcOrd="0" destOrd="0" presId="urn:microsoft.com/office/officeart/2016/7/layout/AccentHomeChevronProcess"/>
-    <dgm:cxn modelId="{62E0986F-AF8A-4BB9-9929-81DF0F4BFDCA}" type="presParOf" srcId="{1B1FFA15-18C7-4FA1-8E23-8A3F31C302EB}" destId="{507DCF5B-980F-4E37-B5EB-2E84D9C6B52F}" srcOrd="1" destOrd="0" presId="urn:microsoft.com/office/officeart/2016/7/layout/AccentHomeChevronProcess"/>
-    <dgm:cxn modelId="{93041484-7DAD-4FD9-B487-F83C4013B175}" type="presParOf" srcId="{1B1FFA15-18C7-4FA1-8E23-8A3F31C302EB}" destId="{EEA84B30-BE1D-4937-8B3F-F60859618187}" srcOrd="2" destOrd="0" presId="urn:microsoft.com/office/officeart/2016/7/layout/AccentHomeChevronProcess"/>
-    <dgm:cxn modelId="{7003133C-AC1E-431B-BAC1-22BEE521CC89}" type="presParOf" srcId="{1B1FFA15-18C7-4FA1-8E23-8A3F31C302EB}" destId="{74B8F068-5875-4CEC-BBA5-2D4AFCF2A5DE}" srcOrd="3" destOrd="0" presId="urn:microsoft.com/office/officeart/2016/7/layout/AccentHomeChevronProcess"/>
-  </dgm:cxnLst>
-  <dgm:bg/>
-  <dgm:whole/>
-  <dgm:extLst>
-    <a:ext uri="http://schemas.microsoft.com/office/drawing/2008/diagram">
-      <dsp:dataModelExt xmlns:dsp="http://schemas.microsoft.com/office/drawing/2008/diagram" relId="rId6" minVer="http://schemas.openxmlformats.org/drawingml/2006/diagram"/>
-    </a:ext>
-  </dgm:extLst>
-</dgm:dataModel>
-</file>
-
-<file path=ppt/diagrams/drawing1.xml><?xml version="1.0" encoding="utf-8"?>
-<dsp:drawing xmlns:dgm="http://schemas.openxmlformats.org/drawingml/2006/diagram" xmlns:dsp="http://schemas.microsoft.com/office/drawing/2008/diagram" xmlns:a="http://schemas.openxmlformats.org/drawingml/2006/main">
-  <dsp:spTree>
-    <dsp:nvGrpSpPr>
-      <dsp:cNvPr id="0" name=""/>
-      <dsp:cNvGrpSpPr/>
-    </dsp:nvGrpSpPr>
-    <dsp:grpSpPr/>
-    <dsp:sp modelId="{E3149CA8-F730-4485-B25A-C15A62708F74}">
-      <dsp:nvSpPr>
-        <dsp:cNvPr id="0" name=""/>
-        <dsp:cNvSpPr/>
-      </dsp:nvSpPr>
-      <dsp:spPr>
-        <a:xfrm rot="5400000">
-          <a:off x="-764178" y="1529189"/>
-          <a:ext cx="1716426" cy="183760"/>
-        </a:xfrm>
-        <a:prstGeom prst="corner">
-          <a:avLst>
-            <a:gd name="adj1" fmla="val 1000"/>
-            <a:gd name="adj2" fmla="val 1000"/>
-          </a:avLst>
-        </a:prstGeom>
-        <a:solidFill>
-          <a:schemeClr val="lt2">
-            <a:hueOff val="0"/>
-            <a:satOff val="0"/>
-            <a:lumOff val="0"/>
-            <a:alphaOff val="0"/>
-          </a:schemeClr>
-        </a:solidFill>
-        <a:ln w="22225" cap="rnd" cmpd="sng" algn="ctr">
-          <a:solidFill>
-            <a:schemeClr val="dk2">
-              <a:hueOff val="0"/>
-              <a:satOff val="0"/>
-              <a:lumOff val="0"/>
-              <a:alphaOff val="0"/>
-            </a:schemeClr>
-          </a:solidFill>
-          <a:prstDash val="solid"/>
-        </a:ln>
-        <a:effectLst/>
-      </dsp:spPr>
-      <dsp:style>
-        <a:lnRef idx="2">
-          <a:scrgbClr r="0" g="0" b="0"/>
-        </a:lnRef>
-        <a:fillRef idx="1">
-          <a:scrgbClr r="0" g="0" b="0"/>
-        </a:fillRef>
-        <a:effectRef idx="0">
-          <a:scrgbClr r="0" g="0" b="0"/>
-        </a:effectRef>
-        <a:fontRef idx="minor"/>
-      </dsp:style>
-    </dsp:sp>
-    <dsp:sp modelId="{356E000D-F109-45EB-B501-4B78AA5C433C}">
-      <dsp:nvSpPr>
-        <dsp:cNvPr id="0" name=""/>
-        <dsp:cNvSpPr/>
-      </dsp:nvSpPr>
-      <dsp:spPr>
-        <a:xfrm>
-          <a:off x="2154" y="2479282"/>
-          <a:ext cx="2297008" cy="572142"/>
-        </a:xfrm>
-        <a:prstGeom prst="homePlate">
-          <a:avLst>
-            <a:gd name="adj" fmla="val 25000"/>
-          </a:avLst>
-        </a:prstGeom>
-        <a:solidFill>
-          <a:schemeClr val="dk2">
-            <a:hueOff val="0"/>
-            <a:satOff val="0"/>
-            <a:lumOff val="0"/>
-            <a:alphaOff val="0"/>
-          </a:schemeClr>
-        </a:solidFill>
-        <a:ln w="22225" cap="rnd" cmpd="sng" algn="ctr">
-          <a:solidFill>
-            <a:schemeClr val="dk2">
-              <a:hueOff val="0"/>
-              <a:satOff val="0"/>
-              <a:lumOff val="0"/>
-              <a:alphaOff val="0"/>
-            </a:schemeClr>
-          </a:solidFill>
-          <a:prstDash val="solid"/>
-        </a:ln>
-        <a:effectLst/>
-      </dsp:spPr>
-      <dsp:style>
-        <a:lnRef idx="2">
-          <a:scrgbClr r="0" g="0" b="0"/>
-        </a:lnRef>
-        <a:fillRef idx="1">
-          <a:scrgbClr r="0" g="0" b="0"/>
-        </a:fillRef>
-        <a:effectRef idx="0">
-          <a:scrgbClr r="0" g="0" b="0"/>
-        </a:effectRef>
-        <a:fontRef idx="minor">
-          <a:schemeClr val="lt1"/>
-        </a:fontRef>
-      </dsp:style>
-      <dsp:txBody>
-        <a:bodyPr spcFirstLastPara="0" vert="horz" wrap="square" lIns="88900" tIns="177800" rIns="88900" bIns="177800" numCol="1" spcCol="1270" anchor="ctr" anchorCtr="0">
-          <a:noAutofit/>
-        </a:bodyPr>
-        <a:lstStyle/>
-        <a:p>
-          <a:pPr marL="0" lvl="0" indent="0" algn="ctr" defTabSz="622300">
-            <a:lnSpc>
-              <a:spcPct val="90000"/>
-            </a:lnSpc>
-            <a:spcBef>
-              <a:spcPct val="0"/>
-            </a:spcBef>
-            <a:spcAft>
-              <a:spcPct val="35000"/>
-            </a:spcAft>
-            <a:buNone/>
-          </a:pPr>
-          <a:r>
-            <a:rPr lang="en-US" sz="1400" kern="1200" dirty="0"/>
-            <a:t>2016</a:t>
-          </a:r>
-        </a:p>
-      </dsp:txBody>
-      <dsp:txXfrm>
-        <a:off x="2154" y="2479282"/>
-        <a:ext cx="2225490" cy="572142"/>
-      </dsp:txXfrm>
-    </dsp:sp>
-    <dsp:sp modelId="{690A1E60-14A3-48E2-969A-2D37B614EB37}">
-      <dsp:nvSpPr>
-        <dsp:cNvPr id="0" name=""/>
-        <dsp:cNvSpPr/>
-      </dsp:nvSpPr>
-      <dsp:spPr>
-        <a:xfrm>
-          <a:off x="185914" y="873112"/>
-          <a:ext cx="1865171" cy="1076732"/>
-        </a:xfrm>
-        <a:prstGeom prst="rect">
-          <a:avLst/>
-        </a:prstGeom>
-        <a:noFill/>
-        <a:ln>
-          <a:noFill/>
-        </a:ln>
-        <a:effectLst/>
-      </dsp:spPr>
-      <dsp:style>
-        <a:lnRef idx="0">
-          <a:scrgbClr r="0" g="0" b="0"/>
-        </a:lnRef>
-        <a:fillRef idx="0">
-          <a:scrgbClr r="0" g="0" b="0"/>
-        </a:fillRef>
-        <a:effectRef idx="0">
-          <a:scrgbClr r="0" g="0" b="0"/>
-        </a:effectRef>
-        <a:fontRef idx="minor"/>
-      </dsp:style>
-      <dsp:txBody>
-        <a:bodyPr spcFirstLastPara="0" vert="horz" wrap="square" lIns="0" tIns="0" rIns="0" bIns="0" numCol="1" spcCol="1270" anchor="t" anchorCtr="0">
-          <a:noAutofit/>
-        </a:bodyPr>
-        <a:lstStyle/>
-        <a:p>
-          <a:pPr marL="0" lvl="0" indent="0" algn="l" defTabSz="622300">
-            <a:lnSpc>
-              <a:spcPct val="90000"/>
-            </a:lnSpc>
-            <a:spcBef>
-              <a:spcPct val="0"/>
-            </a:spcBef>
-            <a:spcAft>
-              <a:spcPct val="35000"/>
-            </a:spcAft>
-            <a:buNone/>
-          </a:pPr>
-          <a:r>
-            <a:rPr lang="en-US" sz="1400" kern="1200" dirty="0"/>
-            <a:t>Lorem ipsum dolor sit amet, consectetuer adipiscing elit. </a:t>
-          </a:r>
-        </a:p>
-      </dsp:txBody>
-      <dsp:txXfrm>
-        <a:off x="185914" y="873112"/>
-        <a:ext cx="1865171" cy="1076732"/>
-      </dsp:txXfrm>
-    </dsp:sp>
-    <dsp:sp modelId="{CC632145-1148-4956-9088-B915D0D0FD99}">
-      <dsp:nvSpPr>
-        <dsp:cNvPr id="0" name=""/>
-        <dsp:cNvSpPr/>
-      </dsp:nvSpPr>
-      <dsp:spPr>
-        <a:xfrm rot="5400000">
-          <a:off x="1417979" y="1529189"/>
-          <a:ext cx="1716426" cy="183760"/>
-        </a:xfrm>
-        <a:prstGeom prst="corner">
-          <a:avLst>
-            <a:gd name="adj1" fmla="val 1000"/>
-            <a:gd name="adj2" fmla="val 1000"/>
-          </a:avLst>
-        </a:prstGeom>
-        <a:solidFill>
-          <a:schemeClr val="lt2">
-            <a:hueOff val="0"/>
-            <a:satOff val="0"/>
-            <a:lumOff val="0"/>
-            <a:alphaOff val="0"/>
-          </a:schemeClr>
-        </a:solidFill>
-        <a:ln w="22225" cap="rnd" cmpd="sng" algn="ctr">
-          <a:solidFill>
-            <a:schemeClr val="dk2">
-              <a:hueOff val="0"/>
-              <a:satOff val="0"/>
-              <a:lumOff val="0"/>
-              <a:alphaOff val="0"/>
-            </a:schemeClr>
-          </a:solidFill>
-          <a:prstDash val="solid"/>
-        </a:ln>
-        <a:effectLst/>
-      </dsp:spPr>
-      <dsp:style>
-        <a:lnRef idx="2">
-          <a:scrgbClr r="0" g="0" b="0"/>
-        </a:lnRef>
-        <a:fillRef idx="1">
-          <a:scrgbClr r="0" g="0" b="0"/>
-        </a:fillRef>
-        <a:effectRef idx="0">
-          <a:scrgbClr r="0" g="0" b="0"/>
-        </a:effectRef>
-        <a:fontRef idx="minor"/>
-      </dsp:style>
-    </dsp:sp>
-    <dsp:sp modelId="{E71F2D5D-B2F9-4DA3-A66A-9C6CCF024E35}">
-      <dsp:nvSpPr>
-        <dsp:cNvPr id="0" name=""/>
-        <dsp:cNvSpPr/>
-      </dsp:nvSpPr>
-      <dsp:spPr>
-        <a:xfrm>
-          <a:off x="2184312" y="2479282"/>
-          <a:ext cx="2297008" cy="572142"/>
-        </a:xfrm>
-        <a:prstGeom prst="chevron">
-          <a:avLst>
-            <a:gd name="adj" fmla="val 25000"/>
-          </a:avLst>
-        </a:prstGeom>
-        <a:solidFill>
-          <a:schemeClr val="dk2">
-            <a:hueOff val="0"/>
-            <a:satOff val="0"/>
-            <a:lumOff val="0"/>
-            <a:alphaOff val="0"/>
-          </a:schemeClr>
-        </a:solidFill>
-        <a:ln w="22225" cap="rnd" cmpd="sng" algn="ctr">
-          <a:solidFill>
-            <a:schemeClr val="dk2">
-              <a:hueOff val="0"/>
-              <a:satOff val="0"/>
-              <a:lumOff val="0"/>
-              <a:alphaOff val="0"/>
-            </a:schemeClr>
-          </a:solidFill>
-          <a:prstDash val="solid"/>
-        </a:ln>
-        <a:effectLst/>
-      </dsp:spPr>
-      <dsp:style>
-        <a:lnRef idx="2">
-          <a:scrgbClr r="0" g="0" b="0"/>
-        </a:lnRef>
-        <a:fillRef idx="1">
-          <a:scrgbClr r="0" g="0" b="0"/>
-        </a:fillRef>
-        <a:effectRef idx="0">
-          <a:scrgbClr r="0" g="0" b="0"/>
-        </a:effectRef>
-        <a:fontRef idx="minor">
-          <a:schemeClr val="lt1"/>
-        </a:fontRef>
-      </dsp:style>
-      <dsp:txBody>
-        <a:bodyPr spcFirstLastPara="0" vert="horz" wrap="square" lIns="88900" tIns="177800" rIns="88900" bIns="177800" numCol="1" spcCol="1270" anchor="ctr" anchorCtr="0">
-          <a:noAutofit/>
-        </a:bodyPr>
-        <a:lstStyle/>
-        <a:p>
-          <a:pPr marL="0" lvl="0" indent="0" algn="ctr" defTabSz="622300">
-            <a:lnSpc>
-              <a:spcPct val="90000"/>
-            </a:lnSpc>
-            <a:spcBef>
-              <a:spcPct val="0"/>
-            </a:spcBef>
-            <a:spcAft>
-              <a:spcPct val="35000"/>
-            </a:spcAft>
-            <a:buNone/>
-          </a:pPr>
-          <a:r>
-            <a:rPr lang="en-US" sz="1400" kern="1200" dirty="0"/>
-            <a:t>2017</a:t>
-          </a:r>
-        </a:p>
-      </dsp:txBody>
-      <dsp:txXfrm>
-        <a:off x="2327348" y="2479282"/>
-        <a:ext cx="2010937" cy="572142"/>
-      </dsp:txXfrm>
-    </dsp:sp>
-    <dsp:sp modelId="{76F87B8F-7B70-4B8F-BD86-BC83CD9F0297}">
-      <dsp:nvSpPr>
-        <dsp:cNvPr id="0" name=""/>
-        <dsp:cNvSpPr/>
-      </dsp:nvSpPr>
-      <dsp:spPr>
-        <a:xfrm>
-          <a:off x="2368073" y="873112"/>
-          <a:ext cx="1865171" cy="1076732"/>
-        </a:xfrm>
-        <a:prstGeom prst="rect">
-          <a:avLst/>
-        </a:prstGeom>
-        <a:noFill/>
-        <a:ln>
-          <a:noFill/>
-        </a:ln>
-        <a:effectLst/>
-      </dsp:spPr>
-      <dsp:style>
-        <a:lnRef idx="0">
-          <a:scrgbClr r="0" g="0" b="0"/>
-        </a:lnRef>
-        <a:fillRef idx="0">
-          <a:scrgbClr r="0" g="0" b="0"/>
-        </a:fillRef>
-        <a:effectRef idx="0">
-          <a:scrgbClr r="0" g="0" b="0"/>
-        </a:effectRef>
-        <a:fontRef idx="minor"/>
-      </dsp:style>
-      <dsp:txBody>
-        <a:bodyPr spcFirstLastPara="0" vert="horz" wrap="square" lIns="0" tIns="0" rIns="0" bIns="0" numCol="1" spcCol="1270" anchor="t" anchorCtr="0">
-          <a:noAutofit/>
-        </a:bodyPr>
-        <a:lstStyle/>
-        <a:p>
-          <a:pPr marL="0" lvl="0" indent="0" algn="l" defTabSz="622300">
-            <a:lnSpc>
-              <a:spcPct val="90000"/>
-            </a:lnSpc>
-            <a:spcBef>
-              <a:spcPct val="0"/>
-            </a:spcBef>
-            <a:spcAft>
-              <a:spcPct val="35000"/>
-            </a:spcAft>
-            <a:buNone/>
-          </a:pPr>
-          <a:r>
-            <a:rPr lang="en-US" sz="1400" kern="1200" dirty="0"/>
-            <a:t>Lorem ipsum dolor sit amet, consectetuer adipiscing elit. </a:t>
-          </a:r>
-        </a:p>
-      </dsp:txBody>
-      <dsp:txXfrm>
-        <a:off x="2368073" y="873112"/>
-        <a:ext cx="1865171" cy="1076732"/>
-      </dsp:txXfrm>
-    </dsp:sp>
-    <dsp:sp modelId="{5C7AB7EB-E74C-4AF9-873D-5493F7962F03}">
-      <dsp:nvSpPr>
-        <dsp:cNvPr id="0" name=""/>
-        <dsp:cNvSpPr/>
-      </dsp:nvSpPr>
-      <dsp:spPr>
-        <a:xfrm rot="5400000">
-          <a:off x="3600137" y="1529189"/>
-          <a:ext cx="1716426" cy="183760"/>
-        </a:xfrm>
-        <a:prstGeom prst="corner">
-          <a:avLst>
-            <a:gd name="adj1" fmla="val 1000"/>
-            <a:gd name="adj2" fmla="val 1000"/>
-          </a:avLst>
-        </a:prstGeom>
-        <a:solidFill>
-          <a:schemeClr val="lt2">
-            <a:hueOff val="0"/>
-            <a:satOff val="0"/>
-            <a:lumOff val="0"/>
-            <a:alphaOff val="0"/>
-          </a:schemeClr>
-        </a:solidFill>
-        <a:ln w="22225" cap="rnd" cmpd="sng" algn="ctr">
-          <a:solidFill>
-            <a:schemeClr val="dk2">
-              <a:hueOff val="0"/>
-              <a:satOff val="0"/>
-              <a:lumOff val="0"/>
-              <a:alphaOff val="0"/>
-            </a:schemeClr>
-          </a:solidFill>
-          <a:prstDash val="solid"/>
-        </a:ln>
-        <a:effectLst/>
-      </dsp:spPr>
-      <dsp:style>
-        <a:lnRef idx="2">
-          <a:scrgbClr r="0" g="0" b="0"/>
-        </a:lnRef>
-        <a:fillRef idx="1">
-          <a:scrgbClr r="0" g="0" b="0"/>
-        </a:fillRef>
-        <a:effectRef idx="0">
-          <a:scrgbClr r="0" g="0" b="0"/>
-        </a:effectRef>
-        <a:fontRef idx="minor"/>
-      </dsp:style>
-    </dsp:sp>
-    <dsp:sp modelId="{FCBE03BB-10EF-463F-ADE9-2490921E2F01}">
-      <dsp:nvSpPr>
-        <dsp:cNvPr id="0" name=""/>
-        <dsp:cNvSpPr/>
-      </dsp:nvSpPr>
-      <dsp:spPr>
-        <a:xfrm>
-          <a:off x="4366470" y="2479282"/>
-          <a:ext cx="2297008" cy="572142"/>
-        </a:xfrm>
-        <a:prstGeom prst="chevron">
-          <a:avLst>
-            <a:gd name="adj" fmla="val 25000"/>
-          </a:avLst>
-        </a:prstGeom>
-        <a:solidFill>
-          <a:schemeClr val="dk2">
-            <a:hueOff val="0"/>
-            <a:satOff val="0"/>
-            <a:lumOff val="0"/>
-            <a:alphaOff val="0"/>
-          </a:schemeClr>
-        </a:solidFill>
-        <a:ln w="22225" cap="rnd" cmpd="sng" algn="ctr">
-          <a:solidFill>
-            <a:schemeClr val="dk2">
-              <a:hueOff val="0"/>
-              <a:satOff val="0"/>
-              <a:lumOff val="0"/>
-              <a:alphaOff val="0"/>
-            </a:schemeClr>
-          </a:solidFill>
-          <a:prstDash val="solid"/>
-        </a:ln>
-        <a:effectLst/>
-      </dsp:spPr>
-      <dsp:style>
-        <a:lnRef idx="2">
-          <a:scrgbClr r="0" g="0" b="0"/>
-        </a:lnRef>
-        <a:fillRef idx="1">
-          <a:scrgbClr r="0" g="0" b="0"/>
-        </a:fillRef>
-        <a:effectRef idx="0">
-          <a:scrgbClr r="0" g="0" b="0"/>
-        </a:effectRef>
-        <a:fontRef idx="minor">
-          <a:schemeClr val="lt1"/>
-        </a:fontRef>
-      </dsp:style>
-      <dsp:txBody>
-        <a:bodyPr spcFirstLastPara="0" vert="horz" wrap="square" lIns="88900" tIns="177800" rIns="88900" bIns="177800" numCol="1" spcCol="1270" anchor="ctr" anchorCtr="0">
-          <a:noAutofit/>
-        </a:bodyPr>
-        <a:lstStyle/>
-        <a:p>
-          <a:pPr marL="0" lvl="0" indent="0" algn="ctr" defTabSz="622300">
-            <a:lnSpc>
-              <a:spcPct val="90000"/>
-            </a:lnSpc>
-            <a:spcBef>
-              <a:spcPct val="0"/>
-            </a:spcBef>
-            <a:spcAft>
-              <a:spcPct val="35000"/>
-            </a:spcAft>
-            <a:buNone/>
-          </a:pPr>
-          <a:r>
-            <a:rPr lang="en-US" sz="1400" kern="1200" dirty="0"/>
-            <a:t>2018</a:t>
-          </a:r>
-        </a:p>
-      </dsp:txBody>
-      <dsp:txXfrm>
-        <a:off x="4509506" y="2479282"/>
-        <a:ext cx="2010937" cy="572142"/>
-      </dsp:txXfrm>
-    </dsp:sp>
-    <dsp:sp modelId="{499DECC5-47AF-4CB1-BCD3-F288444FFD05}">
-      <dsp:nvSpPr>
-        <dsp:cNvPr id="0" name=""/>
-        <dsp:cNvSpPr/>
-      </dsp:nvSpPr>
-      <dsp:spPr>
-        <a:xfrm>
-          <a:off x="4550231" y="873112"/>
-          <a:ext cx="1865171" cy="1076732"/>
-        </a:xfrm>
-        <a:prstGeom prst="rect">
-          <a:avLst/>
-        </a:prstGeom>
-        <a:noFill/>
-        <a:ln>
-          <a:noFill/>
-        </a:ln>
-        <a:effectLst/>
-      </dsp:spPr>
-      <dsp:style>
-        <a:lnRef idx="0">
-          <a:scrgbClr r="0" g="0" b="0"/>
-        </a:lnRef>
-        <a:fillRef idx="0">
-          <a:scrgbClr r="0" g="0" b="0"/>
-        </a:fillRef>
-        <a:effectRef idx="0">
-          <a:scrgbClr r="0" g="0" b="0"/>
-        </a:effectRef>
-        <a:fontRef idx="minor"/>
-      </dsp:style>
-      <dsp:txBody>
-        <a:bodyPr spcFirstLastPara="0" vert="horz" wrap="square" lIns="0" tIns="0" rIns="0" bIns="0" numCol="1" spcCol="1270" anchor="t" anchorCtr="0">
-          <a:noAutofit/>
-        </a:bodyPr>
-        <a:lstStyle/>
-        <a:p>
-          <a:pPr marL="0" lvl="0" indent="0" algn="l" defTabSz="622300">
-            <a:lnSpc>
-              <a:spcPct val="90000"/>
-            </a:lnSpc>
-            <a:spcBef>
-              <a:spcPct val="0"/>
-            </a:spcBef>
-            <a:spcAft>
-              <a:spcPct val="35000"/>
-            </a:spcAft>
-            <a:buNone/>
-          </a:pPr>
-          <a:r>
-            <a:rPr lang="en-US" sz="1400" kern="1200" dirty="0"/>
-            <a:t>Lorem ipsum dolor sit amet, consectetuer adipiscing elit. </a:t>
-          </a:r>
-        </a:p>
-      </dsp:txBody>
-      <dsp:txXfrm>
-        <a:off x="4550231" y="873112"/>
-        <a:ext cx="1865171" cy="1076732"/>
-      </dsp:txXfrm>
-    </dsp:sp>
-    <dsp:sp modelId="{D45698BB-B312-4969-9C62-8B658A7BE04B}">
-      <dsp:nvSpPr>
-        <dsp:cNvPr id="0" name=""/>
-        <dsp:cNvSpPr/>
-      </dsp:nvSpPr>
-      <dsp:spPr>
-        <a:xfrm rot="5400000">
-          <a:off x="5782296" y="1529189"/>
-          <a:ext cx="1716426" cy="183760"/>
-        </a:xfrm>
-        <a:prstGeom prst="corner">
-          <a:avLst>
-            <a:gd name="adj1" fmla="val 1000"/>
-            <a:gd name="adj2" fmla="val 1000"/>
-          </a:avLst>
-        </a:prstGeom>
-        <a:solidFill>
-          <a:schemeClr val="lt2">
-            <a:hueOff val="0"/>
-            <a:satOff val="0"/>
-            <a:lumOff val="0"/>
-            <a:alphaOff val="0"/>
-          </a:schemeClr>
-        </a:solidFill>
-        <a:ln w="22225" cap="rnd" cmpd="sng" algn="ctr">
-          <a:solidFill>
-            <a:schemeClr val="dk2">
-              <a:hueOff val="0"/>
-              <a:satOff val="0"/>
-              <a:lumOff val="0"/>
-              <a:alphaOff val="0"/>
-            </a:schemeClr>
-          </a:solidFill>
-          <a:prstDash val="solid"/>
-        </a:ln>
-        <a:effectLst/>
-      </dsp:spPr>
-      <dsp:style>
-        <a:lnRef idx="2">
-          <a:scrgbClr r="0" g="0" b="0"/>
-        </a:lnRef>
-        <a:fillRef idx="1">
-          <a:scrgbClr r="0" g="0" b="0"/>
-        </a:fillRef>
-        <a:effectRef idx="0">
-          <a:scrgbClr r="0" g="0" b="0"/>
-        </a:effectRef>
-        <a:fontRef idx="minor"/>
-      </dsp:style>
-    </dsp:sp>
-    <dsp:sp modelId="{8CE5514B-799A-4B97-A4CE-949CED117359}">
-      <dsp:nvSpPr>
-        <dsp:cNvPr id="0" name=""/>
-        <dsp:cNvSpPr/>
-      </dsp:nvSpPr>
-      <dsp:spPr>
-        <a:xfrm>
-          <a:off x="6548628" y="2479282"/>
-          <a:ext cx="2297008" cy="572142"/>
-        </a:xfrm>
-        <a:prstGeom prst="chevron">
-          <a:avLst>
-            <a:gd name="adj" fmla="val 25000"/>
-          </a:avLst>
-        </a:prstGeom>
-        <a:solidFill>
-          <a:schemeClr val="dk2">
-            <a:hueOff val="0"/>
-            <a:satOff val="0"/>
-            <a:lumOff val="0"/>
-            <a:alphaOff val="0"/>
-          </a:schemeClr>
-        </a:solidFill>
-        <a:ln w="22225" cap="rnd" cmpd="sng" algn="ctr">
-          <a:solidFill>
-            <a:schemeClr val="dk2">
-              <a:hueOff val="0"/>
-              <a:satOff val="0"/>
-              <a:lumOff val="0"/>
-              <a:alphaOff val="0"/>
-            </a:schemeClr>
-          </a:solidFill>
-          <a:prstDash val="solid"/>
-        </a:ln>
-        <a:effectLst/>
-      </dsp:spPr>
-      <dsp:style>
-        <a:lnRef idx="2">
-          <a:scrgbClr r="0" g="0" b="0"/>
-        </a:lnRef>
-        <a:fillRef idx="1">
-          <a:scrgbClr r="0" g="0" b="0"/>
-        </a:fillRef>
-        <a:effectRef idx="0">
-          <a:scrgbClr r="0" g="0" b="0"/>
-        </a:effectRef>
-        <a:fontRef idx="minor">
-          <a:schemeClr val="lt1"/>
-        </a:fontRef>
-      </dsp:style>
-      <dsp:txBody>
-        <a:bodyPr spcFirstLastPara="0" vert="horz" wrap="square" lIns="88900" tIns="177800" rIns="88900" bIns="177800" numCol="1" spcCol="1270" anchor="ctr" anchorCtr="0">
-          <a:noAutofit/>
-        </a:bodyPr>
-        <a:lstStyle/>
-        <a:p>
-          <a:pPr marL="0" lvl="0" indent="0" algn="ctr" defTabSz="622300">
-            <a:lnSpc>
-              <a:spcPct val="90000"/>
-            </a:lnSpc>
-            <a:spcBef>
-              <a:spcPct val="0"/>
-            </a:spcBef>
-            <a:spcAft>
-              <a:spcPct val="35000"/>
-            </a:spcAft>
-            <a:buNone/>
-          </a:pPr>
-          <a:r>
-            <a:rPr lang="en-US" sz="1400" kern="1200" dirty="0"/>
-            <a:t>2019</a:t>
-          </a:r>
-        </a:p>
-      </dsp:txBody>
-      <dsp:txXfrm>
-        <a:off x="6691664" y="2479282"/>
-        <a:ext cx="2010937" cy="572142"/>
-      </dsp:txXfrm>
-    </dsp:sp>
-    <dsp:sp modelId="{26E75E88-EED9-45B9-B2E1-7CF90983F84F}">
-      <dsp:nvSpPr>
-        <dsp:cNvPr id="0" name=""/>
-        <dsp:cNvSpPr/>
-      </dsp:nvSpPr>
-      <dsp:spPr>
-        <a:xfrm>
-          <a:off x="6732389" y="873112"/>
-          <a:ext cx="1865171" cy="1076732"/>
-        </a:xfrm>
-        <a:prstGeom prst="rect">
-          <a:avLst/>
-        </a:prstGeom>
-        <a:noFill/>
-        <a:ln>
-          <a:noFill/>
-        </a:ln>
-        <a:effectLst/>
-      </dsp:spPr>
-      <dsp:style>
-        <a:lnRef idx="0">
-          <a:scrgbClr r="0" g="0" b="0"/>
-        </a:lnRef>
-        <a:fillRef idx="0">
-          <a:scrgbClr r="0" g="0" b="0"/>
-        </a:fillRef>
-        <a:effectRef idx="0">
-          <a:scrgbClr r="0" g="0" b="0"/>
-        </a:effectRef>
-        <a:fontRef idx="minor"/>
-      </dsp:style>
-      <dsp:txBody>
-        <a:bodyPr spcFirstLastPara="0" vert="horz" wrap="square" lIns="0" tIns="0" rIns="0" bIns="0" numCol="1" spcCol="1270" anchor="t" anchorCtr="0">
-          <a:noAutofit/>
-        </a:bodyPr>
-        <a:lstStyle/>
-        <a:p>
-          <a:pPr marL="0" lvl="0" indent="0" algn="l" defTabSz="622300">
-            <a:lnSpc>
-              <a:spcPct val="90000"/>
-            </a:lnSpc>
-            <a:spcBef>
-              <a:spcPct val="0"/>
-            </a:spcBef>
-            <a:spcAft>
-              <a:spcPct val="35000"/>
-            </a:spcAft>
-            <a:buNone/>
-          </a:pPr>
-          <a:r>
-            <a:rPr lang="en-US" sz="1400" kern="1200" dirty="0"/>
-            <a:t>Lorem ipsum dolor sit amet, consectetuer adipiscing elit. </a:t>
-          </a:r>
-        </a:p>
-      </dsp:txBody>
-      <dsp:txXfrm>
-        <a:off x="6732389" y="873112"/>
-        <a:ext cx="1865171" cy="1076732"/>
-      </dsp:txXfrm>
-    </dsp:sp>
-    <dsp:sp modelId="{736EA73E-CF05-45B4-A946-DC09155D617E}">
-      <dsp:nvSpPr>
-        <dsp:cNvPr id="0" name=""/>
-        <dsp:cNvSpPr/>
-      </dsp:nvSpPr>
-      <dsp:spPr>
-        <a:xfrm rot="5400000">
-          <a:off x="7964454" y="1529189"/>
-          <a:ext cx="1716426" cy="183760"/>
-        </a:xfrm>
-        <a:prstGeom prst="corner">
-          <a:avLst>
-            <a:gd name="adj1" fmla="val 1000"/>
-            <a:gd name="adj2" fmla="val 1000"/>
-          </a:avLst>
-        </a:prstGeom>
-        <a:solidFill>
-          <a:schemeClr val="lt2">
-            <a:hueOff val="0"/>
-            <a:satOff val="0"/>
-            <a:lumOff val="0"/>
-            <a:alphaOff val="0"/>
-          </a:schemeClr>
-        </a:solidFill>
-        <a:ln w="22225" cap="rnd" cmpd="sng" algn="ctr">
-          <a:solidFill>
-            <a:schemeClr val="dk2">
-              <a:hueOff val="0"/>
-              <a:satOff val="0"/>
-              <a:lumOff val="0"/>
-              <a:alphaOff val="0"/>
-            </a:schemeClr>
-          </a:solidFill>
-          <a:prstDash val="solid"/>
-        </a:ln>
-        <a:effectLst/>
-      </dsp:spPr>
-      <dsp:style>
-        <a:lnRef idx="2">
-          <a:scrgbClr r="0" g="0" b="0"/>
-        </a:lnRef>
-        <a:fillRef idx="1">
-          <a:scrgbClr r="0" g="0" b="0"/>
-        </a:fillRef>
-        <a:effectRef idx="0">
-          <a:scrgbClr r="0" g="0" b="0"/>
-        </a:effectRef>
-        <a:fontRef idx="minor"/>
-      </dsp:style>
-    </dsp:sp>
-    <dsp:sp modelId="{507DCF5B-980F-4E37-B5EB-2E84D9C6B52F}">
-      <dsp:nvSpPr>
-        <dsp:cNvPr id="0" name=""/>
-        <dsp:cNvSpPr/>
-      </dsp:nvSpPr>
-      <dsp:spPr>
-        <a:xfrm>
-          <a:off x="8730787" y="2479282"/>
-          <a:ext cx="2297008" cy="572142"/>
-        </a:xfrm>
-        <a:prstGeom prst="chevron">
-          <a:avLst>
-            <a:gd name="adj" fmla="val 25000"/>
-          </a:avLst>
-        </a:prstGeom>
-        <a:solidFill>
-          <a:schemeClr val="dk2">
-            <a:hueOff val="0"/>
-            <a:satOff val="0"/>
-            <a:lumOff val="0"/>
-            <a:alphaOff val="0"/>
-          </a:schemeClr>
-        </a:solidFill>
-        <a:ln w="22225" cap="rnd" cmpd="sng" algn="ctr">
-          <a:solidFill>
-            <a:schemeClr val="dk2">
-              <a:hueOff val="0"/>
-              <a:satOff val="0"/>
-              <a:lumOff val="0"/>
-              <a:alphaOff val="0"/>
-            </a:schemeClr>
-          </a:solidFill>
-          <a:prstDash val="solid"/>
-        </a:ln>
-        <a:effectLst/>
-      </dsp:spPr>
-      <dsp:style>
-        <a:lnRef idx="2">
-          <a:scrgbClr r="0" g="0" b="0"/>
-        </a:lnRef>
-        <a:fillRef idx="1">
-          <a:scrgbClr r="0" g="0" b="0"/>
-        </a:fillRef>
-        <a:effectRef idx="0">
-          <a:scrgbClr r="0" g="0" b="0"/>
-        </a:effectRef>
-        <a:fontRef idx="minor">
-          <a:schemeClr val="lt1"/>
-        </a:fontRef>
-      </dsp:style>
-      <dsp:txBody>
-        <a:bodyPr spcFirstLastPara="0" vert="horz" wrap="square" lIns="88900" tIns="177800" rIns="88900" bIns="177800" numCol="1" spcCol="1270" anchor="ctr" anchorCtr="0">
-          <a:noAutofit/>
-        </a:bodyPr>
-        <a:lstStyle/>
-        <a:p>
-          <a:pPr marL="0" lvl="0" indent="0" algn="ctr" defTabSz="622300">
-            <a:lnSpc>
-              <a:spcPct val="90000"/>
-            </a:lnSpc>
-            <a:spcBef>
-              <a:spcPct val="0"/>
-            </a:spcBef>
-            <a:spcAft>
-              <a:spcPct val="35000"/>
-            </a:spcAft>
-            <a:buNone/>
-          </a:pPr>
-          <a:r>
-            <a:rPr lang="en-US" sz="1400" kern="1200" dirty="0"/>
-            <a:t>2020</a:t>
-          </a:r>
-        </a:p>
-      </dsp:txBody>
-      <dsp:txXfrm>
-        <a:off x="8873823" y="2479282"/>
-        <a:ext cx="2010937" cy="572142"/>
-      </dsp:txXfrm>
-    </dsp:sp>
-    <dsp:sp modelId="{EEA84B30-BE1D-4937-8B3F-F60859618187}">
-      <dsp:nvSpPr>
-        <dsp:cNvPr id="0" name=""/>
-        <dsp:cNvSpPr/>
-      </dsp:nvSpPr>
-      <dsp:spPr>
-        <a:xfrm>
-          <a:off x="8914547" y="873112"/>
-          <a:ext cx="1865171" cy="1076732"/>
-        </a:xfrm>
-        <a:prstGeom prst="rect">
-          <a:avLst/>
-        </a:prstGeom>
-        <a:noFill/>
-        <a:ln>
-          <a:noFill/>
-        </a:ln>
-        <a:effectLst/>
-      </dsp:spPr>
-      <dsp:style>
-        <a:lnRef idx="0">
-          <a:scrgbClr r="0" g="0" b="0"/>
-        </a:lnRef>
-        <a:fillRef idx="0">
-          <a:scrgbClr r="0" g="0" b="0"/>
-        </a:fillRef>
-        <a:effectRef idx="0">
-          <a:scrgbClr r="0" g="0" b="0"/>
-        </a:effectRef>
-        <a:fontRef idx="minor"/>
-      </dsp:style>
-      <dsp:txBody>
-        <a:bodyPr spcFirstLastPara="0" vert="horz" wrap="square" lIns="0" tIns="0" rIns="0" bIns="0" numCol="1" spcCol="1270" anchor="t" anchorCtr="0">
-          <a:noAutofit/>
-        </a:bodyPr>
-        <a:lstStyle/>
-        <a:p>
-          <a:pPr marL="0" lvl="0" indent="0" algn="l" defTabSz="622300">
-            <a:lnSpc>
-              <a:spcPct val="90000"/>
-            </a:lnSpc>
-            <a:spcBef>
-              <a:spcPct val="0"/>
-            </a:spcBef>
-            <a:spcAft>
-              <a:spcPct val="35000"/>
-            </a:spcAft>
-            <a:buNone/>
-          </a:pPr>
-          <a:r>
-            <a:rPr lang="en-US" sz="1400" kern="1200" dirty="0"/>
-            <a:t>Lorem ipsum dolor sit amet, consectetuer adipiscing elit. </a:t>
-          </a:r>
-        </a:p>
-      </dsp:txBody>
-      <dsp:txXfrm>
-        <a:off x="8914547" y="873112"/>
-        <a:ext cx="1865171" cy="1076732"/>
-      </dsp:txXfrm>
-    </dsp:sp>
-  </dsp:spTree>
-</dsp:drawing>
-</file>
-
-<file path=ppt/diagrams/layout1.xml><?xml version="1.0" encoding="utf-8"?>
-<dgm:layoutDef xmlns:dgm="http://schemas.openxmlformats.org/drawingml/2006/diagram" xmlns:a="http://schemas.openxmlformats.org/drawingml/2006/main" uniqueId="urn:microsoft.com/office/officeart/2016/7/layout/AccentHomeChevronProcess">
-  <dgm:title val="Accent Home Chevron Process"/>
-  <dgm:desc val="Use to show a progression; a timeline; sequential steps in a task, process, or workflow; or to emphasize movement or direction. Level 1 text appears inside an chevron shape, except the first shape which comes in a home shape, while Level 2 text appears above the invisible rectangle shapes."/>
-  <dgm:catLst>
-    <dgm:cat type="process" pri="500"/>
-    <dgm:cat type="timeline" pri="600"/>
-  </dgm:catLst>
-  <dgm:sampData>
-    <dgm:dataModel>
-      <dgm:ptLst>
-        <dgm:pt modelId="0" type="doc"/>
-        <dgm:pt modelId="10">
-          <dgm:prSet phldr="1"/>
-        </dgm:pt>
-        <dgm:pt modelId="11">
-          <dgm:prSet phldr="1"/>
-        </dgm:pt>
-        <dgm:pt modelId="20">
-          <dgm:prSet phldr="1"/>
-        </dgm:pt>
-        <dgm:pt modelId="21">
-          <dgm:prSet phldr="1"/>
-        </dgm:pt>
-        <dgm:pt modelId="30">
-          <dgm:prSet phldr="1"/>
-        </dgm:pt>
-        <dgm:pt modelId="31">
-          <dgm:prSet phldr="1"/>
-        </dgm:pt>
-      </dgm:ptLst>
-      <dgm:cxnLst>
-        <dgm:cxn modelId="40" srcId="0" destId="10" srcOrd="0" destOrd="0"/>
-        <dgm:cxn modelId="12" srcId="10" destId="11" srcOrd="0" destOrd="0"/>
-        <dgm:cxn modelId="50" srcId="0" destId="20" srcOrd="1" destOrd="0"/>
-        <dgm:cxn modelId="22" srcId="20" destId="21" srcOrd="0" destOrd="0"/>
-        <dgm:cxn modelId="60" srcId="0" destId="30" srcOrd="1" destOrd="0"/>
-        <dgm:cxn modelId="32" srcId="30" destId="31" srcOrd="0" destOrd="0"/>
-      </dgm:cxnLst>
-      <dgm:bg/>
-      <dgm:whole/>
-    </dgm:dataModel>
-  </dgm:sampData>
-  <dgm:styleData>
-    <dgm:dataModel>
-      <dgm:ptLst>
-        <dgm:pt modelId="0" type="doc"/>
-        <dgm:pt modelId="10">
-          <dgm:prSet phldr="1"/>
-        </dgm:pt>
-        <dgm:pt modelId="20">
-          <dgm:prSet phldr="1"/>
-        </dgm:pt>
-      </dgm:ptLst>
-      <dgm:cxnLst>
-        <dgm:cxn modelId="60" srcId="0" destId="10" srcOrd="0" destOrd="0"/>
-        <dgm:cxn modelId="70" srcId="0" destId="20" srcOrd="1" destOrd="0"/>
-      </dgm:cxnLst>
-      <dgm:bg/>
-      <dgm:whole/>
-    </dgm:dataModel>
-  </dgm:styleData>
-  <dgm:clrData>
-    <dgm:dataModel>
-      <dgm:ptLst>
-        <dgm:pt modelId="0" type="doc"/>
-        <dgm:pt modelId="10">
-          <dgm:prSet phldr="1"/>
-        </dgm:pt>
-        <dgm:pt modelId="20">
-          <dgm:prSet phldr="1"/>
-        </dgm:pt>
-        <dgm:pt modelId="30">
-          <dgm:prSet phldr="1"/>
-        </dgm:pt>
-        <dgm:pt modelId="40">
-          <dgm:prSet phldr="1"/>
-        </dgm:pt>
-      </dgm:ptLst>
-      <dgm:cxnLst>
-        <dgm:cxn modelId="60" srcId="0" destId="10" srcOrd="0" destOrd="0"/>
-        <dgm:cxn modelId="70" srcId="0" destId="20" srcOrd="1" destOrd="0"/>
-        <dgm:cxn modelId="80" srcId="0" destId="30" srcOrd="2" destOrd="0"/>
-        <dgm:cxn modelId="90" srcId="0" destId="40" srcOrd="3" destOrd="0"/>
-      </dgm:cxnLst>
-      <dgm:bg/>
-      <dgm:whole/>
-    </dgm:dataModel>
-  </dgm:clrData>
-  <dgm:layoutNode name="Name0">
-    <dgm:varLst>
-      <dgm:animLvl val="lvl"/>
-      <dgm:resizeHandles val="exact"/>
-    </dgm:varLst>
-    <dgm:choose name="Name1">
-      <dgm:if name="Name2" func="var" arg="dir" op="equ" val="norm">
-        <dgm:alg type="lin"/>
-      </dgm:if>
-      <dgm:else name="Name3">
-        <dgm:alg type="lin">
-          <dgm:param type="linDir" val="fromR"/>
-        </dgm:alg>
-      </dgm:else>
-    </dgm:choose>
-    <dgm:shape xmlns:r="http://schemas.openxmlformats.org/officeDocument/2006/relationships" r:blip="">
-      <dgm:adjLst/>
-    </dgm:shape>
-    <dgm:presOf/>
-    <dgm:choose name="contrsBasedOnsibTransCount">
-      <dgm:if name="oneSibTrans" axis="ch" ptType="sibTrans" func="cnt" op="equ" val="1">
-        <dgm:constrLst>
-          <dgm:constr type="h" for="ch" forName="composite" refType="h" fact="0.6"/>
-          <dgm:constr type="w" for="ch" forName="composite" refType="w"/>
-          <dgm:constr type="primFontSz" for="des" forName="parTx" val="20"/>
-          <dgm:constr type="primFontSz" for="des" forName="desTx" refType="primFontSz" refFor="des" refForName="parTx" op="lte"/>
-          <dgm:constr type="primFontSz" for="des" forName="parTx" op="equ"/>
-          <dgm:constr type="primFontSz" for="des" forName="desTx" op="equ"/>
-          <dgm:constr type="w" for="ch" forName="space" refType="w" refFor="ch" refForName="composite" fact="-0.02"/>
-          <dgm:constr type="w" for="ch" ptType="sibTrans" op="equ"/>
-        </dgm:constrLst>
-      </dgm:if>
-      <dgm:else name="moreThanOneSibTrans">
-        <dgm:choose name="contrsForMoreThanOneSibTrans">
-          <dgm:if name="twoSibTrans" axis="ch" ptType="sibTrans" func="cnt" op="equ" val="2">
-            <dgm:constrLst>
-              <dgm:constr type="h" for="ch" forName="composite" refType="h" fact="0.6"/>
-              <dgm:constr type="w" for="ch" forName="composite" refType="w"/>
-              <dgm:constr type="primFontSz" for="des" forName="parTx" val="20"/>
-              <dgm:constr type="primFontSz" for="des" forName="desTx" refType="primFontSz" refFor="des" refForName="parTx" op="lte"/>
-              <dgm:constr type="primFontSz" for="des" forName="parTx" op="equ"/>
-              <dgm:constr type="primFontSz" for="des" forName="desTx" op="equ"/>
-              <dgm:constr type="w" for="ch" forName="space" refType="w" refFor="ch" refForName="composite" fact="-0.03"/>
-              <dgm:constr type="w" for="ch" ptType="sibTrans" op="equ"/>
-            </dgm:constrLst>
-          </dgm:if>
-          <dgm:else name="moreThanTwoSibTrans">
-            <dgm:choose name="contrsForMoreThanTwoSibTrans">
-              <dgm:if name="threeSibTrans" axis="ch" ptType="sibTrans" func="cnt" op="equ" val="3">
-                <dgm:constrLst>
-                  <dgm:constr type="h" for="ch" forName="composite" refType="h" fact="0.6"/>
-                  <dgm:constr type="w" for="ch" forName="composite" refType="w"/>
-                  <dgm:constr type="primFontSz" for="des" forName="parTx" val="20"/>
-                  <dgm:constr type="primFontSz" for="des" forName="desTx" refType="primFontSz" refFor="des" refForName="parTx" op="lte"/>
-                  <dgm:constr type="primFontSz" for="des" forName="parTx" op="equ"/>
-                  <dgm:constr type="primFontSz" for="des" forName="desTx" op="equ"/>
-                  <dgm:constr type="w" for="ch" forName="space" refType="w" refFor="ch" refForName="composite" fact="-0.04"/>
-                  <dgm:constr type="w" for="ch" ptType="sibTrans" op="equ"/>
-                </dgm:constrLst>
-              </dgm:if>
-              <dgm:else name="moreThanThreeSibTrans">
-                <dgm:choose name="contrsForMoreThanThreeSibTrans">
-                  <dgm:if name="fourToSixSibTrans" axis="ch" ptType="sibTrans" func="cnt" op="lte" val="6">
-                    <dgm:constrLst>
-                      <dgm:constr type="h" for="ch" forName="composite" refType="h" fact="0.6"/>
-                      <dgm:constr type="w" for="ch" forName="composite" refType="w"/>
-                      <dgm:constr type="primFontSz" for="des" forName="parTx" val="20"/>
-                      <dgm:constr type="primFontSz" for="des" forName="desTx" refType="primFontSz" refFor="des" refForName="parTx" op="lte"/>
-                      <dgm:constr type="primFontSz" for="des" forName="parTx" op="equ"/>
-                      <dgm:constr type="primFontSz" for="des" forName="desTx" op="equ"/>
-                      <dgm:constr type="w" for="ch" forName="space" refType="w" refFor="ch" refForName="composite" fact="-0.05"/>
-                      <dgm:constr type="w" for="ch" ptType="sibTrans" op="equ"/>
-                    </dgm:constrLst>
-                  </dgm:if>
-                  <dgm:else name="moreThanSixSibTrans">
-                    <dgm:choose name="contrsForMoreThanSixSibTrans">
-                      <dgm:if name="sevenToEightSibTrans" axis="ch" ptType="sibTrans" func="cnt" op="lte" val="8">
-                        <dgm:constrLst>
-                          <dgm:constr type="h" for="ch" forName="composite" refType="h" fact="0.6"/>
-                          <dgm:constr type="w" for="ch" forName="composite" refType="w"/>
-                          <dgm:constr type="primFontSz" for="des" forName="parTx" val="20"/>
-                          <dgm:constr type="primFontSz" for="des" forName="desTx" refType="primFontSz" refFor="des" refForName="parTx" op="lte"/>
-                          <dgm:constr type="primFontSz" for="des" forName="parTx" op="equ"/>
-                          <dgm:constr type="primFontSz" for="des" forName="desTx" op="equ"/>
-                          <dgm:constr type="w" for="ch" forName="space" refType="w" refFor="ch" refForName="composite" fact="-0.07"/>
-                          <dgm:constr type="w" for="ch" ptType="sibTrans" op="equ"/>
-                        </dgm:constrLst>
-                      </dgm:if>
-                      <dgm:else name="moreThanEightSibTrans">
-                        <dgm:constrLst>
-                          <dgm:constr type="h" for="ch" forName="composite" refType="h" fact="0.6"/>
-                          <dgm:constr type="w" for="ch" forName="composite" refType="w"/>
-                          <dgm:constr type="primFontSz" for="des" forName="parTx" val="20"/>
-                          <dgm:constr type="primFontSz" for="des" forName="desTx" refType="primFontSz" refFor="des" refForName="parTx" op="lte"/>
-                          <dgm:constr type="primFontSz" for="des" forName="parTx" op="equ"/>
-                          <dgm:constr type="primFontSz" for="des" forName="desTx" op="equ"/>
-                          <dgm:constr type="w" for="ch" forName="space" refType="w" refFor="ch" refForName="composite" fact="-0.09"/>
-                          <dgm:constr type="w" for="ch" ptType="sibTrans" op="equ"/>
-                        </dgm:constrLst>
-                      </dgm:else>
-                    </dgm:choose>
-                  </dgm:else>
-                </dgm:choose>
-              </dgm:else>
-            </dgm:choose>
-          </dgm:else>
-        </dgm:choose>
-      </dgm:else>
-    </dgm:choose>
-    <dgm:ruleLst/>
-    <dgm:forEach name="Name6" axis="ch" ptType="node">
-      <dgm:layoutNode name="composite">
-        <dgm:alg type="composite"/>
-        <dgm:shape xmlns:r="http://schemas.openxmlformats.org/officeDocument/2006/relationships" r:blip="">
-          <dgm:adjLst/>
-        </dgm:shape>
-        <dgm:presOf/>
-        <dgm:choose name="LayoutLTRorRTL">
-          <dgm:if name="LayoutLTR" func="var" arg="dir" op="equ" val="norm">
-            <dgm:constrLst>
-              <dgm:constr type="w" for="ch" forName="L" refType="w" fact="0.08"/>
-              <dgm:constr type="h" for="ch" forName="L" refType="h" fact="0.75"/>
-              <dgm:constr type="l" for="ch" forName="L"/>
-              <dgm:constr type="l" for="ch" forName="parTx"/>
-              <dgm:constr type="w" for="ch" forName="parTx" refType="w"/>
-              <dgm:constr type="h" for="ch" forName="parTx" refType="h" fact="0.25"/>
-              <dgm:constr type="t" for="ch" forName="parTx" refType="b" refFor="ch" refForName="L"/>
-              <dgm:constr type="t" for="ch" forName="desTx" refType="w" refFor="ch" refForName="L" fact="0.6"/>
-              <dgm:constr type="b" for="ch" forName="desTx" refType="t" refFor="ch" refForName="EmptyPlaceHolder"/>
-              <dgm:constr type="l" for="ch" forName="desTx" refType="r" refFor="ch" refForName="L"/>
-              <dgm:constr type="w" for="ch" forName="desTx" refType="w" fact="0.812"/>
-              <dgm:constr type="w" for="ch" forName="EmptyPlaceHolder" refType="w" fact="0.82"/>
-              <dgm:constr type="l" for="ch" forName="EmptyPlaceHolder" refType="r" refFor="ch" refForName="L"/>
-              <dgm:constr type="b" for="ch" forName="EmptyPlaceHolder" refType="b" refFor="ch" refForName="L"/>
-              <dgm:constr type="h" for="ch" forName="EmptyPlaceHolder" refType="t" refFor="ch" refForName="desTx"/>
-            </dgm:constrLst>
-          </dgm:if>
-          <dgm:else name="LayoutRTL">
-            <dgm:constrLst>
-              <dgm:constr type="w" for="ch" forName="L" refType="w" fact="0.08"/>
-              <dgm:constr type="h" for="ch" forName="L" refType="h" fact="0.75"/>
-              <dgm:constr type="r" for="ch" forName="L" refType="w"/>
-              <dgm:constr type="r" for="ch" forName="parTx" refType="w"/>
-              <dgm:constr type="w" for="ch" forName="parTx" refType="w"/>
-              <dgm:constr type="h" for="ch" forName="parTx" refType="h" fact="0.25"/>
-              <dgm:constr type="t" for="ch" forName="parTx" refType="b" refFor="ch" refForName="L"/>
-              <dgm:constr type="t" for="ch" forName="desTx" refType="w" refFor="ch" refForName="L" fact="0.6"/>
-              <dgm:constr type="b" for="ch" forName="desTx" refType="t" refFor="ch" refForName="EmptyPlaceHolder"/>
-              <dgm:constr type="r" for="ch" forName="desTx" refType="l" refFor="ch" refForName="L"/>
-              <dgm:constr type="w" for="ch" forName="desTx" refType="w" fact="0.812"/>
-              <dgm:constr type="w" for="ch" forName="EmptyPlaceHolder" refType="w" fact="0.82"/>
-              <dgm:constr type="h" for="ch" forName="EmptyPlaceHolder" refType="w" refFor="ch" refForName="L" fact="0.6"/>
-              <dgm:constr type="b" for="ch" forName="EmptyPlaceHolder" refType="b" refFor="ch" refForName="L"/>
-            </dgm:constrLst>
-          </dgm:else>
-        </dgm:choose>
-        <dgm:layoutNode name="L" styleLbl="solidFgAcc1" moveWith="parTx">
-          <dgm:varLst>
-            <dgm:chMax val="0"/>
-            <dgm:chPref val="0"/>
-          </dgm:varLst>
-          <dgm:alg type="sp"/>
-          <dgm:choose name="Name310">
-            <dgm:if name="Name311" func="var" arg="dir" op="equ" val="norm">
-              <dgm:shape xmlns:r="http://schemas.openxmlformats.org/officeDocument/2006/relationships" rot="90" type="corner" r:blip="">
-                <dgm:adjLst>
-                  <dgm:adj idx="1" val="0.01"/>
-                  <dgm:adj idx="2" val="0.01"/>
-                </dgm:adjLst>
-              </dgm:shape>
-            </dgm:if>
-            <dgm:else name="Name312">
-              <dgm:shape xmlns:r="http://schemas.openxmlformats.org/officeDocument/2006/relationships" rot="180" type="corner" r:blip="">
-                <dgm:adjLst>
-                  <dgm:adj idx="1" val="0.01"/>
-                  <dgm:adj idx="2" val="0.01"/>
-                </dgm:adjLst>
-              </dgm:shape>
-            </dgm:else>
-          </dgm:choose>
-          <dgm:presOf/>
-          <dgm:constrLst/>
-          <dgm:ruleLst/>
-        </dgm:layoutNode>
-        <dgm:layoutNode name="parTx" styleLbl="alignNode1">
-          <dgm:varLst>
-            <dgm:chMax val="0"/>
-            <dgm:chPref val="0"/>
-            <dgm:bulletEnabled val="1"/>
-          </dgm:varLst>
-          <dgm:alg type="tx">
-            <dgm:param type="txAnchorVert" val="mid"/>
-            <dgm:param type="parTxLTRAlign" val="ctr"/>
-            <dgm:param type="parTxRTLAlign" val="ctr"/>
-          </dgm:alg>
-          <dgm:choose name="MakeFirstNodeHomePlate">
-            <dgm:if name="IfFirstNode" axis="self" ptType="node" func="pos" op="equ" val="1">
-              <dgm:choose name="Name110">
-                <dgm:if name="Name111" func="var" arg="dir" op="equ" val="norm">
-                  <dgm:shape xmlns:r="http://schemas.openxmlformats.org/officeDocument/2006/relationships" type="homePlate" r:blip="">
-                    <dgm:adjLst>
-                      <dgm:adj idx="1" val="0.25"/>
-                    </dgm:adjLst>
-                  </dgm:shape>
-                </dgm:if>
-                <dgm:else name="Name112">
-                  <dgm:shape xmlns:r="http://schemas.openxmlformats.org/officeDocument/2006/relationships" rot="180" type="homePlate" r:blip="">
-                    <dgm:adjLst>
-                      <dgm:adj idx="1" val="0.25"/>
-                    </dgm:adjLst>
-                  </dgm:shape>
-                </dgm:else>
-              </dgm:choose>
-            </dgm:if>
-            <dgm:else name="MakeRestOfNodesChevrons">
-              <dgm:choose name="Name10">
-                <dgm:if name="Name11" func="var" arg="dir" op="equ" val="norm">
-                  <dgm:shape xmlns:r="http://schemas.openxmlformats.org/officeDocument/2006/relationships" type="chevron" r:blip="">
-                    <dgm:adjLst>
-                      <dgm:adj idx="1" val="0.25"/>
-                    </dgm:adjLst>
-                  </dgm:shape>
-                </dgm:if>
-                <dgm:else name="Name12">
-                  <dgm:shape xmlns:r="http://schemas.openxmlformats.org/officeDocument/2006/relationships" rot="180" type="chevron" r:blip="">
-                    <dgm:adjLst>
-                      <dgm:adj idx="1" val="0.25"/>
-                    </dgm:adjLst>
-                  </dgm:shape>
-                </dgm:else>
-              </dgm:choose>
-            </dgm:else>
-          </dgm:choose>
-          <dgm:presOf axis="self" ptType="node"/>
-          <dgm:constrLst>
-            <dgm:constr type="tMarg" refType="primFontSz"/>
-            <dgm:constr type="bMarg" refType="primFontSz"/>
-            <dgm:constr type="lMarg" refType="primFontSz" fact="0.5"/>
-            <dgm:constr type="rMarg" refType="primFontSz" fact="0.5"/>
-          </dgm:constrLst>
-          <dgm:ruleLst>
-            <dgm:rule type="primFontSz" val="13" fact="NaN" max="NaN"/>
-          </dgm:ruleLst>
-        </dgm:layoutNode>
-        <dgm:layoutNode name="desTx" styleLbl="revTx" moveWith="parTx">
-          <dgm:varLst>
-            <dgm:chMax val="0"/>
-            <dgm:chPref val="0"/>
-            <dgm:bulletEnabled val="1"/>
-          </dgm:varLst>
-          <dgm:choose name="Name210">
-            <dgm:if name="Name211" func="var" arg="dir" op="equ" val="norm">
-              <dgm:alg type="tx">
-                <dgm:param type="txAnchorVert" val="t"/>
-                <dgm:param type="parTxLTRAlign" val="l"/>
-                <dgm:param type="shpTxLTRAlignCh" val="l"/>
-                <dgm:param type="parTxRTLAlign" val="l"/>
-                <dgm:param type="shpTxRTLAlignCh" val="l"/>
-              </dgm:alg>
-            </dgm:if>
-            <dgm:else name="Name212">
-              <dgm:alg type="tx">
-                <dgm:param type="txAnchorVert" val="t"/>
-                <dgm:param type="parTxLTRAlign" val="r"/>
-                <dgm:param type="shpTxLTRAlignCh" val="r"/>
-                <dgm:param type="parTxRTLAlign" val="r"/>
-                <dgm:param type="shpTxRTLAlignCh" val="r"/>
-              </dgm:alg>
-            </dgm:else>
-          </dgm:choose>
-          <dgm:shape xmlns:r="http://schemas.openxmlformats.org/officeDocument/2006/relationships" type="rect" r:blip="">
-            <dgm:adjLst/>
-          </dgm:shape>
-          <dgm:presOf axis="des" ptType="node"/>
-          <dgm:constrLst>
-            <dgm:constr type="tMarg"/>
-            <dgm:constr type="bMarg"/>
-            <dgm:constr type="lMarg"/>
-            <dgm:constr type="rMarg"/>
-          </dgm:constrLst>
-          <dgm:ruleLst>
-            <dgm:rule type="primFontSz" val="11" fact="NaN" max="NaN"/>
-            <dgm:rule type="secFontSz" val="9" fact="NaN" max="NaN"/>
-          </dgm:ruleLst>
-        </dgm:layoutNode>
-        <dgm:layoutNode name="EmptyPlaceHolder">
-          <dgm:alg type="sp"/>
-          <dgm:shape xmlns:r="http://schemas.openxmlformats.org/officeDocument/2006/relationships" r:blip="">
-            <dgm:adjLst/>
-          </dgm:shape>
-          <dgm:presOf/>
-          <dgm:constrLst/>
-        </dgm:layoutNode>
-      </dgm:layoutNode>
-      <dgm:forEach name="Name19" axis="followSib" ptType="sibTrans" cnt="1">
-        <dgm:layoutNode name="space">
-          <dgm:alg type="sp"/>
-          <dgm:shape xmlns:r="http://schemas.openxmlformats.org/officeDocument/2006/relationships" r:blip="">
-            <dgm:adjLst/>
-          </dgm:shape>
-          <dgm:presOf/>
-          <dgm:constrLst/>
-          <dgm:ruleLst/>
-        </dgm:layoutNode>
-      </dgm:forEach>
-    </dgm:forEach>
-  </dgm:layoutNode>
-</dgm:layoutDef>
-</file>
-
-<file path=ppt/diagrams/quickStyle1.xml><?xml version="1.0" encoding="utf-8"?>
-<dgm:styleDef xmlns:dgm="http://schemas.openxmlformats.org/drawingml/2006/diagram" xmlns:a="http://schemas.openxmlformats.org/drawingml/2006/main" uniqueId="urn:microsoft.com/office/officeart/2005/8/quickstyle/simple1">
-  <dgm:title val=""/>
-  <dgm:desc val=""/>
-  <dgm:catLst>
-    <dgm:cat type="simple" pri="10100"/>
-  </dgm:catLst>
-  <dgm:scene3d>
-    <a:camera prst="orthographicFront"/>
-    <a:lightRig rig="threePt" dir="t"/>
-  </dgm:scene3d>
-  <dgm:styleLbl name="node0">
-    <dgm:scene3d>
-      <a:camera prst="orthographicFront"/>
-      <a:lightRig rig="threePt" dir="t"/>
-    </dgm:scene3d>
-    <dgm:sp3d/>
-    <dgm:txPr/>
-    <dgm:style>
-      <a:lnRef idx="2">
-        <a:scrgbClr r="0" g="0" b="0"/>
-      </a:lnRef>
-      <a:fillRef idx="1">
-        <a:scrgbClr r="0" g="0" b="0"/>
-      </a:fillRef>
-      <a:effectRef idx="0">
-        <a:scrgbClr r="0" g="0" b="0"/>
-      </a:effectRef>
-      <a:fontRef idx="minor">
-        <a:schemeClr val="lt1"/>
-      </a:fontRef>
-    </dgm:style>
-  </dgm:styleLbl>
-  <dgm:styleLbl name="lnNode1">
-    <dgm:scene3d>
-      <a:camera prst="orthographicFront"/>
-      <a:lightRig rig="threePt" dir="t"/>
-    </dgm:scene3d>
-    <dgm:sp3d/>
-    <dgm:txPr/>
-    <dgm:style>
-      <a:lnRef idx="2">
-        <a:scrgbClr r="0" g="0" b="0"/>
-      </a:lnRef>
-      <a:fillRef idx="1">
-        <a:scrgbClr r="0" g="0" b="0"/>
-      </a:fillRef>
-      <a:effectRef idx="0">
-        <a:scrgbClr r="0" g="0" b="0"/>
-      </a:effectRef>
-      <a:fontRef idx="minor">
-        <a:schemeClr val="lt1"/>
-      </a:fontRef>
-    </dgm:style>
-  </dgm:styleLbl>
-  <dgm:styleLbl name="vennNode1">
-    <dgm:scene3d>
-      <a:camera prst="orthographicFront"/>
-      <a:lightRig rig="threePt" dir="t"/>
-    </dgm:scene3d>
-    <dgm:sp3d/>
-    <dgm:txPr/>
-    <dgm:style>
-      <a:lnRef idx="2">
-        <a:scrgbClr r="0" g="0" b="0"/>
-      </a:lnRef>
-      <a:fillRef idx="1">
-        <a:scrgbClr r="0" g="0" b="0"/>
-      </a:fillRef>
-      <a:effectRef idx="0">
-        <a:scrgbClr r="0" g="0" b="0"/>
-      </a:effectRef>
-      <a:fontRef idx="minor">
-        <a:schemeClr val="tx1"/>
-      </a:fontRef>
-    </dgm:style>
-  </dgm:styleLbl>
-  <dgm:styleLbl name="alignNode1">
-    <dgm:scene3d>
-      <a:camera prst="orthographicFront"/>
-      <a:lightRig rig="threePt" dir="t"/>
-    </dgm:scene3d>
-    <dgm:sp3d/>
-    <dgm:txPr/>
-    <dgm:style>
-      <a:lnRef idx="2">
-        <a:scrgbClr r="0" g="0" b="0"/>
-      </a:lnRef>
-      <a:fillRef idx="1">
-        <a:scrgbClr r="0" g="0" b="0"/>
-      </a:fillRef>
-      <a:effectRef idx="0">
-        <a:scrgbClr r="0" g="0" b="0"/>
-      </a:effectRef>
-      <a:fontRef idx="minor">
-        <a:schemeClr val="lt1"/>
-      </a:fontRef>
-    </dgm:style>
-  </dgm:styleLbl>
-  <dgm:styleLbl name="node1">
-    <dgm:scene3d>
-      <a:camera prst="orthographicFront"/>
-      <a:lightRig rig="threePt" dir="t"/>
-    </dgm:scene3d>
-    <dgm:sp3d/>
-    <dgm:txPr/>
-    <dgm:style>
-      <a:lnRef idx="2">
-        <a:scrgbClr r="0" g="0" b="0"/>
-      </a:lnRef>
-      <a:fillRef idx="1">
-        <a:scrgbClr r="0" g="0" b="0"/>
-      </a:fillRef>
-      <a:effectRef idx="0">
-        <a:scrgbClr r="0" g="0" b="0"/>
-      </a:effectRef>
-      <a:fontRef idx="minor">
-        <a:schemeClr val="lt1"/>
-      </a:fontRef>
-    </dgm:style>
-  </dgm:styleLbl>
-  <dgm:styleLbl name="node2">
-    <dgm:scene3d>
-      <a:camera prst="orthographicFront"/>
-      <a:lightRig rig="threePt" dir="t"/>
-    </dgm:scene3d>
-    <dgm:sp3d/>
-    <dgm:txPr/>
-    <dgm:style>
-      <a:lnRef idx="2">
-        <a:scrgbClr r="0" g="0" b="0"/>
-      </a:lnRef>
-      <a:fillRef idx="1">
-        <a:scrgbClr r="0" g="0" b="0"/>
-      </a:fillRef>
-      <a:effectRef idx="0">
-        <a:scrgbClr r="0" g="0" b="0"/>
-      </a:effectRef>
-      <a:fontRef idx="minor">
-        <a:schemeClr val="lt1"/>
-      </a:fontRef>
-    </dgm:style>
-  </dgm:styleLbl>
-  <dgm:styleLbl name="node3">
-    <dgm:scene3d>
-      <a:camera prst="orthographicFront"/>
-      <a:lightRig rig="threePt" dir="t"/>
-    </dgm:scene3d>
-    <dgm:sp3d/>
-    <dgm:txPr/>
-    <dgm:style>
-      <a:lnRef idx="2">
-        <a:scrgbClr r="0" g="0" b="0"/>
-      </a:lnRef>
-      <a:fillRef idx="1">
-        <a:scrgbClr r="0" g="0" b="0"/>
-      </a:fillRef>
-      <a:effectRef idx="0">
-        <a:scrgbClr r="0" g="0" b="0"/>
-      </a:effectRef>
-      <a:fontRef idx="minor">
-        <a:schemeClr val="lt1"/>
-      </a:fontRef>
-    </dgm:style>
-  </dgm:styleLbl>
-  <dgm:styleLbl name="node4">
-    <dgm:scene3d>
-      <a:camera prst="orthographicFront"/>
-      <a:lightRig rig="threePt" dir="t"/>
-    </dgm:scene3d>
-    <dgm:sp3d/>
-    <dgm:txPr/>
-    <dgm:style>
-      <a:lnRef idx="2">
-        <a:scrgbClr r="0" g="0" b="0"/>
-      </a:lnRef>
-      <a:fillRef idx="1">
-        <a:scrgbClr r="0" g="0" b="0"/>
-      </a:fillRef>
-      <a:effectRef idx="0">
-        <a:scrgbClr r="0" g="0" b="0"/>
-      </a:effectRef>
-      <a:fontRef idx="minor">
-        <a:schemeClr val="lt1"/>
-      </a:fontRef>
-    </dgm:style>
-  </dgm:styleLbl>
-  <dgm:styleLbl name="fgImgPlace1">
-    <dgm:scene3d>
-      <a:camera prst="orthographicFront"/>
-      <a:lightRig rig="threePt" dir="t"/>
-    </dgm:scene3d>
-    <dgm:sp3d/>
-    <dgm:txPr/>
-    <dgm:style>
-      <a:lnRef idx="2">
-        <a:scrgbClr r="0" g="0" b="0"/>
-      </a:lnRef>
-      <a:fillRef idx="1">
-        <a:scrgbClr r="0" g="0" b="0"/>
-      </a:fillRef>
-      <a:effectRef idx="0">
-        <a:scrgbClr r="0" g="0" b="0"/>
-      </a:effectRef>
-      <a:fontRef idx="minor"/>
-    </dgm:style>
-  </dgm:styleLbl>
-  <dgm:styleLbl name="alignImgPlace1">
-    <dgm:scene3d>
-      <a:camera prst="orthographicFront"/>
-      <a:lightRig rig="threePt" dir="t"/>
-    </dgm:scene3d>
-    <dgm:sp3d/>
-    <dgm:txPr/>
-    <dgm:style>
-      <a:lnRef idx="2">
-        <a:scrgbClr r="0" g="0" b="0"/>
-      </a:lnRef>
-      <a:fillRef idx="1">
-        <a:scrgbClr r="0" g="0" b="0"/>
-      </a:fillRef>
-      <a:effectRef idx="0">
-        <a:scrgbClr r="0" g="0" b="0"/>
-      </a:effectRef>
-      <a:fontRef idx="minor"/>
-    </dgm:style>
-  </dgm:styleLbl>
-  <dgm:styleLbl name="bgImgPlace1">
-    <dgm:scene3d>
-      <a:camera prst="orthographicFront"/>
-      <a:lightRig rig="threePt" dir="t"/>
-    </dgm:scene3d>
-    <dgm:sp3d/>
-    <dgm:txPr/>
-    <dgm:style>
-      <a:lnRef idx="2">
-        <a:scrgbClr r="0" g="0" b="0"/>
-      </a:lnRef>
-      <a:fillRef idx="1">
-        <a:scrgbClr r="0" g="0" b="0"/>
-      </a:fillRef>
-      <a:effectRef idx="0">
-        <a:scrgbClr r="0" g="0" b="0"/>
-      </a:effectRef>
-      <a:fontRef idx="minor"/>
-    </dgm:style>
-  </dgm:styleLbl>
-  <dgm:styleLbl name="sibTrans2D1">
-    <dgm:scene3d>
-      <a:camera prst="orthographicFront"/>
-      <a:lightRig rig="threePt" dir="t"/>
-    </dgm:scene3d>
-    <dgm:sp3d/>
-    <dgm:txPr/>
-    <dgm:style>
-      <a:lnRef idx="0">
-        <a:scrgbClr r="0" g="0" b="0"/>
-      </a:lnRef>
-      <a:fillRef idx="1">
-        <a:scrgbClr r="0" g="0" b="0"/>
-      </a:fillRef>
-      <a:effectRef idx="0">
-        <a:scrgbClr r="0" g="0" b="0"/>
-      </a:effectRef>
-      <a:fontRef idx="minor">
-        <a:schemeClr val="lt1"/>
-      </a:fontRef>
-    </dgm:style>
-  </dgm:styleLbl>
-  <dgm:styleLbl name="fgSibTrans2D1">
-    <dgm:scene3d>
-      <a:camera prst="orthographicFront"/>
-      <a:lightRig rig="threePt" dir="t"/>
-    </dgm:scene3d>
-    <dgm:sp3d/>
-    <dgm:txPr/>
-    <dgm:style>
-      <a:lnRef idx="0">
-        <a:scrgbClr r="0" g="0" b="0"/>
-      </a:lnRef>
-      <a:fillRef idx="1">
-        <a:scrgbClr r="0" g="0" b="0"/>
-      </a:fillRef>
-      <a:effectRef idx="0">
-        <a:scrgbClr r="0" g="0" b="0"/>
-      </a:effectRef>
-      <a:fontRef idx="minor">
-        <a:schemeClr val="lt1"/>
-      </a:fontRef>
-    </dgm:style>
-  </dgm:styleLbl>
-  <dgm:styleLbl name="bgSibTrans2D1">
-    <dgm:scene3d>
-      <a:camera prst="orthographicFront"/>
-      <a:lightRig rig="threePt" dir="t"/>
-    </dgm:scene3d>
-    <dgm:sp3d/>
-    <dgm:txPr/>
-    <dgm:style>
-      <a:lnRef idx="0">
-        <a:scrgbClr r="0" g="0" b="0"/>
-      </a:lnRef>
-      <a:fillRef idx="1">
-        <a:scrgbClr r="0" g="0" b="0"/>
-      </a:fillRef>
-      <a:effectRef idx="0">
-        <a:scrgbClr r="0" g="0" b="0"/>
-      </a:effectRef>
-      <a:fontRef idx="minor">
-        <a:schemeClr val="lt1"/>
-      </a:fontRef>
-    </dgm:style>
-  </dgm:styleLbl>
-  <dgm:styleLbl name="sibTrans1D1">
-    <dgm:scene3d>
-      <a:camera prst="orthographicFront"/>
-      <a:lightRig rig="threePt" dir="t"/>
-    </dgm:scene3d>
-    <dgm:sp3d/>
-    <dgm:txPr/>
-    <dgm:style>
-      <a:lnRef idx="1">
-        <a:scrgbClr r="0" g="0" b="0"/>
-      </a:lnRef>
-      <a:fillRef idx="0">
-        <a:scrgbClr r="0" g="0" b="0"/>
-      </a:fillRef>
-      <a:effectRef idx="0">
-        <a:scrgbClr r="0" g="0" b="0"/>
-      </a:effectRef>
-      <a:fontRef idx="minor"/>
-    </dgm:style>
-  </dgm:styleLbl>
-  <dgm:styleLbl name="callout">
-    <dgm:scene3d>
-      <a:camera prst="orthographicFront"/>
-      <a:lightRig rig="threePt" dir="t"/>
-    </dgm:scene3d>
-    <dgm:sp3d/>
-    <dgm:txPr/>
-    <dgm:style>
-      <a:lnRef idx="2">
-        <a:scrgbClr r="0" g="0" b="0"/>
-      </a:lnRef>
-      <a:fillRef idx="1">
-        <a:scrgbClr r="0" g="0" b="0"/>
-      </a:fillRef>
-      <a:effectRef idx="0">
-        <a:scrgbClr r="0" g="0" b="0"/>
-      </a:effectRef>
-      <a:fontRef idx="minor"/>
-    </dgm:style>
-  </dgm:styleLbl>
-  <dgm:styleLbl name="asst0">
-    <dgm:scene3d>
-      <a:camera prst="orthographicFront"/>
-      <a:lightRig rig="threePt" dir="t"/>
-    </dgm:scene3d>
-    <dgm:sp3d/>
-    <dgm:txPr/>
-    <dgm:style>
-      <a:lnRef idx="2">
-        <a:scrgbClr r="0" g="0" b="0"/>
-      </a:lnRef>
-      <a:fillRef idx="1">
-        <a:scrgbClr r="0" g="0" b="0"/>
-      </a:fillRef>
-      <a:effectRef idx="0">
-        <a:scrgbClr r="0" g="0" b="0"/>
-      </a:effectRef>
-      <a:fontRef idx="minor">
-        <a:schemeClr val="lt1"/>
-      </a:fontRef>
-    </dgm:style>
-  </dgm:styleLbl>
-  <dgm:styleLbl name="asst1">
-    <dgm:scene3d>
-      <a:camera prst="orthographicFront"/>
-      <a:lightRig rig="threePt" dir="t"/>
-    </dgm:scene3d>
-    <dgm:sp3d/>
-    <dgm:txPr/>
-    <dgm:style>
-      <a:lnRef idx="2">
-        <a:scrgbClr r="0" g="0" b="0"/>
-      </a:lnRef>
-      <a:fillRef idx="1">
-        <a:scrgbClr r="0" g="0" b="0"/>
-      </a:fillRef>
-      <a:effectRef idx="0">
-        <a:scrgbClr r="0" g="0" b="0"/>
-      </a:effectRef>
-      <a:fontRef idx="minor">
-        <a:schemeClr val="lt1"/>
-      </a:fontRef>
-    </dgm:style>
-  </dgm:styleLbl>
-  <dgm:styleLbl name="asst2">
-    <dgm:scene3d>
-      <a:camera prst="orthographicFront"/>
-      <a:lightRig rig="threePt" dir="t"/>
-    </dgm:scene3d>
-    <dgm:sp3d/>
-    <dgm:txPr/>
-    <dgm:style>
-      <a:lnRef idx="2">
-        <a:scrgbClr r="0" g="0" b="0"/>
-      </a:lnRef>
-      <a:fillRef idx="1">
-        <a:scrgbClr r="0" g="0" b="0"/>
-      </a:fillRef>
-      <a:effectRef idx="0">
-        <a:scrgbClr r="0" g="0" b="0"/>
-      </a:effectRef>
-      <a:fontRef idx="minor">
-        <a:schemeClr val="lt1"/>
-      </a:fontRef>
-    </dgm:style>
-  </dgm:styleLbl>
-  <dgm:styleLbl name="asst3">
-    <dgm:scene3d>
-      <a:camera prst="orthographicFront"/>
-      <a:lightRig rig="threePt" dir="t"/>
-    </dgm:scene3d>
-    <dgm:sp3d/>
-    <dgm:txPr/>
-    <dgm:style>
-      <a:lnRef idx="2">
-        <a:scrgbClr r="0" g="0" b="0"/>
-      </a:lnRef>
-      <a:fillRef idx="1">
-        <a:scrgbClr r="0" g="0" b="0"/>
-      </a:fillRef>
-      <a:effectRef idx="0">
-        <a:scrgbClr r="0" g="0" b="0"/>
-      </a:effectRef>
-      <a:fontRef idx="minor">
-        <a:schemeClr val="lt1"/>
-      </a:fontRef>
-    </dgm:style>
-  </dgm:styleLbl>
-  <dgm:styleLbl name="asst4">
-    <dgm:scene3d>
-      <a:camera prst="orthographicFront"/>
-      <a:lightRig rig="threePt" dir="t"/>
-    </dgm:scene3d>
-    <dgm:sp3d/>
-    <dgm:txPr/>
-    <dgm:style>
-      <a:lnRef idx="2">
-        <a:scrgbClr r="0" g="0" b="0"/>
-      </a:lnRef>
-      <a:fillRef idx="1">
-        <a:scrgbClr r="0" g="0" b="0"/>
-      </a:fillRef>
-      <a:effectRef idx="0">
-        <a:scrgbClr r="0" g="0" b="0"/>
-      </a:effectRef>
-      <a:fontRef idx="minor">
-        <a:schemeClr val="lt1"/>
-      </a:fontRef>
-    </dgm:style>
-  </dgm:styleLbl>
-  <dgm:styleLbl name="parChTrans2D1">
-    <dgm:scene3d>
-      <a:camera prst="orthographicFront"/>
-      <a:lightRig rig="threePt" dir="t"/>
-    </dgm:scene3d>
-    <dgm:sp3d/>
-    <dgm:txPr/>
-    <dgm:style>
-      <a:lnRef idx="2">
-        <a:scrgbClr r="0" g="0" b="0"/>
-      </a:lnRef>
-      <a:fillRef idx="1">
-        <a:scrgbClr r="0" g="0" b="0"/>
-      </a:fillRef>
-      <a:effectRef idx="0">
-        <a:scrgbClr r="0" g="0" b="0"/>
-      </a:effectRef>
-      <a:fontRef idx="minor">
-        <a:schemeClr val="lt1"/>
-      </a:fontRef>
-    </dgm:style>
-  </dgm:styleLbl>
-  <dgm:styleLbl name="parChTrans2D2">
-    <dgm:scene3d>
-      <a:camera prst="orthographicFront"/>
-      <a:lightRig rig="threePt" dir="t"/>
-    </dgm:scene3d>
-    <dgm:sp3d/>
-    <dgm:txPr/>
-    <dgm:style>
-      <a:lnRef idx="2">
-        <a:scrgbClr r="0" g="0" b="0"/>
-      </a:lnRef>
-      <a:fillRef idx="1">
-        <a:scrgbClr r="0" g="0" b="0"/>
-      </a:fillRef>
-      <a:effectRef idx="0">
-        <a:scrgbClr r="0" g="0" b="0"/>
-      </a:effectRef>
-      <a:fontRef idx="minor">
-        <a:schemeClr val="lt1"/>
-      </a:fontRef>
-    </dgm:style>
-  </dgm:styleLbl>
-  <dgm:styleLbl name="parChTrans2D3">
-    <dgm:scene3d>
-      <a:camera prst="orthographicFront"/>
-      <a:lightRig rig="threePt" dir="t"/>
-    </dgm:scene3d>
-    <dgm:sp3d/>
-    <dgm:txPr/>
-    <dgm:style>
-      <a:lnRef idx="2">
-        <a:scrgbClr r="0" g="0" b="0"/>
-      </a:lnRef>
-      <a:fillRef idx="1">
-        <a:scrgbClr r="0" g="0" b="0"/>
-      </a:fillRef>
-      <a:effectRef idx="0">
-        <a:scrgbClr r="0" g="0" b="0"/>
-      </a:effectRef>
-      <a:fontRef idx="minor">
-        <a:schemeClr val="lt1"/>
-      </a:fontRef>
-    </dgm:style>
-  </dgm:styleLbl>
-  <dgm:styleLbl name="parChTrans2D4">
-    <dgm:scene3d>
-      <a:camera prst="orthographicFront"/>
-      <a:lightRig rig="threePt" dir="t"/>
-    </dgm:scene3d>
-    <dgm:sp3d/>
-    <dgm:txPr/>
-    <dgm:style>
-      <a:lnRef idx="2">
-        <a:scrgbClr r="0" g="0" b="0"/>
-      </a:lnRef>
-      <a:fillRef idx="1">
-        <a:scrgbClr r="0" g="0" b="0"/>
-      </a:fillRef>
-      <a:effectRef idx="0">
-        <a:scrgbClr r="0" g="0" b="0"/>
-      </a:effectRef>
-      <a:fontRef idx="minor">
-        <a:schemeClr val="lt1"/>
-      </a:fontRef>
-    </dgm:style>
-  </dgm:styleLbl>
-  <dgm:styleLbl name="parChTrans1D1">
-    <dgm:scene3d>
-      <a:camera prst="orthographicFront"/>
-      <a:lightRig rig="threePt" dir="t"/>
-    </dgm:scene3d>
-    <dgm:sp3d/>
-    <dgm:txPr/>
-    <dgm:style>
-      <a:lnRef idx="2">
-        <a:scrgbClr r="0" g="0" b="0"/>
-      </a:lnRef>
-      <a:fillRef idx="0">
-        <a:scrgbClr r="0" g="0" b="0"/>
-      </a:fillRef>
-      <a:effectRef idx="0">
-        <a:scrgbClr r="0" g="0" b="0"/>
-      </a:effectRef>
-      <a:fontRef idx="minor"/>
-    </dgm:style>
-  </dgm:styleLbl>
-  <dgm:styleLbl name="parChTrans1D2">
-    <dgm:scene3d>
-      <a:camera prst="orthographicFront"/>
-      <a:lightRig rig="threePt" dir="t"/>
-    </dgm:scene3d>
-    <dgm:sp3d/>
-    <dgm:txPr/>
-    <dgm:style>
-      <a:lnRef idx="2">
-        <a:scrgbClr r="0" g="0" b="0"/>
-      </a:lnRef>
-      <a:fillRef idx="0">
-        <a:scrgbClr r="0" g="0" b="0"/>
-      </a:fillRef>
-      <a:effectRef idx="0">
-        <a:scrgbClr r="0" g="0" b="0"/>
-      </a:effectRef>
-      <a:fontRef idx="minor"/>
-    </dgm:style>
-  </dgm:styleLbl>
-  <dgm:styleLbl name="parChTrans1D3">
-    <dgm:scene3d>
-      <a:camera prst="orthographicFront"/>
-      <a:lightRig rig="threePt" dir="t"/>
-    </dgm:scene3d>
-    <dgm:sp3d/>
-    <dgm:txPr/>
-    <dgm:style>
-      <a:lnRef idx="2">
-        <a:scrgbClr r="0" g="0" b="0"/>
-      </a:lnRef>
-      <a:fillRef idx="0">
-        <a:scrgbClr r="0" g="0" b="0"/>
-      </a:fillRef>
-      <a:effectRef idx="0">
-        <a:scrgbClr r="0" g="0" b="0"/>
-      </a:effectRef>
-      <a:fontRef idx="minor"/>
-    </dgm:style>
-  </dgm:styleLbl>
-  <dgm:styleLbl name="parChTrans1D4">
-    <dgm:scene3d>
-      <a:camera prst="orthographicFront"/>
-      <a:lightRig rig="threePt" dir="t"/>
-    </dgm:scene3d>
-    <dgm:sp3d/>
-    <dgm:txPr/>
-    <dgm:style>
-      <a:lnRef idx="2">
-        <a:scrgbClr r="0" g="0" b="0"/>
-      </a:lnRef>
-      <a:fillRef idx="0">
-        <a:scrgbClr r="0" g="0" b="0"/>
-      </a:fillRef>
-      <a:effectRef idx="0">
-        <a:scrgbClr r="0" g="0" b="0"/>
-      </a:effectRef>
-      <a:fontRef idx="minor"/>
-    </dgm:style>
-  </dgm:styleLbl>
-  <dgm:styleLbl name="fgAcc1">
-    <dgm:scene3d>
-      <a:camera prst="orthographicFront"/>
-      <a:lightRig rig="threePt" dir="t"/>
-    </dgm:scene3d>
-    <dgm:sp3d/>
-    <dgm:txPr/>
-    <dgm:style>
-      <a:lnRef idx="2">
-        <a:scrgbClr r="0" g="0" b="0"/>
-      </a:lnRef>
-      <a:fillRef idx="1">
-        <a:scrgbClr r="0" g="0" b="0"/>
-      </a:fillRef>
-      <a:effectRef idx="0">
-        <a:scrgbClr r="0" g="0" b="0"/>
-      </a:effectRef>
-      <a:fontRef idx="minor"/>
-    </dgm:style>
-  </dgm:styleLbl>
-  <dgm:styleLbl name="conFgAcc1">
-    <dgm:scene3d>
-      <a:camera prst="orthographicFront"/>
-      <a:lightRig rig="threePt" dir="t"/>
-    </dgm:scene3d>
-    <dgm:sp3d/>
-    <dgm:txPr/>
-    <dgm:style>
-      <a:lnRef idx="2">
-        <a:scrgbClr r="0" g="0" b="0"/>
-      </a:lnRef>
-      <a:fillRef idx="1">
-        <a:scrgbClr r="0" g="0" b="0"/>
-      </a:fillRef>
-      <a:effectRef idx="0">
-        <a:scrgbClr r="0" g="0" b="0"/>
-      </a:effectRef>
-      <a:fontRef idx="minor"/>
-    </dgm:style>
-  </dgm:styleLbl>
-  <dgm:styleLbl name="alignAcc1">
-    <dgm:scene3d>
-      <a:camera prst="orthographicFront"/>
-      <a:lightRig rig="threePt" dir="t"/>
-    </dgm:scene3d>
-    <dgm:sp3d/>
-    <dgm:txPr/>
-    <dgm:style>
-      <a:lnRef idx="2">
-        <a:scrgbClr r="0" g="0" b="0"/>
-      </a:lnRef>
-      <a:fillRef idx="1">
-        <a:scrgbClr r="0" g="0" b="0"/>
-      </a:fillRef>
-      <a:effectRef idx="0">
-        <a:scrgbClr r="0" g="0" b="0"/>
-      </a:effectRef>
-      <a:fontRef idx="minor"/>
-    </dgm:style>
-  </dgm:styleLbl>
-  <dgm:styleLbl name="trAlignAcc1">
-    <dgm:scene3d>
-      <a:camera prst="orthographicFront"/>
-      <a:lightRig rig="threePt" dir="t"/>
-    </dgm:scene3d>
-    <dgm:sp3d/>
-    <dgm:txPr/>
-    <dgm:style>
-      <a:lnRef idx="1">
-        <a:scrgbClr r="0" g="0" b="0"/>
-      </a:lnRef>
-      <a:fillRef idx="1">
-        <a:scrgbClr r="0" g="0" b="0"/>
-      </a:fillRef>
-      <a:effectRef idx="0">
-        <a:scrgbClr r="0" g="0" b="0"/>
-      </a:effectRef>
-      <a:fontRef idx="minor"/>
-    </dgm:style>
-  </dgm:styleLbl>
-  <dgm:styleLbl name="bgAcc1">
-    <dgm:scene3d>
-      <a:camera prst="orthographicFront"/>
-      <a:lightRig rig="threePt" dir="t"/>
-    </dgm:scene3d>
-    <dgm:sp3d/>
-    <dgm:txPr/>
-    <dgm:style>
-      <a:lnRef idx="2">
-        <a:scrgbClr r="0" g="0" b="0"/>
-      </a:lnRef>
-      <a:fillRef idx="1">
-        <a:scrgbClr r="0" g="0" b="0"/>
-      </a:fillRef>
-      <a:effectRef idx="0">
-        <a:scrgbClr r="0" g="0" b="0"/>
-      </a:effectRef>
-      <a:fontRef idx="minor"/>
-    </dgm:style>
-  </dgm:styleLbl>
-  <dgm:styleLbl name="solidFgAcc1">
-    <dgm:scene3d>
-      <a:camera prst="orthographicFront"/>
-      <a:lightRig rig="threePt" dir="t"/>
-    </dgm:scene3d>
-    <dgm:sp3d/>
-    <dgm:txPr/>
-    <dgm:style>
-      <a:lnRef idx="2">
-        <a:scrgbClr r="0" g="0" b="0"/>
-      </a:lnRef>
-      <a:fillRef idx="1">
-        <a:scrgbClr r="0" g="0" b="0"/>
-      </a:fillRef>
-      <a:effectRef idx="0">
-        <a:scrgbClr r="0" g="0" b="0"/>
-      </a:effectRef>
-      <a:fontRef idx="minor"/>
-    </dgm:style>
-  </dgm:styleLbl>
-  <dgm:styleLbl name="solidAlignAcc1">
-    <dgm:scene3d>
-      <a:camera prst="orthographicFront"/>
-      <a:lightRig rig="threePt" dir="t"/>
-    </dgm:scene3d>
-    <dgm:sp3d/>
-    <dgm:txPr/>
-    <dgm:style>
-      <a:lnRef idx="2">
-        <a:scrgbClr r="0" g="0" b="0"/>
-      </a:lnRef>
-      <a:fillRef idx="1">
-        <a:scrgbClr r="0" g="0" b="0"/>
-      </a:fillRef>
-      <a:effectRef idx="0">
-        <a:scrgbClr r="0" g="0" b="0"/>
-      </a:effectRef>
-      <a:fontRef idx="minor"/>
-    </dgm:style>
-  </dgm:styleLbl>
-  <dgm:styleLbl name="solidBgAcc1">
-    <dgm:scene3d>
-      <a:camera prst="orthographicFront"/>
-      <a:lightRig rig="threePt" dir="t"/>
-    </dgm:scene3d>
-    <dgm:sp3d/>
-    <dgm:txPr/>
-    <dgm:style>
-      <a:lnRef idx="2">
-        <a:scrgbClr r="0" g="0" b="0"/>
-      </a:lnRef>
-      <a:fillRef idx="1">
-        <a:scrgbClr r="0" g="0" b="0"/>
-      </a:fillRef>
-      <a:effectRef idx="0">
-        <a:scrgbClr r="0" g="0" b="0"/>
-      </a:effectRef>
-      <a:fontRef idx="minor"/>
-    </dgm:style>
-  </dgm:styleLbl>
-  <dgm:styleLbl name="fgAccFollowNode1">
-    <dgm:scene3d>
-      <a:camera prst="orthographicFront"/>
-      <a:lightRig rig="threePt" dir="t"/>
-    </dgm:scene3d>
-    <dgm:sp3d/>
-    <dgm:txPr/>
-    <dgm:style>
-      <a:lnRef idx="2">
-        <a:scrgbClr r="0" g="0" b="0"/>
-      </a:lnRef>
-      <a:fillRef idx="1">
-        <a:scrgbClr r="0" g="0" b="0"/>
-      </a:fillRef>
-      <a:effectRef idx="0">
-        <a:scrgbClr r="0" g="0" b="0"/>
-      </a:effectRef>
-      <a:fontRef idx="minor"/>
-    </dgm:style>
-  </dgm:styleLbl>
-  <dgm:styleLbl name="alignAccFollowNode1">
-    <dgm:scene3d>
-      <a:camera prst="orthographicFront"/>
-      <a:lightRig rig="threePt" dir="t"/>
-    </dgm:scene3d>
-    <dgm:sp3d/>
-    <dgm:txPr/>
-    <dgm:style>
-      <a:lnRef idx="2">
-        <a:scrgbClr r="0" g="0" b="0"/>
-      </a:lnRef>
-      <a:fillRef idx="1">
-        <a:scrgbClr r="0" g="0" b="0"/>
-      </a:fillRef>
-      <a:effectRef idx="0">
-        <a:scrgbClr r="0" g="0" b="0"/>
-      </a:effectRef>
-      <a:fontRef idx="minor"/>
-    </dgm:style>
-  </dgm:styleLbl>
-  <dgm:styleLbl name="bgAccFollowNode1">
-    <dgm:scene3d>
-      <a:camera prst="orthographicFront"/>
-      <a:lightRig rig="threePt" dir="t"/>
-    </dgm:scene3d>
-    <dgm:sp3d/>
-    <dgm:txPr/>
-    <dgm:style>
-      <a:lnRef idx="2">
-        <a:scrgbClr r="0" g="0" b="0"/>
-      </a:lnRef>
-      <a:fillRef idx="1">
-        <a:scrgbClr r="0" g="0" b="0"/>
-      </a:fillRef>
-      <a:effectRef idx="0">
-        <a:scrgbClr r="0" g="0" b="0"/>
-      </a:effectRef>
-      <a:fontRef idx="minor"/>
-    </dgm:style>
-  </dgm:styleLbl>
-  <dgm:styleLbl name="fgAcc0">
-    <dgm:scene3d>
-      <a:camera prst="orthographicFront"/>
-      <a:lightRig rig="threePt" dir="t"/>
-    </dgm:scene3d>
-    <dgm:sp3d/>
-    <dgm:txPr/>
-    <dgm:style>
-      <a:lnRef idx="2">
-        <a:scrgbClr r="0" g="0" b="0"/>
-      </a:lnRef>
-      <a:fillRef idx="1">
-        <a:scrgbClr r="0" g="0" b="0"/>
-      </a:fillRef>
-      <a:effectRef idx="0">
-        <a:scrgbClr r="0" g="0" b="0"/>
-      </a:effectRef>
-      <a:fontRef idx="minor"/>
-    </dgm:style>
-  </dgm:styleLbl>
-  <dgm:styleLbl name="fgAcc2">
-    <dgm:scene3d>
-      <a:camera prst="orthographicFront"/>
-      <a:lightRig rig="threePt" dir="t"/>
-    </dgm:scene3d>
-    <dgm:sp3d/>
-    <dgm:txPr/>
-    <dgm:style>
-      <a:lnRef idx="2">
-        <a:scrgbClr r="0" g="0" b="0"/>
-      </a:lnRef>
-      <a:fillRef idx="1">
-        <a:scrgbClr r="0" g="0" b="0"/>
-      </a:fillRef>
-      <a:effectRef idx="0">
-        <a:scrgbClr r="0" g="0" b="0"/>
-      </a:effectRef>
-      <a:fontRef idx="minor"/>
-    </dgm:style>
-  </dgm:styleLbl>
-  <dgm:styleLbl name="fgAcc3">
-    <dgm:scene3d>
-      <a:camera prst="orthographicFront"/>
-      <a:lightRig rig="threePt" dir="t"/>
-    </dgm:scene3d>
-    <dgm:sp3d/>
-    <dgm:txPr/>
-    <dgm:style>
-      <a:lnRef idx="2">
-        <a:scrgbClr r="0" g="0" b="0"/>
-      </a:lnRef>
-      <a:fillRef idx="1">
-        <a:scrgbClr r="0" g="0" b="0"/>
-      </a:fillRef>
-      <a:effectRef idx="0">
-        <a:scrgbClr r="0" g="0" b="0"/>
-      </a:effectRef>
-      <a:fontRef idx="minor"/>
-    </dgm:style>
-  </dgm:styleLbl>
-  <dgm:styleLbl name="fgAcc4">
-    <dgm:scene3d>
-      <a:camera prst="orthographicFront"/>
-      <a:lightRig rig="threePt" dir="t"/>
-    </dgm:scene3d>
-    <dgm:sp3d/>
-    <dgm:txPr/>
-    <dgm:style>
-      <a:lnRef idx="2">
-        <a:scrgbClr r="0" g="0" b="0"/>
-      </a:lnRef>
-      <a:fillRef idx="1">
-        <a:scrgbClr r="0" g="0" b="0"/>
-      </a:fillRef>
-      <a:effectRef idx="0">
-        <a:scrgbClr r="0" g="0" b="0"/>
-      </a:effectRef>
-      <a:fontRef idx="minor"/>
-    </dgm:style>
-  </dgm:styleLbl>
-  <dgm:styleLbl name="bgShp">
-    <dgm:scene3d>
-      <a:camera prst="orthographicFront"/>
-      <a:lightRig rig="threePt" dir="t"/>
-    </dgm:scene3d>
-    <dgm:sp3d/>
-    <dgm:txPr/>
-    <dgm:style>
-      <a:lnRef idx="0">
-        <a:scrgbClr r="0" g="0" b="0"/>
-      </a:lnRef>
-      <a:fillRef idx="1">
-        <a:scrgbClr r="0" g="0" b="0"/>
-      </a:fillRef>
-      <a:effectRef idx="0">
-        <a:scrgbClr r="0" g="0" b="0"/>
-      </a:effectRef>
-      <a:fontRef idx="minor"/>
-    </dgm:style>
-  </dgm:styleLbl>
-  <dgm:styleLbl name="dkBgShp">
-    <dgm:scene3d>
-      <a:camera prst="orthographicFront"/>
-      <a:lightRig rig="threePt" dir="t"/>
-    </dgm:scene3d>
-    <dgm:sp3d/>
-    <dgm:txPr/>
-    <dgm:style>
-      <a:lnRef idx="0">
-        <a:scrgbClr r="0" g="0" b="0"/>
-      </a:lnRef>
-      <a:fillRef idx="1">
-        <a:scrgbClr r="0" g="0" b="0"/>
-      </a:fillRef>
-      <a:effectRef idx="0">
-        <a:scrgbClr r="0" g="0" b="0"/>
-      </a:effectRef>
-      <a:fontRef idx="minor"/>
-    </dgm:style>
-  </dgm:styleLbl>
-  <dgm:styleLbl name="trBgShp">
-    <dgm:scene3d>
-      <a:camera prst="orthographicFront"/>
-      <a:lightRig rig="threePt" dir="t"/>
-    </dgm:scene3d>
-    <dgm:sp3d/>
-    <dgm:txPr/>
-    <dgm:style>
-      <a:lnRef idx="0">
-        <a:scrgbClr r="0" g="0" b="0"/>
-      </a:lnRef>
-      <a:fillRef idx="1">
-        <a:scrgbClr r="0" g="0" b="0"/>
-      </a:fillRef>
-      <a:effectRef idx="0">
-        <a:scrgbClr r="0" g="0" b="0"/>
-      </a:effectRef>
-      <a:fontRef idx="minor"/>
-    </dgm:style>
-  </dgm:styleLbl>
-  <dgm:styleLbl name="fgShp">
-    <dgm:scene3d>
-      <a:camera prst="orthographicFront"/>
-      <a:lightRig rig="threePt" dir="t"/>
-    </dgm:scene3d>
-    <dgm:sp3d/>
-    <dgm:txPr/>
-    <dgm:style>
-      <a:lnRef idx="2">
-        <a:scrgbClr r="0" g="0" b="0"/>
-      </a:lnRef>
-      <a:fillRef idx="1">
-        <a:scrgbClr r="0" g="0" b="0"/>
-      </a:fillRef>
-      <a:effectRef idx="0">
-        <a:scrgbClr r="0" g="0" b="0"/>
-      </a:effectRef>
-      <a:fontRef idx="minor"/>
-    </dgm:style>
-  </dgm:styleLbl>
-  <dgm:styleLbl name="revTx">
-    <dgm:scene3d>
-      <a:camera prst="orthographicFront"/>
-      <a:lightRig rig="threePt" dir="t"/>
-    </dgm:scene3d>
-    <dgm:sp3d/>
-    <dgm:txPr/>
-    <dgm:style>
-      <a:lnRef idx="0">
-        <a:scrgbClr r="0" g="0" b="0"/>
-      </a:lnRef>
-      <a:fillRef idx="0">
-        <a:scrgbClr r="0" g="0" b="0"/>
-      </a:fillRef>
-      <a:effectRef idx="0">
-        <a:scrgbClr r="0" g="0" b="0"/>
-      </a:effectRef>
-      <a:fontRef idx="minor"/>
-    </dgm:style>
-  </dgm:styleLbl>
-</dgm:styleDef>
 </file>
 
 <file path=ppt/slideLayouts/slideLayout1.xml><?xml version="1.0" encoding="utf-8"?>
@@ -7568,7 +3754,7 @@
           <a:p>
             <a:r>
               <a:rPr lang="en-US" dirty="0"/>
-              <a:t>Sources used in our analyses</a:t>
+              <a:t>Sources Referenced</a:t>
             </a:r>
           </a:p>
         </p:txBody>
@@ -7837,117 +4023,6 @@
     <p:extLst>
       <p:ext uri="{BB962C8B-B14F-4D97-AF65-F5344CB8AC3E}">
         <p14:creationId xmlns:p14="http://schemas.microsoft.com/office/powerpoint/2010/main" val="4241538222"/>
-      </p:ext>
-    </p:extLst>
-  </p:cSld>
-  <p:clrMapOvr>
-    <a:masterClrMapping/>
-  </p:clrMapOvr>
-</p:sld>
-</file>
-
-<file path=ppt/slides/slide13.xml><?xml version="1.0" encoding="utf-8"?>
-<p:sld xmlns:a="http://schemas.openxmlformats.org/drawingml/2006/main" xmlns:r="http://schemas.openxmlformats.org/officeDocument/2006/relationships" xmlns:p="http://schemas.openxmlformats.org/presentationml/2006/main">
-  <p:cSld>
-    <p:bg>
-      <p:bgPr>
-        <a:solidFill>
-          <a:schemeClr val="bg1"/>
-        </a:solidFill>
-        <a:effectLst/>
-      </p:bgPr>
-    </p:bg>
-    <p:spTree>
-      <p:nvGrpSpPr>
-        <p:cNvPr id="1" name=""/>
-        <p:cNvGrpSpPr/>
-        <p:nvPr/>
-      </p:nvGrpSpPr>
-      <p:grpSpPr>
-        <a:xfrm>
-          <a:off x="0" y="0"/>
-          <a:ext cx="0" cy="0"/>
-          <a:chOff x="0" y="0"/>
-          <a:chExt cx="0" cy="0"/>
-        </a:xfrm>
-      </p:grpSpPr>
-      <p:sp>
-        <p:nvSpPr>
-          <p:cNvPr id="2" name="Title 1">
-            <a:extLst>
-              <a:ext uri="{FF2B5EF4-FFF2-40B4-BE49-F238E27FC236}">
-                <a16:creationId xmlns:a16="http://schemas.microsoft.com/office/drawing/2014/main" id="{59D539EE-4A36-4CA3-94D4-F7FEA2D2411B}"/>
-              </a:ext>
-            </a:extLst>
-          </p:cNvPr>
-          <p:cNvSpPr>
-            <a:spLocks noGrp="1"/>
-          </p:cNvSpPr>
-          <p:nvPr>
-            <p:ph type="title"/>
-          </p:nvPr>
-        </p:nvSpPr>
-        <p:spPr>
-          <a:xfrm>
-            <a:off x="581192" y="702156"/>
-            <a:ext cx="11029616" cy="1188720"/>
-          </a:xfrm>
-        </p:spPr>
-        <p:txBody>
-          <a:bodyPr>
-            <a:normAutofit/>
-          </a:bodyPr>
-          <a:lstStyle/>
-          <a:p>
-            <a:r>
-              <a:rPr lang="en-US" dirty="0">
-                <a:solidFill>
-                  <a:schemeClr val="tx1">
-                    <a:lumMod val="85000"/>
-                    <a:lumOff val="15000"/>
-                  </a:schemeClr>
-                </a:solidFill>
-              </a:rPr>
-              <a:t>Title lorem ipsum </a:t>
-            </a:r>
-          </a:p>
-        </p:txBody>
-      </p:sp>
-      <p:graphicFrame>
-        <p:nvGraphicFramePr>
-          <p:cNvPr id="5" name="Content Placeholder 2" descr="SmartArt timeline">
-            <a:extLst>
-              <a:ext uri="{FF2B5EF4-FFF2-40B4-BE49-F238E27FC236}">
-                <a16:creationId xmlns:a16="http://schemas.microsoft.com/office/drawing/2014/main" id="{3482D096-AEF7-42A2-9733-8437ACF545D2}"/>
-              </a:ext>
-            </a:extLst>
-          </p:cNvPr>
-          <p:cNvGraphicFramePr>
-            <a:graphicFrameLocks noGrp="1"/>
-          </p:cNvGraphicFramePr>
-          <p:nvPr>
-            <p:ph idx="1"/>
-            <p:extLst>
-              <p:ext uri="{D42A27DB-BD31-4B8C-83A1-F6EECF244321}">
-                <p14:modId xmlns:p14="http://schemas.microsoft.com/office/powerpoint/2010/main" val="3982953927"/>
-              </p:ext>
-            </p:extLst>
-          </p:nvPr>
-        </p:nvGraphicFramePr>
-        <p:xfrm>
-          <a:off x="581025" y="2341563"/>
-          <a:ext cx="11029950" cy="3814281"/>
-        </p:xfrm>
-        <a:graphic>
-          <a:graphicData uri="http://schemas.openxmlformats.org/drawingml/2006/diagram">
-            <dgm:relIds xmlns:dgm="http://schemas.openxmlformats.org/drawingml/2006/diagram" xmlns:r="http://schemas.openxmlformats.org/officeDocument/2006/relationships" r:dm="rId2" r:lo="rId3" r:qs="rId4" r:cs="rId5"/>
-          </a:graphicData>
-        </a:graphic>
-      </p:graphicFrame>
-    </p:spTree>
-    <p:extLst>
-      <p:ext uri="{BB962C8B-B14F-4D97-AF65-F5344CB8AC3E}">
-        <p14:creationId xmlns:p14="http://schemas.microsoft.com/office/powerpoint/2010/main" val="3966093881"/>
       </p:ext>
     </p:extLst>
   </p:cSld>
@@ -9847,6 +5922,14 @@
 <file path=ppt/slides/slide5.xml><?xml version="1.0" encoding="utf-8"?>
 <p:sld xmlns:a="http://schemas.openxmlformats.org/drawingml/2006/main" xmlns:r="http://schemas.openxmlformats.org/officeDocument/2006/relationships" xmlns:p="http://schemas.openxmlformats.org/presentationml/2006/main">
   <p:cSld>
+    <p:bg>
+      <p:bgPr>
+        <a:solidFill>
+          <a:schemeClr val="bg1"/>
+        </a:solidFill>
+        <a:effectLst/>
+      </p:bgPr>
+    </p:bg>
     <p:spTree>
       <p:nvGrpSpPr>
         <p:cNvPr id="1" name=""/>
@@ -9863,6 +5946,276 @@
       </p:grpSpPr>
       <p:sp>
         <p:nvSpPr>
+          <p:cNvPr id="71" name="Rectangle 70">
+            <a:extLst>
+              <a:ext uri="{FF2B5EF4-FFF2-40B4-BE49-F238E27FC236}">
+                <a16:creationId xmlns:a16="http://schemas.microsoft.com/office/drawing/2014/main" id="{E6C8E6EB-4C59-429B-97E4-72A058CFC4FB}"/>
+              </a:ext>
+              <a:ext uri="{C183D7F6-B498-43B3-948B-1728B52AA6E4}">
+                <adec:decorative xmlns:adec="http://schemas.microsoft.com/office/drawing/2017/decorative" val="1"/>
+              </a:ext>
+            </a:extLst>
+          </p:cNvPr>
+          <p:cNvSpPr>
+            <a:spLocks noGrp="1" noRot="1" noChangeAspect="1" noMove="1" noResize="1" noEditPoints="1" noAdjustHandles="1" noChangeArrowheads="1" noChangeShapeType="1" noTextEdit="1"/>
+          </p:cNvSpPr>
+          <p:nvPr>
+            <p:extLst>
+              <p:ext uri="{386F3935-93C4-4BCD-93E2-E3B085C9AB24}">
+                <p16:designElem xmlns:p16="http://schemas.microsoft.com/office/powerpoint/2015/main" val="1"/>
+              </p:ext>
+            </p:extLst>
+          </p:nvPr>
+        </p:nvSpPr>
+        <p:spPr>
+          <a:xfrm>
+            <a:off x="446534" y="457200"/>
+            <a:ext cx="3703320" cy="94997"/>
+          </a:xfrm>
+          <a:prstGeom prst="rect">
+            <a:avLst/>
+          </a:prstGeom>
+          <a:solidFill>
+            <a:srgbClr val="465359"/>
+          </a:solidFill>
+          <a:ln>
+            <a:noFill/>
+          </a:ln>
+          <a:effectLst/>
+        </p:spPr>
+        <p:style>
+          <a:lnRef idx="1">
+            <a:schemeClr val="accent1"/>
+          </a:lnRef>
+          <a:fillRef idx="3">
+            <a:schemeClr val="accent1"/>
+          </a:fillRef>
+          <a:effectRef idx="2">
+            <a:schemeClr val="accent1"/>
+          </a:effectRef>
+          <a:fontRef idx="minor">
+            <a:schemeClr val="lt1"/>
+          </a:fontRef>
+        </p:style>
+      </p:sp>
+      <p:sp>
+        <p:nvSpPr>
+          <p:cNvPr id="73" name="Rectangle 72">
+            <a:extLst>
+              <a:ext uri="{FF2B5EF4-FFF2-40B4-BE49-F238E27FC236}">
+                <a16:creationId xmlns:a16="http://schemas.microsoft.com/office/drawing/2014/main" id="{B5B90362-AFCC-46A9-B41C-A257A8C5B314}"/>
+              </a:ext>
+              <a:ext uri="{C183D7F6-B498-43B3-948B-1728B52AA6E4}">
+                <adec:decorative xmlns:adec="http://schemas.microsoft.com/office/drawing/2017/decorative" val="1"/>
+              </a:ext>
+            </a:extLst>
+          </p:cNvPr>
+          <p:cNvSpPr>
+            <a:spLocks noGrp="1" noRot="1" noChangeAspect="1" noMove="1" noResize="1" noEditPoints="1" noAdjustHandles="1" noChangeArrowheads="1" noChangeShapeType="1" noTextEdit="1"/>
+          </p:cNvSpPr>
+          <p:nvPr>
+            <p:extLst>
+              <p:ext uri="{386F3935-93C4-4BCD-93E2-E3B085C9AB24}">
+                <p16:designElem xmlns:p16="http://schemas.microsoft.com/office/powerpoint/2015/main" val="1"/>
+              </p:ext>
+            </p:extLst>
+          </p:nvPr>
+        </p:nvSpPr>
+        <p:spPr>
+          <a:xfrm>
+            <a:off x="8042147" y="453643"/>
+            <a:ext cx="3703320" cy="98554"/>
+          </a:xfrm>
+          <a:prstGeom prst="rect">
+            <a:avLst/>
+          </a:prstGeom>
+          <a:solidFill>
+            <a:srgbClr val="969FA7"/>
+          </a:solidFill>
+          <a:ln>
+            <a:noFill/>
+          </a:ln>
+          <a:effectLst/>
+        </p:spPr>
+        <p:style>
+          <a:lnRef idx="1">
+            <a:schemeClr val="accent1"/>
+          </a:lnRef>
+          <a:fillRef idx="3">
+            <a:schemeClr val="accent1"/>
+          </a:fillRef>
+          <a:effectRef idx="2">
+            <a:schemeClr val="accent1"/>
+          </a:effectRef>
+          <a:fontRef idx="minor">
+            <a:schemeClr val="lt1"/>
+          </a:fontRef>
+        </p:style>
+      </p:sp>
+      <p:sp>
+        <p:nvSpPr>
+          <p:cNvPr id="75" name="Rectangle 74">
+            <a:extLst>
+              <a:ext uri="{FF2B5EF4-FFF2-40B4-BE49-F238E27FC236}">
+                <a16:creationId xmlns:a16="http://schemas.microsoft.com/office/drawing/2014/main" id="{F71EF7F1-38BA-471D-8CD4-2A9AE8E35527}"/>
+              </a:ext>
+              <a:ext uri="{C183D7F6-B498-43B3-948B-1728B52AA6E4}">
+                <adec:decorative xmlns:adec="http://schemas.microsoft.com/office/drawing/2017/decorative" val="1"/>
+              </a:ext>
+            </a:extLst>
+          </p:cNvPr>
+          <p:cNvSpPr>
+            <a:spLocks noGrp="1" noRot="1" noChangeAspect="1" noMove="1" noResize="1" noEditPoints="1" noAdjustHandles="1" noChangeArrowheads="1" noChangeShapeType="1" noTextEdit="1"/>
+          </p:cNvSpPr>
+          <p:nvPr>
+            <p:extLst>
+              <p:ext uri="{386F3935-93C4-4BCD-93E2-E3B085C9AB24}">
+                <p16:designElem xmlns:p16="http://schemas.microsoft.com/office/powerpoint/2015/main" val="1"/>
+              </p:ext>
+            </p:extLst>
+          </p:nvPr>
+        </p:nvSpPr>
+        <p:spPr>
+          <a:xfrm>
+            <a:off x="4241830" y="457200"/>
+            <a:ext cx="3703320" cy="91440"/>
+          </a:xfrm>
+          <a:prstGeom prst="rect">
+            <a:avLst/>
+          </a:prstGeom>
+          <a:solidFill>
+            <a:schemeClr val="accent1"/>
+          </a:solidFill>
+          <a:ln>
+            <a:noFill/>
+          </a:ln>
+          <a:effectLst/>
+        </p:spPr>
+        <p:style>
+          <a:lnRef idx="1">
+            <a:schemeClr val="accent1"/>
+          </a:lnRef>
+          <a:fillRef idx="3">
+            <a:schemeClr val="accent1"/>
+          </a:fillRef>
+          <a:effectRef idx="2">
+            <a:schemeClr val="accent1"/>
+          </a:effectRef>
+          <a:fontRef idx="minor">
+            <a:schemeClr val="lt1"/>
+          </a:fontRef>
+        </p:style>
+      </p:sp>
+      <p:sp useBgFill="1">
+        <p:nvSpPr>
+          <p:cNvPr id="77" name="Rectangle 76">
+            <a:extLst>
+              <a:ext uri="{FF2B5EF4-FFF2-40B4-BE49-F238E27FC236}">
+                <a16:creationId xmlns:a16="http://schemas.microsoft.com/office/drawing/2014/main" id="{B8DD2392-397B-48BF-BEFA-EA1FB881CA85}"/>
+              </a:ext>
+              <a:ext uri="{C183D7F6-B498-43B3-948B-1728B52AA6E4}">
+                <adec:decorative xmlns:adec="http://schemas.microsoft.com/office/drawing/2017/decorative" val="1"/>
+              </a:ext>
+            </a:extLst>
+          </p:cNvPr>
+          <p:cNvSpPr>
+            <a:spLocks noGrp="1" noRot="1" noChangeAspect="1" noMove="1" noResize="1" noEditPoints="1" noAdjustHandles="1" noChangeArrowheads="1" noChangeShapeType="1" noTextEdit="1"/>
+          </p:cNvSpPr>
+          <p:nvPr>
+            <p:extLst>
+              <p:ext uri="{386F3935-93C4-4BCD-93E2-E3B085C9AB24}">
+                <p16:designElem xmlns:p16="http://schemas.microsoft.com/office/powerpoint/2015/main" val="1"/>
+              </p:ext>
+            </p:extLst>
+          </p:nvPr>
+        </p:nvSpPr>
+        <p:spPr>
+          <a:xfrm>
+            <a:off x="0" y="0"/>
+            <a:ext cx="12192000" cy="6858000"/>
+          </a:xfrm>
+          <a:prstGeom prst="rect">
+            <a:avLst/>
+          </a:prstGeom>
+          <a:ln>
+            <a:noFill/>
+          </a:ln>
+        </p:spPr>
+        <p:style>
+          <a:lnRef idx="2">
+            <a:schemeClr val="accent1">
+              <a:shade val="50000"/>
+            </a:schemeClr>
+          </a:lnRef>
+          <a:fillRef idx="1">
+            <a:schemeClr val="accent1"/>
+          </a:fillRef>
+          <a:effectRef idx="0">
+            <a:schemeClr val="accent1"/>
+          </a:effectRef>
+          <a:fontRef idx="minor">
+            <a:schemeClr val="lt1"/>
+          </a:fontRef>
+        </p:style>
+        <p:txBody>
+          <a:bodyPr rtlCol="0" anchor="ctr"/>
+          <a:lstStyle/>
+          <a:p>
+            <a:pPr algn="ctr"/>
+            <a:endParaRPr lang="en-US"/>
+          </a:p>
+        </p:txBody>
+      </p:sp>
+      <p:pic>
+        <p:nvPicPr>
+          <p:cNvPr id="1026" name="Picture 2" descr="A close-up of some medicine&#10;&#10;Description automatically generated with low confidence">
+            <a:extLst>
+              <a:ext uri="{FF2B5EF4-FFF2-40B4-BE49-F238E27FC236}">
+                <a16:creationId xmlns:a16="http://schemas.microsoft.com/office/drawing/2014/main" id="{A5E7DD6F-A5A0-49EF-8221-AFF1118E982E}"/>
+              </a:ext>
+            </a:extLst>
+          </p:cNvPr>
+          <p:cNvPicPr>
+            <a:picLocks noGrp="1" noChangeAspect="1" noChangeArrowheads="1"/>
+          </p:cNvPicPr>
+          <p:nvPr>
+            <p:ph sz="half" idx="2"/>
+          </p:nvPr>
+        </p:nvPicPr>
+        <p:blipFill rotWithShape="1">
+          <a:blip r:embed="rId2">
+            <a:alphaModFix amt="40000"/>
+            <a:extLst>
+              <a:ext uri="{28A0092B-C50C-407E-A947-70E740481C1C}">
+                <a14:useLocalDpi xmlns:a14="http://schemas.microsoft.com/office/drawing/2010/main" val="0"/>
+              </a:ext>
+            </a:extLst>
+          </a:blip>
+          <a:srcRect/>
+          <a:stretch/>
+        </p:blipFill>
+        <p:spPr bwMode="auto">
+          <a:xfrm>
+            <a:off x="20" y="10"/>
+            <a:ext cx="12191980" cy="6857990"/>
+          </a:xfrm>
+          <a:prstGeom prst="rect">
+            <a:avLst/>
+          </a:prstGeom>
+          <a:noFill/>
+          <a:extLst>
+            <a:ext uri="{909E8E84-426E-40DD-AFC4-6F175D3DCCD1}">
+              <a14:hiddenFill xmlns:a14="http://schemas.microsoft.com/office/drawing/2010/main">
+                <a:solidFill>
+                  <a:srgbClr val="FFFFFF"/>
+                </a:solidFill>
+              </a14:hiddenFill>
+            </a:ext>
+          </a:extLst>
+        </p:spPr>
+      </p:pic>
+      <p:sp>
+        <p:nvSpPr>
           <p:cNvPr id="2" name="Title 1">
             <a:extLst>
               <a:ext uri="{FF2B5EF4-FFF2-40B4-BE49-F238E27FC236}">
@@ -9877,13 +6230,27 @@
             <p:ph type="title"/>
           </p:nvPr>
         </p:nvSpPr>
-        <p:spPr/>
-        <p:txBody>
-          <a:bodyPr/>
+        <p:spPr>
+          <a:xfrm>
+            <a:off x="1023870" y="702156"/>
+            <a:ext cx="10144260" cy="1013800"/>
+          </a:xfrm>
+        </p:spPr>
+        <p:txBody>
+          <a:bodyPr vert="horz" lIns="91440" tIns="45720" rIns="91440" bIns="45720" rtlCol="0" anchor="b">
+            <a:normAutofit/>
+          </a:bodyPr>
           <a:lstStyle/>
           <a:p>
             <a:r>
-              <a:rPr lang="en-US" dirty="0"/>
+              <a:rPr lang="en-US" b="0" kern="1200" cap="all">
+                <a:solidFill>
+                  <a:schemeClr val="tx1"/>
+                </a:solidFill>
+                <a:latin typeface="+mj-lt"/>
+                <a:ea typeface="+mj-ea"/>
+                <a:cs typeface="+mj-cs"/>
+              </a:rPr>
               <a:t>Our approach</a:t>
             </a:r>
           </a:p>
@@ -9902,15 +6269,104 @@
             <a:spLocks noGrp="1"/>
           </p:cNvSpPr>
           <p:nvPr>
-            <p:ph idx="1"/>
-          </p:nvPr>
-        </p:nvSpPr>
-        <p:spPr/>
-        <p:txBody>
-          <a:bodyPr/>
+            <p:ph sz="half" idx="1"/>
+          </p:nvPr>
+        </p:nvSpPr>
+        <p:spPr>
+          <a:xfrm>
+            <a:off x="965199" y="2180496"/>
+            <a:ext cx="10261602" cy="3678303"/>
+          </a:xfrm>
+        </p:spPr>
+        <p:txBody>
+          <a:bodyPr vert="horz" lIns="91440" tIns="45720" rIns="91440" bIns="45720" rtlCol="0" anchor="ctr">
+            <a:normAutofit/>
+          </a:bodyPr>
           <a:lstStyle/>
           <a:p>
-            <a:endParaRPr lang="en-US"/>
+            <a:r>
+              <a:rPr lang="en-US" sz="2000" dirty="0"/>
+              <a:t>We focus more on opioid prescribers rather than opioid users</a:t>
+            </a:r>
+          </a:p>
+          <a:p>
+            <a:r>
+              <a:rPr lang="en-US" sz="2000" dirty="0"/>
+              <a:t>We use federal datasets to do broad analysis, state-level ones to see how well those predictors fare</a:t>
+            </a:r>
+          </a:p>
+          <a:p>
+            <a:r>
+              <a:rPr lang="en-US" sz="2000" dirty="0"/>
+              <a:t>We are broad in our analysis, focusing on 3 specific concepts:</a:t>
+            </a:r>
+          </a:p>
+          <a:p>
+            <a:pPr lvl="1"/>
+            <a:r>
+              <a:rPr lang="en-US" sz="1800" dirty="0"/>
+              <a:t>Using federal data to build a classifier which can identify doctors who prescribe opioids</a:t>
+            </a:r>
+          </a:p>
+          <a:p>
+            <a:pPr lvl="1"/>
+            <a:r>
+              <a:rPr lang="en-US" sz="1800" dirty="0"/>
+              <a:t>Using that classifier to gain state-level insights, specifically for the state of Connecticut</a:t>
+            </a:r>
+          </a:p>
+          <a:p>
+            <a:pPr lvl="1"/>
+            <a:r>
+              <a:rPr lang="en-US" sz="1800" dirty="0"/>
+              <a:t>Studying the impact of lobbying groups on opioid prescriber rates</a:t>
+            </a:r>
+          </a:p>
+        </p:txBody>
+      </p:sp>
+      <p:sp>
+        <p:nvSpPr>
+          <p:cNvPr id="5" name="TextBox 4">
+            <a:extLst>
+              <a:ext uri="{FF2B5EF4-FFF2-40B4-BE49-F238E27FC236}">
+                <a16:creationId xmlns:a16="http://schemas.microsoft.com/office/drawing/2014/main" id="{90A63090-805C-4B2D-BA71-AF6BACA156BE}"/>
+              </a:ext>
+            </a:extLst>
+          </p:cNvPr>
+          <p:cNvSpPr txBox="1"/>
+          <p:nvPr/>
+        </p:nvSpPr>
+        <p:spPr>
+          <a:xfrm>
+            <a:off x="2835479" y="6467912"/>
+            <a:ext cx="9236279" cy="246221"/>
+          </a:xfrm>
+          <a:prstGeom prst="rect">
+            <a:avLst/>
+          </a:prstGeom>
+          <a:noFill/>
+        </p:spPr>
+        <p:txBody>
+          <a:bodyPr wrap="square" rtlCol="0">
+            <a:spAutoFit/>
+          </a:bodyPr>
+          <a:lstStyle/>
+          <a:p>
+            <a:pPr algn="r"/>
+            <a:r>
+              <a:rPr lang="en-US" sz="1000" dirty="0"/>
+              <a:t>Image source: </a:t>
+            </a:r>
+            <a:r>
+              <a:rPr lang="en-US" sz="1000" dirty="0">
+                <a:hlinkClick r:id="rId3"/>
+              </a:rPr>
+              <a:t>https://irandaily.ir/content/imgcache/file/291108/0/image_650_365.jpg</a:t>
+            </a:r>
+            <a:r>
+              <a:rPr lang="en-US" sz="1000" dirty="0"/>
+              <a:t> </a:t>
+            </a:r>
           </a:p>
         </p:txBody>
       </p:sp>
@@ -9922,7 +6378,7 @@
     </p:extLst>
   </p:cSld>
   <p:clrMapOvr>
-    <a:masterClrMapping/>
+    <a:overrideClrMapping bg1="dk1" tx1="lt1" bg2="dk2" tx2="lt2" accent1="accent1" accent2="accent2" accent3="accent3" accent4="accent4" accent5="accent5" accent6="accent6" hlink="hlink" folHlink="folHlink"/>
   </p:clrMapOvr>
 </p:sld>
 </file>
@@ -9973,7 +6429,7 @@
               <a:rPr lang="en-US" dirty="0">
                 <a:sym typeface="Wingdings" panose="05000000000000000000" pitchFamily="2" charset="2"/>
               </a:rPr>
-              <a:t> Using Federal data to classify doctors who prescribe opioids</a:t>
+              <a:t> Using Federal data to classify doctors who prescribe opioids (Adithya)</a:t>
             </a:r>
             <a:endParaRPr lang="en-US" dirty="0"/>
           </a:p>
@@ -10000,7 +6456,7 @@
           <a:bodyPr/>
           <a:lstStyle/>
           <a:p>
-            <a:endParaRPr lang="en-US"/>
+            <a:endParaRPr lang="en-US" dirty="0"/>
           </a:p>
         </p:txBody>
       </p:sp>
@@ -10063,7 +6519,7 @@
               <a:rPr lang="en-US" dirty="0">
                 <a:sym typeface="Wingdings" panose="05000000000000000000" pitchFamily="2" charset="2"/>
               </a:rPr>
-              <a:t> using the classifier to gain state-level insights</a:t>
+              <a:t> using the classifier to gain state-level insights (Matthew)</a:t>
             </a:r>
             <a:endParaRPr lang="en-US" dirty="0"/>
           </a:p>
@@ -10153,7 +6609,7 @@
               <a:rPr lang="en-US" dirty="0">
                 <a:sym typeface="Wingdings" panose="05000000000000000000" pitchFamily="2" charset="2"/>
               </a:rPr>
-              <a:t> Studying the impact of lobbying groups on opioid prescriber rates </a:t>
+              <a:t> Studying the impact of lobbying groups on opioid prescriber rates  (Yoselyn)</a:t>
             </a:r>
             <a:endParaRPr lang="en-US" dirty="0"/>
           </a:p>
@@ -10559,6 +7015,15 @@
 </file>
 
 <file path=customXml/item2.xml><?xml version="1.0" encoding="utf-8"?>
+<?mso-contentType ?>
+<FormTemplates xmlns="http://schemas.microsoft.com/sharepoint/v3/contenttype/forms">
+  <Display>DocumentLibraryForm</Display>
+  <Edit>DocumentLibraryForm</Edit>
+  <New>DocumentLibraryForm</New>
+</FormTemplates>
+</file>
+
+<file path=customXml/item3.xml><?xml version="1.0" encoding="utf-8"?>
 <ct:contentTypeSchema xmlns:ct="http://schemas.microsoft.com/office/2006/metadata/contentType" xmlns:ma="http://schemas.microsoft.com/office/2006/metadata/properties/metaAttributes" ct:_="" ma:_="" ma:contentTypeName="Document" ma:contentTypeID="0x01010079F111ED35F8CC479449609E8A0923A6" ma:contentTypeVersion="12" ma:contentTypeDescription="Create a new document." ma:contentTypeScope="" ma:versionID="a410dd7f93c95333ffa1b60ed6adedd1">
   <xsd:schema xmlns:xsd="http://www.w3.org/2001/XMLSchema" xmlns:xs="http://www.w3.org/2001/XMLSchema" xmlns:p="http://schemas.microsoft.com/office/2006/metadata/properties" xmlns:ns2="71af3243-3dd4-4a8d-8c0d-dd76da1f02a5" xmlns:ns3="16c05727-aa75-4e4a-9b5f-8a80a1165891" targetNamespace="http://schemas.microsoft.com/office/2006/metadata/properties" ma:root="true" ma:fieldsID="a936d9baba76aa3866493feff160faab" ns2:_="" ns3:_="">
     <xsd:import namespace="71af3243-3dd4-4a8d-8c0d-dd76da1f02a5"/>
@@ -10779,15 +7244,6 @@
 </ct:contentTypeSchema>
 </file>
 
-<file path=customXml/item3.xml><?xml version="1.0" encoding="utf-8"?>
-<?mso-contentType ?>
-<FormTemplates xmlns="http://schemas.microsoft.com/sharepoint/v3/contenttype/forms">
-  <Display>DocumentLibraryForm</Display>
-  <Edit>DocumentLibraryForm</Edit>
-  <New>DocumentLibraryForm</New>
-</FormTemplates>
-</file>
-
 <file path=customXml/itemProps1.xml><?xml version="1.0" encoding="utf-8"?>
 <ds:datastoreItem xmlns:ds="http://schemas.openxmlformats.org/officeDocument/2006/customXml" ds:itemID="{FBD2D995-20F0-4C14-BF62-1248AB4B484D}">
   <ds:schemaRefs>
@@ -10799,6 +7255,14 @@
 </file>
 
 <file path=customXml/itemProps2.xml><?xml version="1.0" encoding="utf-8"?>
+<ds:datastoreItem xmlns:ds="http://schemas.openxmlformats.org/officeDocument/2006/customXml" ds:itemID="{BB3242A4-1E6A-4E02-809C-4A24066EC01D}">
+  <ds:schemaRefs>
+    <ds:schemaRef ds:uri="http://schemas.microsoft.com/sharepoint/v3/contenttype/forms"/>
+  </ds:schemaRefs>
+</ds:datastoreItem>
+</file>
+
+<file path=customXml/itemProps3.xml><?xml version="1.0" encoding="utf-8"?>
 <ds:datastoreItem xmlns:ds="http://schemas.openxmlformats.org/officeDocument/2006/customXml" ds:itemID="{965255AC-12AC-4323-AA35-9BAC798B66BD}">
   <ds:schemaRefs>
     <ds:schemaRef ds:uri="http://schemas.microsoft.com/office/2006/metadata/contentType"/>
@@ -10815,12 +7279,4 @@
     <ds:schemaRef ds:uri="http://schemas.microsoft.com/internal/obd"/>
   </ds:schemaRefs>
 </ds:datastoreItem>
-</file>
-
-<file path=customXml/itemProps3.xml><?xml version="1.0" encoding="utf-8"?>
-<ds:datastoreItem xmlns:ds="http://schemas.openxmlformats.org/officeDocument/2006/customXml" ds:itemID="{BB3242A4-1E6A-4E02-809C-4A24066EC01D}">
-  <ds:schemaRefs>
-    <ds:schemaRef ds:uri="http://schemas.microsoft.com/sharepoint/v3/contenttype/forms"/>
-  </ds:schemaRefs>
-</ds:datastoreItem>
 </file>
</xml_diff>

<commit_message>
Adding slides for Analysis-2
</commit_message>
<xml_diff>
--- a/presentation/opioid_powerpoint.pptx
+++ b/presentation/opioid_powerpoint.pptx
@@ -12,10 +12,14 @@
     <p:sldId id="291" r:id="rId9"/>
     <p:sldId id="294" r:id="rId10"/>
     <p:sldId id="292" r:id="rId11"/>
-    <p:sldId id="293" r:id="rId12"/>
-    <p:sldId id="295" r:id="rId13"/>
-    <p:sldId id="297" r:id="rId14"/>
-    <p:sldId id="298" r:id="rId15"/>
+    <p:sldId id="302" r:id="rId12"/>
+    <p:sldId id="303" r:id="rId13"/>
+    <p:sldId id="304" r:id="rId14"/>
+    <p:sldId id="305" r:id="rId15"/>
+    <p:sldId id="293" r:id="rId16"/>
+    <p:sldId id="295" r:id="rId17"/>
+    <p:sldId id="297" r:id="rId18"/>
+    <p:sldId id="298" r:id="rId19"/>
   </p:sldIdLst>
   <p:sldSz cx="12192000" cy="6858000"/>
   <p:notesSz cx="6858000" cy="9144000"/>
@@ -3652,6 +3656,806 @@
           <p:cNvPr id="2" name="Title 1">
             <a:extLst>
               <a:ext uri="{FF2B5EF4-FFF2-40B4-BE49-F238E27FC236}">
+                <a16:creationId xmlns:a16="http://schemas.microsoft.com/office/drawing/2014/main" id="{938F78B4-CC9D-4D88-B13C-AF9C83440A72}"/>
+              </a:ext>
+            </a:extLst>
+          </p:cNvPr>
+          <p:cNvSpPr>
+            <a:spLocks noGrp="1"/>
+          </p:cNvSpPr>
+          <p:nvPr>
+            <p:ph type="title"/>
+          </p:nvPr>
+        </p:nvSpPr>
+        <p:spPr/>
+        <p:txBody>
+          <a:bodyPr/>
+          <a:lstStyle/>
+          <a:p>
+            <a:pPr algn="ctr"/>
+            <a:r>
+              <a:rPr lang="en-IN" dirty="0"/>
+              <a:t>MODEL EVALUATION - 1</a:t>
+            </a:r>
+          </a:p>
+        </p:txBody>
+      </p:sp>
+      <p:sp>
+        <p:nvSpPr>
+          <p:cNvPr id="3" name="Content Placeholder 2">
+            <a:extLst>
+              <a:ext uri="{FF2B5EF4-FFF2-40B4-BE49-F238E27FC236}">
+                <a16:creationId xmlns:a16="http://schemas.microsoft.com/office/drawing/2014/main" id="{A8F20FF8-F1D6-4D64-95BB-2A9575C1CA25}"/>
+              </a:ext>
+            </a:extLst>
+          </p:cNvPr>
+          <p:cNvSpPr>
+            <a:spLocks noGrp="1"/>
+          </p:cNvSpPr>
+          <p:nvPr>
+            <p:ph sz="half" idx="1"/>
+          </p:nvPr>
+        </p:nvSpPr>
+        <p:spPr/>
+        <p:txBody>
+          <a:bodyPr>
+            <a:normAutofit/>
+          </a:bodyPr>
+          <a:lstStyle/>
+          <a:p>
+            <a:pPr marL="0" indent="0" algn="ctr">
+              <a:buNone/>
+            </a:pPr>
+            <a:r>
+              <a:rPr lang="en-IN" sz="5400" dirty="0"/>
+              <a:t>TRAIN-TEST SPLITS</a:t>
+            </a:r>
+          </a:p>
+        </p:txBody>
+      </p:sp>
+      <p:pic>
+        <p:nvPicPr>
+          <p:cNvPr id="6" name="Content Placeholder 5">
+            <a:extLst>
+              <a:ext uri="{FF2B5EF4-FFF2-40B4-BE49-F238E27FC236}">
+                <a16:creationId xmlns:a16="http://schemas.microsoft.com/office/drawing/2014/main" id="{F86FE90C-2ADA-4C5C-A89A-CD7C261832F0}"/>
+              </a:ext>
+            </a:extLst>
+          </p:cNvPr>
+          <p:cNvPicPr>
+            <a:picLocks noGrp="1" noChangeAspect="1"/>
+          </p:cNvPicPr>
+          <p:nvPr>
+            <p:ph sz="half" idx="2"/>
+          </p:nvPr>
+        </p:nvPicPr>
+        <p:blipFill>
+          <a:blip r:embed="rId2"/>
+          <a:stretch>
+            <a:fillRect/>
+          </a:stretch>
+        </p:blipFill>
+        <p:spPr>
+          <a:xfrm>
+            <a:off x="6828817" y="2228004"/>
+            <a:ext cx="4124528" cy="3900338"/>
+          </a:xfrm>
+        </p:spPr>
+      </p:pic>
+    </p:spTree>
+    <p:extLst>
+      <p:ext uri="{BB962C8B-B14F-4D97-AF65-F5344CB8AC3E}">
+        <p14:creationId xmlns:p14="http://schemas.microsoft.com/office/powerpoint/2010/main" val="2256668540"/>
+      </p:ext>
+    </p:extLst>
+  </p:cSld>
+  <p:clrMapOvr>
+    <a:masterClrMapping/>
+  </p:clrMapOvr>
+</p:sld>
+</file>
+
+<file path=ppt/slides/slide11.xml><?xml version="1.0" encoding="utf-8"?>
+<p:sld xmlns:a="http://schemas.openxmlformats.org/drawingml/2006/main" xmlns:r="http://schemas.openxmlformats.org/officeDocument/2006/relationships" xmlns:p="http://schemas.openxmlformats.org/presentationml/2006/main">
+  <p:cSld>
+    <p:spTree>
+      <p:nvGrpSpPr>
+        <p:cNvPr id="1" name=""/>
+        <p:cNvGrpSpPr/>
+        <p:nvPr/>
+      </p:nvGrpSpPr>
+      <p:grpSpPr>
+        <a:xfrm>
+          <a:off x="0" y="0"/>
+          <a:ext cx="0" cy="0"/>
+          <a:chOff x="0" y="0"/>
+          <a:chExt cx="0" cy="0"/>
+        </a:xfrm>
+      </p:grpSpPr>
+      <p:sp>
+        <p:nvSpPr>
+          <p:cNvPr id="2" name="Title 1">
+            <a:extLst>
+              <a:ext uri="{FF2B5EF4-FFF2-40B4-BE49-F238E27FC236}">
+                <a16:creationId xmlns:a16="http://schemas.microsoft.com/office/drawing/2014/main" id="{938F78B4-CC9D-4D88-B13C-AF9C83440A72}"/>
+              </a:ext>
+            </a:extLst>
+          </p:cNvPr>
+          <p:cNvSpPr>
+            <a:spLocks noGrp="1"/>
+          </p:cNvSpPr>
+          <p:nvPr>
+            <p:ph type="title"/>
+          </p:nvPr>
+        </p:nvSpPr>
+        <p:spPr/>
+        <p:txBody>
+          <a:bodyPr/>
+          <a:lstStyle/>
+          <a:p>
+            <a:pPr algn="ctr"/>
+            <a:r>
+              <a:rPr lang="en-IN" dirty="0"/>
+              <a:t>MODEL EVALUATION - 2</a:t>
+            </a:r>
+          </a:p>
+        </p:txBody>
+      </p:sp>
+      <p:sp>
+        <p:nvSpPr>
+          <p:cNvPr id="3" name="Content Placeholder 2">
+            <a:extLst>
+              <a:ext uri="{FF2B5EF4-FFF2-40B4-BE49-F238E27FC236}">
+                <a16:creationId xmlns:a16="http://schemas.microsoft.com/office/drawing/2014/main" id="{A8F20FF8-F1D6-4D64-95BB-2A9575C1CA25}"/>
+              </a:ext>
+            </a:extLst>
+          </p:cNvPr>
+          <p:cNvSpPr>
+            <a:spLocks noGrp="1"/>
+          </p:cNvSpPr>
+          <p:nvPr>
+            <p:ph sz="half" idx="1"/>
+          </p:nvPr>
+        </p:nvSpPr>
+        <p:spPr/>
+        <p:txBody>
+          <a:bodyPr>
+            <a:normAutofit/>
+          </a:bodyPr>
+          <a:lstStyle/>
+          <a:p>
+            <a:pPr marL="0" indent="0" algn="ctr">
+              <a:buNone/>
+            </a:pPr>
+            <a:r>
+              <a:rPr lang="en-IN" sz="5400" dirty="0"/>
+              <a:t>5 – CROSS VALIDATION</a:t>
+            </a:r>
+          </a:p>
+        </p:txBody>
+      </p:sp>
+      <p:pic>
+        <p:nvPicPr>
+          <p:cNvPr id="6" name="Content Placeholder 5">
+            <a:extLst>
+              <a:ext uri="{FF2B5EF4-FFF2-40B4-BE49-F238E27FC236}">
+                <a16:creationId xmlns:a16="http://schemas.microsoft.com/office/drawing/2014/main" id="{81AAB02E-5580-4BA7-9101-544E775B1560}"/>
+              </a:ext>
+            </a:extLst>
+          </p:cNvPr>
+          <p:cNvPicPr>
+            <a:picLocks noGrp="1" noChangeAspect="1"/>
+          </p:cNvPicPr>
+          <p:nvPr>
+            <p:ph sz="half" idx="2"/>
+          </p:nvPr>
+        </p:nvPicPr>
+        <p:blipFill>
+          <a:blip r:embed="rId2"/>
+          <a:stretch>
+            <a:fillRect/>
+          </a:stretch>
+        </p:blipFill>
+        <p:spPr>
+          <a:xfrm>
+            <a:off x="6877455" y="2228002"/>
+            <a:ext cx="4357992" cy="3900339"/>
+          </a:xfrm>
+        </p:spPr>
+      </p:pic>
+    </p:spTree>
+    <p:extLst>
+      <p:ext uri="{BB962C8B-B14F-4D97-AF65-F5344CB8AC3E}">
+        <p14:creationId xmlns:p14="http://schemas.microsoft.com/office/powerpoint/2010/main" val="3124800891"/>
+      </p:ext>
+    </p:extLst>
+  </p:cSld>
+  <p:clrMapOvr>
+    <a:masterClrMapping/>
+  </p:clrMapOvr>
+</p:sld>
+</file>
+
+<file path=ppt/slides/slide12.xml><?xml version="1.0" encoding="utf-8"?>
+<p:sld xmlns:a="http://schemas.openxmlformats.org/drawingml/2006/main" xmlns:r="http://schemas.openxmlformats.org/officeDocument/2006/relationships" xmlns:p="http://schemas.openxmlformats.org/presentationml/2006/main">
+  <p:cSld>
+    <p:spTree>
+      <p:nvGrpSpPr>
+        <p:cNvPr id="1" name=""/>
+        <p:cNvGrpSpPr/>
+        <p:nvPr/>
+      </p:nvGrpSpPr>
+      <p:grpSpPr>
+        <a:xfrm>
+          <a:off x="0" y="0"/>
+          <a:ext cx="0" cy="0"/>
+          <a:chOff x="0" y="0"/>
+          <a:chExt cx="0" cy="0"/>
+        </a:xfrm>
+      </p:grpSpPr>
+      <p:sp>
+        <p:nvSpPr>
+          <p:cNvPr id="2" name="Title 1">
+            <a:extLst>
+              <a:ext uri="{FF2B5EF4-FFF2-40B4-BE49-F238E27FC236}">
+                <a16:creationId xmlns:a16="http://schemas.microsoft.com/office/drawing/2014/main" id="{E756EE2A-468B-46E5-AF56-8A4E817793B6}"/>
+              </a:ext>
+            </a:extLst>
+          </p:cNvPr>
+          <p:cNvSpPr>
+            <a:spLocks noGrp="1"/>
+          </p:cNvSpPr>
+          <p:nvPr>
+            <p:ph type="title"/>
+          </p:nvPr>
+        </p:nvSpPr>
+        <p:spPr/>
+        <p:txBody>
+          <a:bodyPr/>
+          <a:lstStyle/>
+          <a:p>
+            <a:r>
+              <a:rPr lang="en-US" dirty="0"/>
+              <a:t>Analysis 3 </a:t>
+            </a:r>
+            <a:r>
+              <a:rPr lang="en-US" dirty="0">
+                <a:sym typeface="Wingdings" panose="05000000000000000000" pitchFamily="2" charset="2"/>
+              </a:rPr>
+              <a:t> using the classifier to gain state-level insights (Matthew)</a:t>
+            </a:r>
+            <a:endParaRPr lang="en-US" dirty="0"/>
+          </a:p>
+        </p:txBody>
+      </p:sp>
+      <p:sp>
+        <p:nvSpPr>
+          <p:cNvPr id="3" name="Content Placeholder 2">
+            <a:extLst>
+              <a:ext uri="{FF2B5EF4-FFF2-40B4-BE49-F238E27FC236}">
+                <a16:creationId xmlns:a16="http://schemas.microsoft.com/office/drawing/2014/main" id="{2A2320BB-4110-4F09-97C6-320540E00F22}"/>
+              </a:ext>
+            </a:extLst>
+          </p:cNvPr>
+          <p:cNvSpPr>
+            <a:spLocks noGrp="1"/>
+          </p:cNvSpPr>
+          <p:nvPr>
+            <p:ph idx="1"/>
+          </p:nvPr>
+        </p:nvSpPr>
+        <p:spPr/>
+        <p:txBody>
+          <a:bodyPr/>
+          <a:lstStyle/>
+          <a:p>
+            <a:endParaRPr lang="en-US"/>
+          </a:p>
+        </p:txBody>
+      </p:sp>
+    </p:spTree>
+    <p:extLst>
+      <p:ext uri="{BB962C8B-B14F-4D97-AF65-F5344CB8AC3E}">
+        <p14:creationId xmlns:p14="http://schemas.microsoft.com/office/powerpoint/2010/main" val="3914474401"/>
+      </p:ext>
+    </p:extLst>
+  </p:cSld>
+  <p:clrMapOvr>
+    <a:masterClrMapping/>
+  </p:clrMapOvr>
+</p:sld>
+</file>
+
+<file path=ppt/slides/slide13.xml><?xml version="1.0" encoding="utf-8"?>
+<p:sld xmlns:a="http://schemas.openxmlformats.org/drawingml/2006/main" xmlns:r="http://schemas.openxmlformats.org/officeDocument/2006/relationships" xmlns:p="http://schemas.openxmlformats.org/presentationml/2006/main">
+  <p:cSld>
+    <p:bg>
+      <p:bgPr>
+        <a:solidFill>
+          <a:schemeClr val="bg1"/>
+        </a:solidFill>
+        <a:effectLst/>
+      </p:bgPr>
+    </p:bg>
+    <p:spTree>
+      <p:nvGrpSpPr>
+        <p:cNvPr id="1" name=""/>
+        <p:cNvGrpSpPr/>
+        <p:nvPr/>
+      </p:nvGrpSpPr>
+      <p:grpSpPr>
+        <a:xfrm>
+          <a:off x="0" y="0"/>
+          <a:ext cx="0" cy="0"/>
+          <a:chOff x="0" y="0"/>
+          <a:chExt cx="0" cy="0"/>
+        </a:xfrm>
+      </p:grpSpPr>
+      <p:sp>
+        <p:nvSpPr>
+          <p:cNvPr id="11" name="Rectangle 10">
+            <a:extLst>
+              <a:ext uri="{FF2B5EF4-FFF2-40B4-BE49-F238E27FC236}">
+                <a16:creationId xmlns:a16="http://schemas.microsoft.com/office/drawing/2014/main" id="{E6C8E6EB-4C59-429B-97E4-72A058CFC4FB}"/>
+              </a:ext>
+              <a:ext uri="{C183D7F6-B498-43B3-948B-1728B52AA6E4}">
+                <adec:decorative xmlns:adec="http://schemas.microsoft.com/office/drawing/2017/decorative" val="1"/>
+              </a:ext>
+            </a:extLst>
+          </p:cNvPr>
+          <p:cNvSpPr>
+            <a:spLocks noGrp="1" noRot="1" noChangeAspect="1" noMove="1" noResize="1" noEditPoints="1" noAdjustHandles="1" noChangeArrowheads="1" noChangeShapeType="1" noTextEdit="1"/>
+          </p:cNvSpPr>
+          <p:nvPr>
+            <p:extLst>
+              <p:ext uri="{386F3935-93C4-4BCD-93E2-E3B085C9AB24}">
+                <p16:designElem xmlns:p16="http://schemas.microsoft.com/office/powerpoint/2015/main" val="1"/>
+              </p:ext>
+            </p:extLst>
+          </p:nvPr>
+        </p:nvSpPr>
+        <p:spPr>
+          <a:xfrm>
+            <a:off x="446534" y="457200"/>
+            <a:ext cx="3703320" cy="94997"/>
+          </a:xfrm>
+          <a:prstGeom prst="rect">
+            <a:avLst/>
+          </a:prstGeom>
+          <a:solidFill>
+            <a:srgbClr val="465359"/>
+          </a:solidFill>
+          <a:ln>
+            <a:noFill/>
+          </a:ln>
+          <a:effectLst/>
+        </p:spPr>
+        <p:style>
+          <a:lnRef idx="1">
+            <a:schemeClr val="accent1"/>
+          </a:lnRef>
+          <a:fillRef idx="3">
+            <a:schemeClr val="accent1"/>
+          </a:fillRef>
+          <a:effectRef idx="2">
+            <a:schemeClr val="accent1"/>
+          </a:effectRef>
+          <a:fontRef idx="minor">
+            <a:schemeClr val="lt1"/>
+          </a:fontRef>
+        </p:style>
+      </p:sp>
+      <p:sp>
+        <p:nvSpPr>
+          <p:cNvPr id="13" name="Rectangle 12">
+            <a:extLst>
+              <a:ext uri="{FF2B5EF4-FFF2-40B4-BE49-F238E27FC236}">
+                <a16:creationId xmlns:a16="http://schemas.microsoft.com/office/drawing/2014/main" id="{B5B90362-AFCC-46A9-B41C-A257A8C5B314}"/>
+              </a:ext>
+              <a:ext uri="{C183D7F6-B498-43B3-948B-1728B52AA6E4}">
+                <adec:decorative xmlns:adec="http://schemas.microsoft.com/office/drawing/2017/decorative" val="1"/>
+              </a:ext>
+            </a:extLst>
+          </p:cNvPr>
+          <p:cNvSpPr>
+            <a:spLocks noGrp="1" noRot="1" noChangeAspect="1" noMove="1" noResize="1" noEditPoints="1" noAdjustHandles="1" noChangeArrowheads="1" noChangeShapeType="1" noTextEdit="1"/>
+          </p:cNvSpPr>
+          <p:nvPr>
+            <p:extLst>
+              <p:ext uri="{386F3935-93C4-4BCD-93E2-E3B085C9AB24}">
+                <p16:designElem xmlns:p16="http://schemas.microsoft.com/office/powerpoint/2015/main" val="1"/>
+              </p:ext>
+            </p:extLst>
+          </p:nvPr>
+        </p:nvSpPr>
+        <p:spPr>
+          <a:xfrm>
+            <a:off x="8042147" y="453643"/>
+            <a:ext cx="3703320" cy="98554"/>
+          </a:xfrm>
+          <a:prstGeom prst="rect">
+            <a:avLst/>
+          </a:prstGeom>
+          <a:solidFill>
+            <a:srgbClr val="969FA7"/>
+          </a:solidFill>
+          <a:ln>
+            <a:noFill/>
+          </a:ln>
+          <a:effectLst/>
+        </p:spPr>
+        <p:style>
+          <a:lnRef idx="1">
+            <a:schemeClr val="accent1"/>
+          </a:lnRef>
+          <a:fillRef idx="3">
+            <a:schemeClr val="accent1"/>
+          </a:fillRef>
+          <a:effectRef idx="2">
+            <a:schemeClr val="accent1"/>
+          </a:effectRef>
+          <a:fontRef idx="minor">
+            <a:schemeClr val="lt1"/>
+          </a:fontRef>
+        </p:style>
+      </p:sp>
+      <p:sp>
+        <p:nvSpPr>
+          <p:cNvPr id="15" name="Rectangle 14">
+            <a:extLst>
+              <a:ext uri="{FF2B5EF4-FFF2-40B4-BE49-F238E27FC236}">
+                <a16:creationId xmlns:a16="http://schemas.microsoft.com/office/drawing/2014/main" id="{F71EF7F1-38BA-471D-8CD4-2A9AE8E35527}"/>
+              </a:ext>
+              <a:ext uri="{C183D7F6-B498-43B3-948B-1728B52AA6E4}">
+                <adec:decorative xmlns:adec="http://schemas.microsoft.com/office/drawing/2017/decorative" val="1"/>
+              </a:ext>
+            </a:extLst>
+          </p:cNvPr>
+          <p:cNvSpPr>
+            <a:spLocks noGrp="1" noRot="1" noChangeAspect="1" noMove="1" noResize="1" noEditPoints="1" noAdjustHandles="1" noChangeArrowheads="1" noChangeShapeType="1" noTextEdit="1"/>
+          </p:cNvSpPr>
+          <p:nvPr>
+            <p:extLst>
+              <p:ext uri="{386F3935-93C4-4BCD-93E2-E3B085C9AB24}">
+                <p16:designElem xmlns:p16="http://schemas.microsoft.com/office/powerpoint/2015/main" val="1"/>
+              </p:ext>
+            </p:extLst>
+          </p:nvPr>
+        </p:nvSpPr>
+        <p:spPr>
+          <a:xfrm>
+            <a:off x="4241830" y="457200"/>
+            <a:ext cx="3703320" cy="91440"/>
+          </a:xfrm>
+          <a:prstGeom prst="rect">
+            <a:avLst/>
+          </a:prstGeom>
+          <a:solidFill>
+            <a:schemeClr val="accent1"/>
+          </a:solidFill>
+          <a:ln>
+            <a:noFill/>
+          </a:ln>
+          <a:effectLst/>
+        </p:spPr>
+        <p:style>
+          <a:lnRef idx="1">
+            <a:schemeClr val="accent1"/>
+          </a:lnRef>
+          <a:fillRef idx="3">
+            <a:schemeClr val="accent1"/>
+          </a:fillRef>
+          <a:effectRef idx="2">
+            <a:schemeClr val="accent1"/>
+          </a:effectRef>
+          <a:fontRef idx="minor">
+            <a:schemeClr val="lt1"/>
+          </a:fontRef>
+        </p:style>
+      </p:sp>
+      <p:sp useBgFill="1">
+        <p:nvSpPr>
+          <p:cNvPr id="17" name="Rectangle 16">
+            <a:extLst>
+              <a:ext uri="{FF2B5EF4-FFF2-40B4-BE49-F238E27FC236}">
+                <a16:creationId xmlns:a16="http://schemas.microsoft.com/office/drawing/2014/main" id="{B8DD2392-397B-48BF-BEFA-EA1FB881CA85}"/>
+              </a:ext>
+              <a:ext uri="{C183D7F6-B498-43B3-948B-1728B52AA6E4}">
+                <adec:decorative xmlns:adec="http://schemas.microsoft.com/office/drawing/2017/decorative" val="1"/>
+              </a:ext>
+            </a:extLst>
+          </p:cNvPr>
+          <p:cNvSpPr>
+            <a:spLocks noGrp="1" noRot="1" noChangeAspect="1" noMove="1" noResize="1" noEditPoints="1" noAdjustHandles="1" noChangeArrowheads="1" noChangeShapeType="1" noTextEdit="1"/>
+          </p:cNvSpPr>
+          <p:nvPr>
+            <p:extLst>
+              <p:ext uri="{386F3935-93C4-4BCD-93E2-E3B085C9AB24}">
+                <p16:designElem xmlns:p16="http://schemas.microsoft.com/office/powerpoint/2015/main" val="1"/>
+              </p:ext>
+            </p:extLst>
+          </p:nvPr>
+        </p:nvSpPr>
+        <p:spPr>
+          <a:xfrm>
+            <a:off x="0" y="0"/>
+            <a:ext cx="12192000" cy="6858000"/>
+          </a:xfrm>
+          <a:prstGeom prst="rect">
+            <a:avLst/>
+          </a:prstGeom>
+          <a:ln>
+            <a:noFill/>
+          </a:ln>
+        </p:spPr>
+        <p:style>
+          <a:lnRef idx="2">
+            <a:schemeClr val="accent1">
+              <a:shade val="50000"/>
+            </a:schemeClr>
+          </a:lnRef>
+          <a:fillRef idx="1">
+            <a:schemeClr val="accent1"/>
+          </a:fillRef>
+          <a:effectRef idx="0">
+            <a:schemeClr val="accent1"/>
+          </a:effectRef>
+          <a:fontRef idx="minor">
+            <a:schemeClr val="lt1"/>
+          </a:fontRef>
+        </p:style>
+        <p:txBody>
+          <a:bodyPr rtlCol="0" anchor="ctr"/>
+          <a:lstStyle/>
+          <a:p>
+            <a:pPr algn="ctr"/>
+            <a:endParaRPr lang="en-US"/>
+          </a:p>
+        </p:txBody>
+      </p:sp>
+      <p:pic>
+        <p:nvPicPr>
+          <p:cNvPr id="6" name="Picture 6" descr="Purposeful Prescribing: A Dentist's Role in the Opioid ...">
+            <a:extLst>
+              <a:ext uri="{FF2B5EF4-FFF2-40B4-BE49-F238E27FC236}">
+                <a16:creationId xmlns:a16="http://schemas.microsoft.com/office/drawing/2014/main" id="{8BC36849-7526-4DD6-88E5-888BF3E08626}"/>
+              </a:ext>
+            </a:extLst>
+          </p:cNvPr>
+          <p:cNvPicPr>
+            <a:picLocks noGrp="1" noChangeAspect="1" noChangeArrowheads="1"/>
+          </p:cNvPicPr>
+          <p:nvPr>
+            <p:ph sz="half" idx="2"/>
+          </p:nvPr>
+        </p:nvPicPr>
+        <p:blipFill rotWithShape="1">
+          <a:blip r:embed="rId2">
+            <a:alphaModFix amt="40000"/>
+            <a:extLst>
+              <a:ext uri="{28A0092B-C50C-407E-A947-70E740481C1C}">
+                <a14:useLocalDpi xmlns:a14="http://schemas.microsoft.com/office/drawing/2010/main" val="0"/>
+              </a:ext>
+            </a:extLst>
+          </a:blip>
+          <a:srcRect l="1111" r="-1" b="-1"/>
+          <a:stretch/>
+        </p:blipFill>
+        <p:spPr bwMode="auto">
+          <a:xfrm>
+            <a:off x="20" y="10"/>
+            <a:ext cx="12191980" cy="6857990"/>
+          </a:xfrm>
+          <a:prstGeom prst="rect">
+            <a:avLst/>
+          </a:prstGeom>
+          <a:noFill/>
+          <a:extLst>
+            <a:ext uri="{909E8E84-426E-40DD-AFC4-6F175D3DCCD1}">
+              <a14:hiddenFill xmlns:a14="http://schemas.microsoft.com/office/drawing/2010/main">
+                <a:solidFill>
+                  <a:srgbClr val="FFFFFF"/>
+                </a:solidFill>
+              </a14:hiddenFill>
+            </a:ext>
+          </a:extLst>
+        </p:spPr>
+      </p:pic>
+      <p:sp>
+        <p:nvSpPr>
+          <p:cNvPr id="2" name="Title 1">
+            <a:extLst>
+              <a:ext uri="{FF2B5EF4-FFF2-40B4-BE49-F238E27FC236}">
+                <a16:creationId xmlns:a16="http://schemas.microsoft.com/office/drawing/2014/main" id="{6BDA7A33-0C3D-41C3-A2AF-8148C7750349}"/>
+              </a:ext>
+            </a:extLst>
+          </p:cNvPr>
+          <p:cNvSpPr>
+            <a:spLocks noGrp="1"/>
+          </p:cNvSpPr>
+          <p:nvPr>
+            <p:ph type="title"/>
+          </p:nvPr>
+        </p:nvSpPr>
+        <p:spPr>
+          <a:xfrm>
+            <a:off x="1023870" y="702156"/>
+            <a:ext cx="10144260" cy="1013800"/>
+          </a:xfrm>
+        </p:spPr>
+        <p:txBody>
+          <a:bodyPr vert="horz" lIns="91440" tIns="45720" rIns="91440" bIns="45720" rtlCol="0" anchor="b">
+            <a:normAutofit/>
+          </a:bodyPr>
+          <a:lstStyle/>
+          <a:p>
+            <a:r>
+              <a:rPr lang="en-US" b="0" kern="1200" cap="all">
+                <a:solidFill>
+                  <a:schemeClr val="tx1"/>
+                </a:solidFill>
+                <a:latin typeface="+mj-lt"/>
+                <a:ea typeface="+mj-ea"/>
+                <a:cs typeface="+mj-cs"/>
+              </a:rPr>
+              <a:t>Overall findings</a:t>
+            </a:r>
+          </a:p>
+        </p:txBody>
+      </p:sp>
+      <p:sp>
+        <p:nvSpPr>
+          <p:cNvPr id="3" name="Content Placeholder 2">
+            <a:extLst>
+              <a:ext uri="{FF2B5EF4-FFF2-40B4-BE49-F238E27FC236}">
+                <a16:creationId xmlns:a16="http://schemas.microsoft.com/office/drawing/2014/main" id="{9B1154EE-81A4-472C-A7E4-B3DCE812CA7B}"/>
+              </a:ext>
+            </a:extLst>
+          </p:cNvPr>
+          <p:cNvSpPr>
+            <a:spLocks noGrp="1"/>
+          </p:cNvSpPr>
+          <p:nvPr>
+            <p:ph sz="half" idx="1"/>
+          </p:nvPr>
+        </p:nvSpPr>
+        <p:spPr>
+          <a:xfrm>
+            <a:off x="965199" y="2180496"/>
+            <a:ext cx="10261602" cy="3678303"/>
+          </a:xfrm>
+        </p:spPr>
+        <p:txBody>
+          <a:bodyPr vert="horz" lIns="91440" tIns="45720" rIns="91440" bIns="45720" rtlCol="0" anchor="ctr">
+            <a:normAutofit/>
+          </a:bodyPr>
+          <a:lstStyle/>
+          <a:p>
+            <a:r>
+              <a:rPr lang="en-US" dirty="0"/>
+              <a:t>Lobbying didn’t have as much of an impact as we thought on opioid distribution rates (no significant correlation)</a:t>
+            </a:r>
+          </a:p>
+          <a:p>
+            <a:pPr lvl="1"/>
+            <a:r>
+              <a:rPr lang="en-US" dirty="0"/>
+              <a:t>Regression didn’t work best for this analysis</a:t>
+            </a:r>
+          </a:p>
+          <a:p>
+            <a:r>
+              <a:rPr lang="en-US" dirty="0"/>
+              <a:t>For the prediction model, gradient boosting classifier worked best, followed by KNN</a:t>
+            </a:r>
+          </a:p>
+          <a:p>
+            <a:r>
+              <a:rPr lang="en-US" dirty="0"/>
+              <a:t>For the state model, gradient boosting also worked well, but we worry about potentially overfitting – with more time we would like to verify with other data, </a:t>
+            </a:r>
+            <a:r>
+              <a:rPr lang="en-US" dirty="0" err="1"/>
+              <a:t>etc</a:t>
+            </a:r>
+            <a:endParaRPr lang="en-US" dirty="0"/>
+          </a:p>
+          <a:p>
+            <a:pPr lvl="1"/>
+            <a:r>
+              <a:rPr lang="en-US" dirty="0"/>
+              <a:t>Model efficacy is hard to determine without other state data</a:t>
+            </a:r>
+          </a:p>
+          <a:p>
+            <a:r>
+              <a:rPr lang="en-US" dirty="0"/>
+              <a:t>We think our contributions can certainly lead to future work around this topic</a:t>
+            </a:r>
+          </a:p>
+        </p:txBody>
+      </p:sp>
+      <p:sp>
+        <p:nvSpPr>
+          <p:cNvPr id="43" name="TextBox 42">
+            <a:extLst>
+              <a:ext uri="{FF2B5EF4-FFF2-40B4-BE49-F238E27FC236}">
+                <a16:creationId xmlns:a16="http://schemas.microsoft.com/office/drawing/2014/main" id="{025B5C5B-A305-4650-A302-440E13A14BB8}"/>
+              </a:ext>
+            </a:extLst>
+          </p:cNvPr>
+          <p:cNvSpPr txBox="1"/>
+          <p:nvPr/>
+        </p:nvSpPr>
+        <p:spPr>
+          <a:xfrm>
+            <a:off x="2835479" y="6467912"/>
+            <a:ext cx="9236279" cy="246221"/>
+          </a:xfrm>
+          <a:prstGeom prst="rect">
+            <a:avLst/>
+          </a:prstGeom>
+          <a:noFill/>
+        </p:spPr>
+        <p:txBody>
+          <a:bodyPr wrap="square" rtlCol="0">
+            <a:spAutoFit/>
+          </a:bodyPr>
+          <a:lstStyle/>
+          <a:p>
+            <a:pPr algn="r"/>
+            <a:r>
+              <a:rPr lang="en-US" sz="1000" dirty="0"/>
+              <a:t>Image source: </a:t>
+            </a:r>
+            <a:r>
+              <a:rPr lang="en-US" sz="1000" dirty="0">
+                <a:hlinkClick r:id="rId3"/>
+              </a:rPr>
+              <a:t>https://i1.wp.com/www.studentdoctor.net/wp-content/uploads/2018/07/20180726_opioid_783935359.png?resize=800%2C445&amp;ssl=1</a:t>
+            </a:r>
+            <a:r>
+              <a:rPr lang="en-US" sz="1000" dirty="0"/>
+              <a:t> </a:t>
+            </a:r>
+          </a:p>
+        </p:txBody>
+      </p:sp>
+    </p:spTree>
+    <p:extLst>
+      <p:ext uri="{BB962C8B-B14F-4D97-AF65-F5344CB8AC3E}">
+        <p14:creationId xmlns:p14="http://schemas.microsoft.com/office/powerpoint/2010/main" val="1728474963"/>
+      </p:ext>
+    </p:extLst>
+  </p:cSld>
+  <p:clrMapOvr>
+    <a:overrideClrMapping bg1="dk1" tx1="lt1" bg2="dk2" tx2="lt2" accent1="accent1" accent2="accent2" accent3="accent3" accent4="accent4" accent5="accent5" accent6="accent6" hlink="hlink" folHlink="folHlink"/>
+  </p:clrMapOvr>
+</p:sld>
+</file>
+
+<file path=ppt/slides/slide14.xml><?xml version="1.0" encoding="utf-8"?>
+<p:sld xmlns:a="http://schemas.openxmlformats.org/drawingml/2006/main" xmlns:r="http://schemas.openxmlformats.org/officeDocument/2006/relationships" xmlns:p="http://schemas.openxmlformats.org/presentationml/2006/main">
+  <p:cSld>
+    <p:spTree>
+      <p:nvGrpSpPr>
+        <p:cNvPr id="1" name=""/>
+        <p:cNvGrpSpPr/>
+        <p:nvPr/>
+      </p:nvGrpSpPr>
+      <p:grpSpPr>
+        <a:xfrm>
+          <a:off x="0" y="0"/>
+          <a:ext cx="0" cy="0"/>
+          <a:chOff x="0" y="0"/>
+          <a:chExt cx="0" cy="0"/>
+        </a:xfrm>
+      </p:grpSpPr>
+      <p:sp>
+        <p:nvSpPr>
+          <p:cNvPr id="2" name="Title 1">
+            <a:extLst>
+              <a:ext uri="{FF2B5EF4-FFF2-40B4-BE49-F238E27FC236}">
                 <a16:creationId xmlns:a16="http://schemas.microsoft.com/office/drawing/2014/main" id="{DF699B60-68C0-4659-8C6B-6A8EACDE70BA}"/>
               </a:ext>
             </a:extLst>
@@ -3884,7 +4688,7 @@
 </p:sld>
 </file>
 
-<file path=ppt/slides/slide11.xml><?xml version="1.0" encoding="utf-8"?>
+<file path=ppt/slides/slide15.xml><?xml version="1.0" encoding="utf-8"?>
 <p:sld xmlns:a="http://schemas.openxmlformats.org/drawingml/2006/main" xmlns:r="http://schemas.openxmlformats.org/officeDocument/2006/relationships" xmlns:p="http://schemas.openxmlformats.org/presentationml/2006/main">
   <p:cSld>
     <p:spTree>
@@ -6392,6 +7196,20 @@
 <file path=ppt/slides/slide7.xml><?xml version="1.0" encoding="utf-8"?>
 <p:sld xmlns:a="http://schemas.openxmlformats.org/drawingml/2006/main" xmlns:r="http://schemas.openxmlformats.org/officeDocument/2006/relationships" xmlns:p="http://schemas.openxmlformats.org/presentationml/2006/main">
   <p:cSld>
+    <p:bg>
+      <p:bgPr>
+        <a:blipFill dpi="0" rotWithShape="1">
+          <a:blip r:embed="rId2">
+            <a:lum/>
+          </a:blip>
+          <a:srcRect/>
+          <a:stretch>
+            <a:fillRect l="-6000" r="-6000"/>
+          </a:stretch>
+        </a:blipFill>
+        <a:effectLst/>
+      </p:bgPr>
+    </p:bg>
     <p:spTree>
       <p:nvGrpSpPr>
         <p:cNvPr id="1" name=""/>
@@ -6459,10 +7277,42 @@
         </p:nvSpPr>
         <p:spPr/>
         <p:txBody>
-          <a:bodyPr/>
+          <a:bodyPr>
+            <a:normAutofit/>
+          </a:bodyPr>
           <a:lstStyle/>
           <a:p>
-            <a:endParaRPr lang="en-US" dirty="0"/>
+            <a:r>
+              <a:rPr lang="en-US" sz="2000" dirty="0">
+                <a:solidFill>
+                  <a:schemeClr val="tx1"/>
+                </a:solidFill>
+              </a:rPr>
+              <a:t>Unnecessary prescriptions potentially play a significant role in the increase in opioid overdoses.</a:t>
+            </a:r>
+          </a:p>
+          <a:p>
+            <a:r>
+              <a:rPr lang="en-US" sz="2000" dirty="0">
+                <a:solidFill>
+                  <a:schemeClr val="tx1"/>
+                </a:solidFill>
+              </a:rPr>
+              <a:t>Patients who do not truly need the medication run the risk of becoming addicted themselves</a:t>
+            </a:r>
+          </a:p>
+          <a:p>
+            <a:r>
+              <a:rPr lang="en-US" sz="2000" dirty="0">
+                <a:solidFill>
+                  <a:schemeClr val="tx1"/>
+                </a:solidFill>
+              </a:rPr>
+              <a:t>Find the likelihood that a provider would prescribe an opioid.</a:t>
+            </a:r>
+          </a:p>
+          <a:p>
+            <a:endParaRPr lang="en-US" sz="1800" dirty="0"/>
           </a:p>
         </p:txBody>
       </p:sp>
@@ -6482,6 +7332,14 @@
 <file path=ppt/slides/slide8.xml><?xml version="1.0" encoding="utf-8"?>
 <p:sld xmlns:a="http://schemas.openxmlformats.org/drawingml/2006/main" xmlns:r="http://schemas.openxmlformats.org/officeDocument/2006/relationships" xmlns:p="http://schemas.openxmlformats.org/presentationml/2006/main">
   <p:cSld>
+    <p:bg>
+      <p:bgPr>
+        <a:solidFill>
+          <a:schemeClr val="bg1"/>
+        </a:solidFill>
+        <a:effectLst/>
+      </p:bgPr>
+    </p:bg>
     <p:spTree>
       <p:nvGrpSpPr>
         <p:cNvPr id="1" name=""/>
@@ -6498,10 +7356,261 @@
       </p:grpSpPr>
       <p:sp>
         <p:nvSpPr>
+          <p:cNvPr id="3076" name="Rectangle 70">
+            <a:extLst>
+              <a:ext uri="{FF2B5EF4-FFF2-40B4-BE49-F238E27FC236}">
+                <a16:creationId xmlns:a16="http://schemas.microsoft.com/office/drawing/2014/main" id="{E6C8E6EB-4C59-429B-97E4-72A058CFC4FB}"/>
+              </a:ext>
+              <a:ext uri="{C183D7F6-B498-43B3-948B-1728B52AA6E4}">
+                <adec:decorative xmlns:adec="http://schemas.microsoft.com/office/drawing/2017/decorative" val="1"/>
+              </a:ext>
+            </a:extLst>
+          </p:cNvPr>
+          <p:cNvSpPr>
+            <a:spLocks noGrp="1" noRot="1" noChangeAspect="1" noMove="1" noResize="1" noEditPoints="1" noAdjustHandles="1" noChangeArrowheads="1" noChangeShapeType="1" noTextEdit="1"/>
+          </p:cNvSpPr>
+          <p:nvPr>
+            <p:extLst>
+              <p:ext uri="{386F3935-93C4-4BCD-93E2-E3B085C9AB24}">
+                <p16:designElem xmlns:p16="http://schemas.microsoft.com/office/powerpoint/2015/main" val="1"/>
+              </p:ext>
+            </p:extLst>
+          </p:nvPr>
+        </p:nvSpPr>
+        <p:spPr>
+          <a:xfrm>
+            <a:off x="446534" y="457200"/>
+            <a:ext cx="3703320" cy="94997"/>
+          </a:xfrm>
+          <a:prstGeom prst="rect">
+            <a:avLst/>
+          </a:prstGeom>
+          <a:solidFill>
+            <a:srgbClr val="465359"/>
+          </a:solidFill>
+          <a:ln>
+            <a:noFill/>
+          </a:ln>
+          <a:effectLst/>
+        </p:spPr>
+        <p:style>
+          <a:lnRef idx="1">
+            <a:schemeClr val="accent1"/>
+          </a:lnRef>
+          <a:fillRef idx="3">
+            <a:schemeClr val="accent1"/>
+          </a:fillRef>
+          <a:effectRef idx="2">
+            <a:schemeClr val="accent1"/>
+          </a:effectRef>
+          <a:fontRef idx="minor">
+            <a:schemeClr val="lt1"/>
+          </a:fontRef>
+        </p:style>
+      </p:sp>
+      <p:sp>
+        <p:nvSpPr>
+          <p:cNvPr id="3077" name="Rectangle 72">
+            <a:extLst>
+              <a:ext uri="{FF2B5EF4-FFF2-40B4-BE49-F238E27FC236}">
+                <a16:creationId xmlns:a16="http://schemas.microsoft.com/office/drawing/2014/main" id="{B5B90362-AFCC-46A9-B41C-A257A8C5B314}"/>
+              </a:ext>
+              <a:ext uri="{C183D7F6-B498-43B3-948B-1728B52AA6E4}">
+                <adec:decorative xmlns:adec="http://schemas.microsoft.com/office/drawing/2017/decorative" val="1"/>
+              </a:ext>
+            </a:extLst>
+          </p:cNvPr>
+          <p:cNvSpPr>
+            <a:spLocks noGrp="1" noRot="1" noChangeAspect="1" noMove="1" noResize="1" noEditPoints="1" noAdjustHandles="1" noChangeArrowheads="1" noChangeShapeType="1" noTextEdit="1"/>
+          </p:cNvSpPr>
+          <p:nvPr>
+            <p:extLst>
+              <p:ext uri="{386F3935-93C4-4BCD-93E2-E3B085C9AB24}">
+                <p16:designElem xmlns:p16="http://schemas.microsoft.com/office/powerpoint/2015/main" val="1"/>
+              </p:ext>
+            </p:extLst>
+          </p:nvPr>
+        </p:nvSpPr>
+        <p:spPr>
+          <a:xfrm>
+            <a:off x="8042147" y="453643"/>
+            <a:ext cx="3703320" cy="98554"/>
+          </a:xfrm>
+          <a:prstGeom prst="rect">
+            <a:avLst/>
+          </a:prstGeom>
+          <a:solidFill>
+            <a:srgbClr val="969FA7"/>
+          </a:solidFill>
+          <a:ln>
+            <a:noFill/>
+          </a:ln>
+          <a:effectLst/>
+        </p:spPr>
+        <p:style>
+          <a:lnRef idx="1">
+            <a:schemeClr val="accent1"/>
+          </a:lnRef>
+          <a:fillRef idx="3">
+            <a:schemeClr val="accent1"/>
+          </a:fillRef>
+          <a:effectRef idx="2">
+            <a:schemeClr val="accent1"/>
+          </a:effectRef>
+          <a:fontRef idx="minor">
+            <a:schemeClr val="lt1"/>
+          </a:fontRef>
+        </p:style>
+      </p:sp>
+      <p:sp>
+        <p:nvSpPr>
+          <p:cNvPr id="3078" name="Rectangle 74">
+            <a:extLst>
+              <a:ext uri="{FF2B5EF4-FFF2-40B4-BE49-F238E27FC236}">
+                <a16:creationId xmlns:a16="http://schemas.microsoft.com/office/drawing/2014/main" id="{F71EF7F1-38BA-471D-8CD4-2A9AE8E35527}"/>
+              </a:ext>
+              <a:ext uri="{C183D7F6-B498-43B3-948B-1728B52AA6E4}">
+                <adec:decorative xmlns:adec="http://schemas.microsoft.com/office/drawing/2017/decorative" val="1"/>
+              </a:ext>
+            </a:extLst>
+          </p:cNvPr>
+          <p:cNvSpPr>
+            <a:spLocks noGrp="1" noRot="1" noChangeAspect="1" noMove="1" noResize="1" noEditPoints="1" noAdjustHandles="1" noChangeArrowheads="1" noChangeShapeType="1" noTextEdit="1"/>
+          </p:cNvSpPr>
+          <p:nvPr>
+            <p:extLst>
+              <p:ext uri="{386F3935-93C4-4BCD-93E2-E3B085C9AB24}">
+                <p16:designElem xmlns:p16="http://schemas.microsoft.com/office/powerpoint/2015/main" val="1"/>
+              </p:ext>
+            </p:extLst>
+          </p:nvPr>
+        </p:nvSpPr>
+        <p:spPr>
+          <a:xfrm>
+            <a:off x="4241830" y="457200"/>
+            <a:ext cx="3703320" cy="91440"/>
+          </a:xfrm>
+          <a:prstGeom prst="rect">
+            <a:avLst/>
+          </a:prstGeom>
+          <a:solidFill>
+            <a:schemeClr val="accent1"/>
+          </a:solidFill>
+          <a:ln>
+            <a:noFill/>
+          </a:ln>
+          <a:effectLst/>
+        </p:spPr>
+        <p:style>
+          <a:lnRef idx="1">
+            <a:schemeClr val="accent1"/>
+          </a:lnRef>
+          <a:fillRef idx="3">
+            <a:schemeClr val="accent1"/>
+          </a:fillRef>
+          <a:effectRef idx="2">
+            <a:schemeClr val="accent1"/>
+          </a:effectRef>
+          <a:fontRef idx="minor">
+            <a:schemeClr val="lt1"/>
+          </a:fontRef>
+        </p:style>
+      </p:sp>
+      <p:sp useBgFill="1">
+        <p:nvSpPr>
+          <p:cNvPr id="3079" name="Rectangle 76">
+            <a:extLst>
+              <a:ext uri="{FF2B5EF4-FFF2-40B4-BE49-F238E27FC236}">
+                <a16:creationId xmlns:a16="http://schemas.microsoft.com/office/drawing/2014/main" id="{504BED40-EAF7-4E55-AFF7-2CD840EBD3AA}"/>
+              </a:ext>
+              <a:ext uri="{C183D7F6-B498-43B3-948B-1728B52AA6E4}">
+                <adec:decorative xmlns:adec="http://schemas.microsoft.com/office/drawing/2017/decorative" val="1"/>
+              </a:ext>
+            </a:extLst>
+          </p:cNvPr>
+          <p:cNvSpPr>
+            <a:spLocks noGrp="1" noRot="1" noChangeAspect="1" noMove="1" noResize="1" noEditPoints="1" noAdjustHandles="1" noChangeArrowheads="1" noChangeShapeType="1" noTextEdit="1"/>
+          </p:cNvSpPr>
+          <p:nvPr>
+            <p:extLst>
+              <p:ext uri="{386F3935-93C4-4BCD-93E2-E3B085C9AB24}">
+                <p16:designElem xmlns:p16="http://schemas.microsoft.com/office/powerpoint/2015/main" val="1"/>
+              </p:ext>
+            </p:extLst>
+          </p:nvPr>
+        </p:nvSpPr>
+        <p:spPr>
+          <a:xfrm>
+            <a:off x="0" y="0"/>
+            <a:ext cx="12192000" cy="6858000"/>
+          </a:xfrm>
+          <a:prstGeom prst="rect">
+            <a:avLst/>
+          </a:prstGeom>
+          <a:ln>
+            <a:noFill/>
+          </a:ln>
+        </p:spPr>
+        <p:style>
+          <a:lnRef idx="2">
+            <a:schemeClr val="accent1">
+              <a:shade val="50000"/>
+            </a:schemeClr>
+          </a:lnRef>
+          <a:fillRef idx="1">
+            <a:schemeClr val="accent1"/>
+          </a:fillRef>
+          <a:effectRef idx="0">
+            <a:schemeClr val="accent1"/>
+          </a:effectRef>
+          <a:fontRef idx="minor">
+            <a:schemeClr val="lt1"/>
+          </a:fontRef>
+        </p:style>
+        <p:txBody>
+          <a:bodyPr rtlCol="0" anchor="ctr"/>
+          <a:lstStyle/>
+          <a:p>
+            <a:pPr marL="0" marR="0" lvl="0" indent="0" algn="ctr" defTabSz="914400" rtl="0" eaLnBrk="1" fontAlgn="auto" latinLnBrk="0" hangingPunct="1">
+              <a:lnSpc>
+                <a:spcPct val="100000"/>
+              </a:lnSpc>
+              <a:spcBef>
+                <a:spcPts val="0"/>
+              </a:spcBef>
+              <a:spcAft>
+                <a:spcPts val="0"/>
+              </a:spcAft>
+              <a:buClrTx/>
+              <a:buSzTx/>
+              <a:buFontTx/>
+              <a:buNone/>
+              <a:tabLst/>
+              <a:defRPr/>
+            </a:pPr>
+            <a:endParaRPr kumimoji="0" lang="en-US" sz="1800" b="0" i="0" u="none" strike="noStrike" kern="1200" cap="none" spc="0" normalizeH="0" baseline="0" noProof="0">
+              <a:ln>
+                <a:noFill/>
+              </a:ln>
+              <a:solidFill>
+                <a:prstClr val="white"/>
+              </a:solidFill>
+              <a:effectLst/>
+              <a:uLnTx/>
+              <a:uFillTx/>
+              <a:latin typeface="Franklin Gothic Book" panose="020B0502020104020203"/>
+              <a:ea typeface="+mn-ea"/>
+              <a:cs typeface="+mn-cs"/>
+            </a:endParaRPr>
+          </a:p>
+        </p:txBody>
+      </p:sp>
+      <p:sp>
+        <p:nvSpPr>
           <p:cNvPr id="2" name="Title 1">
             <a:extLst>
               <a:ext uri="{FF2B5EF4-FFF2-40B4-BE49-F238E27FC236}">
-                <a16:creationId xmlns:a16="http://schemas.microsoft.com/office/drawing/2014/main" id="{E756EE2A-468B-46E5-AF56-8A4E817793B6}"/>
+                <a16:creationId xmlns:a16="http://schemas.microsoft.com/office/drawing/2014/main" id="{85940B36-0E12-4886-AAAD-2B05B75F1025}"/>
               </a:ext>
             </a:extLst>
           </p:cNvPr>
@@ -6512,54 +7621,191 @@
             <p:ph type="title"/>
           </p:nvPr>
         </p:nvSpPr>
-        <p:spPr/>
-        <p:txBody>
-          <a:bodyPr/>
+        <p:spPr>
+          <a:xfrm>
+            <a:off x="581193" y="702156"/>
+            <a:ext cx="6309003" cy="1013800"/>
+          </a:xfrm>
+        </p:spPr>
+        <p:txBody>
+          <a:bodyPr vert="horz" lIns="91440" tIns="45720" rIns="91440" bIns="45720" rtlCol="0" anchor="b">
+            <a:normAutofit/>
+          </a:bodyPr>
           <a:lstStyle/>
           <a:p>
             <a:r>
               <a:rPr lang="en-US" dirty="0"/>
-              <a:t>Analysis 3 </a:t>
-            </a:r>
+              <a:t>Understanding the Dataset</a:t>
+            </a:r>
+            <a:endParaRPr lang="en-US" b="0" kern="1200" cap="all" dirty="0">
+              <a:solidFill>
+                <a:schemeClr val="tx2"/>
+              </a:solidFill>
+              <a:latin typeface="+mj-lt"/>
+              <a:ea typeface="+mj-ea"/>
+              <a:cs typeface="+mj-cs"/>
+            </a:endParaRPr>
+          </a:p>
+        </p:txBody>
+      </p:sp>
+      <p:sp>
+        <p:nvSpPr>
+          <p:cNvPr id="79" name="Rectangle 78">
+            <a:extLst>
+              <a:ext uri="{FF2B5EF4-FFF2-40B4-BE49-F238E27FC236}">
+                <a16:creationId xmlns:a16="http://schemas.microsoft.com/office/drawing/2014/main" id="{F367CCF1-BB1E-41CF-8499-94A870C33EFA}"/>
+              </a:ext>
+              <a:ext uri="{C183D7F6-B498-43B3-948B-1728B52AA6E4}">
+                <adec:decorative xmlns:adec="http://schemas.microsoft.com/office/drawing/2017/decorative" val="1"/>
+              </a:ext>
+            </a:extLst>
+          </p:cNvPr>
+          <p:cNvSpPr>
+            <a:spLocks noGrp="1" noRot="1" noChangeAspect="1" noMove="1" noResize="1" noEditPoints="1" noAdjustHandles="1" noChangeArrowheads="1" noChangeShapeType="1" noTextEdit="1"/>
+          </p:cNvSpPr>
+          <p:nvPr>
+            <p:extLst>
+              <p:ext uri="{386F3935-93C4-4BCD-93E2-E3B085C9AB24}">
+                <p16:designElem xmlns:p16="http://schemas.microsoft.com/office/powerpoint/2015/main" val="1"/>
+              </p:ext>
+            </p:extLst>
+          </p:nvPr>
+        </p:nvSpPr>
+        <p:spPr>
+          <a:xfrm>
+            <a:off x="446534" y="457200"/>
+            <a:ext cx="6675120" cy="94997"/>
+          </a:xfrm>
+          <a:prstGeom prst="rect">
+            <a:avLst/>
+          </a:prstGeom>
+          <a:solidFill>
+            <a:schemeClr val="accent1"/>
+          </a:solidFill>
+          <a:ln>
+            <a:noFill/>
+          </a:ln>
+          <a:effectLst/>
+        </p:spPr>
+        <p:style>
+          <a:lnRef idx="1">
+            <a:schemeClr val="accent1"/>
+          </a:lnRef>
+          <a:fillRef idx="3">
+            <a:schemeClr val="accent1"/>
+          </a:fillRef>
+          <a:effectRef idx="2">
+            <a:schemeClr val="accent1"/>
+          </a:effectRef>
+          <a:fontRef idx="minor">
+            <a:schemeClr val="lt1"/>
+          </a:fontRef>
+        </p:style>
+      </p:sp>
+      <p:sp>
+        <p:nvSpPr>
+          <p:cNvPr id="3" name="Content Placeholder 2">
+            <a:extLst>
+              <a:ext uri="{FF2B5EF4-FFF2-40B4-BE49-F238E27FC236}">
+                <a16:creationId xmlns:a16="http://schemas.microsoft.com/office/drawing/2014/main" id="{84D8C1C2-13D3-43D0-BF28-477405EA9B64}"/>
+              </a:ext>
+            </a:extLst>
+          </p:cNvPr>
+          <p:cNvSpPr>
+            <a:spLocks noGrp="1"/>
+          </p:cNvSpPr>
+          <p:nvPr>
+            <p:ph sz="half" idx="1"/>
+          </p:nvPr>
+        </p:nvSpPr>
+        <p:spPr>
+          <a:xfrm>
+            <a:off x="581194" y="1896533"/>
+            <a:ext cx="6309003" cy="3962266"/>
+          </a:xfrm>
+        </p:spPr>
+        <p:txBody>
+          <a:bodyPr vert="horz" lIns="91440" tIns="45720" rIns="91440" bIns="45720" rtlCol="0" anchor="ctr">
+            <a:normAutofit/>
+          </a:bodyPr>
+          <a:lstStyle/>
+          <a:p>
+            <a:r>
+              <a:rPr lang="en-US" dirty="0"/>
+              <a:t>S</a:t>
+            </a:r>
+            <a:r>
+              <a:rPr lang="en-US" b="0" i="0" dirty="0">
+                <a:effectLst/>
+              </a:rPr>
+              <a:t>ummaries of prescription records for 250 common opioid and non-opioid drugs written by 25,000 unique licensed medical professionals.</a:t>
+            </a:r>
+          </a:p>
+          <a:p>
             <a:r>
               <a:rPr lang="en-US" dirty="0">
-                <a:sym typeface="Wingdings" panose="05000000000000000000" pitchFamily="2" charset="2"/>
+                <a:solidFill>
+                  <a:schemeClr val="tx2"/>
+                </a:solidFill>
               </a:rPr>
-              <a:t> using the classifier to gain state-level insights (Matthew)</a:t>
-            </a:r>
-            <a:endParaRPr lang="en-US" dirty="0"/>
-          </a:p>
-        </p:txBody>
-      </p:sp>
-      <p:sp>
-        <p:nvSpPr>
-          <p:cNvPr id="3" name="Content Placeholder 2">
-            <a:extLst>
-              <a:ext uri="{FF2B5EF4-FFF2-40B4-BE49-F238E27FC236}">
-                <a16:creationId xmlns:a16="http://schemas.microsoft.com/office/drawing/2014/main" id="{2A2320BB-4110-4F09-97C6-320540E00F22}"/>
-              </a:ext>
-            </a:extLst>
-          </p:cNvPr>
-          <p:cNvSpPr>
-            <a:spLocks noGrp="1"/>
-          </p:cNvSpPr>
-          <p:nvPr>
-            <p:ph idx="1"/>
-          </p:nvPr>
-        </p:nvSpPr>
-        <p:spPr/>
-        <p:txBody>
-          <a:bodyPr/>
-          <a:lstStyle/>
-          <a:p>
-            <a:endParaRPr lang="en-US"/>
-          </a:p>
-        </p:txBody>
-      </p:sp>
+              <a:t>Features – Gender, State, Credentials, Specialty, Opioid-Prescriber Label &amp; List of Drugs. </a:t>
+            </a:r>
+          </a:p>
+        </p:txBody>
+      </p:sp>
+      <p:pic>
+        <p:nvPicPr>
+          <p:cNvPr id="1028" name="Picture 4" descr="Opioid Distribution And Sales Data Release Sheds Light On Opioid  Prescribing : Shots - Health News : NPR">
+            <a:extLst>
+              <a:ext uri="{FF2B5EF4-FFF2-40B4-BE49-F238E27FC236}">
+                <a16:creationId xmlns:a16="http://schemas.microsoft.com/office/drawing/2014/main" id="{DBE1B409-FF83-496F-8387-D3E6250C7F49}"/>
+              </a:ext>
+            </a:extLst>
+          </p:cNvPr>
+          <p:cNvPicPr>
+            <a:picLocks noGrp="1" noChangeAspect="1" noChangeArrowheads="1"/>
+          </p:cNvPicPr>
+          <p:nvPr>
+            <p:ph sz="half" idx="2"/>
+          </p:nvPr>
+        </p:nvPicPr>
+        <p:blipFill>
+          <a:blip r:embed="rId2">
+            <a:extLst>
+              <a:ext uri="{28A0092B-C50C-407E-A947-70E740481C1C}">
+                <a14:useLocalDpi xmlns:a14="http://schemas.microsoft.com/office/drawing/2010/main" val="0"/>
+              </a:ext>
+            </a:extLst>
+          </a:blip>
+          <a:srcRect/>
+          <a:stretch>
+            <a:fillRect/>
+          </a:stretch>
+        </p:blipFill>
+        <p:spPr bwMode="auto">
+          <a:xfrm>
+            <a:off x="7121654" y="0"/>
+            <a:ext cx="5070346" cy="6857999"/>
+          </a:xfrm>
+          <a:prstGeom prst="rect">
+            <a:avLst/>
+          </a:prstGeom>
+          <a:noFill/>
+          <a:extLst>
+            <a:ext uri="{909E8E84-426E-40DD-AFC4-6F175D3DCCD1}">
+              <a14:hiddenFill xmlns:a14="http://schemas.microsoft.com/office/drawing/2010/main">
+                <a:solidFill>
+                  <a:srgbClr val="FFFFFF"/>
+                </a:solidFill>
+              </a14:hiddenFill>
+            </a:ext>
+          </a:extLst>
+        </p:spPr>
+      </p:pic>
     </p:spTree>
     <p:extLst>
       <p:ext uri="{BB962C8B-B14F-4D97-AF65-F5344CB8AC3E}">
-        <p14:creationId xmlns:p14="http://schemas.microsoft.com/office/powerpoint/2010/main" val="3914474401"/>
+        <p14:creationId xmlns:p14="http://schemas.microsoft.com/office/powerpoint/2010/main" val="2623746664"/>
       </p:ext>
     </p:extLst>
   </p:cSld>
@@ -6596,7 +7842,7 @@
       </p:grpSpPr>
       <p:sp>
         <p:nvSpPr>
-          <p:cNvPr id="11" name="Rectangle 10">
+          <p:cNvPr id="3076" name="Rectangle 70">
             <a:extLst>
               <a:ext uri="{FF2B5EF4-FFF2-40B4-BE49-F238E27FC236}">
                 <a16:creationId xmlns:a16="http://schemas.microsoft.com/office/drawing/2014/main" id="{E6C8E6EB-4C59-429B-97E4-72A058CFC4FB}"/>
@@ -6650,7 +7896,7 @@
       </p:sp>
       <p:sp>
         <p:nvSpPr>
-          <p:cNvPr id="13" name="Rectangle 12">
+          <p:cNvPr id="3077" name="Rectangle 72">
             <a:extLst>
               <a:ext uri="{FF2B5EF4-FFF2-40B4-BE49-F238E27FC236}">
                 <a16:creationId xmlns:a16="http://schemas.microsoft.com/office/drawing/2014/main" id="{B5B90362-AFCC-46A9-B41C-A257A8C5B314}"/>
@@ -6704,7 +7950,7 @@
       </p:sp>
       <p:sp>
         <p:nvSpPr>
-          <p:cNvPr id="15" name="Rectangle 14">
+          <p:cNvPr id="3078" name="Rectangle 74">
             <a:extLst>
               <a:ext uri="{FF2B5EF4-FFF2-40B4-BE49-F238E27FC236}">
                 <a16:creationId xmlns:a16="http://schemas.microsoft.com/office/drawing/2014/main" id="{F71EF7F1-38BA-471D-8CD4-2A9AE8E35527}"/>
@@ -6758,10 +8004,10 @@
       </p:sp>
       <p:sp useBgFill="1">
         <p:nvSpPr>
-          <p:cNvPr id="17" name="Rectangle 16">
-            <a:extLst>
-              <a:ext uri="{FF2B5EF4-FFF2-40B4-BE49-F238E27FC236}">
-                <a16:creationId xmlns:a16="http://schemas.microsoft.com/office/drawing/2014/main" id="{B8DD2392-397B-48BF-BEFA-EA1FB881CA85}"/>
+          <p:cNvPr id="3079" name="Rectangle 76">
+            <a:extLst>
+              <a:ext uri="{FF2B5EF4-FFF2-40B4-BE49-F238E27FC236}">
+                <a16:creationId xmlns:a16="http://schemas.microsoft.com/office/drawing/2014/main" id="{504BED40-EAF7-4E55-AFF7-2CD840EBD3AA}"/>
               </a:ext>
               <a:ext uri="{C183D7F6-B498-43B3-948B-1728B52AA6E4}">
                 <adec:decorative xmlns:adec="http://schemas.microsoft.com/office/drawing/2017/decorative" val="1"/>
@@ -6811,65 +8057,46 @@
           <a:bodyPr rtlCol="0" anchor="ctr"/>
           <a:lstStyle/>
           <a:p>
-            <a:pPr algn="ctr"/>
-            <a:endParaRPr lang="en-US"/>
-          </a:p>
-        </p:txBody>
-      </p:sp>
-      <p:pic>
-        <p:nvPicPr>
-          <p:cNvPr id="6" name="Picture 6" descr="Purposeful Prescribing: A Dentist's Role in the Opioid ...">
-            <a:extLst>
-              <a:ext uri="{FF2B5EF4-FFF2-40B4-BE49-F238E27FC236}">
-                <a16:creationId xmlns:a16="http://schemas.microsoft.com/office/drawing/2014/main" id="{8BC36849-7526-4DD6-88E5-888BF3E08626}"/>
-              </a:ext>
-            </a:extLst>
-          </p:cNvPr>
-          <p:cNvPicPr>
-            <a:picLocks noGrp="1" noChangeAspect="1" noChangeArrowheads="1"/>
-          </p:cNvPicPr>
-          <p:nvPr>
-            <p:ph sz="half" idx="2"/>
-          </p:nvPr>
-        </p:nvPicPr>
-        <p:blipFill rotWithShape="1">
-          <a:blip r:embed="rId2">
-            <a:alphaModFix amt="40000"/>
-            <a:extLst>
-              <a:ext uri="{28A0092B-C50C-407E-A947-70E740481C1C}">
-                <a14:useLocalDpi xmlns:a14="http://schemas.microsoft.com/office/drawing/2010/main" val="0"/>
-              </a:ext>
-            </a:extLst>
-          </a:blip>
-          <a:srcRect l="1111" r="-1" b="-1"/>
-          <a:stretch/>
-        </p:blipFill>
-        <p:spPr bwMode="auto">
-          <a:xfrm>
-            <a:off x="20" y="10"/>
-            <a:ext cx="12191980" cy="6857990"/>
-          </a:xfrm>
-          <a:prstGeom prst="rect">
-            <a:avLst/>
-          </a:prstGeom>
-          <a:noFill/>
-          <a:extLst>
-            <a:ext uri="{909E8E84-426E-40DD-AFC4-6F175D3DCCD1}">
-              <a14:hiddenFill xmlns:a14="http://schemas.microsoft.com/office/drawing/2010/main">
-                <a:solidFill>
-                  <a:srgbClr val="FFFFFF"/>
-                </a:solidFill>
-              </a14:hiddenFill>
-            </a:ext>
-          </a:extLst>
-        </p:spPr>
-      </p:pic>
+            <a:pPr marL="0" marR="0" lvl="0" indent="0" algn="ctr" defTabSz="914400" rtl="0" eaLnBrk="1" fontAlgn="auto" latinLnBrk="0" hangingPunct="1">
+              <a:lnSpc>
+                <a:spcPct val="100000"/>
+              </a:lnSpc>
+              <a:spcBef>
+                <a:spcPts val="0"/>
+              </a:spcBef>
+              <a:spcAft>
+                <a:spcPts val="0"/>
+              </a:spcAft>
+              <a:buClrTx/>
+              <a:buSzTx/>
+              <a:buFontTx/>
+              <a:buNone/>
+              <a:tabLst/>
+              <a:defRPr/>
+            </a:pPr>
+            <a:endParaRPr kumimoji="0" lang="en-US" sz="1800" b="0" i="0" u="none" strike="noStrike" kern="1200" cap="none" spc="0" normalizeH="0" baseline="0" noProof="0">
+              <a:ln>
+                <a:noFill/>
+              </a:ln>
+              <a:solidFill>
+                <a:prstClr val="white"/>
+              </a:solidFill>
+              <a:effectLst/>
+              <a:uLnTx/>
+              <a:uFillTx/>
+              <a:latin typeface="Franklin Gothic Book" panose="020B0502020104020203"/>
+              <a:ea typeface="+mn-ea"/>
+              <a:cs typeface="+mn-cs"/>
+            </a:endParaRPr>
+          </a:p>
+        </p:txBody>
+      </p:sp>
       <p:sp>
         <p:nvSpPr>
           <p:cNvPr id="2" name="Title 1">
             <a:extLst>
               <a:ext uri="{FF2B5EF4-FFF2-40B4-BE49-F238E27FC236}">
-                <a16:creationId xmlns:a16="http://schemas.microsoft.com/office/drawing/2014/main" id="{6BDA7A33-0C3D-41C3-A2AF-8148C7750349}"/>
+                <a16:creationId xmlns:a16="http://schemas.microsoft.com/office/drawing/2014/main" id="{85940B36-0E12-4886-AAAD-2B05B75F1025}"/>
               </a:ext>
             </a:extLst>
           </p:cNvPr>
@@ -6882,8 +8109,8 @@
         </p:nvSpPr>
         <p:spPr>
           <a:xfrm>
-            <a:off x="1023870" y="702156"/>
-            <a:ext cx="10144260" cy="1013800"/>
+            <a:off x="581193" y="702156"/>
+            <a:ext cx="6476555" cy="1013800"/>
           </a:xfrm>
         </p:spPr>
         <p:txBody>
@@ -6893,25 +8120,79 @@
           <a:lstStyle/>
           <a:p>
             <a:r>
-              <a:rPr lang="en-US" b="0" kern="1200" cap="all">
-                <a:solidFill>
-                  <a:schemeClr val="tx1"/>
+              <a:rPr lang="en-US" b="0" kern="1200" cap="all" dirty="0">
+                <a:solidFill>
+                  <a:schemeClr val="tx2"/>
                 </a:solidFill>
                 <a:latin typeface="+mj-lt"/>
                 <a:ea typeface="+mj-ea"/>
                 <a:cs typeface="+mj-cs"/>
               </a:rPr>
-              <a:t>Overall findings</a:t>
-            </a:r>
-          </a:p>
-        </p:txBody>
+              <a:t>Prediction – classification algorithms</a:t>
+            </a:r>
+          </a:p>
+        </p:txBody>
+      </p:sp>
+      <p:sp>
+        <p:nvSpPr>
+          <p:cNvPr id="79" name="Rectangle 78">
+            <a:extLst>
+              <a:ext uri="{FF2B5EF4-FFF2-40B4-BE49-F238E27FC236}">
+                <a16:creationId xmlns:a16="http://schemas.microsoft.com/office/drawing/2014/main" id="{F367CCF1-BB1E-41CF-8499-94A870C33EFA}"/>
+              </a:ext>
+              <a:ext uri="{C183D7F6-B498-43B3-948B-1728B52AA6E4}">
+                <adec:decorative xmlns:adec="http://schemas.microsoft.com/office/drawing/2017/decorative" val="1"/>
+              </a:ext>
+            </a:extLst>
+          </p:cNvPr>
+          <p:cNvSpPr>
+            <a:spLocks noGrp="1" noRot="1" noChangeAspect="1" noMove="1" noResize="1" noEditPoints="1" noAdjustHandles="1" noChangeArrowheads="1" noChangeShapeType="1" noTextEdit="1"/>
+          </p:cNvSpPr>
+          <p:nvPr>
+            <p:extLst>
+              <p:ext uri="{386F3935-93C4-4BCD-93E2-E3B085C9AB24}">
+                <p16:designElem xmlns:p16="http://schemas.microsoft.com/office/powerpoint/2015/main" val="1"/>
+              </p:ext>
+            </p:extLst>
+          </p:nvPr>
+        </p:nvSpPr>
+        <p:spPr>
+          <a:xfrm>
+            <a:off x="446534" y="457200"/>
+            <a:ext cx="6675120" cy="94997"/>
+          </a:xfrm>
+          <a:prstGeom prst="rect">
+            <a:avLst/>
+          </a:prstGeom>
+          <a:solidFill>
+            <a:schemeClr val="accent1"/>
+          </a:solidFill>
+          <a:ln>
+            <a:noFill/>
+          </a:ln>
+          <a:effectLst/>
+        </p:spPr>
+        <p:style>
+          <a:lnRef idx="1">
+            <a:schemeClr val="accent1"/>
+          </a:lnRef>
+          <a:fillRef idx="3">
+            <a:schemeClr val="accent1"/>
+          </a:fillRef>
+          <a:effectRef idx="2">
+            <a:schemeClr val="accent1"/>
+          </a:effectRef>
+          <a:fontRef idx="minor">
+            <a:schemeClr val="lt1"/>
+          </a:fontRef>
+        </p:style>
       </p:sp>
       <p:sp>
         <p:nvSpPr>
           <p:cNvPr id="3" name="Content Placeholder 2">
             <a:extLst>
               <a:ext uri="{FF2B5EF4-FFF2-40B4-BE49-F238E27FC236}">
-                <a16:creationId xmlns:a16="http://schemas.microsoft.com/office/drawing/2014/main" id="{9B1154EE-81A4-472C-A7E4-B3DCE812CA7B}"/>
+                <a16:creationId xmlns:a16="http://schemas.microsoft.com/office/drawing/2014/main" id="{84D8C1C2-13D3-43D0-BF28-477405EA9B64}"/>
               </a:ext>
             </a:extLst>
           </p:cNvPr>
@@ -6924,8 +8205,8 @@
         </p:nvSpPr>
         <p:spPr>
           <a:xfrm>
-            <a:off x="965199" y="2180496"/>
-            <a:ext cx="10261602" cy="3678303"/>
+            <a:off x="581194" y="1896533"/>
+            <a:ext cx="6309003" cy="3962266"/>
           </a:xfrm>
         </p:spPr>
         <p:txBody>
@@ -6935,104 +8216,98 @@
           <a:lstStyle/>
           <a:p>
             <a:r>
-              <a:rPr lang="en-US" dirty="0"/>
-              <a:t>Lobbying didn’t have as much of an impact as we thought on opioid distribution rates (no significant correlation)</a:t>
-            </a:r>
-          </a:p>
-          <a:p>
-            <a:pPr lvl="1"/>
-            <a:r>
-              <a:rPr lang="en-US" dirty="0"/>
-              <a:t>Regression didn’t work best for this analysis</a:t>
-            </a:r>
-          </a:p>
-          <a:p>
-            <a:r>
-              <a:rPr lang="en-US" dirty="0"/>
-              <a:t>For the prediction model, gradient boosting classifier worked best, followed by KNN</a:t>
-            </a:r>
-          </a:p>
-          <a:p>
-            <a:r>
-              <a:rPr lang="en-US" dirty="0"/>
-              <a:t>For the state model, gradient boosting also worked well, but we worry about potentially overfitting – with more time we would like to verify with other data, </a:t>
-            </a:r>
-            <a:r>
-              <a:rPr lang="en-US" dirty="0" err="1"/>
-              <a:t>etc</a:t>
-            </a:r>
-            <a:endParaRPr lang="en-US" dirty="0"/>
-          </a:p>
-          <a:p>
-            <a:pPr lvl="1"/>
-            <a:r>
-              <a:rPr lang="en-US" dirty="0"/>
-              <a:t>Model efficacy is hard to determine without other state data</a:t>
-            </a:r>
-          </a:p>
-          <a:p>
-            <a:r>
-              <a:rPr lang="en-US" dirty="0"/>
-              <a:t>We think our contributions can certainly lead to future work around this topic</a:t>
-            </a:r>
-          </a:p>
-        </p:txBody>
-      </p:sp>
-      <p:sp>
-        <p:nvSpPr>
-          <p:cNvPr id="43" name="TextBox 42">
-            <a:extLst>
-              <a:ext uri="{FF2B5EF4-FFF2-40B4-BE49-F238E27FC236}">
-                <a16:creationId xmlns:a16="http://schemas.microsoft.com/office/drawing/2014/main" id="{025B5C5B-A305-4650-A302-440E13A14BB8}"/>
-              </a:ext>
-            </a:extLst>
-          </p:cNvPr>
-          <p:cNvSpPr txBox="1"/>
-          <p:nvPr/>
-        </p:nvSpPr>
-        <p:spPr>
-          <a:xfrm>
-            <a:off x="2835479" y="6467912"/>
-            <a:ext cx="9236279" cy="246221"/>
-          </a:xfrm>
-          <a:prstGeom prst="rect">
-            <a:avLst/>
-          </a:prstGeom>
-          <a:noFill/>
-        </p:spPr>
-        <p:txBody>
-          <a:bodyPr wrap="square" rtlCol="0">
-            <a:spAutoFit/>
-          </a:bodyPr>
-          <a:lstStyle/>
-          <a:p>
-            <a:pPr algn="r"/>
-            <a:r>
-              <a:rPr lang="en-US" sz="1000" dirty="0"/>
-              <a:t>Image source: </a:t>
-            </a:r>
-            <a:r>
-              <a:rPr lang="en-US" sz="1000" dirty="0">
-                <a:hlinkClick r:id="rId3"/>
+              <a:rPr lang="en-US" sz="2000" b="0" i="0" dirty="0">
+                <a:effectLst/>
+                <a:latin typeface="Inter"/>
               </a:rPr>
-              <a:t>https://i1.wp.com/www.studentdoctor.net/wp-content/uploads/2018/07/20180726_opioid_783935359.png?resize=800%2C445&amp;ssl=1</a:t>
-            </a:r>
-            <a:r>
-              <a:rPr lang="en-US" sz="1000" dirty="0"/>
-              <a:t> </a:t>
-            </a:r>
-          </a:p>
-        </p:txBody>
-      </p:sp>
+              <a:t>The P</a:t>
+            </a:r>
+            <a:r>
+              <a:rPr lang="en-US" sz="2000" dirty="0">
+                <a:latin typeface="Inter"/>
+              </a:rPr>
+              <a:t>erceptron</a:t>
+            </a:r>
+          </a:p>
+          <a:p>
+            <a:r>
+              <a:rPr lang="en-US" sz="2000" b="0" i="0" dirty="0">
+                <a:effectLst/>
+                <a:latin typeface="Inter"/>
+              </a:rPr>
+              <a:t>K-Nearest Neighbors</a:t>
+            </a:r>
+          </a:p>
+          <a:p>
+            <a:r>
+              <a:rPr lang="en-US" sz="2000" dirty="0">
+                <a:solidFill>
+                  <a:schemeClr val="tx2"/>
+                </a:solidFill>
+              </a:rPr>
+              <a:t>Gaussian Naïve Bayes</a:t>
+            </a:r>
+          </a:p>
+          <a:p>
+            <a:r>
+              <a:rPr lang="en-US" sz="2000" dirty="0">
+                <a:solidFill>
+                  <a:schemeClr val="tx2"/>
+                </a:solidFill>
+              </a:rPr>
+              <a:t>Decision Trees</a:t>
+            </a:r>
+          </a:p>
+          <a:p>
+            <a:r>
+              <a:rPr lang="en-US" sz="2000" dirty="0">
+                <a:solidFill>
+                  <a:schemeClr val="tx2"/>
+                </a:solidFill>
+              </a:rPr>
+              <a:t>Gradient Boosting </a:t>
+            </a:r>
+          </a:p>
+        </p:txBody>
+      </p:sp>
+      <p:pic>
+        <p:nvPicPr>
+          <p:cNvPr id="7" name="Content Placeholder 6">
+            <a:extLst>
+              <a:ext uri="{FF2B5EF4-FFF2-40B4-BE49-F238E27FC236}">
+                <a16:creationId xmlns:a16="http://schemas.microsoft.com/office/drawing/2014/main" id="{173ADF57-D3AC-4016-B1FB-8422200DFAA0}"/>
+              </a:ext>
+            </a:extLst>
+          </p:cNvPr>
+          <p:cNvPicPr>
+            <a:picLocks noGrp="1" noChangeAspect="1"/>
+          </p:cNvPicPr>
+          <p:nvPr>
+            <p:ph sz="half" idx="2"/>
+          </p:nvPr>
+        </p:nvPicPr>
+        <p:blipFill>
+          <a:blip r:embed="rId2"/>
+          <a:stretch>
+            <a:fillRect/>
+          </a:stretch>
+        </p:blipFill>
+        <p:spPr>
+          <a:xfrm>
+            <a:off x="7121654" y="0"/>
+            <a:ext cx="5070346" cy="6858000"/>
+          </a:xfrm>
+        </p:spPr>
+      </p:pic>
     </p:spTree>
     <p:extLst>
       <p:ext uri="{BB962C8B-B14F-4D97-AF65-F5344CB8AC3E}">
-        <p14:creationId xmlns:p14="http://schemas.microsoft.com/office/powerpoint/2010/main" val="1728474963"/>
+        <p14:creationId xmlns:p14="http://schemas.microsoft.com/office/powerpoint/2010/main" val="4259430929"/>
       </p:ext>
     </p:extLst>
   </p:cSld>
   <p:clrMapOvr>
-    <a:overrideClrMapping bg1="dk1" tx1="lt1" bg2="dk2" tx2="lt2" accent1="accent1" accent2="accent2" accent3="accent3" accent4="accent4" accent5="accent5" accent6="accent6" hlink="hlink" folHlink="folHlink"/>
+    <a:masterClrMapping/>
   </p:clrMapOvr>
 </p:sld>
 </file>
@@ -7316,6 +8591,15 @@
 </file>
 
 <file path=customXml/item2.xml><?xml version="1.0" encoding="utf-8"?>
+<?mso-contentType ?>
+<FormTemplates xmlns="http://schemas.microsoft.com/sharepoint/v3/contenttype/forms">
+  <Display>DocumentLibraryForm</Display>
+  <Edit>DocumentLibraryForm</Edit>
+  <New>DocumentLibraryForm</New>
+</FormTemplates>
+</file>
+
+<file path=customXml/item3.xml><?xml version="1.0" encoding="utf-8"?>
 <ct:contentTypeSchema xmlns:ct="http://schemas.microsoft.com/office/2006/metadata/contentType" xmlns:ma="http://schemas.microsoft.com/office/2006/metadata/properties/metaAttributes" ct:_="" ma:_="" ma:contentTypeName="Document" ma:contentTypeID="0x01010079F111ED35F8CC479449609E8A0923A6" ma:contentTypeVersion="12" ma:contentTypeDescription="Create a new document." ma:contentTypeScope="" ma:versionID="a410dd7f93c95333ffa1b60ed6adedd1">
   <xsd:schema xmlns:xsd="http://www.w3.org/2001/XMLSchema" xmlns:xs="http://www.w3.org/2001/XMLSchema" xmlns:p="http://schemas.microsoft.com/office/2006/metadata/properties" xmlns:ns2="71af3243-3dd4-4a8d-8c0d-dd76da1f02a5" xmlns:ns3="16c05727-aa75-4e4a-9b5f-8a80a1165891" targetNamespace="http://schemas.microsoft.com/office/2006/metadata/properties" ma:root="true" ma:fieldsID="a936d9baba76aa3866493feff160faab" ns2:_="" ns3:_="">
     <xsd:import namespace="71af3243-3dd4-4a8d-8c0d-dd76da1f02a5"/>
@@ -7536,15 +8820,6 @@
 </ct:contentTypeSchema>
 </file>
 
-<file path=customXml/item3.xml><?xml version="1.0" encoding="utf-8"?>
-<?mso-contentType ?>
-<FormTemplates xmlns="http://schemas.microsoft.com/sharepoint/v3/contenttype/forms">
-  <Display>DocumentLibraryForm</Display>
-  <Edit>DocumentLibraryForm</Edit>
-  <New>DocumentLibraryForm</New>
-</FormTemplates>
-</file>
-
 <file path=customXml/itemProps1.xml><?xml version="1.0" encoding="utf-8"?>
 <ds:datastoreItem xmlns:ds="http://schemas.openxmlformats.org/officeDocument/2006/customXml" ds:itemID="{FBD2D995-20F0-4C14-BF62-1248AB4B484D}">
   <ds:schemaRefs>
@@ -7556,6 +8831,14 @@
 </file>
 
 <file path=customXml/itemProps2.xml><?xml version="1.0" encoding="utf-8"?>
+<ds:datastoreItem xmlns:ds="http://schemas.openxmlformats.org/officeDocument/2006/customXml" ds:itemID="{BB3242A4-1E6A-4E02-809C-4A24066EC01D}">
+  <ds:schemaRefs>
+    <ds:schemaRef ds:uri="http://schemas.microsoft.com/sharepoint/v3/contenttype/forms"/>
+  </ds:schemaRefs>
+</ds:datastoreItem>
+</file>
+
+<file path=customXml/itemProps3.xml><?xml version="1.0" encoding="utf-8"?>
 <ds:datastoreItem xmlns:ds="http://schemas.openxmlformats.org/officeDocument/2006/customXml" ds:itemID="{965255AC-12AC-4323-AA35-9BAC798B66BD}">
   <ds:schemaRefs>
     <ds:schemaRef ds:uri="http://schemas.microsoft.com/office/2006/metadata/contentType"/>
@@ -7572,12 +8855,4 @@
     <ds:schemaRef ds:uri="http://schemas.microsoft.com/internal/obd"/>
   </ds:schemaRefs>
 </ds:datastoreItem>
-</file>
-
-<file path=customXml/itemProps3.xml><?xml version="1.0" encoding="utf-8"?>
-<ds:datastoreItem xmlns:ds="http://schemas.openxmlformats.org/officeDocument/2006/customXml" ds:itemID="{BB3242A4-1E6A-4E02-809C-4A24066EC01D}">
-  <ds:schemaRefs>
-    <ds:schemaRef ds:uri="http://schemas.microsoft.com/sharepoint/v3/contenttype/forms"/>
-  </ds:schemaRefs>
-</ds:datastoreItem>
 </file>
</xml_diff>